<commit_message>
Updating script to include ETL logic
</commit_message>
<xml_diff>
--- a/Custom Lineage Creator.pptx
+++ b/Custom Lineage Creator.pptx
@@ -7,17 +7,21 @@
     <p:sldMasterId id="2147483794" r:id="rId5"/>
   </p:sldMasterIdLst>
   <p:notesMasterIdLst>
-    <p:notesMasterId r:id="rId11"/>
+    <p:notesMasterId r:id="rId15"/>
   </p:notesMasterIdLst>
   <p:handoutMasterIdLst>
-    <p:handoutMasterId r:id="rId12"/>
+    <p:handoutMasterId r:id="rId16"/>
   </p:handoutMasterIdLst>
   <p:sldIdLst>
     <p:sldId id="288" r:id="rId6"/>
     <p:sldId id="2134807745" r:id="rId7"/>
     <p:sldId id="2134807791" r:id="rId8"/>
-    <p:sldId id="2134807766" r:id="rId9"/>
-    <p:sldId id="267" r:id="rId10"/>
+    <p:sldId id="2134807792" r:id="rId9"/>
+    <p:sldId id="2134807793" r:id="rId10"/>
+    <p:sldId id="2134807794" r:id="rId11"/>
+    <p:sldId id="2134807795" r:id="rId12"/>
+    <p:sldId id="2134807766" r:id="rId13"/>
+    <p:sldId id="267" r:id="rId14"/>
   </p:sldIdLst>
   <p:sldSz cx="12188825" cy="6858000"/>
   <p:notesSz cx="7104063" cy="10234613"/>
@@ -124,6 +128,10 @@
             <p14:sldId id="288"/>
             <p14:sldId id="2134807745"/>
             <p14:sldId id="2134807791"/>
+            <p14:sldId id="2134807792"/>
+            <p14:sldId id="2134807793"/>
+            <p14:sldId id="2134807794"/>
+            <p14:sldId id="2134807795"/>
             <p14:sldId id="2134807766"/>
           </p14:sldIdLst>
         </p14:section>
@@ -319,7 +327,7 @@
           <a:p>
             <a:fld id="{A8AF0ABA-1503-4581-BC5A-AF3D56D7DD45}" type="datetimeFigureOut">
               <a:rPr lang="en-US" smtClean="0"/>
-              <a:t>10/22/2024</a:t>
+              <a:t>11/4/2024</a:t>
             </a:fld>
             <a:endParaRPr lang="en-US"/>
           </a:p>
@@ -484,7 +492,7 @@
           <a:p>
             <a:fld id="{78186FDC-CD1E-4E7E-B1CD-1CBCCD519E8C}" type="datetimeFigureOut">
               <a:rPr lang="en-US" smtClean="0"/>
-              <a:t>10/22/2024</a:t>
+              <a:t>11/4/2024</a:t>
             </a:fld>
             <a:endParaRPr lang="en-US"/>
           </a:p>
@@ -920,7 +928,7 @@
           <a:p>
             <a:fld id="{4B9A8B04-59C6-4476-9B83-8806D24CC38B}" type="slidenum">
               <a:rPr lang="en-US" smtClean="0"/>
-              <a:t>5</a:t>
+              <a:t>9</a:t>
             </a:fld>
             <a:endParaRPr lang="en-US"/>
           </a:p>
@@ -23451,6 +23459,2375 @@
       </p:grpSpPr>
       <p:sp>
         <p:nvSpPr>
+          <p:cNvPr id="29" name="Title 4">
+            <a:extLst>
+              <a:ext uri="{FF2B5EF4-FFF2-40B4-BE49-F238E27FC236}">
+                <a16:creationId xmlns:a16="http://schemas.microsoft.com/office/drawing/2014/main" id="{CDAFCEB1-84B4-1FF8-6C77-B719D71B0E80}"/>
+              </a:ext>
+            </a:extLst>
+          </p:cNvPr>
+          <p:cNvSpPr>
+            <a:spLocks noGrp="1"/>
+          </p:cNvSpPr>
+          <p:nvPr>
+            <p:ph type="title"/>
+          </p:nvPr>
+        </p:nvSpPr>
+        <p:spPr>
+          <a:xfrm>
+            <a:off x="284546" y="159431"/>
+            <a:ext cx="11195177" cy="562427"/>
+          </a:xfrm>
+        </p:spPr>
+        <p:txBody>
+          <a:bodyPr/>
+          <a:lstStyle/>
+          <a:p>
+            <a:r>
+              <a:rPr lang="en-US" dirty="0"/>
+              <a:t>ETL Configuration </a:t>
+            </a:r>
+            <a:r>
+              <a:rPr lang="en-US" i="1" dirty="0"/>
+              <a:t>(optional)</a:t>
+            </a:r>
+            <a:endParaRPr lang="en-IN" i="1" dirty="0"/>
+          </a:p>
+        </p:txBody>
+      </p:sp>
+      <p:sp>
+        <p:nvSpPr>
+          <p:cNvPr id="2" name="TextBox 1">
+            <a:extLst>
+              <a:ext uri="{FF2B5EF4-FFF2-40B4-BE49-F238E27FC236}">
+                <a16:creationId xmlns:a16="http://schemas.microsoft.com/office/drawing/2014/main" id="{D467DCCE-B639-A33F-4B00-8B2252D83658}"/>
+              </a:ext>
+            </a:extLst>
+          </p:cNvPr>
+          <p:cNvSpPr txBox="1"/>
+          <p:nvPr/>
+        </p:nvSpPr>
+        <p:spPr>
+          <a:xfrm>
+            <a:off x="527832" y="941859"/>
+            <a:ext cx="10490887" cy="1002471"/>
+          </a:xfrm>
+          <a:prstGeom prst="rect">
+            <a:avLst/>
+          </a:prstGeom>
+          <a:noFill/>
+        </p:spPr>
+        <p:txBody>
+          <a:bodyPr wrap="square" lIns="0" tIns="0" rIns="0" bIns="0" rtlCol="0">
+            <a:noAutofit/>
+          </a:bodyPr>
+          <a:lstStyle/>
+          <a:p>
+            <a:pPr>
+              <a:lnSpc>
+                <a:spcPct val="90000"/>
+              </a:lnSpc>
+              <a:spcAft>
+                <a:spcPts val="1000"/>
+              </a:spcAft>
+            </a:pPr>
+            <a:r>
+              <a:rPr lang="en-US" sz="2100" dirty="0">
+                <a:latin typeface="Roboto" charset="0"/>
+                <a:ea typeface="Roboto" charset="0"/>
+                <a:cs typeface="Roboto" charset="0"/>
+              </a:rPr>
+              <a:t>Optionally, you can configure the script to create custom sources to act an ETLs to be between the source and target. The script will create a custom ETL source for you and build the lineage. For example:</a:t>
+            </a:r>
+          </a:p>
+        </p:txBody>
+      </p:sp>
+      <p:pic>
+        <p:nvPicPr>
+          <p:cNvPr id="5" name="Picture 4" descr="A screenshot of a computer&#10;&#10;Description automatically generated">
+            <a:extLst>
+              <a:ext uri="{FF2B5EF4-FFF2-40B4-BE49-F238E27FC236}">
+                <a16:creationId xmlns:a16="http://schemas.microsoft.com/office/drawing/2014/main" id="{29338AB4-BBCB-8572-0E3B-CEE5107F2436}"/>
+              </a:ext>
+            </a:extLst>
+          </p:cNvPr>
+          <p:cNvPicPr>
+            <a:picLocks noChangeAspect="1"/>
+          </p:cNvPicPr>
+          <p:nvPr/>
+        </p:nvPicPr>
+        <p:blipFill>
+          <a:blip r:embed="rId2"/>
+          <a:stretch>
+            <a:fillRect/>
+          </a:stretch>
+        </p:blipFill>
+        <p:spPr>
+          <a:xfrm>
+            <a:off x="904345" y="2159000"/>
+            <a:ext cx="3622499" cy="1762297"/>
+          </a:xfrm>
+          <a:prstGeom prst="rect">
+            <a:avLst/>
+          </a:prstGeom>
+        </p:spPr>
+      </p:pic>
+      <p:sp>
+        <p:nvSpPr>
+          <p:cNvPr id="6" name="TextBox 5">
+            <a:extLst>
+              <a:ext uri="{FF2B5EF4-FFF2-40B4-BE49-F238E27FC236}">
+                <a16:creationId xmlns:a16="http://schemas.microsoft.com/office/drawing/2014/main" id="{02EDE361-9A34-2794-3BD6-A6744914B785}"/>
+              </a:ext>
+            </a:extLst>
+          </p:cNvPr>
+          <p:cNvSpPr txBox="1"/>
+          <p:nvPr/>
+        </p:nvSpPr>
+        <p:spPr>
+          <a:xfrm>
+            <a:off x="904345" y="2057400"/>
+            <a:ext cx="1930921" cy="203200"/>
+          </a:xfrm>
+          <a:prstGeom prst="rect">
+            <a:avLst/>
+          </a:prstGeom>
+          <a:noFill/>
+        </p:spPr>
+        <p:txBody>
+          <a:bodyPr wrap="square" lIns="0" tIns="0" rIns="0" bIns="0" rtlCol="0">
+            <a:noAutofit/>
+          </a:bodyPr>
+          <a:lstStyle/>
+          <a:p>
+            <a:pPr>
+              <a:lnSpc>
+                <a:spcPct val="90000"/>
+              </a:lnSpc>
+              <a:spcAft>
+                <a:spcPts val="1000"/>
+              </a:spcAft>
+            </a:pPr>
+            <a:r>
+              <a:rPr lang="en-US" sz="1200" dirty="0">
+                <a:latin typeface="Roboto" charset="0"/>
+                <a:ea typeface="Roboto" charset="0"/>
+                <a:cs typeface="Roboto" charset="0"/>
+              </a:rPr>
+              <a:t>Example of simple lineage:</a:t>
+            </a:r>
+          </a:p>
+        </p:txBody>
+      </p:sp>
+      <p:pic>
+        <p:nvPicPr>
+          <p:cNvPr id="9" name="Picture 8" descr="A screenshot of a computer&#10;&#10;Description automatically generated">
+            <a:extLst>
+              <a:ext uri="{FF2B5EF4-FFF2-40B4-BE49-F238E27FC236}">
+                <a16:creationId xmlns:a16="http://schemas.microsoft.com/office/drawing/2014/main" id="{10B4AC70-650D-120F-F4D3-C3B3C4FEEBC5}"/>
+              </a:ext>
+            </a:extLst>
+          </p:cNvPr>
+          <p:cNvPicPr>
+            <a:picLocks noChangeAspect="1"/>
+          </p:cNvPicPr>
+          <p:nvPr/>
+        </p:nvPicPr>
+        <p:blipFill>
+          <a:blip r:embed="rId3"/>
+          <a:stretch>
+            <a:fillRect/>
+          </a:stretch>
+        </p:blipFill>
+        <p:spPr>
+          <a:xfrm>
+            <a:off x="1640680" y="4135967"/>
+            <a:ext cx="5772327" cy="2031463"/>
+          </a:xfrm>
+          <a:prstGeom prst="rect">
+            <a:avLst/>
+          </a:prstGeom>
+        </p:spPr>
+      </p:pic>
+      <p:sp>
+        <p:nvSpPr>
+          <p:cNvPr id="10" name="TextBox 9">
+            <a:extLst>
+              <a:ext uri="{FF2B5EF4-FFF2-40B4-BE49-F238E27FC236}">
+                <a16:creationId xmlns:a16="http://schemas.microsoft.com/office/drawing/2014/main" id="{11772137-C473-7D46-B57C-3DFF3C558E39}"/>
+              </a:ext>
+            </a:extLst>
+          </p:cNvPr>
+          <p:cNvSpPr txBox="1"/>
+          <p:nvPr/>
+        </p:nvSpPr>
+        <p:spPr>
+          <a:xfrm>
+            <a:off x="1750133" y="4034366"/>
+            <a:ext cx="2776711" cy="210255"/>
+          </a:xfrm>
+          <a:prstGeom prst="rect">
+            <a:avLst/>
+          </a:prstGeom>
+          <a:noFill/>
+        </p:spPr>
+        <p:txBody>
+          <a:bodyPr wrap="square" lIns="0" tIns="0" rIns="0" bIns="0" rtlCol="0">
+            <a:noAutofit/>
+          </a:bodyPr>
+          <a:lstStyle/>
+          <a:p>
+            <a:pPr>
+              <a:lnSpc>
+                <a:spcPct val="90000"/>
+              </a:lnSpc>
+              <a:spcAft>
+                <a:spcPts val="1000"/>
+              </a:spcAft>
+            </a:pPr>
+            <a:r>
+              <a:rPr lang="en-US" sz="1200" dirty="0">
+                <a:latin typeface="Roboto" charset="0"/>
+                <a:ea typeface="Roboto" charset="0"/>
+                <a:cs typeface="Roboto" charset="0"/>
+              </a:rPr>
+              <a:t>Example of lineage with a custom ETL:</a:t>
+            </a:r>
+          </a:p>
+        </p:txBody>
+      </p:sp>
+    </p:spTree>
+    <p:extLst>
+      <p:ext uri="{BB962C8B-B14F-4D97-AF65-F5344CB8AC3E}">
+        <p14:creationId xmlns:p14="http://schemas.microsoft.com/office/powerpoint/2010/main" val="4125033200"/>
+      </p:ext>
+    </p:extLst>
+  </p:cSld>
+  <p:clrMapOvr>
+    <a:masterClrMapping/>
+  </p:clrMapOvr>
+  <mc:AlternateContent xmlns:mc="http://schemas.openxmlformats.org/markup-compatibility/2006">
+    <mc:Choice xmlns:p14="http://schemas.microsoft.com/office/powerpoint/2010/main" Requires="p14">
+      <p:transition spd="med" p14:dur="700" advClick="0">
+        <p:fade/>
+      </p:transition>
+    </mc:Choice>
+    <mc:Fallback>
+      <p:transition spd="med" advClick="0">
+        <p:fade/>
+      </p:transition>
+    </mc:Fallback>
+  </mc:AlternateContent>
+</p:sld>
+</file>
+
+<file path=ppt/slides/slide5.xml><?xml version="1.0" encoding="utf-8"?>
+<p:sld xmlns:a="http://schemas.openxmlformats.org/drawingml/2006/main" xmlns:r="http://schemas.openxmlformats.org/officeDocument/2006/relationships" xmlns:p="http://schemas.openxmlformats.org/presentationml/2006/main">
+  <p:cSld>
+    <p:spTree>
+      <p:nvGrpSpPr>
+        <p:cNvPr id="1" name=""/>
+        <p:cNvGrpSpPr/>
+        <p:nvPr/>
+      </p:nvGrpSpPr>
+      <p:grpSpPr>
+        <a:xfrm>
+          <a:off x="0" y="0"/>
+          <a:ext cx="0" cy="0"/>
+          <a:chOff x="0" y="0"/>
+          <a:chExt cx="0" cy="0"/>
+        </a:xfrm>
+      </p:grpSpPr>
+      <p:sp>
+        <p:nvSpPr>
+          <p:cNvPr id="5" name="Title 4">
+            <a:extLst>
+              <a:ext uri="{FF2B5EF4-FFF2-40B4-BE49-F238E27FC236}">
+                <a16:creationId xmlns:a16="http://schemas.microsoft.com/office/drawing/2014/main" id="{C2B479B7-4E1E-475F-B459-5CE8B05302D3}"/>
+              </a:ext>
+            </a:extLst>
+          </p:cNvPr>
+          <p:cNvSpPr>
+            <a:spLocks noGrp="1"/>
+          </p:cNvSpPr>
+          <p:nvPr>
+            <p:ph type="title"/>
+          </p:nvPr>
+        </p:nvSpPr>
+        <p:spPr/>
+        <p:txBody>
+          <a:bodyPr/>
+          <a:lstStyle/>
+          <a:p>
+            <a:r>
+              <a:rPr lang="en-US" dirty="0"/>
+              <a:t>ETL Configuration </a:t>
+            </a:r>
+            <a:r>
+              <a:rPr lang="en-US" i="1" dirty="0"/>
+              <a:t>(optional)</a:t>
+            </a:r>
+            <a:endParaRPr lang="en-IN" dirty="0"/>
+          </a:p>
+        </p:txBody>
+      </p:sp>
+      <p:sp>
+        <p:nvSpPr>
+          <p:cNvPr id="16" name="Content Placeholder 13">
+            <a:extLst>
+              <a:ext uri="{FF2B5EF4-FFF2-40B4-BE49-F238E27FC236}">
+                <a16:creationId xmlns:a16="http://schemas.microsoft.com/office/drawing/2014/main" id="{807EB0DB-72EF-4CAE-8A2F-F7E55C093081}"/>
+              </a:ext>
+            </a:extLst>
+          </p:cNvPr>
+          <p:cNvSpPr txBox="1">
+            <a:spLocks/>
+          </p:cNvSpPr>
+          <p:nvPr/>
+        </p:nvSpPr>
+        <p:spPr>
+          <a:xfrm>
+            <a:off x="1180247" y="1610532"/>
+            <a:ext cx="3180631" cy="2562457"/>
+          </a:xfrm>
+          <a:prstGeom prst="rect">
+            <a:avLst/>
+          </a:prstGeom>
+        </p:spPr>
+        <p:txBody>
+          <a:bodyPr vert="horz" lIns="0" tIns="0" rIns="0" bIns="0" rtlCol="0">
+            <a:noAutofit/>
+          </a:bodyPr>
+          <a:lstStyle>
+            <a:lvl1pPr marL="173038" indent="-173038" algn="l" defTabSz="914217" rtl="0" eaLnBrk="1" latinLnBrk="0" hangingPunct="1">
+              <a:lnSpc>
+                <a:spcPct val="90000"/>
+              </a:lnSpc>
+              <a:spcBef>
+                <a:spcPts val="400"/>
+              </a:spcBef>
+              <a:spcAft>
+                <a:spcPts val="1200"/>
+              </a:spcAft>
+              <a:buClr>
+                <a:schemeClr val="accent2"/>
+              </a:buClr>
+              <a:buFont typeface="Arial" panose="020B0604020202020204" pitchFamily="34" charset="0"/>
+              <a:buChar char="•"/>
+              <a:defRPr sz="2100" b="0" i="0" kern="1200" baseline="0">
+                <a:solidFill>
+                  <a:schemeClr val="tx1"/>
+                </a:solidFill>
+                <a:latin typeface="Roboto" charset="0"/>
+                <a:ea typeface="Roboto" charset="0"/>
+                <a:cs typeface="Roboto" charset="0"/>
+              </a:defRPr>
+            </a:lvl1pPr>
+            <a:lvl2pPr marL="344488" indent="-174625" algn="l" defTabSz="914217" rtl="0" eaLnBrk="1" latinLnBrk="0" hangingPunct="1">
+              <a:lnSpc>
+                <a:spcPct val="90000"/>
+              </a:lnSpc>
+              <a:spcBef>
+                <a:spcPts val="0"/>
+              </a:spcBef>
+              <a:spcAft>
+                <a:spcPts val="1200"/>
+              </a:spcAft>
+              <a:buClr>
+                <a:schemeClr val="accent2"/>
+              </a:buClr>
+              <a:buFont typeface="Arial" panose="020B0604020202020204" pitchFamily="34" charset="0"/>
+              <a:buChar char="•"/>
+              <a:defRPr sz="1800" b="0" i="0" kern="1200" baseline="0">
+                <a:solidFill>
+                  <a:schemeClr val="tx1"/>
+                </a:solidFill>
+                <a:latin typeface="Roboto" charset="0"/>
+                <a:ea typeface="Roboto" charset="0"/>
+                <a:cs typeface="Roboto" charset="0"/>
+              </a:defRPr>
+            </a:lvl2pPr>
+            <a:lvl3pPr marL="514350" indent="-169863" algn="l" defTabSz="914217" rtl="0" eaLnBrk="1" latinLnBrk="0" hangingPunct="1">
+              <a:lnSpc>
+                <a:spcPct val="90000"/>
+              </a:lnSpc>
+              <a:spcBef>
+                <a:spcPts val="0"/>
+              </a:spcBef>
+              <a:spcAft>
+                <a:spcPts val="1200"/>
+              </a:spcAft>
+              <a:buClr>
+                <a:schemeClr val="accent2"/>
+              </a:buClr>
+              <a:buFont typeface="Arial" panose="020B0604020202020204" pitchFamily="34" charset="0"/>
+              <a:buChar char="•"/>
+              <a:defRPr sz="1600" b="0" i="0" kern="1200">
+                <a:solidFill>
+                  <a:schemeClr val="tx1"/>
+                </a:solidFill>
+                <a:latin typeface="Roboto" charset="0"/>
+                <a:ea typeface="Roboto" charset="0"/>
+                <a:cs typeface="Roboto" charset="0"/>
+              </a:defRPr>
+            </a:lvl3pPr>
+            <a:lvl4pPr marL="630238" indent="-171450" algn="l" defTabSz="914217" rtl="0" eaLnBrk="1" latinLnBrk="0" hangingPunct="1">
+              <a:lnSpc>
+                <a:spcPct val="90000"/>
+              </a:lnSpc>
+              <a:spcBef>
+                <a:spcPts val="0"/>
+              </a:spcBef>
+              <a:spcAft>
+                <a:spcPts val="1200"/>
+              </a:spcAft>
+              <a:buClr>
+                <a:schemeClr val="accent2"/>
+              </a:buClr>
+              <a:buFont typeface="Arial" panose="020B0604020202020204" pitchFamily="34" charset="0"/>
+              <a:buChar char="•"/>
+              <a:defRPr sz="1400" b="0" i="0" kern="1200">
+                <a:solidFill>
+                  <a:schemeClr val="tx1"/>
+                </a:solidFill>
+                <a:latin typeface="Roboto" charset="0"/>
+                <a:ea typeface="Roboto" charset="0"/>
+                <a:cs typeface="Roboto" charset="0"/>
+              </a:defRPr>
+            </a:lvl4pPr>
+            <a:lvl5pPr marL="800100" indent="-169863" algn="l" defTabSz="914217" rtl="0" eaLnBrk="1" latinLnBrk="0" hangingPunct="1">
+              <a:lnSpc>
+                <a:spcPct val="90000"/>
+              </a:lnSpc>
+              <a:spcBef>
+                <a:spcPts val="0"/>
+              </a:spcBef>
+              <a:spcAft>
+                <a:spcPts val="1200"/>
+              </a:spcAft>
+              <a:buClr>
+                <a:schemeClr val="accent2"/>
+              </a:buClr>
+              <a:buFont typeface="Arial" panose="020B0604020202020204" pitchFamily="34" charset="0"/>
+              <a:buChar char="•"/>
+              <a:defRPr sz="1400" b="0" i="0" kern="1200">
+                <a:solidFill>
+                  <a:schemeClr val="tx1"/>
+                </a:solidFill>
+                <a:latin typeface="Roboto" charset="0"/>
+                <a:ea typeface="Roboto" charset="0"/>
+                <a:cs typeface="Roboto" charset="0"/>
+              </a:defRPr>
+            </a:lvl5pPr>
+            <a:lvl6pPr marL="914400" indent="-169863" algn="l" defTabSz="914217" rtl="0" eaLnBrk="1" latinLnBrk="0" hangingPunct="1">
+              <a:lnSpc>
+                <a:spcPct val="90000"/>
+              </a:lnSpc>
+              <a:spcBef>
+                <a:spcPts val="500"/>
+              </a:spcBef>
+              <a:spcAft>
+                <a:spcPts val="1200"/>
+              </a:spcAft>
+              <a:buClr>
+                <a:schemeClr val="accent2"/>
+              </a:buClr>
+              <a:buFont typeface="Arial" panose="020B0604020202020204" pitchFamily="34" charset="0"/>
+              <a:buChar char="•"/>
+              <a:defRPr sz="1200" b="0" i="0" kern="1200">
+                <a:solidFill>
+                  <a:schemeClr val="tx1"/>
+                </a:solidFill>
+                <a:latin typeface="Roboto" charset="0"/>
+                <a:ea typeface="Roboto" charset="0"/>
+                <a:cs typeface="Roboto" charset="0"/>
+              </a:defRPr>
+            </a:lvl6pPr>
+            <a:lvl7pPr marL="1084263" indent="-169863" algn="l" defTabSz="914217" rtl="0" eaLnBrk="1" latinLnBrk="0" hangingPunct="1">
+              <a:lnSpc>
+                <a:spcPct val="90000"/>
+              </a:lnSpc>
+              <a:spcBef>
+                <a:spcPts val="500"/>
+              </a:spcBef>
+              <a:spcAft>
+                <a:spcPts val="1200"/>
+              </a:spcAft>
+              <a:buClr>
+                <a:schemeClr val="accent2"/>
+              </a:buClr>
+              <a:buFont typeface="Arial" panose="020B0604020202020204" pitchFamily="34" charset="0"/>
+              <a:buChar char="•"/>
+              <a:defRPr sz="1200" b="0" i="0" kern="1200">
+                <a:solidFill>
+                  <a:schemeClr val="tx1"/>
+                </a:solidFill>
+                <a:latin typeface="Roboto" charset="0"/>
+                <a:ea typeface="Roboto" charset="0"/>
+                <a:cs typeface="Roboto" charset="0"/>
+              </a:defRPr>
+            </a:lvl7pPr>
+            <a:lvl8pPr marL="1258888" indent="-174625" algn="l" defTabSz="914217" rtl="0" eaLnBrk="1" latinLnBrk="0" hangingPunct="1">
+              <a:lnSpc>
+                <a:spcPct val="90000"/>
+              </a:lnSpc>
+              <a:spcBef>
+                <a:spcPts val="500"/>
+              </a:spcBef>
+              <a:spcAft>
+                <a:spcPts val="1200"/>
+              </a:spcAft>
+              <a:buClr>
+                <a:schemeClr val="accent2"/>
+              </a:buClr>
+              <a:buFont typeface="Arial" panose="020B0604020202020204" pitchFamily="34" charset="0"/>
+              <a:buChar char="•"/>
+              <a:defRPr sz="1200" b="0" i="0" kern="1200">
+                <a:solidFill>
+                  <a:schemeClr val="tx1"/>
+                </a:solidFill>
+                <a:latin typeface="Roboto" charset="0"/>
+                <a:ea typeface="Roboto" charset="0"/>
+                <a:cs typeface="Roboto" charset="0"/>
+              </a:defRPr>
+            </a:lvl8pPr>
+            <a:lvl9pPr marL="1428750" indent="-169863" algn="l" defTabSz="914217" rtl="0" eaLnBrk="1" latinLnBrk="0" hangingPunct="1">
+              <a:lnSpc>
+                <a:spcPct val="90000"/>
+              </a:lnSpc>
+              <a:spcBef>
+                <a:spcPts val="500"/>
+              </a:spcBef>
+              <a:spcAft>
+                <a:spcPts val="1200"/>
+              </a:spcAft>
+              <a:buClr>
+                <a:schemeClr val="accent2"/>
+              </a:buClr>
+              <a:buFont typeface="Arial" panose="020B0604020202020204" pitchFamily="34" charset="0"/>
+              <a:buChar char="•"/>
+              <a:defRPr sz="1200" b="0" i="0" kern="1200">
+                <a:solidFill>
+                  <a:schemeClr val="tx1"/>
+                </a:solidFill>
+                <a:latin typeface="Roboto" charset="0"/>
+                <a:ea typeface="Roboto" charset="0"/>
+                <a:cs typeface="Roboto" charset="0"/>
+              </a:defRPr>
+            </a:lvl9pPr>
+          </a:lstStyle>
+          <a:p>
+            <a:pPr marL="0" indent="0">
+              <a:buNone/>
+            </a:pPr>
+            <a:endParaRPr lang="en-IN" sz="1600" dirty="0"/>
+          </a:p>
+        </p:txBody>
+      </p:sp>
+      <p:sp>
+        <p:nvSpPr>
+          <p:cNvPr id="6" name="TextBox 5">
+            <a:extLst>
+              <a:ext uri="{FF2B5EF4-FFF2-40B4-BE49-F238E27FC236}">
+                <a16:creationId xmlns:a16="http://schemas.microsoft.com/office/drawing/2014/main" id="{9F8FFC18-4FD7-5E97-CCB3-5E13CE612AEB}"/>
+              </a:ext>
+            </a:extLst>
+          </p:cNvPr>
+          <p:cNvSpPr txBox="1"/>
+          <p:nvPr/>
+        </p:nvSpPr>
+        <p:spPr>
+          <a:xfrm>
+            <a:off x="674588" y="1157381"/>
+            <a:ext cx="11088434" cy="3200130"/>
+          </a:xfrm>
+          <a:prstGeom prst="rect">
+            <a:avLst/>
+          </a:prstGeom>
+          <a:noFill/>
+        </p:spPr>
+        <p:txBody>
+          <a:bodyPr wrap="square" lIns="0" tIns="0" rIns="0" bIns="0" rtlCol="0">
+            <a:noAutofit/>
+          </a:bodyPr>
+          <a:lstStyle/>
+          <a:p>
+            <a:pPr>
+              <a:lnSpc>
+                <a:spcPct val="90000"/>
+              </a:lnSpc>
+              <a:spcAft>
+                <a:spcPts val="1000"/>
+              </a:spcAft>
+            </a:pPr>
+            <a:r>
+              <a:rPr lang="en-US" sz="1600" dirty="0">
+                <a:latin typeface="Roboto" charset="0"/>
+                <a:ea typeface="Roboto" charset="0"/>
+                <a:cs typeface="Roboto" charset="0"/>
+              </a:rPr>
+              <a:t>If including a custom ETL, add additional information in the config file:</a:t>
+            </a:r>
+          </a:p>
+          <a:p>
+            <a:pPr marL="342900" indent="-342900">
+              <a:lnSpc>
+                <a:spcPct val="90000"/>
+              </a:lnSpc>
+              <a:spcAft>
+                <a:spcPts val="1000"/>
+              </a:spcAft>
+              <a:buFont typeface="Arial" panose="020B0604020202020204" pitchFamily="34" charset="0"/>
+              <a:buChar char="•"/>
+            </a:pPr>
+            <a:r>
+              <a:rPr lang="en-US" sz="1600" i="1" dirty="0">
+                <a:latin typeface="Roboto" charset="0"/>
+                <a:ea typeface="Roboto" charset="0"/>
+                <a:cs typeface="Roboto" charset="0"/>
+              </a:rPr>
+              <a:t>ETL Resource Name.</a:t>
+            </a:r>
+            <a:r>
+              <a:rPr lang="en-US" sz="1600" dirty="0">
+                <a:latin typeface="Roboto" charset="0"/>
+                <a:ea typeface="Roboto" charset="0"/>
+                <a:cs typeface="Roboto" charset="0"/>
+              </a:rPr>
+              <a:t> The Resource Name for the ETL.</a:t>
+            </a:r>
+          </a:p>
+          <a:p>
+            <a:pPr marL="342900" indent="-342900">
+              <a:lnSpc>
+                <a:spcPct val="90000"/>
+              </a:lnSpc>
+              <a:spcAft>
+                <a:spcPts val="1000"/>
+              </a:spcAft>
+              <a:buFont typeface="Arial" panose="020B0604020202020204" pitchFamily="34" charset="0"/>
+              <a:buChar char="•"/>
+            </a:pPr>
+            <a:r>
+              <a:rPr lang="en-US" sz="1600" i="1" dirty="0">
+                <a:latin typeface="Roboto" charset="0"/>
+                <a:ea typeface="Roboto" charset="0"/>
+                <a:cs typeface="Roboto" charset="0"/>
+              </a:rPr>
+              <a:t>ETL Path. </a:t>
+            </a:r>
+            <a:r>
+              <a:rPr lang="en-US" sz="1600" dirty="0">
+                <a:latin typeface="Roboto" charset="0"/>
+                <a:ea typeface="Roboto" charset="0"/>
+                <a:cs typeface="Roboto" charset="0"/>
+              </a:rPr>
+              <a:t>Path that leads to the actual ETL logic separated by “/”. This might include projects, folders, etc. </a:t>
+            </a:r>
+          </a:p>
+          <a:p>
+            <a:pPr marL="342900" indent="-342900">
+              <a:lnSpc>
+                <a:spcPct val="90000"/>
+              </a:lnSpc>
+              <a:spcAft>
+                <a:spcPts val="1000"/>
+              </a:spcAft>
+              <a:buFont typeface="Arial" panose="020B0604020202020204" pitchFamily="34" charset="0"/>
+              <a:buChar char="•"/>
+            </a:pPr>
+            <a:r>
+              <a:rPr lang="en-US" sz="1600" i="1" dirty="0">
+                <a:latin typeface="Roboto" charset="0"/>
+                <a:ea typeface="Roboto" charset="0"/>
+                <a:cs typeface="Roboto" charset="0"/>
+              </a:rPr>
+              <a:t>ETL Path Types. </a:t>
+            </a:r>
+            <a:r>
+              <a:rPr lang="en-US" sz="1600" dirty="0">
+                <a:latin typeface="Roboto" charset="0"/>
+                <a:ea typeface="Roboto" charset="0"/>
+                <a:cs typeface="Roboto" charset="0"/>
+              </a:rPr>
+              <a:t>The full class types for the above path separated by “/”.</a:t>
+            </a:r>
+          </a:p>
+          <a:p>
+            <a:pPr marL="342900" indent="-342900">
+              <a:lnSpc>
+                <a:spcPct val="90000"/>
+              </a:lnSpc>
+              <a:spcAft>
+                <a:spcPts val="1000"/>
+              </a:spcAft>
+              <a:buFont typeface="Arial" panose="020B0604020202020204" pitchFamily="34" charset="0"/>
+              <a:buChar char="•"/>
+            </a:pPr>
+            <a:r>
+              <a:rPr lang="en-US" sz="1600" i="1" dirty="0">
+                <a:latin typeface="Roboto" charset="0"/>
+                <a:ea typeface="Roboto" charset="0"/>
+                <a:cs typeface="Roboto" charset="0"/>
+              </a:rPr>
+              <a:t>ETL Dataset Type. </a:t>
+            </a:r>
+            <a:r>
+              <a:rPr lang="en-US" sz="1600" dirty="0">
+                <a:latin typeface="Roboto" charset="0"/>
+                <a:ea typeface="Roboto" charset="0"/>
+                <a:cs typeface="Roboto" charset="0"/>
+              </a:rPr>
+              <a:t>The full class type for the “dataset” portion of the ETL. This will be the object included in lineage</a:t>
+            </a:r>
+          </a:p>
+          <a:p>
+            <a:pPr marL="342900" indent="-342900">
+              <a:lnSpc>
+                <a:spcPct val="90000"/>
+              </a:lnSpc>
+              <a:spcAft>
+                <a:spcPts val="1000"/>
+              </a:spcAft>
+              <a:buFont typeface="Arial" panose="020B0604020202020204" pitchFamily="34" charset="0"/>
+              <a:buChar char="•"/>
+            </a:pPr>
+            <a:r>
+              <a:rPr lang="en-US" sz="1600" i="1" dirty="0">
+                <a:latin typeface="Roboto" charset="0"/>
+                <a:ea typeface="Roboto" charset="0"/>
+                <a:cs typeface="Roboto" charset="0"/>
+              </a:rPr>
+              <a:t>ETL Dataset Name. </a:t>
+            </a:r>
+            <a:r>
+              <a:rPr lang="en-US" sz="1600" dirty="0">
+                <a:latin typeface="Roboto" charset="0"/>
+                <a:ea typeface="Roboto" charset="0"/>
+                <a:cs typeface="Roboto" charset="0"/>
+              </a:rPr>
+              <a:t>The name for the “dataset” portion of the ETL. Use the token {name} for the name of the source dataset. This will be the object included in lineage</a:t>
+            </a:r>
+          </a:p>
+          <a:p>
+            <a:pPr marL="342900" indent="-342900">
+              <a:lnSpc>
+                <a:spcPct val="90000"/>
+              </a:lnSpc>
+              <a:spcAft>
+                <a:spcPts val="1000"/>
+              </a:spcAft>
+              <a:buFont typeface="Arial" panose="020B0604020202020204" pitchFamily="34" charset="0"/>
+              <a:buChar char="•"/>
+            </a:pPr>
+            <a:r>
+              <a:rPr lang="en-US" sz="1600" i="1" dirty="0">
+                <a:latin typeface="Roboto" charset="0"/>
+                <a:ea typeface="Roboto" charset="0"/>
+                <a:cs typeface="Roboto" charset="0"/>
+              </a:rPr>
+              <a:t>ETL Element Type. </a:t>
+            </a:r>
+            <a:r>
+              <a:rPr lang="en-US" sz="1600" dirty="0">
+                <a:latin typeface="Roboto" charset="0"/>
+                <a:ea typeface="Roboto" charset="0"/>
+                <a:cs typeface="Roboto" charset="0"/>
+              </a:rPr>
+              <a:t>The full class type for the “element” portion of the ETL. This will be the object included in lineage</a:t>
+            </a:r>
+          </a:p>
+          <a:p>
+            <a:pPr marL="342900" indent="-342900">
+              <a:lnSpc>
+                <a:spcPct val="90000"/>
+              </a:lnSpc>
+              <a:spcAft>
+                <a:spcPts val="1000"/>
+              </a:spcAft>
+              <a:buFont typeface="Arial" panose="020B0604020202020204" pitchFamily="34" charset="0"/>
+              <a:buChar char="•"/>
+            </a:pPr>
+            <a:r>
+              <a:rPr lang="en-US" sz="1600" i="1" dirty="0">
+                <a:latin typeface="Roboto" charset="0"/>
+                <a:ea typeface="Roboto" charset="0"/>
+                <a:cs typeface="Roboto" charset="0"/>
+              </a:rPr>
+              <a:t>ETL Element Name. </a:t>
+            </a:r>
+            <a:r>
+              <a:rPr lang="en-US" sz="1600" dirty="0">
+                <a:latin typeface="Roboto" charset="0"/>
+                <a:ea typeface="Roboto" charset="0"/>
+                <a:cs typeface="Roboto" charset="0"/>
+              </a:rPr>
+              <a:t>The name for the “element” portion of the ETL. Use the token {name} for the name of the source element. This will be the object included in lineage</a:t>
+            </a:r>
+          </a:p>
+          <a:p>
+            <a:pPr marL="342900" indent="-342900">
+              <a:lnSpc>
+                <a:spcPct val="90000"/>
+              </a:lnSpc>
+              <a:spcAft>
+                <a:spcPts val="1000"/>
+              </a:spcAft>
+              <a:buFont typeface="Arial" panose="020B0604020202020204" pitchFamily="34" charset="0"/>
+              <a:buChar char="•"/>
+            </a:pPr>
+            <a:endParaRPr lang="en-US" sz="1600" dirty="0">
+              <a:latin typeface="Roboto" charset="0"/>
+              <a:ea typeface="Roboto" charset="0"/>
+              <a:cs typeface="Roboto" charset="0"/>
+            </a:endParaRPr>
+          </a:p>
+          <a:p>
+            <a:pPr marL="342900" indent="-342900">
+              <a:lnSpc>
+                <a:spcPct val="90000"/>
+              </a:lnSpc>
+              <a:spcAft>
+                <a:spcPts val="1000"/>
+              </a:spcAft>
+              <a:buFont typeface="Arial" panose="020B0604020202020204" pitchFamily="34" charset="0"/>
+              <a:buChar char="•"/>
+            </a:pPr>
+            <a:endParaRPr lang="en-US" sz="1600" dirty="0">
+              <a:latin typeface="Roboto" charset="0"/>
+              <a:ea typeface="Roboto" charset="0"/>
+              <a:cs typeface="Roboto" charset="0"/>
+            </a:endParaRPr>
+          </a:p>
+        </p:txBody>
+      </p:sp>
+      <p:pic>
+        <p:nvPicPr>
+          <p:cNvPr id="3" name="Picture 2">
+            <a:extLst>
+              <a:ext uri="{FF2B5EF4-FFF2-40B4-BE49-F238E27FC236}">
+                <a16:creationId xmlns:a16="http://schemas.microsoft.com/office/drawing/2014/main" id="{F17A353E-E23B-2CE7-2786-4D5EDDDA3124}"/>
+              </a:ext>
+            </a:extLst>
+          </p:cNvPr>
+          <p:cNvPicPr>
+            <a:picLocks noChangeAspect="1"/>
+          </p:cNvPicPr>
+          <p:nvPr/>
+        </p:nvPicPr>
+        <p:blipFill>
+          <a:blip r:embed="rId2"/>
+          <a:stretch>
+            <a:fillRect/>
+          </a:stretch>
+        </p:blipFill>
+        <p:spPr>
+          <a:xfrm>
+            <a:off x="198551" y="4907832"/>
+            <a:ext cx="11763022" cy="936953"/>
+          </a:xfrm>
+          <a:prstGeom prst="rect">
+            <a:avLst/>
+          </a:prstGeom>
+        </p:spPr>
+      </p:pic>
+      <p:sp>
+        <p:nvSpPr>
+          <p:cNvPr id="4" name="TextBox 3">
+            <a:extLst>
+              <a:ext uri="{FF2B5EF4-FFF2-40B4-BE49-F238E27FC236}">
+                <a16:creationId xmlns:a16="http://schemas.microsoft.com/office/drawing/2014/main" id="{BA27B495-4EB1-275D-5BC2-1248E563FA0C}"/>
+              </a:ext>
+            </a:extLst>
+          </p:cNvPr>
+          <p:cNvSpPr txBox="1"/>
+          <p:nvPr/>
+        </p:nvSpPr>
+        <p:spPr>
+          <a:xfrm>
+            <a:off x="482474" y="4607462"/>
+            <a:ext cx="1930921" cy="203200"/>
+          </a:xfrm>
+          <a:prstGeom prst="rect">
+            <a:avLst/>
+          </a:prstGeom>
+          <a:noFill/>
+        </p:spPr>
+        <p:txBody>
+          <a:bodyPr wrap="square" lIns="0" tIns="0" rIns="0" bIns="0" rtlCol="0">
+            <a:noAutofit/>
+          </a:bodyPr>
+          <a:lstStyle/>
+          <a:p>
+            <a:pPr>
+              <a:lnSpc>
+                <a:spcPct val="90000"/>
+              </a:lnSpc>
+              <a:spcAft>
+                <a:spcPts val="1000"/>
+              </a:spcAft>
+            </a:pPr>
+            <a:r>
+              <a:rPr lang="en-US" sz="1200" dirty="0">
+                <a:latin typeface="Roboto" charset="0"/>
+                <a:ea typeface="Roboto" charset="0"/>
+                <a:cs typeface="Roboto" charset="0"/>
+              </a:rPr>
+              <a:t>Examples:</a:t>
+            </a:r>
+          </a:p>
+        </p:txBody>
+      </p:sp>
+    </p:spTree>
+    <p:extLst>
+      <p:ext uri="{BB962C8B-B14F-4D97-AF65-F5344CB8AC3E}">
+        <p14:creationId xmlns:p14="http://schemas.microsoft.com/office/powerpoint/2010/main" val="1730007939"/>
+      </p:ext>
+    </p:extLst>
+  </p:cSld>
+  <p:clrMapOvr>
+    <a:masterClrMapping/>
+  </p:clrMapOvr>
+  <mc:AlternateContent xmlns:mc="http://schemas.openxmlformats.org/markup-compatibility/2006" xmlns:p14="http://schemas.microsoft.com/office/powerpoint/2010/main">
+    <mc:Choice Requires="p14">
+      <p:transition spd="med" p14:dur="700" advClick="0">
+        <p:fade/>
+      </p:transition>
+    </mc:Choice>
+    <mc:Fallback xmlns="">
+      <p:transition spd="med" advClick="0">
+        <p:fade/>
+      </p:transition>
+    </mc:Fallback>
+  </mc:AlternateContent>
+</p:sld>
+</file>
+
+<file path=ppt/slides/slide6.xml><?xml version="1.0" encoding="utf-8"?>
+<p:sld xmlns:a="http://schemas.openxmlformats.org/drawingml/2006/main" xmlns:r="http://schemas.openxmlformats.org/officeDocument/2006/relationships" xmlns:p="http://schemas.openxmlformats.org/presentationml/2006/main">
+  <p:cSld>
+    <p:spTree>
+      <p:nvGrpSpPr>
+        <p:cNvPr id="1" name=""/>
+        <p:cNvGrpSpPr/>
+        <p:nvPr/>
+      </p:nvGrpSpPr>
+      <p:grpSpPr>
+        <a:xfrm>
+          <a:off x="0" y="0"/>
+          <a:ext cx="0" cy="0"/>
+          <a:chOff x="0" y="0"/>
+          <a:chExt cx="0" cy="0"/>
+        </a:xfrm>
+      </p:grpSpPr>
+      <p:sp>
+        <p:nvSpPr>
+          <p:cNvPr id="5" name="Title 4">
+            <a:extLst>
+              <a:ext uri="{FF2B5EF4-FFF2-40B4-BE49-F238E27FC236}">
+                <a16:creationId xmlns:a16="http://schemas.microsoft.com/office/drawing/2014/main" id="{C2B479B7-4E1E-475F-B459-5CE8B05302D3}"/>
+              </a:ext>
+            </a:extLst>
+          </p:cNvPr>
+          <p:cNvSpPr>
+            <a:spLocks noGrp="1"/>
+          </p:cNvSpPr>
+          <p:nvPr>
+            <p:ph type="title"/>
+          </p:nvPr>
+        </p:nvSpPr>
+        <p:spPr/>
+        <p:txBody>
+          <a:bodyPr/>
+          <a:lstStyle/>
+          <a:p>
+            <a:r>
+              <a:rPr lang="en-US" dirty="0"/>
+              <a:t>ETL Configuration </a:t>
+            </a:r>
+            <a:r>
+              <a:rPr lang="en-US" i="1" dirty="0"/>
+              <a:t>(considerations)</a:t>
+            </a:r>
+            <a:endParaRPr lang="en-IN" dirty="0"/>
+          </a:p>
+        </p:txBody>
+      </p:sp>
+      <p:sp>
+        <p:nvSpPr>
+          <p:cNvPr id="16" name="Content Placeholder 13">
+            <a:extLst>
+              <a:ext uri="{FF2B5EF4-FFF2-40B4-BE49-F238E27FC236}">
+                <a16:creationId xmlns:a16="http://schemas.microsoft.com/office/drawing/2014/main" id="{807EB0DB-72EF-4CAE-8A2F-F7E55C093081}"/>
+              </a:ext>
+            </a:extLst>
+          </p:cNvPr>
+          <p:cNvSpPr txBox="1">
+            <a:spLocks/>
+          </p:cNvSpPr>
+          <p:nvPr/>
+        </p:nvSpPr>
+        <p:spPr>
+          <a:xfrm>
+            <a:off x="1180247" y="1610532"/>
+            <a:ext cx="3180631" cy="2562457"/>
+          </a:xfrm>
+          <a:prstGeom prst="rect">
+            <a:avLst/>
+          </a:prstGeom>
+        </p:spPr>
+        <p:txBody>
+          <a:bodyPr vert="horz" lIns="0" tIns="0" rIns="0" bIns="0" rtlCol="0">
+            <a:noAutofit/>
+          </a:bodyPr>
+          <a:lstStyle>
+            <a:lvl1pPr marL="173038" indent="-173038" algn="l" defTabSz="914217" rtl="0" eaLnBrk="1" latinLnBrk="0" hangingPunct="1">
+              <a:lnSpc>
+                <a:spcPct val="90000"/>
+              </a:lnSpc>
+              <a:spcBef>
+                <a:spcPts val="400"/>
+              </a:spcBef>
+              <a:spcAft>
+                <a:spcPts val="1200"/>
+              </a:spcAft>
+              <a:buClr>
+                <a:schemeClr val="accent2"/>
+              </a:buClr>
+              <a:buFont typeface="Arial" panose="020B0604020202020204" pitchFamily="34" charset="0"/>
+              <a:buChar char="•"/>
+              <a:defRPr sz="2100" b="0" i="0" kern="1200" baseline="0">
+                <a:solidFill>
+                  <a:schemeClr val="tx1"/>
+                </a:solidFill>
+                <a:latin typeface="Roboto" charset="0"/>
+                <a:ea typeface="Roboto" charset="0"/>
+                <a:cs typeface="Roboto" charset="0"/>
+              </a:defRPr>
+            </a:lvl1pPr>
+            <a:lvl2pPr marL="344488" indent="-174625" algn="l" defTabSz="914217" rtl="0" eaLnBrk="1" latinLnBrk="0" hangingPunct="1">
+              <a:lnSpc>
+                <a:spcPct val="90000"/>
+              </a:lnSpc>
+              <a:spcBef>
+                <a:spcPts val="0"/>
+              </a:spcBef>
+              <a:spcAft>
+                <a:spcPts val="1200"/>
+              </a:spcAft>
+              <a:buClr>
+                <a:schemeClr val="accent2"/>
+              </a:buClr>
+              <a:buFont typeface="Arial" panose="020B0604020202020204" pitchFamily="34" charset="0"/>
+              <a:buChar char="•"/>
+              <a:defRPr sz="1800" b="0" i="0" kern="1200" baseline="0">
+                <a:solidFill>
+                  <a:schemeClr val="tx1"/>
+                </a:solidFill>
+                <a:latin typeface="Roboto" charset="0"/>
+                <a:ea typeface="Roboto" charset="0"/>
+                <a:cs typeface="Roboto" charset="0"/>
+              </a:defRPr>
+            </a:lvl2pPr>
+            <a:lvl3pPr marL="514350" indent="-169863" algn="l" defTabSz="914217" rtl="0" eaLnBrk="1" latinLnBrk="0" hangingPunct="1">
+              <a:lnSpc>
+                <a:spcPct val="90000"/>
+              </a:lnSpc>
+              <a:spcBef>
+                <a:spcPts val="0"/>
+              </a:spcBef>
+              <a:spcAft>
+                <a:spcPts val="1200"/>
+              </a:spcAft>
+              <a:buClr>
+                <a:schemeClr val="accent2"/>
+              </a:buClr>
+              <a:buFont typeface="Arial" panose="020B0604020202020204" pitchFamily="34" charset="0"/>
+              <a:buChar char="•"/>
+              <a:defRPr sz="1600" b="0" i="0" kern="1200">
+                <a:solidFill>
+                  <a:schemeClr val="tx1"/>
+                </a:solidFill>
+                <a:latin typeface="Roboto" charset="0"/>
+                <a:ea typeface="Roboto" charset="0"/>
+                <a:cs typeface="Roboto" charset="0"/>
+              </a:defRPr>
+            </a:lvl3pPr>
+            <a:lvl4pPr marL="630238" indent="-171450" algn="l" defTabSz="914217" rtl="0" eaLnBrk="1" latinLnBrk="0" hangingPunct="1">
+              <a:lnSpc>
+                <a:spcPct val="90000"/>
+              </a:lnSpc>
+              <a:spcBef>
+                <a:spcPts val="0"/>
+              </a:spcBef>
+              <a:spcAft>
+                <a:spcPts val="1200"/>
+              </a:spcAft>
+              <a:buClr>
+                <a:schemeClr val="accent2"/>
+              </a:buClr>
+              <a:buFont typeface="Arial" panose="020B0604020202020204" pitchFamily="34" charset="0"/>
+              <a:buChar char="•"/>
+              <a:defRPr sz="1400" b="0" i="0" kern="1200">
+                <a:solidFill>
+                  <a:schemeClr val="tx1"/>
+                </a:solidFill>
+                <a:latin typeface="Roboto" charset="0"/>
+                <a:ea typeface="Roboto" charset="0"/>
+                <a:cs typeface="Roboto" charset="0"/>
+              </a:defRPr>
+            </a:lvl4pPr>
+            <a:lvl5pPr marL="800100" indent="-169863" algn="l" defTabSz="914217" rtl="0" eaLnBrk="1" latinLnBrk="0" hangingPunct="1">
+              <a:lnSpc>
+                <a:spcPct val="90000"/>
+              </a:lnSpc>
+              <a:spcBef>
+                <a:spcPts val="0"/>
+              </a:spcBef>
+              <a:spcAft>
+                <a:spcPts val="1200"/>
+              </a:spcAft>
+              <a:buClr>
+                <a:schemeClr val="accent2"/>
+              </a:buClr>
+              <a:buFont typeface="Arial" panose="020B0604020202020204" pitchFamily="34" charset="0"/>
+              <a:buChar char="•"/>
+              <a:defRPr sz="1400" b="0" i="0" kern="1200">
+                <a:solidFill>
+                  <a:schemeClr val="tx1"/>
+                </a:solidFill>
+                <a:latin typeface="Roboto" charset="0"/>
+                <a:ea typeface="Roboto" charset="0"/>
+                <a:cs typeface="Roboto" charset="0"/>
+              </a:defRPr>
+            </a:lvl5pPr>
+            <a:lvl6pPr marL="914400" indent="-169863" algn="l" defTabSz="914217" rtl="0" eaLnBrk="1" latinLnBrk="0" hangingPunct="1">
+              <a:lnSpc>
+                <a:spcPct val="90000"/>
+              </a:lnSpc>
+              <a:spcBef>
+                <a:spcPts val="500"/>
+              </a:spcBef>
+              <a:spcAft>
+                <a:spcPts val="1200"/>
+              </a:spcAft>
+              <a:buClr>
+                <a:schemeClr val="accent2"/>
+              </a:buClr>
+              <a:buFont typeface="Arial" panose="020B0604020202020204" pitchFamily="34" charset="0"/>
+              <a:buChar char="•"/>
+              <a:defRPr sz="1200" b="0" i="0" kern="1200">
+                <a:solidFill>
+                  <a:schemeClr val="tx1"/>
+                </a:solidFill>
+                <a:latin typeface="Roboto" charset="0"/>
+                <a:ea typeface="Roboto" charset="0"/>
+                <a:cs typeface="Roboto" charset="0"/>
+              </a:defRPr>
+            </a:lvl6pPr>
+            <a:lvl7pPr marL="1084263" indent="-169863" algn="l" defTabSz="914217" rtl="0" eaLnBrk="1" latinLnBrk="0" hangingPunct="1">
+              <a:lnSpc>
+                <a:spcPct val="90000"/>
+              </a:lnSpc>
+              <a:spcBef>
+                <a:spcPts val="500"/>
+              </a:spcBef>
+              <a:spcAft>
+                <a:spcPts val="1200"/>
+              </a:spcAft>
+              <a:buClr>
+                <a:schemeClr val="accent2"/>
+              </a:buClr>
+              <a:buFont typeface="Arial" panose="020B0604020202020204" pitchFamily="34" charset="0"/>
+              <a:buChar char="•"/>
+              <a:defRPr sz="1200" b="0" i="0" kern="1200">
+                <a:solidFill>
+                  <a:schemeClr val="tx1"/>
+                </a:solidFill>
+                <a:latin typeface="Roboto" charset="0"/>
+                <a:ea typeface="Roboto" charset="0"/>
+                <a:cs typeface="Roboto" charset="0"/>
+              </a:defRPr>
+            </a:lvl7pPr>
+            <a:lvl8pPr marL="1258888" indent="-174625" algn="l" defTabSz="914217" rtl="0" eaLnBrk="1" latinLnBrk="0" hangingPunct="1">
+              <a:lnSpc>
+                <a:spcPct val="90000"/>
+              </a:lnSpc>
+              <a:spcBef>
+                <a:spcPts val="500"/>
+              </a:spcBef>
+              <a:spcAft>
+                <a:spcPts val="1200"/>
+              </a:spcAft>
+              <a:buClr>
+                <a:schemeClr val="accent2"/>
+              </a:buClr>
+              <a:buFont typeface="Arial" panose="020B0604020202020204" pitchFamily="34" charset="0"/>
+              <a:buChar char="•"/>
+              <a:defRPr sz="1200" b="0" i="0" kern="1200">
+                <a:solidFill>
+                  <a:schemeClr val="tx1"/>
+                </a:solidFill>
+                <a:latin typeface="Roboto" charset="0"/>
+                <a:ea typeface="Roboto" charset="0"/>
+                <a:cs typeface="Roboto" charset="0"/>
+              </a:defRPr>
+            </a:lvl8pPr>
+            <a:lvl9pPr marL="1428750" indent="-169863" algn="l" defTabSz="914217" rtl="0" eaLnBrk="1" latinLnBrk="0" hangingPunct="1">
+              <a:lnSpc>
+                <a:spcPct val="90000"/>
+              </a:lnSpc>
+              <a:spcBef>
+                <a:spcPts val="500"/>
+              </a:spcBef>
+              <a:spcAft>
+                <a:spcPts val="1200"/>
+              </a:spcAft>
+              <a:buClr>
+                <a:schemeClr val="accent2"/>
+              </a:buClr>
+              <a:buFont typeface="Arial" panose="020B0604020202020204" pitchFamily="34" charset="0"/>
+              <a:buChar char="•"/>
+              <a:defRPr sz="1200" b="0" i="0" kern="1200">
+                <a:solidFill>
+                  <a:schemeClr val="tx1"/>
+                </a:solidFill>
+                <a:latin typeface="Roboto" charset="0"/>
+                <a:ea typeface="Roboto" charset="0"/>
+                <a:cs typeface="Roboto" charset="0"/>
+              </a:defRPr>
+            </a:lvl9pPr>
+          </a:lstStyle>
+          <a:p>
+            <a:pPr marL="0" indent="0">
+              <a:buNone/>
+            </a:pPr>
+            <a:endParaRPr lang="en-IN" sz="1600" dirty="0"/>
+          </a:p>
+        </p:txBody>
+      </p:sp>
+      <p:sp>
+        <p:nvSpPr>
+          <p:cNvPr id="6" name="TextBox 5">
+            <a:extLst>
+              <a:ext uri="{FF2B5EF4-FFF2-40B4-BE49-F238E27FC236}">
+                <a16:creationId xmlns:a16="http://schemas.microsoft.com/office/drawing/2014/main" id="{9F8FFC18-4FD7-5E97-CCB3-5E13CE612AEB}"/>
+              </a:ext>
+            </a:extLst>
+          </p:cNvPr>
+          <p:cNvSpPr txBox="1"/>
+          <p:nvPr/>
+        </p:nvSpPr>
+        <p:spPr>
+          <a:xfrm>
+            <a:off x="674588" y="1157381"/>
+            <a:ext cx="11088434" cy="2161552"/>
+          </a:xfrm>
+          <a:prstGeom prst="rect">
+            <a:avLst/>
+          </a:prstGeom>
+          <a:noFill/>
+        </p:spPr>
+        <p:txBody>
+          <a:bodyPr wrap="square" lIns="0" tIns="0" rIns="0" bIns="0" rtlCol="0">
+            <a:noAutofit/>
+          </a:bodyPr>
+          <a:lstStyle/>
+          <a:p>
+            <a:pPr>
+              <a:lnSpc>
+                <a:spcPct val="90000"/>
+              </a:lnSpc>
+              <a:spcAft>
+                <a:spcPts val="1000"/>
+              </a:spcAft>
+            </a:pPr>
+            <a:r>
+              <a:rPr lang="en-US" sz="1600" dirty="0">
+                <a:latin typeface="Roboto" charset="0"/>
+                <a:ea typeface="Roboto" charset="0"/>
+                <a:cs typeface="Roboto" charset="0"/>
+              </a:rPr>
+              <a:t>Things to note about the ETL :</a:t>
+            </a:r>
+          </a:p>
+          <a:p>
+            <a:pPr marL="342900" indent="-342900">
+              <a:lnSpc>
+                <a:spcPct val="90000"/>
+              </a:lnSpc>
+              <a:spcAft>
+                <a:spcPts val="1000"/>
+              </a:spcAft>
+              <a:buFont typeface="Arial" panose="020B0604020202020204" pitchFamily="34" charset="0"/>
+              <a:buChar char="•"/>
+            </a:pPr>
+            <a:r>
+              <a:rPr lang="en-US" sz="2000" dirty="0">
+                <a:latin typeface="Roboto" charset="0"/>
+                <a:ea typeface="Roboto" charset="0"/>
+                <a:cs typeface="Roboto" charset="0"/>
+              </a:rPr>
+              <a:t>The script uses no APIs. In order to </a:t>
+            </a:r>
+            <a:r>
+              <a:rPr lang="en-US" sz="2000" dirty="0" err="1">
+                <a:latin typeface="Roboto" charset="0"/>
+                <a:ea typeface="Roboto" charset="0"/>
+                <a:cs typeface="Roboto" charset="0"/>
+              </a:rPr>
+              <a:t>to</a:t>
+            </a:r>
+            <a:r>
+              <a:rPr lang="en-US" sz="2000" dirty="0">
+                <a:latin typeface="Roboto" charset="0"/>
+                <a:ea typeface="Roboto" charset="0"/>
+                <a:cs typeface="Roboto" charset="0"/>
+              </a:rPr>
+              <a:t> get the templates, the script needs a copy of the metamodel (</a:t>
+            </a:r>
+            <a:r>
+              <a:rPr lang="en-US" sz="2000" dirty="0" err="1">
+                <a:latin typeface="Roboto" charset="0"/>
+                <a:ea typeface="Roboto" charset="0"/>
+                <a:cs typeface="Roboto" charset="0"/>
+              </a:rPr>
+              <a:t>json</a:t>
+            </a:r>
+            <a:r>
+              <a:rPr lang="en-US" sz="2000" dirty="0">
+                <a:latin typeface="Roboto" charset="0"/>
+                <a:ea typeface="Roboto" charset="0"/>
+                <a:cs typeface="Roboto" charset="0"/>
+              </a:rPr>
+              <a:t>) and template (zip) placed in the “templates” folder </a:t>
+            </a:r>
+          </a:p>
+          <a:p>
+            <a:pPr marL="342900" indent="-342900">
+              <a:lnSpc>
+                <a:spcPct val="90000"/>
+              </a:lnSpc>
+              <a:spcAft>
+                <a:spcPts val="1000"/>
+              </a:spcAft>
+              <a:buFont typeface="Arial" panose="020B0604020202020204" pitchFamily="34" charset="0"/>
+              <a:buChar char="•"/>
+            </a:pPr>
+            <a:r>
+              <a:rPr lang="en-US" sz="2000" dirty="0">
+                <a:latin typeface="Roboto" charset="0"/>
+                <a:ea typeface="Roboto" charset="0"/>
+                <a:cs typeface="Roboto" charset="0"/>
+              </a:rPr>
+              <a:t>If the ETL Name entered does not exist, it will give the logic to create it, but it won’t have the ID needed for the lineage portion. It will but a “placeholder” in the links.csv file. I would suggest you manually create the resource (of the same name), and don’t run a scan. This will produce the ID that will be used.</a:t>
+            </a:r>
+          </a:p>
+          <a:p>
+            <a:pPr marL="342900" indent="-342900">
+              <a:lnSpc>
+                <a:spcPct val="90000"/>
+              </a:lnSpc>
+              <a:spcAft>
+                <a:spcPts val="1000"/>
+              </a:spcAft>
+              <a:buFont typeface="Arial" panose="020B0604020202020204" pitchFamily="34" charset="0"/>
+              <a:buChar char="•"/>
+            </a:pPr>
+            <a:endParaRPr lang="en-US" sz="2000" dirty="0">
+              <a:latin typeface="Roboto" charset="0"/>
+              <a:ea typeface="Roboto" charset="0"/>
+              <a:cs typeface="Roboto" charset="0"/>
+            </a:endParaRPr>
+          </a:p>
+          <a:p>
+            <a:pPr marL="342900" indent="-342900">
+              <a:lnSpc>
+                <a:spcPct val="90000"/>
+              </a:lnSpc>
+              <a:spcAft>
+                <a:spcPts val="1000"/>
+              </a:spcAft>
+              <a:buFont typeface="Arial" panose="020B0604020202020204" pitchFamily="34" charset="0"/>
+              <a:buChar char="•"/>
+            </a:pPr>
+            <a:endParaRPr lang="en-US" sz="1600" dirty="0">
+              <a:latin typeface="Roboto" charset="0"/>
+              <a:ea typeface="Roboto" charset="0"/>
+              <a:cs typeface="Roboto" charset="0"/>
+            </a:endParaRPr>
+          </a:p>
+          <a:p>
+            <a:pPr marL="342900" indent="-342900">
+              <a:lnSpc>
+                <a:spcPct val="90000"/>
+              </a:lnSpc>
+              <a:spcAft>
+                <a:spcPts val="1000"/>
+              </a:spcAft>
+              <a:buFont typeface="Arial" panose="020B0604020202020204" pitchFamily="34" charset="0"/>
+              <a:buChar char="•"/>
+            </a:pPr>
+            <a:endParaRPr lang="en-US" sz="1600" dirty="0">
+              <a:latin typeface="Roboto" charset="0"/>
+              <a:ea typeface="Roboto" charset="0"/>
+              <a:cs typeface="Roboto" charset="0"/>
+            </a:endParaRPr>
+          </a:p>
+        </p:txBody>
+      </p:sp>
+    </p:spTree>
+    <p:extLst>
+      <p:ext uri="{BB962C8B-B14F-4D97-AF65-F5344CB8AC3E}">
+        <p14:creationId xmlns:p14="http://schemas.microsoft.com/office/powerpoint/2010/main" val="456076945"/>
+      </p:ext>
+    </p:extLst>
+  </p:cSld>
+  <p:clrMapOvr>
+    <a:masterClrMapping/>
+  </p:clrMapOvr>
+  <mc:AlternateContent xmlns:mc="http://schemas.openxmlformats.org/markup-compatibility/2006" xmlns:p14="http://schemas.microsoft.com/office/powerpoint/2010/main">
+    <mc:Choice Requires="p14">
+      <p:transition spd="med" p14:dur="700" advClick="0">
+        <p:fade/>
+      </p:transition>
+    </mc:Choice>
+    <mc:Fallback xmlns="">
+      <p:transition spd="med" advClick="0">
+        <p:fade/>
+      </p:transition>
+    </mc:Fallback>
+  </mc:AlternateContent>
+</p:sld>
+</file>
+
+<file path=ppt/slides/slide7.xml><?xml version="1.0" encoding="utf-8"?>
+<p:sld xmlns:a="http://schemas.openxmlformats.org/drawingml/2006/main" xmlns:r="http://schemas.openxmlformats.org/officeDocument/2006/relationships" xmlns:p="http://schemas.openxmlformats.org/presentationml/2006/main">
+  <p:cSld>
+    <p:spTree>
+      <p:nvGrpSpPr>
+        <p:cNvPr id="1" name=""/>
+        <p:cNvGrpSpPr/>
+        <p:nvPr/>
+      </p:nvGrpSpPr>
+      <p:grpSpPr>
+        <a:xfrm>
+          <a:off x="0" y="0"/>
+          <a:ext cx="0" cy="0"/>
+          <a:chOff x="0" y="0"/>
+          <a:chExt cx="0" cy="0"/>
+        </a:xfrm>
+      </p:grpSpPr>
+      <p:sp>
+        <p:nvSpPr>
+          <p:cNvPr id="5" name="Title 4">
+            <a:extLst>
+              <a:ext uri="{FF2B5EF4-FFF2-40B4-BE49-F238E27FC236}">
+                <a16:creationId xmlns:a16="http://schemas.microsoft.com/office/drawing/2014/main" id="{C2B479B7-4E1E-475F-B459-5CE8B05302D3}"/>
+              </a:ext>
+            </a:extLst>
+          </p:cNvPr>
+          <p:cNvSpPr>
+            <a:spLocks noGrp="1"/>
+          </p:cNvSpPr>
+          <p:nvPr>
+            <p:ph type="title"/>
+          </p:nvPr>
+        </p:nvSpPr>
+        <p:spPr>
+          <a:xfrm>
+            <a:off x="319060" y="187082"/>
+            <a:ext cx="11195177" cy="562427"/>
+          </a:xfrm>
+        </p:spPr>
+        <p:txBody>
+          <a:bodyPr/>
+          <a:lstStyle/>
+          <a:p>
+            <a:r>
+              <a:rPr lang="en-US" dirty="0"/>
+              <a:t>Usage</a:t>
+            </a:r>
+            <a:endParaRPr lang="en-IN" dirty="0"/>
+          </a:p>
+        </p:txBody>
+      </p:sp>
+      <p:sp>
+        <p:nvSpPr>
+          <p:cNvPr id="16" name="Content Placeholder 13">
+            <a:extLst>
+              <a:ext uri="{FF2B5EF4-FFF2-40B4-BE49-F238E27FC236}">
+                <a16:creationId xmlns:a16="http://schemas.microsoft.com/office/drawing/2014/main" id="{807EB0DB-72EF-4CAE-8A2F-F7E55C093081}"/>
+              </a:ext>
+            </a:extLst>
+          </p:cNvPr>
+          <p:cNvSpPr txBox="1">
+            <a:spLocks/>
+          </p:cNvSpPr>
+          <p:nvPr/>
+        </p:nvSpPr>
+        <p:spPr>
+          <a:xfrm>
+            <a:off x="1180247" y="1610532"/>
+            <a:ext cx="3180631" cy="2562457"/>
+          </a:xfrm>
+          <a:prstGeom prst="rect">
+            <a:avLst/>
+          </a:prstGeom>
+        </p:spPr>
+        <p:txBody>
+          <a:bodyPr vert="horz" lIns="0" tIns="0" rIns="0" bIns="0" rtlCol="0">
+            <a:noAutofit/>
+          </a:bodyPr>
+          <a:lstStyle>
+            <a:lvl1pPr marL="173038" indent="-173038" algn="l" defTabSz="914217" rtl="0" eaLnBrk="1" latinLnBrk="0" hangingPunct="1">
+              <a:lnSpc>
+                <a:spcPct val="90000"/>
+              </a:lnSpc>
+              <a:spcBef>
+                <a:spcPts val="400"/>
+              </a:spcBef>
+              <a:spcAft>
+                <a:spcPts val="1200"/>
+              </a:spcAft>
+              <a:buClr>
+                <a:schemeClr val="accent2"/>
+              </a:buClr>
+              <a:buFont typeface="Arial" panose="020B0604020202020204" pitchFamily="34" charset="0"/>
+              <a:buChar char="•"/>
+              <a:defRPr sz="2100" b="0" i="0" kern="1200" baseline="0">
+                <a:solidFill>
+                  <a:schemeClr val="tx1"/>
+                </a:solidFill>
+                <a:latin typeface="Roboto" charset="0"/>
+                <a:ea typeface="Roboto" charset="0"/>
+                <a:cs typeface="Roboto" charset="0"/>
+              </a:defRPr>
+            </a:lvl1pPr>
+            <a:lvl2pPr marL="344488" indent="-174625" algn="l" defTabSz="914217" rtl="0" eaLnBrk="1" latinLnBrk="0" hangingPunct="1">
+              <a:lnSpc>
+                <a:spcPct val="90000"/>
+              </a:lnSpc>
+              <a:spcBef>
+                <a:spcPts val="0"/>
+              </a:spcBef>
+              <a:spcAft>
+                <a:spcPts val="1200"/>
+              </a:spcAft>
+              <a:buClr>
+                <a:schemeClr val="accent2"/>
+              </a:buClr>
+              <a:buFont typeface="Arial" panose="020B0604020202020204" pitchFamily="34" charset="0"/>
+              <a:buChar char="•"/>
+              <a:defRPr sz="1800" b="0" i="0" kern="1200" baseline="0">
+                <a:solidFill>
+                  <a:schemeClr val="tx1"/>
+                </a:solidFill>
+                <a:latin typeface="Roboto" charset="0"/>
+                <a:ea typeface="Roboto" charset="0"/>
+                <a:cs typeface="Roboto" charset="0"/>
+              </a:defRPr>
+            </a:lvl2pPr>
+            <a:lvl3pPr marL="514350" indent="-169863" algn="l" defTabSz="914217" rtl="0" eaLnBrk="1" latinLnBrk="0" hangingPunct="1">
+              <a:lnSpc>
+                <a:spcPct val="90000"/>
+              </a:lnSpc>
+              <a:spcBef>
+                <a:spcPts val="0"/>
+              </a:spcBef>
+              <a:spcAft>
+                <a:spcPts val="1200"/>
+              </a:spcAft>
+              <a:buClr>
+                <a:schemeClr val="accent2"/>
+              </a:buClr>
+              <a:buFont typeface="Arial" panose="020B0604020202020204" pitchFamily="34" charset="0"/>
+              <a:buChar char="•"/>
+              <a:defRPr sz="1600" b="0" i="0" kern="1200">
+                <a:solidFill>
+                  <a:schemeClr val="tx1"/>
+                </a:solidFill>
+                <a:latin typeface="Roboto" charset="0"/>
+                <a:ea typeface="Roboto" charset="0"/>
+                <a:cs typeface="Roboto" charset="0"/>
+              </a:defRPr>
+            </a:lvl3pPr>
+            <a:lvl4pPr marL="630238" indent="-171450" algn="l" defTabSz="914217" rtl="0" eaLnBrk="1" latinLnBrk="0" hangingPunct="1">
+              <a:lnSpc>
+                <a:spcPct val="90000"/>
+              </a:lnSpc>
+              <a:spcBef>
+                <a:spcPts val="0"/>
+              </a:spcBef>
+              <a:spcAft>
+                <a:spcPts val="1200"/>
+              </a:spcAft>
+              <a:buClr>
+                <a:schemeClr val="accent2"/>
+              </a:buClr>
+              <a:buFont typeface="Arial" panose="020B0604020202020204" pitchFamily="34" charset="0"/>
+              <a:buChar char="•"/>
+              <a:defRPr sz="1400" b="0" i="0" kern="1200">
+                <a:solidFill>
+                  <a:schemeClr val="tx1"/>
+                </a:solidFill>
+                <a:latin typeface="Roboto" charset="0"/>
+                <a:ea typeface="Roboto" charset="0"/>
+                <a:cs typeface="Roboto" charset="0"/>
+              </a:defRPr>
+            </a:lvl4pPr>
+            <a:lvl5pPr marL="800100" indent="-169863" algn="l" defTabSz="914217" rtl="0" eaLnBrk="1" latinLnBrk="0" hangingPunct="1">
+              <a:lnSpc>
+                <a:spcPct val="90000"/>
+              </a:lnSpc>
+              <a:spcBef>
+                <a:spcPts val="0"/>
+              </a:spcBef>
+              <a:spcAft>
+                <a:spcPts val="1200"/>
+              </a:spcAft>
+              <a:buClr>
+                <a:schemeClr val="accent2"/>
+              </a:buClr>
+              <a:buFont typeface="Arial" panose="020B0604020202020204" pitchFamily="34" charset="0"/>
+              <a:buChar char="•"/>
+              <a:defRPr sz="1400" b="0" i="0" kern="1200">
+                <a:solidFill>
+                  <a:schemeClr val="tx1"/>
+                </a:solidFill>
+                <a:latin typeface="Roboto" charset="0"/>
+                <a:ea typeface="Roboto" charset="0"/>
+                <a:cs typeface="Roboto" charset="0"/>
+              </a:defRPr>
+            </a:lvl5pPr>
+            <a:lvl6pPr marL="914400" indent="-169863" algn="l" defTabSz="914217" rtl="0" eaLnBrk="1" latinLnBrk="0" hangingPunct="1">
+              <a:lnSpc>
+                <a:spcPct val="90000"/>
+              </a:lnSpc>
+              <a:spcBef>
+                <a:spcPts val="500"/>
+              </a:spcBef>
+              <a:spcAft>
+                <a:spcPts val="1200"/>
+              </a:spcAft>
+              <a:buClr>
+                <a:schemeClr val="accent2"/>
+              </a:buClr>
+              <a:buFont typeface="Arial" panose="020B0604020202020204" pitchFamily="34" charset="0"/>
+              <a:buChar char="•"/>
+              <a:defRPr sz="1200" b="0" i="0" kern="1200">
+                <a:solidFill>
+                  <a:schemeClr val="tx1"/>
+                </a:solidFill>
+                <a:latin typeface="Roboto" charset="0"/>
+                <a:ea typeface="Roboto" charset="0"/>
+                <a:cs typeface="Roboto" charset="0"/>
+              </a:defRPr>
+            </a:lvl6pPr>
+            <a:lvl7pPr marL="1084263" indent="-169863" algn="l" defTabSz="914217" rtl="0" eaLnBrk="1" latinLnBrk="0" hangingPunct="1">
+              <a:lnSpc>
+                <a:spcPct val="90000"/>
+              </a:lnSpc>
+              <a:spcBef>
+                <a:spcPts val="500"/>
+              </a:spcBef>
+              <a:spcAft>
+                <a:spcPts val="1200"/>
+              </a:spcAft>
+              <a:buClr>
+                <a:schemeClr val="accent2"/>
+              </a:buClr>
+              <a:buFont typeface="Arial" panose="020B0604020202020204" pitchFamily="34" charset="0"/>
+              <a:buChar char="•"/>
+              <a:defRPr sz="1200" b="0" i="0" kern="1200">
+                <a:solidFill>
+                  <a:schemeClr val="tx1"/>
+                </a:solidFill>
+                <a:latin typeface="Roboto" charset="0"/>
+                <a:ea typeface="Roboto" charset="0"/>
+                <a:cs typeface="Roboto" charset="0"/>
+              </a:defRPr>
+            </a:lvl7pPr>
+            <a:lvl8pPr marL="1258888" indent="-174625" algn="l" defTabSz="914217" rtl="0" eaLnBrk="1" latinLnBrk="0" hangingPunct="1">
+              <a:lnSpc>
+                <a:spcPct val="90000"/>
+              </a:lnSpc>
+              <a:spcBef>
+                <a:spcPts val="500"/>
+              </a:spcBef>
+              <a:spcAft>
+                <a:spcPts val="1200"/>
+              </a:spcAft>
+              <a:buClr>
+                <a:schemeClr val="accent2"/>
+              </a:buClr>
+              <a:buFont typeface="Arial" panose="020B0604020202020204" pitchFamily="34" charset="0"/>
+              <a:buChar char="•"/>
+              <a:defRPr sz="1200" b="0" i="0" kern="1200">
+                <a:solidFill>
+                  <a:schemeClr val="tx1"/>
+                </a:solidFill>
+                <a:latin typeface="Roboto" charset="0"/>
+                <a:ea typeface="Roboto" charset="0"/>
+                <a:cs typeface="Roboto" charset="0"/>
+              </a:defRPr>
+            </a:lvl8pPr>
+            <a:lvl9pPr marL="1428750" indent="-169863" algn="l" defTabSz="914217" rtl="0" eaLnBrk="1" latinLnBrk="0" hangingPunct="1">
+              <a:lnSpc>
+                <a:spcPct val="90000"/>
+              </a:lnSpc>
+              <a:spcBef>
+                <a:spcPts val="500"/>
+              </a:spcBef>
+              <a:spcAft>
+                <a:spcPts val="1200"/>
+              </a:spcAft>
+              <a:buClr>
+                <a:schemeClr val="accent2"/>
+              </a:buClr>
+              <a:buFont typeface="Arial" panose="020B0604020202020204" pitchFamily="34" charset="0"/>
+              <a:buChar char="•"/>
+              <a:defRPr sz="1200" b="0" i="0" kern="1200">
+                <a:solidFill>
+                  <a:schemeClr val="tx1"/>
+                </a:solidFill>
+                <a:latin typeface="Roboto" charset="0"/>
+                <a:ea typeface="Roboto" charset="0"/>
+                <a:cs typeface="Roboto" charset="0"/>
+              </a:defRPr>
+            </a:lvl9pPr>
+          </a:lstStyle>
+          <a:p>
+            <a:pPr marL="0" indent="0">
+              <a:buNone/>
+            </a:pPr>
+            <a:endParaRPr lang="en-IN" sz="1600" dirty="0"/>
+          </a:p>
+        </p:txBody>
+      </p:sp>
+      <p:sp>
+        <p:nvSpPr>
+          <p:cNvPr id="6" name="TextBox 5">
+            <a:extLst>
+              <a:ext uri="{FF2B5EF4-FFF2-40B4-BE49-F238E27FC236}">
+                <a16:creationId xmlns:a16="http://schemas.microsoft.com/office/drawing/2014/main" id="{9F8FFC18-4FD7-5E97-CCB3-5E13CE612AEB}"/>
+              </a:ext>
+            </a:extLst>
+          </p:cNvPr>
+          <p:cNvSpPr txBox="1"/>
+          <p:nvPr/>
+        </p:nvSpPr>
+        <p:spPr>
+          <a:xfrm>
+            <a:off x="595566" y="749509"/>
+            <a:ext cx="11195176" cy="5414224"/>
+          </a:xfrm>
+          <a:prstGeom prst="rect">
+            <a:avLst/>
+          </a:prstGeom>
+          <a:noFill/>
+        </p:spPr>
+        <p:txBody>
+          <a:bodyPr wrap="square" lIns="0" tIns="0" rIns="0" bIns="0" rtlCol="0">
+            <a:noAutofit/>
+          </a:bodyPr>
+          <a:lstStyle/>
+          <a:p>
+            <a:pPr>
+              <a:lnSpc>
+                <a:spcPct val="90000"/>
+              </a:lnSpc>
+              <a:spcAft>
+                <a:spcPts val="1000"/>
+              </a:spcAft>
+            </a:pPr>
+            <a:r>
+              <a:rPr lang="en-US" sz="1600" dirty="0">
+                <a:latin typeface="Roboto" charset="0"/>
+                <a:ea typeface="Roboto" charset="0"/>
+                <a:cs typeface="Roboto" charset="0"/>
+              </a:rPr>
+              <a:t>Things to note about the ETL :</a:t>
+            </a:r>
+          </a:p>
+          <a:p>
+            <a:pPr marL="342900" indent="-342900">
+              <a:lnSpc>
+                <a:spcPct val="90000"/>
+              </a:lnSpc>
+              <a:spcAft>
+                <a:spcPts val="1000"/>
+              </a:spcAft>
+              <a:buFont typeface="+mj-lt"/>
+              <a:buAutoNum type="arabicPeriod"/>
+            </a:pPr>
+            <a:r>
+              <a:rPr lang="en-US" sz="1600" dirty="0">
+                <a:latin typeface="Roboto" charset="0"/>
+                <a:ea typeface="Roboto" charset="0"/>
+                <a:cs typeface="Roboto" charset="0"/>
+              </a:rPr>
+              <a:t>(optional) If you’re going to be using a new Custom Source, create the custom source within MCC (using the exact name you’ll use. For the Zip file, provide any zip file (as a placeholder), and do not run the scan. (This will create the resource, and generate a unique ID for the resource, that the script will use for lineage)</a:t>
+            </a:r>
+          </a:p>
+          <a:p>
+            <a:pPr marL="342900" indent="-342900">
+              <a:lnSpc>
+                <a:spcPct val="90000"/>
+              </a:lnSpc>
+              <a:spcAft>
+                <a:spcPts val="1000"/>
+              </a:spcAft>
+              <a:buFont typeface="+mj-lt"/>
+              <a:buAutoNum type="arabicPeriod"/>
+            </a:pPr>
+            <a:r>
+              <a:rPr lang="en-US" sz="1600" dirty="0">
+                <a:latin typeface="Roboto" charset="0"/>
+                <a:ea typeface="Roboto" charset="0"/>
+                <a:cs typeface="Roboto" charset="0"/>
+              </a:rPr>
+              <a:t>(optional) If you’re going to using a Custom Source, download the metamodel (</a:t>
+            </a:r>
+            <a:r>
+              <a:rPr lang="en-US" sz="1600" dirty="0" err="1">
+                <a:latin typeface="Roboto" charset="0"/>
+                <a:ea typeface="Roboto" charset="0"/>
+                <a:cs typeface="Roboto" charset="0"/>
+              </a:rPr>
+              <a:t>json</a:t>
+            </a:r>
+            <a:r>
+              <a:rPr lang="en-US" sz="1600" dirty="0">
+                <a:latin typeface="Roboto" charset="0"/>
+                <a:ea typeface="Roboto" charset="0"/>
+                <a:cs typeface="Roboto" charset="0"/>
+              </a:rPr>
+              <a:t>) and the metadata template (zip) from MCC, and place these files in the “templates” directory. (for convenience, included are the files required for IICSv2)</a:t>
+            </a:r>
+          </a:p>
+          <a:p>
+            <a:pPr marL="342900" indent="-342900">
+              <a:lnSpc>
+                <a:spcPct val="90000"/>
+              </a:lnSpc>
+              <a:spcAft>
+                <a:spcPts val="1000"/>
+              </a:spcAft>
+              <a:buFont typeface="+mj-lt"/>
+              <a:buAutoNum type="arabicPeriod"/>
+            </a:pPr>
+            <a:endParaRPr lang="en-US" sz="1600" dirty="0">
+              <a:latin typeface="Roboto" charset="0"/>
+              <a:ea typeface="Roboto" charset="0"/>
+              <a:cs typeface="Roboto" charset="0"/>
+            </a:endParaRPr>
+          </a:p>
+          <a:p>
+            <a:pPr marL="342900" indent="-342900">
+              <a:lnSpc>
+                <a:spcPct val="90000"/>
+              </a:lnSpc>
+              <a:spcAft>
+                <a:spcPts val="1000"/>
+              </a:spcAft>
+              <a:buFont typeface="+mj-lt"/>
+              <a:buAutoNum type="arabicPeriod"/>
+            </a:pPr>
+            <a:r>
+              <a:rPr lang="en-US" sz="1600" dirty="0">
+                <a:latin typeface="Roboto" charset="0"/>
+                <a:ea typeface="Roboto" charset="0"/>
+                <a:cs typeface="Roboto" charset="0"/>
+              </a:rPr>
+              <a:t>Within CDGC, run a search for “Resources”. Export the results. When completes, you’ll either have an excel (xlsx) or a zip file. Whichever it is, save it in the same directory as the python script.</a:t>
+            </a:r>
+          </a:p>
+          <a:p>
+            <a:pPr marL="342900" indent="-342900">
+              <a:lnSpc>
+                <a:spcPct val="90000"/>
+              </a:lnSpc>
+              <a:spcAft>
+                <a:spcPts val="1000"/>
+              </a:spcAft>
+              <a:buFont typeface="+mj-lt"/>
+              <a:buAutoNum type="arabicPeriod"/>
+            </a:pPr>
+            <a:r>
+              <a:rPr lang="en-US" sz="1600" dirty="0">
+                <a:latin typeface="Roboto" charset="0"/>
+                <a:ea typeface="Roboto" charset="0"/>
+                <a:cs typeface="Roboto" charset="0"/>
+              </a:rPr>
+              <a:t>Modify the config.csv (or other csv filename) file for your information.</a:t>
+            </a:r>
+          </a:p>
+          <a:p>
+            <a:pPr marL="342900" indent="-342900">
+              <a:lnSpc>
+                <a:spcPct val="90000"/>
+              </a:lnSpc>
+              <a:spcAft>
+                <a:spcPts val="1000"/>
+              </a:spcAft>
+              <a:buFont typeface="+mj-lt"/>
+              <a:buAutoNum type="arabicPeriod"/>
+            </a:pPr>
+            <a:r>
+              <a:rPr lang="en-US" sz="1600" dirty="0">
+                <a:latin typeface="Roboto" charset="0"/>
+                <a:ea typeface="Roboto" charset="0"/>
+                <a:cs typeface="Roboto" charset="0"/>
+              </a:rPr>
+              <a:t>(if first time running) Run pip to get the required libraries: </a:t>
+            </a:r>
+          </a:p>
+          <a:p>
+            <a:pPr marL="342900" indent="-342900">
+              <a:lnSpc>
+                <a:spcPct val="90000"/>
+              </a:lnSpc>
+              <a:spcAft>
+                <a:spcPts val="1000"/>
+              </a:spcAft>
+              <a:buFont typeface="+mj-lt"/>
+              <a:buAutoNum type="arabicPeriod"/>
+            </a:pPr>
+            <a:r>
+              <a:rPr lang="en-US" sz="1600" dirty="0">
+                <a:latin typeface="Roboto" charset="0"/>
+                <a:ea typeface="Roboto" charset="0"/>
+                <a:cs typeface="Roboto" charset="0"/>
+              </a:rPr>
+              <a:t>Execute the script (if using config other than config.csv, specify that file. Examples:</a:t>
+            </a:r>
+          </a:p>
+          <a:p>
+            <a:pPr marL="342900" indent="-342900">
+              <a:lnSpc>
+                <a:spcPct val="90000"/>
+              </a:lnSpc>
+              <a:spcAft>
+                <a:spcPts val="1000"/>
+              </a:spcAft>
+              <a:buFont typeface="+mj-lt"/>
+              <a:buAutoNum type="arabicPeriod"/>
+            </a:pPr>
+            <a:endParaRPr lang="en-US" sz="1600" dirty="0">
+              <a:latin typeface="Roboto" charset="0"/>
+              <a:ea typeface="Roboto" charset="0"/>
+              <a:cs typeface="Roboto" charset="0"/>
+            </a:endParaRPr>
+          </a:p>
+          <a:p>
+            <a:pPr marL="342900" indent="-342900">
+              <a:lnSpc>
+                <a:spcPct val="90000"/>
+              </a:lnSpc>
+              <a:spcAft>
+                <a:spcPts val="1000"/>
+              </a:spcAft>
+              <a:buFont typeface="+mj-lt"/>
+              <a:buAutoNum type="arabicPeriod"/>
+            </a:pPr>
+            <a:endParaRPr lang="en-US" sz="1600" dirty="0">
+              <a:latin typeface="Roboto" charset="0"/>
+              <a:ea typeface="Roboto" charset="0"/>
+              <a:cs typeface="Roboto" charset="0"/>
+            </a:endParaRPr>
+          </a:p>
+          <a:p>
+            <a:pPr marL="342900" indent="-342900">
+              <a:lnSpc>
+                <a:spcPct val="90000"/>
+              </a:lnSpc>
+              <a:spcAft>
+                <a:spcPts val="1000"/>
+              </a:spcAft>
+              <a:buFont typeface="+mj-lt"/>
+              <a:buAutoNum type="arabicPeriod"/>
+            </a:pPr>
+            <a:endParaRPr lang="en-US" sz="1600" dirty="0">
+              <a:latin typeface="Roboto" charset="0"/>
+              <a:ea typeface="Roboto" charset="0"/>
+              <a:cs typeface="Roboto" charset="0"/>
+            </a:endParaRPr>
+          </a:p>
+          <a:p>
+            <a:pPr marL="342900" indent="-342900">
+              <a:lnSpc>
+                <a:spcPct val="90000"/>
+              </a:lnSpc>
+              <a:spcAft>
+                <a:spcPts val="1000"/>
+              </a:spcAft>
+              <a:buFont typeface="+mj-lt"/>
+              <a:buAutoNum type="arabicPeriod"/>
+            </a:pPr>
+            <a:r>
+              <a:rPr lang="en-US" sz="1600" dirty="0">
+                <a:latin typeface="Roboto" charset="0"/>
+                <a:ea typeface="Roboto" charset="0"/>
+                <a:cs typeface="Roboto" charset="0"/>
+              </a:rPr>
+              <a:t>From within MCC, create a custom resource and use the lineage_&lt;timestamp&gt;.zip for the lineage</a:t>
+            </a:r>
+          </a:p>
+          <a:p>
+            <a:pPr marL="342900" indent="-342900">
+              <a:lnSpc>
+                <a:spcPct val="90000"/>
+              </a:lnSpc>
+              <a:spcAft>
+                <a:spcPts val="1000"/>
+              </a:spcAft>
+              <a:buFont typeface="+mj-lt"/>
+              <a:buAutoNum type="arabicPeriod"/>
+            </a:pPr>
+            <a:r>
+              <a:rPr lang="en-US" sz="1600" dirty="0">
+                <a:latin typeface="Roboto" charset="0"/>
+                <a:ea typeface="Roboto" charset="0"/>
+                <a:cs typeface="Roboto" charset="0"/>
+              </a:rPr>
+              <a:t>From within MCC, create a custom resource and use the &lt;</a:t>
+            </a:r>
+            <a:r>
+              <a:rPr lang="en-US" sz="1600" dirty="0" err="1">
+                <a:latin typeface="Roboto" charset="0"/>
+                <a:ea typeface="Roboto" charset="0"/>
+                <a:cs typeface="Roboto" charset="0"/>
+              </a:rPr>
+              <a:t>Resource_Name</a:t>
+            </a:r>
+            <a:r>
+              <a:rPr lang="en-US" sz="1600" dirty="0">
+                <a:latin typeface="Roboto" charset="0"/>
+                <a:ea typeface="Roboto" charset="0"/>
+                <a:cs typeface="Roboto" charset="0"/>
+              </a:rPr>
+              <a:t>&gt;_&lt;timestamp&gt;.zip for the ETL</a:t>
+            </a:r>
+          </a:p>
+          <a:p>
+            <a:pPr marL="342900" indent="-342900">
+              <a:lnSpc>
+                <a:spcPct val="90000"/>
+              </a:lnSpc>
+              <a:spcAft>
+                <a:spcPts val="1000"/>
+              </a:spcAft>
+              <a:buFont typeface="+mj-lt"/>
+              <a:buAutoNum type="arabicPeriod"/>
+            </a:pPr>
+            <a:endParaRPr lang="en-US" sz="1600" dirty="0">
+              <a:latin typeface="Roboto" charset="0"/>
+              <a:ea typeface="Roboto" charset="0"/>
+              <a:cs typeface="Roboto" charset="0"/>
+            </a:endParaRPr>
+          </a:p>
+          <a:p>
+            <a:pPr marL="342900" indent="-342900">
+              <a:lnSpc>
+                <a:spcPct val="90000"/>
+              </a:lnSpc>
+              <a:spcAft>
+                <a:spcPts val="1000"/>
+              </a:spcAft>
+              <a:buFont typeface="+mj-lt"/>
+              <a:buAutoNum type="arabicPeriod"/>
+            </a:pPr>
+            <a:endParaRPr lang="en-US" sz="1600" dirty="0">
+              <a:latin typeface="Roboto" charset="0"/>
+              <a:ea typeface="Roboto" charset="0"/>
+              <a:cs typeface="Roboto" charset="0"/>
+            </a:endParaRPr>
+          </a:p>
+          <a:p>
+            <a:pPr marL="342900" indent="-342900">
+              <a:lnSpc>
+                <a:spcPct val="90000"/>
+              </a:lnSpc>
+              <a:spcAft>
+                <a:spcPts val="1000"/>
+              </a:spcAft>
+              <a:buFont typeface="Arial" panose="020B0604020202020204" pitchFamily="34" charset="0"/>
+              <a:buChar char="•"/>
+            </a:pPr>
+            <a:endParaRPr lang="en-US" sz="2000" dirty="0">
+              <a:latin typeface="Roboto" charset="0"/>
+              <a:ea typeface="Roboto" charset="0"/>
+              <a:cs typeface="Roboto" charset="0"/>
+            </a:endParaRPr>
+          </a:p>
+          <a:p>
+            <a:pPr marL="342900" indent="-342900">
+              <a:lnSpc>
+                <a:spcPct val="90000"/>
+              </a:lnSpc>
+              <a:spcAft>
+                <a:spcPts val="1000"/>
+              </a:spcAft>
+              <a:buFont typeface="Arial" panose="020B0604020202020204" pitchFamily="34" charset="0"/>
+              <a:buChar char="•"/>
+            </a:pPr>
+            <a:endParaRPr lang="en-US" sz="1600" dirty="0">
+              <a:latin typeface="Roboto" charset="0"/>
+              <a:ea typeface="Roboto" charset="0"/>
+              <a:cs typeface="Roboto" charset="0"/>
+            </a:endParaRPr>
+          </a:p>
+          <a:p>
+            <a:pPr marL="342900" indent="-342900">
+              <a:lnSpc>
+                <a:spcPct val="90000"/>
+              </a:lnSpc>
+              <a:spcAft>
+                <a:spcPts val="1000"/>
+              </a:spcAft>
+              <a:buFont typeface="Arial" panose="020B0604020202020204" pitchFamily="34" charset="0"/>
+              <a:buChar char="•"/>
+            </a:pPr>
+            <a:endParaRPr lang="en-US" sz="1600" dirty="0">
+              <a:latin typeface="Roboto" charset="0"/>
+              <a:ea typeface="Roboto" charset="0"/>
+              <a:cs typeface="Roboto" charset="0"/>
+            </a:endParaRPr>
+          </a:p>
+        </p:txBody>
+      </p:sp>
+      <p:graphicFrame>
+        <p:nvGraphicFramePr>
+          <p:cNvPr id="2" name="Table 1">
+            <a:extLst>
+              <a:ext uri="{FF2B5EF4-FFF2-40B4-BE49-F238E27FC236}">
+                <a16:creationId xmlns:a16="http://schemas.microsoft.com/office/drawing/2014/main" id="{CBB87940-D3D1-FDC2-E236-808263BFFA99}"/>
+              </a:ext>
+            </a:extLst>
+          </p:cNvPr>
+          <p:cNvGraphicFramePr>
+            <a:graphicFrameLocks noGrp="1"/>
+          </p:cNvGraphicFramePr>
+          <p:nvPr>
+            <p:extLst>
+              <p:ext uri="{D42A27DB-BD31-4B8C-83A1-F6EECF244321}">
+                <p14:modId xmlns:p14="http://schemas.microsoft.com/office/powerpoint/2010/main" val="712019081"/>
+              </p:ext>
+            </p:extLst>
+          </p:nvPr>
+        </p:nvGraphicFramePr>
+        <p:xfrm>
+          <a:off x="1546049" y="4355869"/>
+          <a:ext cx="8546218" cy="914400"/>
+        </p:xfrm>
+        <a:graphic>
+          <a:graphicData uri="http://schemas.openxmlformats.org/drawingml/2006/table">
+            <a:tbl>
+              <a:tblPr firstRow="1" bandRow="1">
+                <a:tableStyleId>{5C22544A-7EE6-4342-B048-85BDC9FD1C3A}</a:tableStyleId>
+              </a:tblPr>
+              <a:tblGrid>
+                <a:gridCol w="8546218">
+                  <a:extLst>
+                    <a:ext uri="{9D8B030D-6E8A-4147-A177-3AD203B41FA5}">
+                      <a16:colId xmlns:a16="http://schemas.microsoft.com/office/drawing/2014/main" val="1261491639"/>
+                    </a:ext>
+                  </a:extLst>
+                </a:gridCol>
+              </a:tblGrid>
+              <a:tr h="338838">
+                <a:tc>
+                  <a:txBody>
+                    <a:bodyPr/>
+                    <a:lstStyle/>
+                    <a:p>
+                      <a:r>
+                        <a:rPr lang="en-US" b="0" dirty="0">
+                          <a:solidFill>
+                            <a:schemeClr val="bg2"/>
+                          </a:solidFill>
+                          <a:latin typeface="Courier New" panose="02070309020205020404" pitchFamily="49" charset="0"/>
+                          <a:cs typeface="Courier New" panose="02070309020205020404" pitchFamily="49" charset="0"/>
+                        </a:rPr>
+                        <a:t>python custom_lineage_creator.py</a:t>
+                      </a:r>
+                    </a:p>
+                    <a:p>
+                      <a:r>
+                        <a:rPr lang="en-US" b="0" dirty="0">
+                          <a:solidFill>
+                            <a:schemeClr val="bg2"/>
+                          </a:solidFill>
+                          <a:latin typeface="Courier New" panose="02070309020205020404" pitchFamily="49" charset="0"/>
+                          <a:cs typeface="Courier New" panose="02070309020205020404" pitchFamily="49" charset="0"/>
+                        </a:rPr>
+                        <a:t>python3 custom_lineage_creator.py</a:t>
+                      </a:r>
+                    </a:p>
+                    <a:p>
+                      <a:r>
+                        <a:rPr lang="en-US" b="0" dirty="0">
+                          <a:solidFill>
+                            <a:schemeClr val="bg2"/>
+                          </a:solidFill>
+                          <a:latin typeface="Courier New" panose="02070309020205020404" pitchFamily="49" charset="0"/>
+                          <a:cs typeface="Courier New" panose="02070309020205020404" pitchFamily="49" charset="0"/>
+                        </a:rPr>
+                        <a:t>python custom_lineage_creator.py config_with_etl.csv</a:t>
+                      </a:r>
+                    </a:p>
+                  </a:txBody>
+                  <a:tcPr>
+                    <a:solidFill>
+                      <a:schemeClr val="tx1"/>
+                    </a:solidFill>
+                  </a:tcPr>
+                </a:tc>
+                <a:extLst>
+                  <a:ext uri="{0D108BD9-81ED-4DB2-BD59-A6C34878D82A}">
+                    <a16:rowId xmlns:a16="http://schemas.microsoft.com/office/drawing/2014/main" val="3598110298"/>
+                  </a:ext>
+                </a:extLst>
+              </a:tr>
+            </a:tbl>
+          </a:graphicData>
+        </a:graphic>
+      </p:graphicFrame>
+      <p:graphicFrame>
+        <p:nvGraphicFramePr>
+          <p:cNvPr id="3" name="Table 2">
+            <a:extLst>
+              <a:ext uri="{FF2B5EF4-FFF2-40B4-BE49-F238E27FC236}">
+                <a16:creationId xmlns:a16="http://schemas.microsoft.com/office/drawing/2014/main" id="{F825C568-28C1-C2BF-6DEA-C1EAF9BA1114}"/>
+              </a:ext>
+            </a:extLst>
+          </p:cNvPr>
+          <p:cNvGraphicFramePr>
+            <a:graphicFrameLocks noGrp="1"/>
+          </p:cNvGraphicFramePr>
+          <p:nvPr>
+            <p:extLst>
+              <p:ext uri="{D42A27DB-BD31-4B8C-83A1-F6EECF244321}">
+                <p14:modId xmlns:p14="http://schemas.microsoft.com/office/powerpoint/2010/main" val="4132330575"/>
+              </p:ext>
+            </p:extLst>
+          </p:nvPr>
+        </p:nvGraphicFramePr>
+        <p:xfrm>
+          <a:off x="6105701" y="3582238"/>
+          <a:ext cx="5329514" cy="365760"/>
+        </p:xfrm>
+        <a:graphic>
+          <a:graphicData uri="http://schemas.openxmlformats.org/drawingml/2006/table">
+            <a:tbl>
+              <a:tblPr firstRow="1" bandRow="1">
+                <a:tableStyleId>{5C22544A-7EE6-4342-B048-85BDC9FD1C3A}</a:tableStyleId>
+              </a:tblPr>
+              <a:tblGrid>
+                <a:gridCol w="5329514">
+                  <a:extLst>
+                    <a:ext uri="{9D8B030D-6E8A-4147-A177-3AD203B41FA5}">
+                      <a16:colId xmlns:a16="http://schemas.microsoft.com/office/drawing/2014/main" val="1261491639"/>
+                    </a:ext>
+                  </a:extLst>
+                </a:gridCol>
+              </a:tblGrid>
+              <a:tr h="338838">
+                <a:tc>
+                  <a:txBody>
+                    <a:bodyPr/>
+                    <a:lstStyle/>
+                    <a:p>
+                      <a:r>
+                        <a:rPr lang="en-US" b="0" dirty="0">
+                          <a:solidFill>
+                            <a:schemeClr val="bg2"/>
+                          </a:solidFill>
+                          <a:latin typeface="Courier New" panose="02070309020205020404" pitchFamily="49" charset="0"/>
+                          <a:cs typeface="Courier New" panose="02070309020205020404" pitchFamily="49" charset="0"/>
+                        </a:rPr>
+                        <a:t>pip install pandas datetime </a:t>
+                      </a:r>
+                      <a:r>
+                        <a:rPr lang="en-US" b="0" dirty="0" err="1">
+                          <a:solidFill>
+                            <a:schemeClr val="bg2"/>
+                          </a:solidFill>
+                          <a:latin typeface="Courier New" panose="02070309020205020404" pitchFamily="49" charset="0"/>
+                          <a:cs typeface="Courier New" panose="02070309020205020404" pitchFamily="49" charset="0"/>
+                        </a:rPr>
+                        <a:t>openpyxl</a:t>
+                      </a:r>
+                      <a:endParaRPr lang="en-US" b="0" dirty="0">
+                        <a:solidFill>
+                          <a:schemeClr val="bg2"/>
+                        </a:solidFill>
+                        <a:latin typeface="Courier New" panose="02070309020205020404" pitchFamily="49" charset="0"/>
+                        <a:cs typeface="Courier New" panose="02070309020205020404" pitchFamily="49" charset="0"/>
+                      </a:endParaRPr>
+                    </a:p>
+                  </a:txBody>
+                  <a:tcPr>
+                    <a:solidFill>
+                      <a:schemeClr val="tx1"/>
+                    </a:solidFill>
+                  </a:tcPr>
+                </a:tc>
+                <a:extLst>
+                  <a:ext uri="{0D108BD9-81ED-4DB2-BD59-A6C34878D82A}">
+                    <a16:rowId xmlns:a16="http://schemas.microsoft.com/office/drawing/2014/main" val="3598110298"/>
+                  </a:ext>
+                </a:extLst>
+              </a:tr>
+            </a:tbl>
+          </a:graphicData>
+        </a:graphic>
+      </p:graphicFrame>
+    </p:spTree>
+    <p:extLst>
+      <p:ext uri="{BB962C8B-B14F-4D97-AF65-F5344CB8AC3E}">
+        <p14:creationId xmlns:p14="http://schemas.microsoft.com/office/powerpoint/2010/main" val="386637155"/>
+      </p:ext>
+    </p:extLst>
+  </p:cSld>
+  <p:clrMapOvr>
+    <a:masterClrMapping/>
+  </p:clrMapOvr>
+  <mc:AlternateContent xmlns:mc="http://schemas.openxmlformats.org/markup-compatibility/2006" xmlns:p14="http://schemas.microsoft.com/office/powerpoint/2010/main">
+    <mc:Choice Requires="p14">
+      <p:transition spd="med" p14:dur="700" advClick="0">
+        <p:fade/>
+      </p:transition>
+    </mc:Choice>
+    <mc:Fallback xmlns="">
+      <p:transition spd="med" advClick="0">
+        <p:fade/>
+      </p:transition>
+    </mc:Fallback>
+  </mc:AlternateContent>
+</p:sld>
+</file>
+
+<file path=ppt/slides/slide8.xml><?xml version="1.0" encoding="utf-8"?>
+<p:sld xmlns:a="http://schemas.openxmlformats.org/drawingml/2006/main" xmlns:r="http://schemas.openxmlformats.org/officeDocument/2006/relationships" xmlns:p="http://schemas.openxmlformats.org/presentationml/2006/main">
+  <p:cSld>
+    <p:spTree>
+      <p:nvGrpSpPr>
+        <p:cNvPr id="1" name=""/>
+        <p:cNvGrpSpPr/>
+        <p:nvPr/>
+      </p:nvGrpSpPr>
+      <p:grpSpPr>
+        <a:xfrm>
+          <a:off x="0" y="0"/>
+          <a:ext cx="0" cy="0"/>
+          <a:chOff x="0" y="0"/>
+          <a:chExt cx="0" cy="0"/>
+        </a:xfrm>
+      </p:grpSpPr>
+      <p:sp>
+        <p:nvSpPr>
           <p:cNvPr id="6" name="TextBox 5">
             <a:extLst>
               <a:ext uri="{FF2B5EF4-FFF2-40B4-BE49-F238E27FC236}">
@@ -23493,7 +25870,7 @@
                 <a:ea typeface="Roboto" charset="0"/>
                 <a:cs typeface="Roboto" charset="0"/>
               </a:rPr>
-              <a:t>Execute with python, no arguments needed</a:t>
+              <a:t>Python will look for the latest Excel or zip file in the same directory.</a:t>
             </a:r>
           </a:p>
           <a:p>
@@ -23513,7 +25890,7 @@
                 <a:ea typeface="Roboto" charset="0"/>
                 <a:cs typeface="Roboto" charset="0"/>
               </a:rPr>
-              <a:t>No API needed. Uses export files. Export the Resources, including children and details and place in the same directory as the python script</a:t>
+              <a:t>Python will look for the config.csv in the same directory (if config file not specified)</a:t>
             </a:r>
           </a:p>
           <a:p>
@@ -23533,7 +25910,7 @@
                 <a:ea typeface="Roboto" charset="0"/>
                 <a:cs typeface="Roboto" charset="0"/>
               </a:rPr>
-              <a:t>Python will look for the latest Excel or zip file in the same directory.</a:t>
+              <a:t>Will display the lineage that it’s creating </a:t>
             </a:r>
           </a:p>
           <a:p>
@@ -23553,7 +25930,7 @@
                 <a:ea typeface="Roboto" charset="0"/>
                 <a:cs typeface="Roboto" charset="0"/>
               </a:rPr>
-              <a:t>Python will look for the config.csv in the same directory</a:t>
+              <a:t>Will display the match score for the dataset / element</a:t>
             </a:r>
           </a:p>
           <a:p>
@@ -23573,7 +25950,7 @@
                 <a:ea typeface="Roboto" charset="0"/>
                 <a:cs typeface="Roboto" charset="0"/>
               </a:rPr>
-              <a:t>Will display the lineage that it’s creating </a:t>
+              <a:t>Will write the lineage information to links_&lt;timestamp&gt;.csv within the “links” directory</a:t>
             </a:r>
           </a:p>
           <a:p>
@@ -23593,7 +25970,7 @@
                 <a:ea typeface="Roboto" charset="0"/>
                 <a:cs typeface="Roboto" charset="0"/>
               </a:rPr>
-              <a:t>Will display the match score for the dataset / element</a:t>
+              <a:t>Will write the lineage information to lineage_&lt;timestamp&gt;.zip within the “links” directory</a:t>
             </a:r>
           </a:p>
           <a:p>
@@ -23613,8 +25990,59 @@
                 <a:ea typeface="Roboto" charset="0"/>
                 <a:cs typeface="Roboto" charset="0"/>
               </a:rPr>
-              <a:t>Will write the lineage information to links_&lt;timestamp&gt;.csv</a:t>
-            </a:r>
+              <a:t>Will write the ETL Resource information to &lt;Resource Name&gt;_&lt;timestamp&gt;.zip within the “resources” directory</a:t>
+            </a:r>
+          </a:p>
+          <a:p>
+            <a:pPr marL="342900" indent="-342900">
+              <a:lnSpc>
+                <a:spcPct val="90000"/>
+              </a:lnSpc>
+              <a:spcAft>
+                <a:spcPts val="1000"/>
+              </a:spcAft>
+              <a:buFont typeface="Arial" panose="020B0604020202020204" pitchFamily="34" charset="0"/>
+              <a:buChar char="•"/>
+            </a:pPr>
+            <a:endParaRPr lang="en-US" sz="1600" dirty="0">
+              <a:latin typeface="Roboto" charset="0"/>
+              <a:ea typeface="Roboto" charset="0"/>
+              <a:cs typeface="Roboto" charset="0"/>
+            </a:endParaRPr>
+          </a:p>
+          <a:p>
+            <a:pPr marL="342900" indent="-342900">
+              <a:lnSpc>
+                <a:spcPct val="90000"/>
+              </a:lnSpc>
+              <a:spcAft>
+                <a:spcPts val="1000"/>
+              </a:spcAft>
+              <a:buFont typeface="Arial" panose="020B0604020202020204" pitchFamily="34" charset="0"/>
+              <a:buChar char="•"/>
+            </a:pPr>
+            <a:endParaRPr lang="en-US" sz="1600" dirty="0">
+              <a:latin typeface="Roboto" charset="0"/>
+              <a:ea typeface="Roboto" charset="0"/>
+              <a:cs typeface="Roboto" charset="0"/>
+            </a:endParaRPr>
+          </a:p>
+          <a:p>
+            <a:pPr marL="342900" indent="-342900">
+              <a:lnSpc>
+                <a:spcPct val="90000"/>
+              </a:lnSpc>
+              <a:spcAft>
+                <a:spcPts val="1000"/>
+              </a:spcAft>
+              <a:buFont typeface="Arial" panose="020B0604020202020204" pitchFamily="34" charset="0"/>
+              <a:buChar char="•"/>
+            </a:pPr>
+            <a:endParaRPr lang="en-US" sz="1600" dirty="0">
+              <a:latin typeface="Roboto" charset="0"/>
+              <a:ea typeface="Roboto" charset="0"/>
+              <a:cs typeface="Roboto" charset="0"/>
+            </a:endParaRPr>
           </a:p>
           <a:p>
             <a:pPr marL="342900" indent="-342900">
@@ -23735,9 +26163,9 @@
           <a:p>
             <a:r>
               <a:rPr lang="en-US" dirty="0"/>
-              <a:t>Run</a:t>
-            </a:r>
-            <a:endParaRPr lang="en-IN" i="1" dirty="0"/>
+              <a:t>Output</a:t>
+            </a:r>
+            <a:endParaRPr lang="en-IN" dirty="0"/>
           </a:p>
         </p:txBody>
       </p:sp>
@@ -23796,7 +26224,7 @@
 </p:sld>
 </file>
 
-<file path=ppt/slides/slide5.xml><?xml version="1.0" encoding="utf-8"?>
+<file path=ppt/slides/slide9.xml><?xml version="1.0" encoding="utf-8"?>
 <p:sld xmlns:a="http://schemas.openxmlformats.org/drawingml/2006/main" xmlns:r="http://schemas.openxmlformats.org/officeDocument/2006/relationships" xmlns:p="http://schemas.openxmlformats.org/presentationml/2006/main">
   <p:cSld>
     <p:spTree>
@@ -25548,6 +27976,15 @@
 </file>
 
 <file path=customXml/item1.xml><?xml version="1.0" encoding="utf-8"?>
+<?mso-contentType ?>
+<FormTemplates xmlns="http://schemas.microsoft.com/sharepoint/v3/contenttype/forms">
+  <Display>DocumentLibraryForm</Display>
+  <Edit>DocumentLibraryForm</Edit>
+  <New>DocumentLibraryForm</New>
+</FormTemplates>
+</file>
+
+<file path=customXml/item2.xml><?xml version="1.0" encoding="utf-8"?>
 <ct:contentTypeSchema xmlns:ct="http://schemas.microsoft.com/office/2006/metadata/contentType" xmlns:ma="http://schemas.microsoft.com/office/2006/metadata/properties/metaAttributes" ct:_="" ma:_="" ma:contentTypeName="Document" ma:contentTypeID="0x0101008F469B9DDCB7884E95DD88D1FAB455BB" ma:contentTypeVersion="4" ma:contentTypeDescription="Create a new document." ma:contentTypeScope="" ma:versionID="2af74787b6fa7b67583c56dc5776735d">
   <xsd:schema xmlns:xsd="http://www.w3.org/2001/XMLSchema" xmlns:xs="http://www.w3.org/2001/XMLSchema" xmlns:p="http://schemas.microsoft.com/office/2006/metadata/properties" xmlns:ns2="d7abb67f-8ba3-4629-af4a-9ad47f056db5" targetNamespace="http://schemas.microsoft.com/office/2006/metadata/properties" ma:root="true" ma:fieldsID="03e5ccd49f08cdc976c4df5b8baab980" ns2:_="">
     <xsd:import namespace="d7abb67f-8ba3-4629-af4a-9ad47f056db5"/>
@@ -25693,16 +28130,15 @@
 </ct:contentTypeSchema>
 </file>
 
-<file path=customXml/item2.xml><?xml version="1.0" encoding="utf-8"?>
-<?mso-contentType ?>
-<FormTemplates xmlns="http://schemas.microsoft.com/sharepoint/v3/contenttype/forms">
-  <Display>DocumentLibraryForm</Display>
-  <Edit>DocumentLibraryForm</Edit>
-  <New>DocumentLibraryForm</New>
-</FormTemplates>
+<file path=customXml/itemProps1.xml><?xml version="1.0" encoding="utf-8"?>
+<ds:datastoreItem xmlns:ds="http://schemas.openxmlformats.org/officeDocument/2006/customXml" ds:itemID="{0FFC13DC-9E91-480E-AA50-E69DFCF153D3}">
+  <ds:schemaRefs>
+    <ds:schemaRef ds:uri="http://schemas.microsoft.com/sharepoint/v3/contenttype/forms"/>
+  </ds:schemaRefs>
+</ds:datastoreItem>
 </file>
 
-<file path=customXml/itemProps1.xml><?xml version="1.0" encoding="utf-8"?>
+<file path=customXml/itemProps2.xml><?xml version="1.0" encoding="utf-8"?>
 <ds:datastoreItem xmlns:ds="http://schemas.openxmlformats.org/officeDocument/2006/customXml" ds:itemID="{5CA5433E-CDB9-440C-BB77-1799205ED86D}">
   <ds:schemaRefs>
     <ds:schemaRef ds:uri="d7abb67f-8ba3-4629-af4a-9ad47f056db5"/>
@@ -25718,12 +28154,4 @@
     <ds:schemaRef ds:uri="http://www.w3.org/2001/XMLSchema"/>
   </ds:schemaRefs>
 </ds:datastoreItem>
-</file>
-
-<file path=customXml/itemProps2.xml><?xml version="1.0" encoding="utf-8"?>
-<ds:datastoreItem xmlns:ds="http://schemas.openxmlformats.org/officeDocument/2006/customXml" ds:itemID="{0FFC13DC-9E91-480E-AA50-E69DFCF153D3}">
-  <ds:schemaRefs>
-    <ds:schemaRef ds:uri="http://schemas.microsoft.com/sharepoint/v3/contenttype/forms"/>
-  </ds:schemaRefs>
-</ds:datastoreItem>
 </file>
</xml_diff>

<commit_message>
Multiple changes. Finalizes features for ETL process, including extra tokens, and ability to add extra attributes onto classes.
</commit_message>
<xml_diff>
--- a/Custom Lineage Creator.pptx
+++ b/Custom Lineage Creator.pptx
@@ -7,10 +7,10 @@
     <p:sldMasterId id="2147483794" r:id="rId5"/>
   </p:sldMasterIdLst>
   <p:notesMasterIdLst>
-    <p:notesMasterId r:id="rId15"/>
+    <p:notesMasterId r:id="rId16"/>
   </p:notesMasterIdLst>
   <p:handoutMasterIdLst>
-    <p:handoutMasterId r:id="rId16"/>
+    <p:handoutMasterId r:id="rId17"/>
   </p:handoutMasterIdLst>
   <p:sldIdLst>
     <p:sldId id="288" r:id="rId6"/>
@@ -18,10 +18,11 @@
     <p:sldId id="2134807791" r:id="rId8"/>
     <p:sldId id="2134807792" r:id="rId9"/>
     <p:sldId id="2134807793" r:id="rId10"/>
-    <p:sldId id="2134807794" r:id="rId11"/>
-    <p:sldId id="2134807795" r:id="rId12"/>
-    <p:sldId id="2134807766" r:id="rId13"/>
-    <p:sldId id="267" r:id="rId14"/>
+    <p:sldId id="2134807796" r:id="rId11"/>
+    <p:sldId id="2134807794" r:id="rId12"/>
+    <p:sldId id="2134807795" r:id="rId13"/>
+    <p:sldId id="2134807766" r:id="rId14"/>
+    <p:sldId id="267" r:id="rId15"/>
   </p:sldIdLst>
   <p:sldSz cx="12188825" cy="6858000"/>
   <p:notesSz cx="7104063" cy="10234613"/>
@@ -130,6 +131,7 @@
             <p14:sldId id="2134807791"/>
             <p14:sldId id="2134807792"/>
             <p14:sldId id="2134807793"/>
+            <p14:sldId id="2134807796"/>
             <p14:sldId id="2134807794"/>
             <p14:sldId id="2134807795"/>
             <p14:sldId id="2134807766"/>
@@ -327,7 +329,7 @@
           <a:p>
             <a:fld id="{A8AF0ABA-1503-4581-BC5A-AF3D56D7DD45}" type="datetimeFigureOut">
               <a:rPr lang="en-US" smtClean="0"/>
-              <a:t>11/4/2024</a:t>
+              <a:t>11/5/2024</a:t>
             </a:fld>
             <a:endParaRPr lang="en-US"/>
           </a:p>
@@ -492,7 +494,7 @@
           <a:p>
             <a:fld id="{78186FDC-CD1E-4E7E-B1CD-1CBCCD519E8C}" type="datetimeFigureOut">
               <a:rPr lang="en-US" smtClean="0"/>
-              <a:t>11/4/2024</a:t>
+              <a:t>11/5/2024</a:t>
             </a:fld>
             <a:endParaRPr lang="en-US"/>
           </a:p>
@@ -907,6 +909,90 @@
           <a:bodyPr/>
           <a:lstStyle/>
           <a:p>
+            <a:endParaRPr lang="en-US" dirty="0"/>
+          </a:p>
+        </p:txBody>
+      </p:sp>
+      <p:sp>
+        <p:nvSpPr>
+          <p:cNvPr id="4" name="Slide Number Placeholder 3"/>
+          <p:cNvSpPr>
+            <a:spLocks noGrp="1"/>
+          </p:cNvSpPr>
+          <p:nvPr>
+            <p:ph type="sldNum" sz="quarter" idx="5"/>
+          </p:nvPr>
+        </p:nvSpPr>
+        <p:spPr/>
+        <p:txBody>
+          <a:bodyPr/>
+          <a:lstStyle/>
+          <a:p>
+            <a:fld id="{4B9A8B04-59C6-4476-9B83-8806D24CC38B}" type="slidenum">
+              <a:rPr lang="en-US" smtClean="0"/>
+              <a:t>6</a:t>
+            </a:fld>
+            <a:endParaRPr lang="en-US"/>
+          </a:p>
+        </p:txBody>
+      </p:sp>
+    </p:spTree>
+    <p:extLst>
+      <p:ext uri="{BB962C8B-B14F-4D97-AF65-F5344CB8AC3E}">
+        <p14:creationId xmlns:p14="http://schemas.microsoft.com/office/powerpoint/2010/main" val="132795145"/>
+      </p:ext>
+    </p:extLst>
+  </p:cSld>
+  <p:clrMapOvr>
+    <a:masterClrMapping/>
+  </p:clrMapOvr>
+</p:notes>
+</file>
+
+<file path=ppt/notesSlides/notesSlide3.xml><?xml version="1.0" encoding="utf-8"?>
+<p:notes xmlns:a="http://schemas.openxmlformats.org/drawingml/2006/main" xmlns:r="http://schemas.openxmlformats.org/officeDocument/2006/relationships" xmlns:p="http://schemas.openxmlformats.org/presentationml/2006/main">
+  <p:cSld>
+    <p:spTree>
+      <p:nvGrpSpPr>
+        <p:cNvPr id="1" name=""/>
+        <p:cNvGrpSpPr/>
+        <p:nvPr/>
+      </p:nvGrpSpPr>
+      <p:grpSpPr>
+        <a:xfrm>
+          <a:off x="0" y="0"/>
+          <a:ext cx="0" cy="0"/>
+          <a:chOff x="0" y="0"/>
+          <a:chExt cx="0" cy="0"/>
+        </a:xfrm>
+      </p:grpSpPr>
+      <p:sp>
+        <p:nvSpPr>
+          <p:cNvPr id="2" name="Slide Image Placeholder 1"/>
+          <p:cNvSpPr>
+            <a:spLocks noGrp="1" noRot="1" noChangeAspect="1"/>
+          </p:cNvSpPr>
+          <p:nvPr>
+            <p:ph type="sldImg"/>
+          </p:nvPr>
+        </p:nvSpPr>
+        <p:spPr/>
+      </p:sp>
+      <p:sp>
+        <p:nvSpPr>
+          <p:cNvPr id="3" name="Notes Placeholder 2"/>
+          <p:cNvSpPr>
+            <a:spLocks noGrp="1"/>
+          </p:cNvSpPr>
+          <p:nvPr>
+            <p:ph type="body" idx="1"/>
+          </p:nvPr>
+        </p:nvSpPr>
+        <p:spPr/>
+        <p:txBody>
+          <a:bodyPr/>
+          <a:lstStyle/>
+          <a:p>
             <a:endParaRPr lang="en-US"/>
           </a:p>
         </p:txBody>
@@ -928,7 +1014,7 @@
           <a:p>
             <a:fld id="{4B9A8B04-59C6-4476-9B83-8806D24CC38B}" type="slidenum">
               <a:rPr lang="en-US" smtClean="0"/>
-              <a:t>9</a:t>
+              <a:t>10</a:t>
             </a:fld>
             <a:endParaRPr lang="en-US"/>
           </a:p>
@@ -22289,6 +22375,328 @@
 </p:sld>
 </file>
 
+<file path=ppt/slides/slide10.xml><?xml version="1.0" encoding="utf-8"?>
+<p:sld xmlns:a="http://schemas.openxmlformats.org/drawingml/2006/main" xmlns:r="http://schemas.openxmlformats.org/officeDocument/2006/relationships" xmlns:p="http://schemas.openxmlformats.org/presentationml/2006/main">
+  <p:cSld>
+    <p:spTree>
+      <p:nvGrpSpPr>
+        <p:cNvPr id="1" name=""/>
+        <p:cNvGrpSpPr/>
+        <p:nvPr/>
+      </p:nvGrpSpPr>
+      <p:grpSpPr>
+        <a:xfrm>
+          <a:off x="0" y="0"/>
+          <a:ext cx="0" cy="0"/>
+          <a:chOff x="0" y="0"/>
+          <a:chExt cx="0" cy="0"/>
+        </a:xfrm>
+      </p:grpSpPr>
+      <p:sp>
+        <p:nvSpPr>
+          <p:cNvPr id="3" name="Text Placeholder 2"/>
+          <p:cNvSpPr>
+            <a:spLocks noGrp="1"/>
+          </p:cNvSpPr>
+          <p:nvPr>
+            <p:ph type="body" sz="quarter" idx="11"/>
+          </p:nvPr>
+        </p:nvSpPr>
+        <p:spPr>
+          <a:xfrm>
+            <a:off x="1069107" y="1465399"/>
+            <a:ext cx="7339764" cy="953605"/>
+          </a:xfrm>
+        </p:spPr>
+        <p:txBody>
+          <a:bodyPr/>
+          <a:lstStyle/>
+          <a:p>
+            <a:r>
+              <a:rPr lang="en-US"/>
+              <a:t>Thank You</a:t>
+            </a:r>
+          </a:p>
+        </p:txBody>
+      </p:sp>
+      <p:sp>
+        <p:nvSpPr>
+          <p:cNvPr id="4" name="Text Placeholder 2">
+            <a:extLst>
+              <a:ext uri="{FF2B5EF4-FFF2-40B4-BE49-F238E27FC236}">
+                <a16:creationId xmlns:a16="http://schemas.microsoft.com/office/drawing/2014/main" id="{08C726FA-899D-4D62-B2B9-31D3C881C6EC}"/>
+              </a:ext>
+            </a:extLst>
+          </p:cNvPr>
+          <p:cNvSpPr txBox="1">
+            <a:spLocks/>
+          </p:cNvSpPr>
+          <p:nvPr/>
+        </p:nvSpPr>
+        <p:spPr>
+          <a:xfrm>
+            <a:off x="1069107" y="2715079"/>
+            <a:ext cx="7339764" cy="1416346"/>
+          </a:xfrm>
+          <a:prstGeom prst="rect">
+            <a:avLst/>
+          </a:prstGeom>
+        </p:spPr>
+        <p:txBody>
+          <a:bodyPr vert="horz" lIns="0" tIns="0" rIns="0" bIns="0" rtlCol="0">
+            <a:noAutofit/>
+          </a:bodyPr>
+          <a:lstStyle>
+            <a:lvl1pPr marL="0" indent="0" algn="l" defTabSz="914217" rtl="0" eaLnBrk="1" latinLnBrk="0" hangingPunct="1">
+              <a:lnSpc>
+                <a:spcPct val="90000"/>
+              </a:lnSpc>
+              <a:spcBef>
+                <a:spcPts val="400"/>
+              </a:spcBef>
+              <a:spcAft>
+                <a:spcPts val="1200"/>
+              </a:spcAft>
+              <a:buClr>
+                <a:schemeClr val="accent2"/>
+              </a:buClr>
+              <a:buFont typeface="Arial" panose="020B0604020202020204" pitchFamily="34" charset="0"/>
+              <a:buNone/>
+              <a:defRPr sz="5399" b="0" i="0" kern="1200">
+                <a:solidFill>
+                  <a:schemeClr val="bg1"/>
+                </a:solidFill>
+                <a:latin typeface="Roboto Light" charset="0"/>
+                <a:ea typeface="Roboto Light" charset="0"/>
+                <a:cs typeface="Roboto Light" charset="0"/>
+              </a:defRPr>
+            </a:lvl1pPr>
+            <a:lvl2pPr marL="457108" indent="0" algn="l" defTabSz="914217" rtl="0" eaLnBrk="1" latinLnBrk="0" hangingPunct="1">
+              <a:lnSpc>
+                <a:spcPct val="90000"/>
+              </a:lnSpc>
+              <a:spcBef>
+                <a:spcPts val="0"/>
+              </a:spcBef>
+              <a:spcAft>
+                <a:spcPts val="1200"/>
+              </a:spcAft>
+              <a:buClr>
+                <a:schemeClr val="accent2"/>
+              </a:buClr>
+              <a:buFont typeface="Arial" panose="020B0604020202020204" pitchFamily="34" charset="0"/>
+              <a:buNone/>
+              <a:defRPr sz="1800" b="0" i="0" kern="1200">
+                <a:solidFill>
+                  <a:schemeClr val="tx1"/>
+                </a:solidFill>
+                <a:latin typeface="Roboto" charset="0"/>
+                <a:ea typeface="Roboto" charset="0"/>
+                <a:cs typeface="Roboto" charset="0"/>
+              </a:defRPr>
+            </a:lvl2pPr>
+            <a:lvl3pPr marL="914217" indent="0" algn="l" defTabSz="914217" rtl="0" eaLnBrk="1" latinLnBrk="0" hangingPunct="1">
+              <a:lnSpc>
+                <a:spcPct val="90000"/>
+              </a:lnSpc>
+              <a:spcBef>
+                <a:spcPts val="0"/>
+              </a:spcBef>
+              <a:spcAft>
+                <a:spcPts val="1200"/>
+              </a:spcAft>
+              <a:buClr>
+                <a:schemeClr val="accent2"/>
+              </a:buClr>
+              <a:buFont typeface="Arial" panose="020B0604020202020204" pitchFamily="34" charset="0"/>
+              <a:buNone/>
+              <a:defRPr sz="1600" b="0" i="0" kern="1200">
+                <a:solidFill>
+                  <a:schemeClr val="tx1"/>
+                </a:solidFill>
+                <a:latin typeface="Roboto" charset="0"/>
+                <a:ea typeface="Roboto" charset="0"/>
+                <a:cs typeface="Roboto" charset="0"/>
+              </a:defRPr>
+            </a:lvl3pPr>
+            <a:lvl4pPr marL="1371326" indent="0" algn="l" defTabSz="914217" rtl="0" eaLnBrk="1" latinLnBrk="0" hangingPunct="1">
+              <a:lnSpc>
+                <a:spcPct val="90000"/>
+              </a:lnSpc>
+              <a:spcBef>
+                <a:spcPts val="0"/>
+              </a:spcBef>
+              <a:spcAft>
+                <a:spcPts val="1200"/>
+              </a:spcAft>
+              <a:buClr>
+                <a:schemeClr val="accent2"/>
+              </a:buClr>
+              <a:buFont typeface="Arial" panose="020B0604020202020204" pitchFamily="34" charset="0"/>
+              <a:buNone/>
+              <a:defRPr sz="1400" b="0" i="0" kern="1200">
+                <a:solidFill>
+                  <a:schemeClr val="tx1"/>
+                </a:solidFill>
+                <a:latin typeface="Roboto" charset="0"/>
+                <a:ea typeface="Roboto" charset="0"/>
+                <a:cs typeface="Roboto" charset="0"/>
+              </a:defRPr>
+            </a:lvl4pPr>
+            <a:lvl5pPr marL="1828435" indent="0" algn="l" defTabSz="914217" rtl="0" eaLnBrk="1" latinLnBrk="0" hangingPunct="1">
+              <a:lnSpc>
+                <a:spcPct val="90000"/>
+              </a:lnSpc>
+              <a:spcBef>
+                <a:spcPts val="0"/>
+              </a:spcBef>
+              <a:spcAft>
+                <a:spcPts val="1200"/>
+              </a:spcAft>
+              <a:buClr>
+                <a:schemeClr val="accent2"/>
+              </a:buClr>
+              <a:buFont typeface="Arial" panose="020B0604020202020204" pitchFamily="34" charset="0"/>
+              <a:buNone/>
+              <a:defRPr sz="1400" b="0" i="0" kern="1200">
+                <a:solidFill>
+                  <a:schemeClr val="tx1"/>
+                </a:solidFill>
+                <a:latin typeface="Roboto" charset="0"/>
+                <a:ea typeface="Roboto" charset="0"/>
+                <a:cs typeface="Roboto" charset="0"/>
+              </a:defRPr>
+            </a:lvl5pPr>
+            <a:lvl6pPr marL="914400" indent="-169863" algn="l" defTabSz="914217" rtl="0" eaLnBrk="1" latinLnBrk="0" hangingPunct="1">
+              <a:lnSpc>
+                <a:spcPct val="90000"/>
+              </a:lnSpc>
+              <a:spcBef>
+                <a:spcPts val="500"/>
+              </a:spcBef>
+              <a:spcAft>
+                <a:spcPts val="1200"/>
+              </a:spcAft>
+              <a:buClr>
+                <a:schemeClr val="accent2"/>
+              </a:buClr>
+              <a:buFont typeface="Arial" panose="020B0604020202020204" pitchFamily="34" charset="0"/>
+              <a:buChar char="•"/>
+              <a:defRPr sz="1200" b="0" i="0" kern="1200">
+                <a:solidFill>
+                  <a:schemeClr val="tx1"/>
+                </a:solidFill>
+                <a:latin typeface="Roboto" charset="0"/>
+                <a:ea typeface="Roboto" charset="0"/>
+                <a:cs typeface="Roboto" charset="0"/>
+              </a:defRPr>
+            </a:lvl6pPr>
+            <a:lvl7pPr marL="1084263" indent="-169863" algn="l" defTabSz="914217" rtl="0" eaLnBrk="1" latinLnBrk="0" hangingPunct="1">
+              <a:lnSpc>
+                <a:spcPct val="90000"/>
+              </a:lnSpc>
+              <a:spcBef>
+                <a:spcPts val="500"/>
+              </a:spcBef>
+              <a:spcAft>
+                <a:spcPts val="1200"/>
+              </a:spcAft>
+              <a:buClr>
+                <a:schemeClr val="accent2"/>
+              </a:buClr>
+              <a:buFont typeface="Arial" panose="020B0604020202020204" pitchFamily="34" charset="0"/>
+              <a:buChar char="•"/>
+              <a:defRPr sz="1200" b="0" i="0" kern="1200">
+                <a:solidFill>
+                  <a:schemeClr val="tx1"/>
+                </a:solidFill>
+                <a:latin typeface="Roboto" charset="0"/>
+                <a:ea typeface="Roboto" charset="0"/>
+                <a:cs typeface="Roboto" charset="0"/>
+              </a:defRPr>
+            </a:lvl7pPr>
+            <a:lvl8pPr marL="1258888" indent="-174625" algn="l" defTabSz="914217" rtl="0" eaLnBrk="1" latinLnBrk="0" hangingPunct="1">
+              <a:lnSpc>
+                <a:spcPct val="90000"/>
+              </a:lnSpc>
+              <a:spcBef>
+                <a:spcPts val="500"/>
+              </a:spcBef>
+              <a:spcAft>
+                <a:spcPts val="1200"/>
+              </a:spcAft>
+              <a:buClr>
+                <a:schemeClr val="accent2"/>
+              </a:buClr>
+              <a:buFont typeface="Arial" panose="020B0604020202020204" pitchFamily="34" charset="0"/>
+              <a:buChar char="•"/>
+              <a:defRPr sz="1200" b="0" i="0" kern="1200">
+                <a:solidFill>
+                  <a:schemeClr val="tx1"/>
+                </a:solidFill>
+                <a:latin typeface="Roboto" charset="0"/>
+                <a:ea typeface="Roboto" charset="0"/>
+                <a:cs typeface="Roboto" charset="0"/>
+              </a:defRPr>
+            </a:lvl8pPr>
+            <a:lvl9pPr marL="1428750" indent="-169863" algn="l" defTabSz="914217" rtl="0" eaLnBrk="1" latinLnBrk="0" hangingPunct="1">
+              <a:lnSpc>
+                <a:spcPct val="90000"/>
+              </a:lnSpc>
+              <a:spcBef>
+                <a:spcPts val="500"/>
+              </a:spcBef>
+              <a:spcAft>
+                <a:spcPts val="1200"/>
+              </a:spcAft>
+              <a:buClr>
+                <a:schemeClr val="accent2"/>
+              </a:buClr>
+              <a:buFont typeface="Arial" panose="020B0604020202020204" pitchFamily="34" charset="0"/>
+              <a:buChar char="•"/>
+              <a:defRPr sz="1200" b="0" i="0" kern="1200">
+                <a:solidFill>
+                  <a:schemeClr val="tx1"/>
+                </a:solidFill>
+                <a:latin typeface="Roboto" charset="0"/>
+                <a:ea typeface="Roboto" charset="0"/>
+                <a:cs typeface="Roboto" charset="0"/>
+              </a:defRPr>
+            </a:lvl9pPr>
+          </a:lstStyle>
+          <a:p>
+            <a:r>
+              <a:rPr lang="en-US" sz="1600"/>
+              <a:t>Questions / Issues / Suggestions:</a:t>
+            </a:r>
+          </a:p>
+          <a:p>
+            <a:r>
+              <a:rPr lang="en-US" sz="1600"/>
+              <a:t>Scott Hayes</a:t>
+            </a:r>
+          </a:p>
+          <a:p>
+            <a:r>
+              <a:rPr lang="en-US" sz="1600"/>
+              <a:t>shayes@informatica.com</a:t>
+            </a:r>
+          </a:p>
+        </p:txBody>
+      </p:sp>
+    </p:spTree>
+    <p:extLst>
+      <p:ext uri="{BB962C8B-B14F-4D97-AF65-F5344CB8AC3E}">
+        <p14:creationId xmlns:p14="http://schemas.microsoft.com/office/powerpoint/2010/main" val="1233805520"/>
+      </p:ext>
+    </p:extLst>
+  </p:cSld>
+  <p:clrMapOvr>
+    <a:masterClrMapping/>
+  </p:clrMapOvr>
+</p:sld>
+</file>
+
 <file path=ppt/slides/slide2.xml><?xml version="1.0" encoding="utf-8"?>
 <p:sld xmlns:a="http://schemas.openxmlformats.org/drawingml/2006/main" xmlns:r="http://schemas.openxmlformats.org/officeDocument/2006/relationships" xmlns:p="http://schemas.openxmlformats.org/presentationml/2006/main">
   <p:cSld>
@@ -23706,13 +24114,13 @@
   <p:clrMapOvr>
     <a:masterClrMapping/>
   </p:clrMapOvr>
-  <mc:AlternateContent xmlns:mc="http://schemas.openxmlformats.org/markup-compatibility/2006">
-    <mc:Choice xmlns:p14="http://schemas.microsoft.com/office/powerpoint/2010/main" Requires="p14">
+  <mc:AlternateContent xmlns:mc="http://schemas.openxmlformats.org/markup-compatibility/2006" xmlns:p14="http://schemas.microsoft.com/office/powerpoint/2010/main">
+    <mc:Choice Requires="p14">
       <p:transition spd="med" p14:dur="700" advClick="0">
         <p:fade/>
       </p:transition>
     </mc:Choice>
-    <mc:Fallback>
+    <mc:Fallback xmlns="">
       <p:transition spd="med" advClick="0">
         <p:fade/>
       </p:transition>
@@ -24038,8 +24446,8 @@
         </p:nvSpPr>
         <p:spPr>
           <a:xfrm>
-            <a:off x="674588" y="1157381"/>
-            <a:ext cx="11088434" cy="3200130"/>
+            <a:off x="313343" y="1060211"/>
+            <a:ext cx="8898389" cy="3450081"/>
           </a:xfrm>
           <a:prstGeom prst="rect">
             <a:avLst/>
@@ -24061,7 +24469,7 @@
               </a:spcAft>
             </a:pPr>
             <a:r>
-              <a:rPr lang="en-US" sz="1600" dirty="0">
+              <a:rPr lang="en-US" sz="1400" dirty="0">
                 <a:latin typeface="Roboto" charset="0"/>
                 <a:ea typeface="Roboto" charset="0"/>
                 <a:cs typeface="Roboto" charset="0"/>
@@ -24081,7 +24489,7 @@
               <a:buChar char="•"/>
             </a:pPr>
             <a:r>
-              <a:rPr lang="en-US" sz="1600" i="1" dirty="0">
+              <a:rPr lang="en-US" sz="1400" i="1" dirty="0">
                 <a:latin typeface="Roboto" charset="0"/>
                 <a:ea typeface="Roboto" charset="0"/>
                 <a:cs typeface="Roboto" charset="0"/>
@@ -24089,7 +24497,7 @@
               <a:t>ETL Resource Name.</a:t>
             </a:r>
             <a:r>
-              <a:rPr lang="en-US" sz="1600" dirty="0">
+              <a:rPr lang="en-US" sz="1400" dirty="0">
                 <a:latin typeface="Roboto" charset="0"/>
                 <a:ea typeface="Roboto" charset="0"/>
                 <a:cs typeface="Roboto" charset="0"/>
@@ -24109,7 +24517,7 @@
               <a:buChar char="•"/>
             </a:pPr>
             <a:r>
-              <a:rPr lang="en-US" sz="1600" i="1" dirty="0">
+              <a:rPr lang="en-US" sz="1400" i="1" dirty="0">
                 <a:latin typeface="Roboto" charset="0"/>
                 <a:ea typeface="Roboto" charset="0"/>
                 <a:cs typeface="Roboto" charset="0"/>
@@ -24117,7 +24525,7 @@
               <a:t>ETL Path. </a:t>
             </a:r>
             <a:r>
-              <a:rPr lang="en-US" sz="1600" dirty="0">
+              <a:rPr lang="en-US" sz="1400" dirty="0">
                 <a:latin typeface="Roboto" charset="0"/>
                 <a:ea typeface="Roboto" charset="0"/>
                 <a:cs typeface="Roboto" charset="0"/>
@@ -24137,7 +24545,7 @@
               <a:buChar char="•"/>
             </a:pPr>
             <a:r>
-              <a:rPr lang="en-US" sz="1600" i="1" dirty="0">
+              <a:rPr lang="en-US" sz="1400" i="1" dirty="0">
                 <a:latin typeface="Roboto" charset="0"/>
                 <a:ea typeface="Roboto" charset="0"/>
                 <a:cs typeface="Roboto" charset="0"/>
@@ -24145,7 +24553,7 @@
               <a:t>ETL Path Types. </a:t>
             </a:r>
             <a:r>
-              <a:rPr lang="en-US" sz="1600" dirty="0">
+              <a:rPr lang="en-US" sz="1400" dirty="0">
                 <a:latin typeface="Roboto" charset="0"/>
                 <a:ea typeface="Roboto" charset="0"/>
                 <a:cs typeface="Roboto" charset="0"/>
@@ -24165,7 +24573,7 @@
               <a:buChar char="•"/>
             </a:pPr>
             <a:r>
-              <a:rPr lang="en-US" sz="1600" i="1" dirty="0">
+              <a:rPr lang="en-US" sz="1400" i="1" dirty="0">
                 <a:latin typeface="Roboto" charset="0"/>
                 <a:ea typeface="Roboto" charset="0"/>
                 <a:cs typeface="Roboto" charset="0"/>
@@ -24173,7 +24581,7 @@
               <a:t>ETL Dataset Type. </a:t>
             </a:r>
             <a:r>
-              <a:rPr lang="en-US" sz="1600" dirty="0">
+              <a:rPr lang="en-US" sz="1400" dirty="0">
                 <a:latin typeface="Roboto" charset="0"/>
                 <a:ea typeface="Roboto" charset="0"/>
                 <a:cs typeface="Roboto" charset="0"/>
@@ -24193,7 +24601,7 @@
               <a:buChar char="•"/>
             </a:pPr>
             <a:r>
-              <a:rPr lang="en-US" sz="1600" i="1" dirty="0">
+              <a:rPr lang="en-US" sz="1400" i="1" dirty="0">
                 <a:latin typeface="Roboto" charset="0"/>
                 <a:ea typeface="Roboto" charset="0"/>
                 <a:cs typeface="Roboto" charset="0"/>
@@ -24201,12 +24609,12 @@
               <a:t>ETL Dataset Name. </a:t>
             </a:r>
             <a:r>
-              <a:rPr lang="en-US" sz="1600" dirty="0">
+              <a:rPr lang="en-US" sz="1400" dirty="0">
                 <a:latin typeface="Roboto" charset="0"/>
                 <a:ea typeface="Roboto" charset="0"/>
                 <a:cs typeface="Roboto" charset="0"/>
               </a:rPr>
-              <a:t>The name for the “dataset” portion of the ETL. Use the token {name} for the name of the source dataset. This will be the object included in lineage</a:t>
+              <a:t>The name for the “dataset” portion of the ETL. This will be the object included in lineage</a:t>
             </a:r>
           </a:p>
           <a:p>
@@ -24221,7 +24629,7 @@
               <a:buChar char="•"/>
             </a:pPr>
             <a:r>
-              <a:rPr lang="en-US" sz="1600" i="1" dirty="0">
+              <a:rPr lang="en-US" sz="1400" i="1" dirty="0">
                 <a:latin typeface="Roboto" charset="0"/>
                 <a:ea typeface="Roboto" charset="0"/>
                 <a:cs typeface="Roboto" charset="0"/>
@@ -24229,7 +24637,7 @@
               <a:t>ETL Element Type. </a:t>
             </a:r>
             <a:r>
-              <a:rPr lang="en-US" sz="1600" dirty="0">
+              <a:rPr lang="en-US" sz="1400" dirty="0">
                 <a:latin typeface="Roboto" charset="0"/>
                 <a:ea typeface="Roboto" charset="0"/>
                 <a:cs typeface="Roboto" charset="0"/>
@@ -24249,7 +24657,7 @@
               <a:buChar char="•"/>
             </a:pPr>
             <a:r>
-              <a:rPr lang="en-US" sz="1600" i="1" dirty="0">
+              <a:rPr lang="en-US" sz="1400" i="1" dirty="0">
                 <a:latin typeface="Roboto" charset="0"/>
                 <a:ea typeface="Roboto" charset="0"/>
                 <a:cs typeface="Roboto" charset="0"/>
@@ -24257,12 +24665,12 @@
               <a:t>ETL Element Name. </a:t>
             </a:r>
             <a:r>
-              <a:rPr lang="en-US" sz="1600" dirty="0">
+              <a:rPr lang="en-US" sz="1400" dirty="0">
                 <a:latin typeface="Roboto" charset="0"/>
                 <a:ea typeface="Roboto" charset="0"/>
                 <a:cs typeface="Roboto" charset="0"/>
               </a:rPr>
-              <a:t>The name for the “element” portion of the ETL. Use the token {name} for the name of the source element. This will be the object included in lineage</a:t>
+              <a:t>The name for the “element” portion of the ETL. </a:t>
             </a:r>
           </a:p>
           <a:p>
@@ -24276,24 +24684,7 @@
               <a:buFont typeface="Arial" panose="020B0604020202020204" pitchFamily="34" charset="0"/>
               <a:buChar char="•"/>
             </a:pPr>
-            <a:endParaRPr lang="en-US" sz="1600" dirty="0">
-              <a:latin typeface="Roboto" charset="0"/>
-              <a:ea typeface="Roboto" charset="0"/>
-              <a:cs typeface="Roboto" charset="0"/>
-            </a:endParaRPr>
-          </a:p>
-          <a:p>
-            <a:pPr marL="342900" indent="-342900">
-              <a:lnSpc>
-                <a:spcPct val="90000"/>
-              </a:lnSpc>
-              <a:spcAft>
-                <a:spcPts val="1000"/>
-              </a:spcAft>
-              <a:buFont typeface="Arial" panose="020B0604020202020204" pitchFamily="34" charset="0"/>
-              <a:buChar char="•"/>
-            </a:pPr>
-            <a:endParaRPr lang="en-US" sz="1600" dirty="0">
+            <a:endParaRPr lang="en-US" sz="1400" dirty="0">
               <a:latin typeface="Roboto" charset="0"/>
               <a:ea typeface="Roboto" charset="0"/>
               <a:cs typeface="Roboto" charset="0"/>
@@ -24374,6 +24765,257 @@
                 <a:cs typeface="Roboto" charset="0"/>
               </a:rPr>
               <a:t>Examples:</a:t>
+            </a:r>
+          </a:p>
+        </p:txBody>
+      </p:sp>
+      <p:sp>
+        <p:nvSpPr>
+          <p:cNvPr id="2" name="TextBox 1">
+            <a:extLst>
+              <a:ext uri="{FF2B5EF4-FFF2-40B4-BE49-F238E27FC236}">
+                <a16:creationId xmlns:a16="http://schemas.microsoft.com/office/drawing/2014/main" id="{9F5CBFB1-DB84-2883-BD04-F81CFEBAB1F8}"/>
+              </a:ext>
+            </a:extLst>
+          </p:cNvPr>
+          <p:cNvSpPr txBox="1"/>
+          <p:nvPr/>
+        </p:nvSpPr>
+        <p:spPr>
+          <a:xfrm>
+            <a:off x="9347200" y="1950168"/>
+            <a:ext cx="3025422" cy="2038589"/>
+          </a:xfrm>
+          <a:prstGeom prst="rect">
+            <a:avLst/>
+          </a:prstGeom>
+          <a:noFill/>
+        </p:spPr>
+        <p:txBody>
+          <a:bodyPr wrap="square" lIns="0" tIns="0" rIns="0" bIns="0" rtlCol="0">
+            <a:noAutofit/>
+          </a:bodyPr>
+          <a:lstStyle/>
+          <a:p>
+            <a:pPr>
+              <a:lnSpc>
+                <a:spcPct val="90000"/>
+              </a:lnSpc>
+              <a:spcAft>
+                <a:spcPts val="1000"/>
+              </a:spcAft>
+            </a:pPr>
+            <a:r>
+              <a:rPr lang="en-US" sz="1000" dirty="0">
+                <a:latin typeface="Roboto" charset="0"/>
+                <a:ea typeface="Roboto" charset="0"/>
+                <a:cs typeface="Roboto" charset="0"/>
+              </a:rPr>
+              <a:t>Tokens:</a:t>
+            </a:r>
+          </a:p>
+          <a:p>
+            <a:pPr marL="342900" indent="-342900">
+              <a:lnSpc>
+                <a:spcPct val="90000"/>
+              </a:lnSpc>
+              <a:spcAft>
+                <a:spcPts val="1000"/>
+              </a:spcAft>
+              <a:buFont typeface="Arial" panose="020B0604020202020204" pitchFamily="34" charset="0"/>
+              <a:buChar char="•"/>
+            </a:pPr>
+            <a:r>
+              <a:rPr lang="en-US" sz="1000" i="1" dirty="0">
+                <a:latin typeface="Roboto" charset="0"/>
+                <a:ea typeface="Roboto" charset="0"/>
+                <a:cs typeface="Roboto" charset="0"/>
+              </a:rPr>
+              <a:t>{</a:t>
+            </a:r>
+            <a:r>
+              <a:rPr lang="en-US" sz="1000" i="1" dirty="0" err="1">
+                <a:latin typeface="Roboto" charset="0"/>
+                <a:ea typeface="Roboto" charset="0"/>
+                <a:cs typeface="Roboto" charset="0"/>
+              </a:rPr>
+              <a:t>s_dataset</a:t>
+            </a:r>
+            <a:r>
+              <a:rPr lang="en-US" sz="1000" i="1" dirty="0">
+                <a:latin typeface="Roboto" charset="0"/>
+                <a:ea typeface="Roboto" charset="0"/>
+                <a:cs typeface="Roboto" charset="0"/>
+              </a:rPr>
+              <a:t>}: </a:t>
+            </a:r>
+            <a:r>
+              <a:rPr lang="en-US" sz="1000" dirty="0">
+                <a:latin typeface="Roboto" charset="0"/>
+                <a:ea typeface="Roboto" charset="0"/>
+                <a:cs typeface="Roboto" charset="0"/>
+              </a:rPr>
+              <a:t>Source Dataset</a:t>
+            </a:r>
+          </a:p>
+          <a:p>
+            <a:pPr marL="342900" indent="-342900">
+              <a:lnSpc>
+                <a:spcPct val="90000"/>
+              </a:lnSpc>
+              <a:spcAft>
+                <a:spcPts val="1000"/>
+              </a:spcAft>
+              <a:buFont typeface="Arial" panose="020B0604020202020204" pitchFamily="34" charset="0"/>
+              <a:buChar char="•"/>
+            </a:pPr>
+            <a:r>
+              <a:rPr lang="en-US" sz="1000" i="1" dirty="0">
+                <a:latin typeface="Roboto" charset="0"/>
+                <a:ea typeface="Roboto" charset="0"/>
+                <a:cs typeface="Roboto" charset="0"/>
+              </a:rPr>
+              <a:t>{</a:t>
+            </a:r>
+            <a:r>
+              <a:rPr lang="en-US" sz="1000" i="1" dirty="0" err="1">
+                <a:latin typeface="Roboto" charset="0"/>
+                <a:ea typeface="Roboto" charset="0"/>
+                <a:cs typeface="Roboto" charset="0"/>
+              </a:rPr>
+              <a:t>t_dataset</a:t>
+            </a:r>
+            <a:r>
+              <a:rPr lang="en-US" sz="1000" i="1" dirty="0">
+                <a:latin typeface="Roboto" charset="0"/>
+                <a:ea typeface="Roboto" charset="0"/>
+                <a:cs typeface="Roboto" charset="0"/>
+              </a:rPr>
+              <a:t>}: </a:t>
+            </a:r>
+            <a:r>
+              <a:rPr lang="en-US" sz="1000" dirty="0">
+                <a:latin typeface="Roboto" charset="0"/>
+                <a:ea typeface="Roboto" charset="0"/>
+                <a:cs typeface="Roboto" charset="0"/>
+              </a:rPr>
+              <a:t>Target Dataset</a:t>
+            </a:r>
+          </a:p>
+          <a:p>
+            <a:pPr marL="342900" indent="-342900">
+              <a:lnSpc>
+                <a:spcPct val="90000"/>
+              </a:lnSpc>
+              <a:spcAft>
+                <a:spcPts val="1000"/>
+              </a:spcAft>
+              <a:buFont typeface="Arial" panose="020B0604020202020204" pitchFamily="34" charset="0"/>
+              <a:buChar char="•"/>
+            </a:pPr>
+            <a:r>
+              <a:rPr lang="en-US" sz="1000" i="1" dirty="0">
+                <a:latin typeface="Roboto" charset="0"/>
+                <a:ea typeface="Roboto" charset="0"/>
+                <a:cs typeface="Roboto" charset="0"/>
+              </a:rPr>
+              <a:t>{</a:t>
+            </a:r>
+            <a:r>
+              <a:rPr lang="en-US" sz="1000" i="1" dirty="0" err="1">
+                <a:latin typeface="Roboto" charset="0"/>
+                <a:ea typeface="Roboto" charset="0"/>
+                <a:cs typeface="Roboto" charset="0"/>
+              </a:rPr>
+              <a:t>s_element</a:t>
+            </a:r>
+            <a:r>
+              <a:rPr lang="en-US" sz="1000" i="1" dirty="0">
+                <a:latin typeface="Roboto" charset="0"/>
+                <a:ea typeface="Roboto" charset="0"/>
+                <a:cs typeface="Roboto" charset="0"/>
+              </a:rPr>
+              <a:t>}: </a:t>
+            </a:r>
+            <a:r>
+              <a:rPr lang="en-US" sz="1000" dirty="0">
+                <a:latin typeface="Roboto" charset="0"/>
+                <a:ea typeface="Roboto" charset="0"/>
+                <a:cs typeface="Roboto" charset="0"/>
+              </a:rPr>
+              <a:t>Source Element</a:t>
+            </a:r>
+          </a:p>
+          <a:p>
+            <a:pPr marL="342900" indent="-342900">
+              <a:lnSpc>
+                <a:spcPct val="90000"/>
+              </a:lnSpc>
+              <a:spcAft>
+                <a:spcPts val="1000"/>
+              </a:spcAft>
+              <a:buFont typeface="Arial" panose="020B0604020202020204" pitchFamily="34" charset="0"/>
+              <a:buChar char="•"/>
+            </a:pPr>
+            <a:r>
+              <a:rPr lang="en-US" sz="1000" i="1" dirty="0">
+                <a:latin typeface="Roboto" charset="0"/>
+                <a:ea typeface="Roboto" charset="0"/>
+                <a:cs typeface="Roboto" charset="0"/>
+              </a:rPr>
+              <a:t>{</a:t>
+            </a:r>
+            <a:r>
+              <a:rPr lang="en-US" sz="1000" i="1" dirty="0" err="1">
+                <a:latin typeface="Roboto" charset="0"/>
+                <a:ea typeface="Roboto" charset="0"/>
+                <a:cs typeface="Roboto" charset="0"/>
+              </a:rPr>
+              <a:t>t_element</a:t>
+            </a:r>
+            <a:r>
+              <a:rPr lang="en-US" sz="1000" i="1" dirty="0">
+                <a:latin typeface="Roboto" charset="0"/>
+                <a:ea typeface="Roboto" charset="0"/>
+                <a:cs typeface="Roboto" charset="0"/>
+              </a:rPr>
+              <a:t>}: </a:t>
+            </a:r>
+            <a:r>
+              <a:rPr lang="en-US" sz="1000" dirty="0">
+                <a:latin typeface="Roboto" charset="0"/>
+                <a:ea typeface="Roboto" charset="0"/>
+                <a:cs typeface="Roboto" charset="0"/>
+              </a:rPr>
+              <a:t>Target Element</a:t>
+            </a:r>
+          </a:p>
+          <a:p>
+            <a:pPr marL="342900" indent="-342900">
+              <a:lnSpc>
+                <a:spcPct val="90000"/>
+              </a:lnSpc>
+              <a:spcAft>
+                <a:spcPts val="1000"/>
+              </a:spcAft>
+              <a:buFont typeface="Arial" panose="020B0604020202020204" pitchFamily="34" charset="0"/>
+              <a:buChar char="•"/>
+            </a:pPr>
+            <a:r>
+              <a:rPr lang="en-US" sz="1000" i="1" dirty="0">
+                <a:latin typeface="Roboto" charset="0"/>
+                <a:ea typeface="Roboto" charset="0"/>
+                <a:cs typeface="Roboto" charset="0"/>
+              </a:rPr>
+              <a:t>{name}: </a:t>
+            </a:r>
+            <a:r>
+              <a:rPr lang="en-US" sz="1000" dirty="0">
+                <a:latin typeface="Roboto" charset="0"/>
+                <a:ea typeface="Roboto" charset="0"/>
+                <a:cs typeface="Roboto" charset="0"/>
+              </a:rPr>
+              <a:t>Source dataset/element (context based)</a:t>
             </a:r>
           </a:p>
         </p:txBody>
@@ -24447,7 +25089,7 @@
             </a:r>
             <a:r>
               <a:rPr lang="en-US" i="1" dirty="0"/>
-              <a:t>(considerations)</a:t>
+              <a:t>(optional)</a:t>
             </a:r>
             <a:endParaRPr lang="en-IN" dirty="0"/>
           </a:p>
@@ -24721,7 +25363,7 @@
         <p:spPr>
           <a:xfrm>
             <a:off x="674588" y="1157381"/>
-            <a:ext cx="11088434" cy="2161552"/>
+            <a:ext cx="11088434" cy="3200130"/>
           </a:xfrm>
           <a:prstGeom prst="rect">
             <a:avLst/>
@@ -24748,7 +25390,7 @@
                 <a:ea typeface="Roboto" charset="0"/>
                 <a:cs typeface="Roboto" charset="0"/>
               </a:rPr>
-              <a:t>Things to note about the ETL :</a:t>
+              <a:t>Extra Fields can be included, in case there are specific attributes you want to provide:</a:t>
             </a:r>
           </a:p>
           <a:p>
@@ -24763,82 +25405,21 @@
               <a:buChar char="•"/>
             </a:pPr>
             <a:r>
-              <a:rPr lang="en-US" sz="2000" dirty="0">
+              <a:rPr lang="en-US" sz="1600" i="1" dirty="0">
                 <a:latin typeface="Roboto" charset="0"/>
                 <a:ea typeface="Roboto" charset="0"/>
                 <a:cs typeface="Roboto" charset="0"/>
               </a:rPr>
-              <a:t>The script uses no APIs. In order to </a:t>
-            </a:r>
-            <a:r>
-              <a:rPr lang="en-US" sz="2000" dirty="0" err="1">
+              <a:t>&lt;object name&gt;:&lt;object attribute&gt;.</a:t>
+            </a:r>
+            <a:r>
+              <a:rPr lang="en-US" sz="1600" dirty="0">
                 <a:latin typeface="Roboto" charset="0"/>
                 <a:ea typeface="Roboto" charset="0"/>
                 <a:cs typeface="Roboto" charset="0"/>
               </a:rPr>
-              <a:t>to</a:t>
-            </a:r>
-            <a:r>
-              <a:rPr lang="en-US" sz="2000" dirty="0">
-                <a:latin typeface="Roboto" charset="0"/>
-                <a:ea typeface="Roboto" charset="0"/>
-                <a:cs typeface="Roboto" charset="0"/>
-              </a:rPr>
-              <a:t> get the templates, the script needs a copy of the metamodel (</a:t>
-            </a:r>
-            <a:r>
-              <a:rPr lang="en-US" sz="2000" dirty="0" err="1">
-                <a:latin typeface="Roboto" charset="0"/>
-                <a:ea typeface="Roboto" charset="0"/>
-                <a:cs typeface="Roboto" charset="0"/>
-              </a:rPr>
-              <a:t>json</a:t>
-            </a:r>
-            <a:r>
-              <a:rPr lang="en-US" sz="2000" dirty="0">
-                <a:latin typeface="Roboto" charset="0"/>
-                <a:ea typeface="Roboto" charset="0"/>
-                <a:cs typeface="Roboto" charset="0"/>
-              </a:rPr>
-              <a:t>) and template (zip) placed in the “templates” folder </a:t>
-            </a:r>
-          </a:p>
-          <a:p>
-            <a:pPr marL="342900" indent="-342900">
-              <a:lnSpc>
-                <a:spcPct val="90000"/>
-              </a:lnSpc>
-              <a:spcAft>
-                <a:spcPts val="1000"/>
-              </a:spcAft>
-              <a:buFont typeface="Arial" panose="020B0604020202020204" pitchFamily="34" charset="0"/>
-              <a:buChar char="•"/>
-            </a:pPr>
-            <a:r>
-              <a:rPr lang="en-US" sz="2000" dirty="0">
-                <a:latin typeface="Roboto" charset="0"/>
-                <a:ea typeface="Roboto" charset="0"/>
-                <a:cs typeface="Roboto" charset="0"/>
-              </a:rPr>
-              <a:t>If the ETL Name entered does not exist, it will give the logic to create it, but it won’t have the ID needed for the lineage portion. It will but a “placeholder” in the links.csv file. I would suggest you manually create the resource (of the same name), and don’t run a scan. This will produce the ID that will be used.</a:t>
-            </a:r>
-          </a:p>
-          <a:p>
-            <a:pPr marL="342900" indent="-342900">
-              <a:lnSpc>
-                <a:spcPct val="90000"/>
-              </a:lnSpc>
-              <a:spcAft>
-                <a:spcPts val="1000"/>
-              </a:spcAft>
-              <a:buFont typeface="Arial" panose="020B0604020202020204" pitchFamily="34" charset="0"/>
-              <a:buChar char="•"/>
-            </a:pPr>
-            <a:endParaRPr lang="en-US" sz="2000" dirty="0">
-              <a:latin typeface="Roboto" charset="0"/>
-              <a:ea typeface="Roboto" charset="0"/>
-              <a:cs typeface="Roboto" charset="0"/>
-            </a:endParaRPr>
+              <a:t> Value for the specified attribute</a:t>
+            </a:r>
           </a:p>
           <a:p>
             <a:pPr marL="342900" indent="-342900">
@@ -24876,10 +25457,87 @@
           </a:p>
         </p:txBody>
       </p:sp>
+      <p:sp>
+        <p:nvSpPr>
+          <p:cNvPr id="4" name="TextBox 3">
+            <a:extLst>
+              <a:ext uri="{FF2B5EF4-FFF2-40B4-BE49-F238E27FC236}">
+                <a16:creationId xmlns:a16="http://schemas.microsoft.com/office/drawing/2014/main" id="{BA27B495-4EB1-275D-5BC2-1248E563FA0C}"/>
+              </a:ext>
+            </a:extLst>
+          </p:cNvPr>
+          <p:cNvSpPr txBox="1"/>
+          <p:nvPr/>
+        </p:nvSpPr>
+        <p:spPr>
+          <a:xfrm>
+            <a:off x="482474" y="4607462"/>
+            <a:ext cx="1930921" cy="203200"/>
+          </a:xfrm>
+          <a:prstGeom prst="rect">
+            <a:avLst/>
+          </a:prstGeom>
+          <a:noFill/>
+        </p:spPr>
+        <p:txBody>
+          <a:bodyPr wrap="square" lIns="0" tIns="0" rIns="0" bIns="0" rtlCol="0">
+            <a:noAutofit/>
+          </a:bodyPr>
+          <a:lstStyle/>
+          <a:p>
+            <a:pPr>
+              <a:lnSpc>
+                <a:spcPct val="90000"/>
+              </a:lnSpc>
+              <a:spcAft>
+                <a:spcPts val="1000"/>
+              </a:spcAft>
+            </a:pPr>
+            <a:r>
+              <a:rPr lang="en-US" sz="1200" dirty="0">
+                <a:latin typeface="Roboto" charset="0"/>
+                <a:ea typeface="Roboto" charset="0"/>
+                <a:cs typeface="Roboto" charset="0"/>
+              </a:rPr>
+              <a:t>Examples:</a:t>
+            </a:r>
+          </a:p>
+        </p:txBody>
+      </p:sp>
+      <p:pic>
+        <p:nvPicPr>
+          <p:cNvPr id="7" name="Picture 6">
+            <a:extLst>
+              <a:ext uri="{FF2B5EF4-FFF2-40B4-BE49-F238E27FC236}">
+                <a16:creationId xmlns:a16="http://schemas.microsoft.com/office/drawing/2014/main" id="{747799CD-2122-F233-BD9E-C0046AFDEF87}"/>
+              </a:ext>
+            </a:extLst>
+          </p:cNvPr>
+          <p:cNvPicPr>
+            <a:picLocks noChangeAspect="1"/>
+          </p:cNvPicPr>
+          <p:nvPr/>
+        </p:nvPicPr>
+        <p:blipFill>
+          <a:blip r:embed="rId3"/>
+          <a:stretch>
+            <a:fillRect/>
+          </a:stretch>
+        </p:blipFill>
+        <p:spPr>
+          <a:xfrm>
+            <a:off x="482474" y="4810662"/>
+            <a:ext cx="11514237" cy="1378701"/>
+          </a:xfrm>
+          <a:prstGeom prst="rect">
+            <a:avLst/>
+          </a:prstGeom>
+        </p:spPr>
+      </p:pic>
     </p:spTree>
     <p:extLst>
       <p:ext uri="{BB962C8B-B14F-4D97-AF65-F5344CB8AC3E}">
-        <p14:creationId xmlns:p14="http://schemas.microsoft.com/office/powerpoint/2010/main" val="456076945"/>
+        <p14:creationId xmlns:p14="http://schemas.microsoft.com/office/powerpoint/2010/main" val="1967428043"/>
       </p:ext>
     </p:extLst>
   </p:cSld>
@@ -24934,19 +25592,18 @@
             <p:ph type="title"/>
           </p:nvPr>
         </p:nvSpPr>
-        <p:spPr>
-          <a:xfrm>
-            <a:off x="319060" y="187082"/>
-            <a:ext cx="11195177" cy="562427"/>
-          </a:xfrm>
-        </p:spPr>
+        <p:spPr/>
         <p:txBody>
           <a:bodyPr/>
           <a:lstStyle/>
           <a:p>
             <a:r>
               <a:rPr lang="en-US" dirty="0"/>
-              <a:t>Usage</a:t>
+              <a:t>ETL Configuration </a:t>
+            </a:r>
+            <a:r>
+              <a:rPr lang="en-US" i="1" dirty="0"/>
+              <a:t>(considerations)</a:t>
             </a:r>
             <a:endParaRPr lang="en-IN" dirty="0"/>
           </a:p>
@@ -25219,6 +25876,505 @@
         </p:nvSpPr>
         <p:spPr>
           <a:xfrm>
+            <a:off x="674588" y="1157381"/>
+            <a:ext cx="11088434" cy="2161552"/>
+          </a:xfrm>
+          <a:prstGeom prst="rect">
+            <a:avLst/>
+          </a:prstGeom>
+          <a:noFill/>
+        </p:spPr>
+        <p:txBody>
+          <a:bodyPr wrap="square" lIns="0" tIns="0" rIns="0" bIns="0" rtlCol="0">
+            <a:noAutofit/>
+          </a:bodyPr>
+          <a:lstStyle/>
+          <a:p>
+            <a:pPr>
+              <a:lnSpc>
+                <a:spcPct val="90000"/>
+              </a:lnSpc>
+              <a:spcAft>
+                <a:spcPts val="1000"/>
+              </a:spcAft>
+            </a:pPr>
+            <a:r>
+              <a:rPr lang="en-US" sz="1600" dirty="0">
+                <a:latin typeface="Roboto" charset="0"/>
+                <a:ea typeface="Roboto" charset="0"/>
+                <a:cs typeface="Roboto" charset="0"/>
+              </a:rPr>
+              <a:t>Things to note about the ETL :</a:t>
+            </a:r>
+          </a:p>
+          <a:p>
+            <a:pPr marL="342900" indent="-342900">
+              <a:lnSpc>
+                <a:spcPct val="90000"/>
+              </a:lnSpc>
+              <a:spcAft>
+                <a:spcPts val="1000"/>
+              </a:spcAft>
+              <a:buFont typeface="Arial" panose="020B0604020202020204" pitchFamily="34" charset="0"/>
+              <a:buChar char="•"/>
+            </a:pPr>
+            <a:r>
+              <a:rPr lang="en-US" sz="2000" dirty="0">
+                <a:latin typeface="Roboto" charset="0"/>
+                <a:ea typeface="Roboto" charset="0"/>
+                <a:cs typeface="Roboto" charset="0"/>
+              </a:rPr>
+              <a:t>The script uses no APIs. In order to </a:t>
+            </a:r>
+            <a:r>
+              <a:rPr lang="en-US" sz="2000" dirty="0" err="1">
+                <a:latin typeface="Roboto" charset="0"/>
+                <a:ea typeface="Roboto" charset="0"/>
+                <a:cs typeface="Roboto" charset="0"/>
+              </a:rPr>
+              <a:t>to</a:t>
+            </a:r>
+            <a:r>
+              <a:rPr lang="en-US" sz="2000" dirty="0">
+                <a:latin typeface="Roboto" charset="0"/>
+                <a:ea typeface="Roboto" charset="0"/>
+                <a:cs typeface="Roboto" charset="0"/>
+              </a:rPr>
+              <a:t> get the templates, the script needs a copy of the metamodel (</a:t>
+            </a:r>
+            <a:r>
+              <a:rPr lang="en-US" sz="2000" dirty="0" err="1">
+                <a:latin typeface="Roboto" charset="0"/>
+                <a:ea typeface="Roboto" charset="0"/>
+                <a:cs typeface="Roboto" charset="0"/>
+              </a:rPr>
+              <a:t>json</a:t>
+            </a:r>
+            <a:r>
+              <a:rPr lang="en-US" sz="2000" dirty="0">
+                <a:latin typeface="Roboto" charset="0"/>
+                <a:ea typeface="Roboto" charset="0"/>
+                <a:cs typeface="Roboto" charset="0"/>
+              </a:rPr>
+              <a:t>) and template (zip) placed in the “templates” folder </a:t>
+            </a:r>
+          </a:p>
+          <a:p>
+            <a:pPr marL="342900" indent="-342900">
+              <a:lnSpc>
+                <a:spcPct val="90000"/>
+              </a:lnSpc>
+              <a:spcAft>
+                <a:spcPts val="1000"/>
+              </a:spcAft>
+              <a:buFont typeface="Arial" panose="020B0604020202020204" pitchFamily="34" charset="0"/>
+              <a:buChar char="•"/>
+            </a:pPr>
+            <a:r>
+              <a:rPr lang="en-US" sz="2000" dirty="0">
+                <a:latin typeface="Roboto" charset="0"/>
+                <a:ea typeface="Roboto" charset="0"/>
+                <a:cs typeface="Roboto" charset="0"/>
+              </a:rPr>
+              <a:t>If the ETL Name entered does not exist, it will give the logic to create it, but it won’t have the ID needed for the lineage portion. It will but a “placeholder” in the links.csv file. I would suggest you manually create the resource (of the same name), and don’t run a scan. This will produce the ID that will be used.</a:t>
+            </a:r>
+          </a:p>
+          <a:p>
+            <a:pPr marL="342900" indent="-342900">
+              <a:lnSpc>
+                <a:spcPct val="90000"/>
+              </a:lnSpc>
+              <a:spcAft>
+                <a:spcPts val="1000"/>
+              </a:spcAft>
+              <a:buFont typeface="Arial" panose="020B0604020202020204" pitchFamily="34" charset="0"/>
+              <a:buChar char="•"/>
+            </a:pPr>
+            <a:endParaRPr lang="en-US" sz="2000" dirty="0">
+              <a:latin typeface="Roboto" charset="0"/>
+              <a:ea typeface="Roboto" charset="0"/>
+              <a:cs typeface="Roboto" charset="0"/>
+            </a:endParaRPr>
+          </a:p>
+          <a:p>
+            <a:pPr marL="342900" indent="-342900">
+              <a:lnSpc>
+                <a:spcPct val="90000"/>
+              </a:lnSpc>
+              <a:spcAft>
+                <a:spcPts val="1000"/>
+              </a:spcAft>
+              <a:buFont typeface="Arial" panose="020B0604020202020204" pitchFamily="34" charset="0"/>
+              <a:buChar char="•"/>
+            </a:pPr>
+            <a:endParaRPr lang="en-US" sz="1600" dirty="0">
+              <a:latin typeface="Roboto" charset="0"/>
+              <a:ea typeface="Roboto" charset="0"/>
+              <a:cs typeface="Roboto" charset="0"/>
+            </a:endParaRPr>
+          </a:p>
+          <a:p>
+            <a:pPr marL="342900" indent="-342900">
+              <a:lnSpc>
+                <a:spcPct val="90000"/>
+              </a:lnSpc>
+              <a:spcAft>
+                <a:spcPts val="1000"/>
+              </a:spcAft>
+              <a:buFont typeface="Arial" panose="020B0604020202020204" pitchFamily="34" charset="0"/>
+              <a:buChar char="•"/>
+            </a:pPr>
+            <a:endParaRPr lang="en-US" sz="1600" dirty="0">
+              <a:latin typeface="Roboto" charset="0"/>
+              <a:ea typeface="Roboto" charset="0"/>
+              <a:cs typeface="Roboto" charset="0"/>
+            </a:endParaRPr>
+          </a:p>
+        </p:txBody>
+      </p:sp>
+    </p:spTree>
+    <p:extLst>
+      <p:ext uri="{BB962C8B-B14F-4D97-AF65-F5344CB8AC3E}">
+        <p14:creationId xmlns:p14="http://schemas.microsoft.com/office/powerpoint/2010/main" val="456076945"/>
+      </p:ext>
+    </p:extLst>
+  </p:cSld>
+  <p:clrMapOvr>
+    <a:masterClrMapping/>
+  </p:clrMapOvr>
+  <mc:AlternateContent xmlns:mc="http://schemas.openxmlformats.org/markup-compatibility/2006" xmlns:p14="http://schemas.microsoft.com/office/powerpoint/2010/main">
+    <mc:Choice Requires="p14">
+      <p:transition spd="med" p14:dur="700" advClick="0">
+        <p:fade/>
+      </p:transition>
+    </mc:Choice>
+    <mc:Fallback xmlns="">
+      <p:transition spd="med" advClick="0">
+        <p:fade/>
+      </p:transition>
+    </mc:Fallback>
+  </mc:AlternateContent>
+</p:sld>
+</file>
+
+<file path=ppt/slides/slide8.xml><?xml version="1.0" encoding="utf-8"?>
+<p:sld xmlns:a="http://schemas.openxmlformats.org/drawingml/2006/main" xmlns:r="http://schemas.openxmlformats.org/officeDocument/2006/relationships" xmlns:p="http://schemas.openxmlformats.org/presentationml/2006/main">
+  <p:cSld>
+    <p:spTree>
+      <p:nvGrpSpPr>
+        <p:cNvPr id="1" name=""/>
+        <p:cNvGrpSpPr/>
+        <p:nvPr/>
+      </p:nvGrpSpPr>
+      <p:grpSpPr>
+        <a:xfrm>
+          <a:off x="0" y="0"/>
+          <a:ext cx="0" cy="0"/>
+          <a:chOff x="0" y="0"/>
+          <a:chExt cx="0" cy="0"/>
+        </a:xfrm>
+      </p:grpSpPr>
+      <p:sp>
+        <p:nvSpPr>
+          <p:cNvPr id="5" name="Title 4">
+            <a:extLst>
+              <a:ext uri="{FF2B5EF4-FFF2-40B4-BE49-F238E27FC236}">
+                <a16:creationId xmlns:a16="http://schemas.microsoft.com/office/drawing/2014/main" id="{C2B479B7-4E1E-475F-B459-5CE8B05302D3}"/>
+              </a:ext>
+            </a:extLst>
+          </p:cNvPr>
+          <p:cNvSpPr>
+            <a:spLocks noGrp="1"/>
+          </p:cNvSpPr>
+          <p:nvPr>
+            <p:ph type="title"/>
+          </p:nvPr>
+        </p:nvSpPr>
+        <p:spPr>
+          <a:xfrm>
+            <a:off x="319060" y="187082"/>
+            <a:ext cx="11195177" cy="562427"/>
+          </a:xfrm>
+        </p:spPr>
+        <p:txBody>
+          <a:bodyPr/>
+          <a:lstStyle/>
+          <a:p>
+            <a:r>
+              <a:rPr lang="en-US" dirty="0"/>
+              <a:t>Usage</a:t>
+            </a:r>
+            <a:endParaRPr lang="en-IN" dirty="0"/>
+          </a:p>
+        </p:txBody>
+      </p:sp>
+      <p:sp>
+        <p:nvSpPr>
+          <p:cNvPr id="16" name="Content Placeholder 13">
+            <a:extLst>
+              <a:ext uri="{FF2B5EF4-FFF2-40B4-BE49-F238E27FC236}">
+                <a16:creationId xmlns:a16="http://schemas.microsoft.com/office/drawing/2014/main" id="{807EB0DB-72EF-4CAE-8A2F-F7E55C093081}"/>
+              </a:ext>
+            </a:extLst>
+          </p:cNvPr>
+          <p:cNvSpPr txBox="1">
+            <a:spLocks/>
+          </p:cNvSpPr>
+          <p:nvPr/>
+        </p:nvSpPr>
+        <p:spPr>
+          <a:xfrm>
+            <a:off x="1180247" y="1610532"/>
+            <a:ext cx="3180631" cy="2562457"/>
+          </a:xfrm>
+          <a:prstGeom prst="rect">
+            <a:avLst/>
+          </a:prstGeom>
+        </p:spPr>
+        <p:txBody>
+          <a:bodyPr vert="horz" lIns="0" tIns="0" rIns="0" bIns="0" rtlCol="0">
+            <a:noAutofit/>
+          </a:bodyPr>
+          <a:lstStyle>
+            <a:lvl1pPr marL="173038" indent="-173038" algn="l" defTabSz="914217" rtl="0" eaLnBrk="1" latinLnBrk="0" hangingPunct="1">
+              <a:lnSpc>
+                <a:spcPct val="90000"/>
+              </a:lnSpc>
+              <a:spcBef>
+                <a:spcPts val="400"/>
+              </a:spcBef>
+              <a:spcAft>
+                <a:spcPts val="1200"/>
+              </a:spcAft>
+              <a:buClr>
+                <a:schemeClr val="accent2"/>
+              </a:buClr>
+              <a:buFont typeface="Arial" panose="020B0604020202020204" pitchFamily="34" charset="0"/>
+              <a:buChar char="•"/>
+              <a:defRPr sz="2100" b="0" i="0" kern="1200" baseline="0">
+                <a:solidFill>
+                  <a:schemeClr val="tx1"/>
+                </a:solidFill>
+                <a:latin typeface="Roboto" charset="0"/>
+                <a:ea typeface="Roboto" charset="0"/>
+                <a:cs typeface="Roboto" charset="0"/>
+              </a:defRPr>
+            </a:lvl1pPr>
+            <a:lvl2pPr marL="344488" indent="-174625" algn="l" defTabSz="914217" rtl="0" eaLnBrk="1" latinLnBrk="0" hangingPunct="1">
+              <a:lnSpc>
+                <a:spcPct val="90000"/>
+              </a:lnSpc>
+              <a:spcBef>
+                <a:spcPts val="0"/>
+              </a:spcBef>
+              <a:spcAft>
+                <a:spcPts val="1200"/>
+              </a:spcAft>
+              <a:buClr>
+                <a:schemeClr val="accent2"/>
+              </a:buClr>
+              <a:buFont typeface="Arial" panose="020B0604020202020204" pitchFamily="34" charset="0"/>
+              <a:buChar char="•"/>
+              <a:defRPr sz="1800" b="0" i="0" kern="1200" baseline="0">
+                <a:solidFill>
+                  <a:schemeClr val="tx1"/>
+                </a:solidFill>
+                <a:latin typeface="Roboto" charset="0"/>
+                <a:ea typeface="Roboto" charset="0"/>
+                <a:cs typeface="Roboto" charset="0"/>
+              </a:defRPr>
+            </a:lvl2pPr>
+            <a:lvl3pPr marL="514350" indent="-169863" algn="l" defTabSz="914217" rtl="0" eaLnBrk="1" latinLnBrk="0" hangingPunct="1">
+              <a:lnSpc>
+                <a:spcPct val="90000"/>
+              </a:lnSpc>
+              <a:spcBef>
+                <a:spcPts val="0"/>
+              </a:spcBef>
+              <a:spcAft>
+                <a:spcPts val="1200"/>
+              </a:spcAft>
+              <a:buClr>
+                <a:schemeClr val="accent2"/>
+              </a:buClr>
+              <a:buFont typeface="Arial" panose="020B0604020202020204" pitchFamily="34" charset="0"/>
+              <a:buChar char="•"/>
+              <a:defRPr sz="1600" b="0" i="0" kern="1200">
+                <a:solidFill>
+                  <a:schemeClr val="tx1"/>
+                </a:solidFill>
+                <a:latin typeface="Roboto" charset="0"/>
+                <a:ea typeface="Roboto" charset="0"/>
+                <a:cs typeface="Roboto" charset="0"/>
+              </a:defRPr>
+            </a:lvl3pPr>
+            <a:lvl4pPr marL="630238" indent="-171450" algn="l" defTabSz="914217" rtl="0" eaLnBrk="1" latinLnBrk="0" hangingPunct="1">
+              <a:lnSpc>
+                <a:spcPct val="90000"/>
+              </a:lnSpc>
+              <a:spcBef>
+                <a:spcPts val="0"/>
+              </a:spcBef>
+              <a:spcAft>
+                <a:spcPts val="1200"/>
+              </a:spcAft>
+              <a:buClr>
+                <a:schemeClr val="accent2"/>
+              </a:buClr>
+              <a:buFont typeface="Arial" panose="020B0604020202020204" pitchFamily="34" charset="0"/>
+              <a:buChar char="•"/>
+              <a:defRPr sz="1400" b="0" i="0" kern="1200">
+                <a:solidFill>
+                  <a:schemeClr val="tx1"/>
+                </a:solidFill>
+                <a:latin typeface="Roboto" charset="0"/>
+                <a:ea typeface="Roboto" charset="0"/>
+                <a:cs typeface="Roboto" charset="0"/>
+              </a:defRPr>
+            </a:lvl4pPr>
+            <a:lvl5pPr marL="800100" indent="-169863" algn="l" defTabSz="914217" rtl="0" eaLnBrk="1" latinLnBrk="0" hangingPunct="1">
+              <a:lnSpc>
+                <a:spcPct val="90000"/>
+              </a:lnSpc>
+              <a:spcBef>
+                <a:spcPts val="0"/>
+              </a:spcBef>
+              <a:spcAft>
+                <a:spcPts val="1200"/>
+              </a:spcAft>
+              <a:buClr>
+                <a:schemeClr val="accent2"/>
+              </a:buClr>
+              <a:buFont typeface="Arial" panose="020B0604020202020204" pitchFamily="34" charset="0"/>
+              <a:buChar char="•"/>
+              <a:defRPr sz="1400" b="0" i="0" kern="1200">
+                <a:solidFill>
+                  <a:schemeClr val="tx1"/>
+                </a:solidFill>
+                <a:latin typeface="Roboto" charset="0"/>
+                <a:ea typeface="Roboto" charset="0"/>
+                <a:cs typeface="Roboto" charset="0"/>
+              </a:defRPr>
+            </a:lvl5pPr>
+            <a:lvl6pPr marL="914400" indent="-169863" algn="l" defTabSz="914217" rtl="0" eaLnBrk="1" latinLnBrk="0" hangingPunct="1">
+              <a:lnSpc>
+                <a:spcPct val="90000"/>
+              </a:lnSpc>
+              <a:spcBef>
+                <a:spcPts val="500"/>
+              </a:spcBef>
+              <a:spcAft>
+                <a:spcPts val="1200"/>
+              </a:spcAft>
+              <a:buClr>
+                <a:schemeClr val="accent2"/>
+              </a:buClr>
+              <a:buFont typeface="Arial" panose="020B0604020202020204" pitchFamily="34" charset="0"/>
+              <a:buChar char="•"/>
+              <a:defRPr sz="1200" b="0" i="0" kern="1200">
+                <a:solidFill>
+                  <a:schemeClr val="tx1"/>
+                </a:solidFill>
+                <a:latin typeface="Roboto" charset="0"/>
+                <a:ea typeface="Roboto" charset="0"/>
+                <a:cs typeface="Roboto" charset="0"/>
+              </a:defRPr>
+            </a:lvl6pPr>
+            <a:lvl7pPr marL="1084263" indent="-169863" algn="l" defTabSz="914217" rtl="0" eaLnBrk="1" latinLnBrk="0" hangingPunct="1">
+              <a:lnSpc>
+                <a:spcPct val="90000"/>
+              </a:lnSpc>
+              <a:spcBef>
+                <a:spcPts val="500"/>
+              </a:spcBef>
+              <a:spcAft>
+                <a:spcPts val="1200"/>
+              </a:spcAft>
+              <a:buClr>
+                <a:schemeClr val="accent2"/>
+              </a:buClr>
+              <a:buFont typeface="Arial" panose="020B0604020202020204" pitchFamily="34" charset="0"/>
+              <a:buChar char="•"/>
+              <a:defRPr sz="1200" b="0" i="0" kern="1200">
+                <a:solidFill>
+                  <a:schemeClr val="tx1"/>
+                </a:solidFill>
+                <a:latin typeface="Roboto" charset="0"/>
+                <a:ea typeface="Roboto" charset="0"/>
+                <a:cs typeface="Roboto" charset="0"/>
+              </a:defRPr>
+            </a:lvl7pPr>
+            <a:lvl8pPr marL="1258888" indent="-174625" algn="l" defTabSz="914217" rtl="0" eaLnBrk="1" latinLnBrk="0" hangingPunct="1">
+              <a:lnSpc>
+                <a:spcPct val="90000"/>
+              </a:lnSpc>
+              <a:spcBef>
+                <a:spcPts val="500"/>
+              </a:spcBef>
+              <a:spcAft>
+                <a:spcPts val="1200"/>
+              </a:spcAft>
+              <a:buClr>
+                <a:schemeClr val="accent2"/>
+              </a:buClr>
+              <a:buFont typeface="Arial" panose="020B0604020202020204" pitchFamily="34" charset="0"/>
+              <a:buChar char="•"/>
+              <a:defRPr sz="1200" b="0" i="0" kern="1200">
+                <a:solidFill>
+                  <a:schemeClr val="tx1"/>
+                </a:solidFill>
+                <a:latin typeface="Roboto" charset="0"/>
+                <a:ea typeface="Roboto" charset="0"/>
+                <a:cs typeface="Roboto" charset="0"/>
+              </a:defRPr>
+            </a:lvl8pPr>
+            <a:lvl9pPr marL="1428750" indent="-169863" algn="l" defTabSz="914217" rtl="0" eaLnBrk="1" latinLnBrk="0" hangingPunct="1">
+              <a:lnSpc>
+                <a:spcPct val="90000"/>
+              </a:lnSpc>
+              <a:spcBef>
+                <a:spcPts val="500"/>
+              </a:spcBef>
+              <a:spcAft>
+                <a:spcPts val="1200"/>
+              </a:spcAft>
+              <a:buClr>
+                <a:schemeClr val="accent2"/>
+              </a:buClr>
+              <a:buFont typeface="Arial" panose="020B0604020202020204" pitchFamily="34" charset="0"/>
+              <a:buChar char="•"/>
+              <a:defRPr sz="1200" b="0" i="0" kern="1200">
+                <a:solidFill>
+                  <a:schemeClr val="tx1"/>
+                </a:solidFill>
+                <a:latin typeface="Roboto" charset="0"/>
+                <a:ea typeface="Roboto" charset="0"/>
+                <a:cs typeface="Roboto" charset="0"/>
+              </a:defRPr>
+            </a:lvl9pPr>
+          </a:lstStyle>
+          <a:p>
+            <a:pPr marL="0" indent="0">
+              <a:buNone/>
+            </a:pPr>
+            <a:endParaRPr lang="en-IN" sz="1600" dirty="0"/>
+          </a:p>
+        </p:txBody>
+      </p:sp>
+      <p:sp>
+        <p:nvSpPr>
+          <p:cNvPr id="6" name="TextBox 5">
+            <a:extLst>
+              <a:ext uri="{FF2B5EF4-FFF2-40B4-BE49-F238E27FC236}">
+                <a16:creationId xmlns:a16="http://schemas.microsoft.com/office/drawing/2014/main" id="{9F8FFC18-4FD7-5E97-CCB3-5E13CE612AEB}"/>
+              </a:ext>
+            </a:extLst>
+          </p:cNvPr>
+          <p:cNvSpPr txBox="1"/>
+          <p:nvPr/>
+        </p:nvSpPr>
+        <p:spPr>
+          <a:xfrm>
             <a:off x="595566" y="749509"/>
             <a:ext cx="11195176" cy="5414224"/>
           </a:xfrm>
@@ -25809,7 +26965,7 @@
 </p:sld>
 </file>
 
-<file path=ppt/slides/slide8.xml><?xml version="1.0" encoding="utf-8"?>
+<file path=ppt/slides/slide9.xml><?xml version="1.0" encoding="utf-8"?>
 <p:sld xmlns:a="http://schemas.openxmlformats.org/drawingml/2006/main" xmlns:r="http://schemas.openxmlformats.org/officeDocument/2006/relationships" xmlns:p="http://schemas.openxmlformats.org/presentationml/2006/main">
   <p:cSld>
     <p:spTree>
@@ -26221,328 +27377,6 @@
       </p:transition>
     </mc:Fallback>
   </mc:AlternateContent>
-</p:sld>
-</file>
-
-<file path=ppt/slides/slide9.xml><?xml version="1.0" encoding="utf-8"?>
-<p:sld xmlns:a="http://schemas.openxmlformats.org/drawingml/2006/main" xmlns:r="http://schemas.openxmlformats.org/officeDocument/2006/relationships" xmlns:p="http://schemas.openxmlformats.org/presentationml/2006/main">
-  <p:cSld>
-    <p:spTree>
-      <p:nvGrpSpPr>
-        <p:cNvPr id="1" name=""/>
-        <p:cNvGrpSpPr/>
-        <p:nvPr/>
-      </p:nvGrpSpPr>
-      <p:grpSpPr>
-        <a:xfrm>
-          <a:off x="0" y="0"/>
-          <a:ext cx="0" cy="0"/>
-          <a:chOff x="0" y="0"/>
-          <a:chExt cx="0" cy="0"/>
-        </a:xfrm>
-      </p:grpSpPr>
-      <p:sp>
-        <p:nvSpPr>
-          <p:cNvPr id="3" name="Text Placeholder 2"/>
-          <p:cNvSpPr>
-            <a:spLocks noGrp="1"/>
-          </p:cNvSpPr>
-          <p:nvPr>
-            <p:ph type="body" sz="quarter" idx="11"/>
-          </p:nvPr>
-        </p:nvSpPr>
-        <p:spPr>
-          <a:xfrm>
-            <a:off x="1069107" y="1465399"/>
-            <a:ext cx="7339764" cy="953605"/>
-          </a:xfrm>
-        </p:spPr>
-        <p:txBody>
-          <a:bodyPr/>
-          <a:lstStyle/>
-          <a:p>
-            <a:r>
-              <a:rPr lang="en-US"/>
-              <a:t>Thank You</a:t>
-            </a:r>
-          </a:p>
-        </p:txBody>
-      </p:sp>
-      <p:sp>
-        <p:nvSpPr>
-          <p:cNvPr id="4" name="Text Placeholder 2">
-            <a:extLst>
-              <a:ext uri="{FF2B5EF4-FFF2-40B4-BE49-F238E27FC236}">
-                <a16:creationId xmlns:a16="http://schemas.microsoft.com/office/drawing/2014/main" id="{08C726FA-899D-4D62-B2B9-31D3C881C6EC}"/>
-              </a:ext>
-            </a:extLst>
-          </p:cNvPr>
-          <p:cNvSpPr txBox="1">
-            <a:spLocks/>
-          </p:cNvSpPr>
-          <p:nvPr/>
-        </p:nvSpPr>
-        <p:spPr>
-          <a:xfrm>
-            <a:off x="1069107" y="2715079"/>
-            <a:ext cx="7339764" cy="1416346"/>
-          </a:xfrm>
-          <a:prstGeom prst="rect">
-            <a:avLst/>
-          </a:prstGeom>
-        </p:spPr>
-        <p:txBody>
-          <a:bodyPr vert="horz" lIns="0" tIns="0" rIns="0" bIns="0" rtlCol="0">
-            <a:noAutofit/>
-          </a:bodyPr>
-          <a:lstStyle>
-            <a:lvl1pPr marL="0" indent="0" algn="l" defTabSz="914217" rtl="0" eaLnBrk="1" latinLnBrk="0" hangingPunct="1">
-              <a:lnSpc>
-                <a:spcPct val="90000"/>
-              </a:lnSpc>
-              <a:spcBef>
-                <a:spcPts val="400"/>
-              </a:spcBef>
-              <a:spcAft>
-                <a:spcPts val="1200"/>
-              </a:spcAft>
-              <a:buClr>
-                <a:schemeClr val="accent2"/>
-              </a:buClr>
-              <a:buFont typeface="Arial" panose="020B0604020202020204" pitchFamily="34" charset="0"/>
-              <a:buNone/>
-              <a:defRPr sz="5399" b="0" i="0" kern="1200">
-                <a:solidFill>
-                  <a:schemeClr val="bg1"/>
-                </a:solidFill>
-                <a:latin typeface="Roboto Light" charset="0"/>
-                <a:ea typeface="Roboto Light" charset="0"/>
-                <a:cs typeface="Roboto Light" charset="0"/>
-              </a:defRPr>
-            </a:lvl1pPr>
-            <a:lvl2pPr marL="457108" indent="0" algn="l" defTabSz="914217" rtl="0" eaLnBrk="1" latinLnBrk="0" hangingPunct="1">
-              <a:lnSpc>
-                <a:spcPct val="90000"/>
-              </a:lnSpc>
-              <a:spcBef>
-                <a:spcPts val="0"/>
-              </a:spcBef>
-              <a:spcAft>
-                <a:spcPts val="1200"/>
-              </a:spcAft>
-              <a:buClr>
-                <a:schemeClr val="accent2"/>
-              </a:buClr>
-              <a:buFont typeface="Arial" panose="020B0604020202020204" pitchFamily="34" charset="0"/>
-              <a:buNone/>
-              <a:defRPr sz="1800" b="0" i="0" kern="1200">
-                <a:solidFill>
-                  <a:schemeClr val="tx1"/>
-                </a:solidFill>
-                <a:latin typeface="Roboto" charset="0"/>
-                <a:ea typeface="Roboto" charset="0"/>
-                <a:cs typeface="Roboto" charset="0"/>
-              </a:defRPr>
-            </a:lvl2pPr>
-            <a:lvl3pPr marL="914217" indent="0" algn="l" defTabSz="914217" rtl="0" eaLnBrk="1" latinLnBrk="0" hangingPunct="1">
-              <a:lnSpc>
-                <a:spcPct val="90000"/>
-              </a:lnSpc>
-              <a:spcBef>
-                <a:spcPts val="0"/>
-              </a:spcBef>
-              <a:spcAft>
-                <a:spcPts val="1200"/>
-              </a:spcAft>
-              <a:buClr>
-                <a:schemeClr val="accent2"/>
-              </a:buClr>
-              <a:buFont typeface="Arial" panose="020B0604020202020204" pitchFamily="34" charset="0"/>
-              <a:buNone/>
-              <a:defRPr sz="1600" b="0" i="0" kern="1200">
-                <a:solidFill>
-                  <a:schemeClr val="tx1"/>
-                </a:solidFill>
-                <a:latin typeface="Roboto" charset="0"/>
-                <a:ea typeface="Roboto" charset="0"/>
-                <a:cs typeface="Roboto" charset="0"/>
-              </a:defRPr>
-            </a:lvl3pPr>
-            <a:lvl4pPr marL="1371326" indent="0" algn="l" defTabSz="914217" rtl="0" eaLnBrk="1" latinLnBrk="0" hangingPunct="1">
-              <a:lnSpc>
-                <a:spcPct val="90000"/>
-              </a:lnSpc>
-              <a:spcBef>
-                <a:spcPts val="0"/>
-              </a:spcBef>
-              <a:spcAft>
-                <a:spcPts val="1200"/>
-              </a:spcAft>
-              <a:buClr>
-                <a:schemeClr val="accent2"/>
-              </a:buClr>
-              <a:buFont typeface="Arial" panose="020B0604020202020204" pitchFamily="34" charset="0"/>
-              <a:buNone/>
-              <a:defRPr sz="1400" b="0" i="0" kern="1200">
-                <a:solidFill>
-                  <a:schemeClr val="tx1"/>
-                </a:solidFill>
-                <a:latin typeface="Roboto" charset="0"/>
-                <a:ea typeface="Roboto" charset="0"/>
-                <a:cs typeface="Roboto" charset="0"/>
-              </a:defRPr>
-            </a:lvl4pPr>
-            <a:lvl5pPr marL="1828435" indent="0" algn="l" defTabSz="914217" rtl="0" eaLnBrk="1" latinLnBrk="0" hangingPunct="1">
-              <a:lnSpc>
-                <a:spcPct val="90000"/>
-              </a:lnSpc>
-              <a:spcBef>
-                <a:spcPts val="0"/>
-              </a:spcBef>
-              <a:spcAft>
-                <a:spcPts val="1200"/>
-              </a:spcAft>
-              <a:buClr>
-                <a:schemeClr val="accent2"/>
-              </a:buClr>
-              <a:buFont typeface="Arial" panose="020B0604020202020204" pitchFamily="34" charset="0"/>
-              <a:buNone/>
-              <a:defRPr sz="1400" b="0" i="0" kern="1200">
-                <a:solidFill>
-                  <a:schemeClr val="tx1"/>
-                </a:solidFill>
-                <a:latin typeface="Roboto" charset="0"/>
-                <a:ea typeface="Roboto" charset="0"/>
-                <a:cs typeface="Roboto" charset="0"/>
-              </a:defRPr>
-            </a:lvl5pPr>
-            <a:lvl6pPr marL="914400" indent="-169863" algn="l" defTabSz="914217" rtl="0" eaLnBrk="1" latinLnBrk="0" hangingPunct="1">
-              <a:lnSpc>
-                <a:spcPct val="90000"/>
-              </a:lnSpc>
-              <a:spcBef>
-                <a:spcPts val="500"/>
-              </a:spcBef>
-              <a:spcAft>
-                <a:spcPts val="1200"/>
-              </a:spcAft>
-              <a:buClr>
-                <a:schemeClr val="accent2"/>
-              </a:buClr>
-              <a:buFont typeface="Arial" panose="020B0604020202020204" pitchFamily="34" charset="0"/>
-              <a:buChar char="•"/>
-              <a:defRPr sz="1200" b="0" i="0" kern="1200">
-                <a:solidFill>
-                  <a:schemeClr val="tx1"/>
-                </a:solidFill>
-                <a:latin typeface="Roboto" charset="0"/>
-                <a:ea typeface="Roboto" charset="0"/>
-                <a:cs typeface="Roboto" charset="0"/>
-              </a:defRPr>
-            </a:lvl6pPr>
-            <a:lvl7pPr marL="1084263" indent="-169863" algn="l" defTabSz="914217" rtl="0" eaLnBrk="1" latinLnBrk="0" hangingPunct="1">
-              <a:lnSpc>
-                <a:spcPct val="90000"/>
-              </a:lnSpc>
-              <a:spcBef>
-                <a:spcPts val="500"/>
-              </a:spcBef>
-              <a:spcAft>
-                <a:spcPts val="1200"/>
-              </a:spcAft>
-              <a:buClr>
-                <a:schemeClr val="accent2"/>
-              </a:buClr>
-              <a:buFont typeface="Arial" panose="020B0604020202020204" pitchFamily="34" charset="0"/>
-              <a:buChar char="•"/>
-              <a:defRPr sz="1200" b="0" i="0" kern="1200">
-                <a:solidFill>
-                  <a:schemeClr val="tx1"/>
-                </a:solidFill>
-                <a:latin typeface="Roboto" charset="0"/>
-                <a:ea typeface="Roboto" charset="0"/>
-                <a:cs typeface="Roboto" charset="0"/>
-              </a:defRPr>
-            </a:lvl7pPr>
-            <a:lvl8pPr marL="1258888" indent="-174625" algn="l" defTabSz="914217" rtl="0" eaLnBrk="1" latinLnBrk="0" hangingPunct="1">
-              <a:lnSpc>
-                <a:spcPct val="90000"/>
-              </a:lnSpc>
-              <a:spcBef>
-                <a:spcPts val="500"/>
-              </a:spcBef>
-              <a:spcAft>
-                <a:spcPts val="1200"/>
-              </a:spcAft>
-              <a:buClr>
-                <a:schemeClr val="accent2"/>
-              </a:buClr>
-              <a:buFont typeface="Arial" panose="020B0604020202020204" pitchFamily="34" charset="0"/>
-              <a:buChar char="•"/>
-              <a:defRPr sz="1200" b="0" i="0" kern="1200">
-                <a:solidFill>
-                  <a:schemeClr val="tx1"/>
-                </a:solidFill>
-                <a:latin typeface="Roboto" charset="0"/>
-                <a:ea typeface="Roboto" charset="0"/>
-                <a:cs typeface="Roboto" charset="0"/>
-              </a:defRPr>
-            </a:lvl8pPr>
-            <a:lvl9pPr marL="1428750" indent="-169863" algn="l" defTabSz="914217" rtl="0" eaLnBrk="1" latinLnBrk="0" hangingPunct="1">
-              <a:lnSpc>
-                <a:spcPct val="90000"/>
-              </a:lnSpc>
-              <a:spcBef>
-                <a:spcPts val="500"/>
-              </a:spcBef>
-              <a:spcAft>
-                <a:spcPts val="1200"/>
-              </a:spcAft>
-              <a:buClr>
-                <a:schemeClr val="accent2"/>
-              </a:buClr>
-              <a:buFont typeface="Arial" panose="020B0604020202020204" pitchFamily="34" charset="0"/>
-              <a:buChar char="•"/>
-              <a:defRPr sz="1200" b="0" i="0" kern="1200">
-                <a:solidFill>
-                  <a:schemeClr val="tx1"/>
-                </a:solidFill>
-                <a:latin typeface="Roboto" charset="0"/>
-                <a:ea typeface="Roboto" charset="0"/>
-                <a:cs typeface="Roboto" charset="0"/>
-              </a:defRPr>
-            </a:lvl9pPr>
-          </a:lstStyle>
-          <a:p>
-            <a:r>
-              <a:rPr lang="en-US" sz="1600"/>
-              <a:t>Questions / Issues / Suggestions:</a:t>
-            </a:r>
-          </a:p>
-          <a:p>
-            <a:r>
-              <a:rPr lang="en-US" sz="1600"/>
-              <a:t>Scott Hayes</a:t>
-            </a:r>
-          </a:p>
-          <a:p>
-            <a:r>
-              <a:rPr lang="en-US" sz="1600"/>
-              <a:t>shayes@informatica.com</a:t>
-            </a:r>
-          </a:p>
-        </p:txBody>
-      </p:sp>
-    </p:spTree>
-    <p:extLst>
-      <p:ext uri="{BB962C8B-B14F-4D97-AF65-F5344CB8AC3E}">
-        <p14:creationId xmlns:p14="http://schemas.microsoft.com/office/powerpoint/2010/main" val="1233805520"/>
-      </p:ext>
-    </p:extLst>
-  </p:cSld>
-  <p:clrMapOvr>
-    <a:masterClrMapping/>
-  </p:clrMapOvr>
 </p:sld>
 </file>
 
@@ -27976,15 +28810,6 @@
 </file>
 
 <file path=customXml/item1.xml><?xml version="1.0" encoding="utf-8"?>
-<?mso-contentType ?>
-<FormTemplates xmlns="http://schemas.microsoft.com/sharepoint/v3/contenttype/forms">
-  <Display>DocumentLibraryForm</Display>
-  <Edit>DocumentLibraryForm</Edit>
-  <New>DocumentLibraryForm</New>
-</FormTemplates>
-</file>
-
-<file path=customXml/item2.xml><?xml version="1.0" encoding="utf-8"?>
 <ct:contentTypeSchema xmlns:ct="http://schemas.microsoft.com/office/2006/metadata/contentType" xmlns:ma="http://schemas.microsoft.com/office/2006/metadata/properties/metaAttributes" ct:_="" ma:_="" ma:contentTypeName="Document" ma:contentTypeID="0x0101008F469B9DDCB7884E95DD88D1FAB455BB" ma:contentTypeVersion="4" ma:contentTypeDescription="Create a new document." ma:contentTypeScope="" ma:versionID="2af74787b6fa7b67583c56dc5776735d">
   <xsd:schema xmlns:xsd="http://www.w3.org/2001/XMLSchema" xmlns:xs="http://www.w3.org/2001/XMLSchema" xmlns:p="http://schemas.microsoft.com/office/2006/metadata/properties" xmlns:ns2="d7abb67f-8ba3-4629-af4a-9ad47f056db5" targetNamespace="http://schemas.microsoft.com/office/2006/metadata/properties" ma:root="true" ma:fieldsID="03e5ccd49f08cdc976c4df5b8baab980" ns2:_="">
     <xsd:import namespace="d7abb67f-8ba3-4629-af4a-9ad47f056db5"/>
@@ -28130,15 +28955,16 @@
 </ct:contentTypeSchema>
 </file>
 
-<file path=customXml/itemProps1.xml><?xml version="1.0" encoding="utf-8"?>
-<ds:datastoreItem xmlns:ds="http://schemas.openxmlformats.org/officeDocument/2006/customXml" ds:itemID="{0FFC13DC-9E91-480E-AA50-E69DFCF153D3}">
-  <ds:schemaRefs>
-    <ds:schemaRef ds:uri="http://schemas.microsoft.com/sharepoint/v3/contenttype/forms"/>
-  </ds:schemaRefs>
-</ds:datastoreItem>
+<file path=customXml/item2.xml><?xml version="1.0" encoding="utf-8"?>
+<?mso-contentType ?>
+<FormTemplates xmlns="http://schemas.microsoft.com/sharepoint/v3/contenttype/forms">
+  <Display>DocumentLibraryForm</Display>
+  <Edit>DocumentLibraryForm</Edit>
+  <New>DocumentLibraryForm</New>
+</FormTemplates>
 </file>
 
-<file path=customXml/itemProps2.xml><?xml version="1.0" encoding="utf-8"?>
+<file path=customXml/itemProps1.xml><?xml version="1.0" encoding="utf-8"?>
 <ds:datastoreItem xmlns:ds="http://schemas.openxmlformats.org/officeDocument/2006/customXml" ds:itemID="{5CA5433E-CDB9-440C-BB77-1799205ED86D}">
   <ds:schemaRefs>
     <ds:schemaRef ds:uri="d7abb67f-8ba3-4629-af4a-9ad47f056db5"/>
@@ -28154,4 +28980,12 @@
     <ds:schemaRef ds:uri="http://www.w3.org/2001/XMLSchema"/>
   </ds:schemaRefs>
 </ds:datastoreItem>
+</file>
+
+<file path=customXml/itemProps2.xml><?xml version="1.0" encoding="utf-8"?>
+<ds:datastoreItem xmlns:ds="http://schemas.openxmlformats.org/officeDocument/2006/customXml" ds:itemID="{0FFC13DC-9E91-480E-AA50-E69DFCF153D3}">
+  <ds:schemaRefs>
+    <ds:schemaRef ds:uri="http://schemas.microsoft.com/sharepoint/v3/contenttype/forms"/>
+  </ds:schemaRefs>
+</ds:datastoreItem>
 </file>
</xml_diff>

<commit_message>
Version 20241105 Fix that will make sure that associations are for ParentChild Added flag that will allow to force attributes that aren't in the original template Added Example for the "Script" Class type, with attributes like expression and source code.
</commit_message>
<xml_diff>
--- a/Custom Lineage Creator.pptx
+++ b/Custom Lineage Creator.pptx
@@ -7,10 +7,10 @@
     <p:sldMasterId id="2147483794" r:id="rId5"/>
   </p:sldMasterIdLst>
   <p:notesMasterIdLst>
-    <p:notesMasterId r:id="rId16"/>
+    <p:notesMasterId r:id="rId17"/>
   </p:notesMasterIdLst>
   <p:handoutMasterIdLst>
-    <p:handoutMasterId r:id="rId17"/>
+    <p:handoutMasterId r:id="rId18"/>
   </p:handoutMasterIdLst>
   <p:sldIdLst>
     <p:sldId id="288" r:id="rId6"/>
@@ -18,11 +18,12 @@
     <p:sldId id="2134807791" r:id="rId8"/>
     <p:sldId id="2134807792" r:id="rId9"/>
     <p:sldId id="2134807793" r:id="rId10"/>
-    <p:sldId id="2134807796" r:id="rId11"/>
-    <p:sldId id="2134807794" r:id="rId12"/>
-    <p:sldId id="2134807795" r:id="rId13"/>
-    <p:sldId id="2134807766" r:id="rId14"/>
-    <p:sldId id="267" r:id="rId15"/>
+    <p:sldId id="2134807797" r:id="rId11"/>
+    <p:sldId id="2134807796" r:id="rId12"/>
+    <p:sldId id="2134807794" r:id="rId13"/>
+    <p:sldId id="2134807795" r:id="rId14"/>
+    <p:sldId id="2134807766" r:id="rId15"/>
+    <p:sldId id="267" r:id="rId16"/>
   </p:sldIdLst>
   <p:sldSz cx="12188825" cy="6858000"/>
   <p:notesSz cx="7104063" cy="10234613"/>
@@ -131,6 +132,7 @@
             <p14:sldId id="2134807791"/>
             <p14:sldId id="2134807792"/>
             <p14:sldId id="2134807793"/>
+            <p14:sldId id="2134807797"/>
             <p14:sldId id="2134807796"/>
             <p14:sldId id="2134807794"/>
             <p14:sldId id="2134807795"/>
@@ -329,7 +331,7 @@
           <a:p>
             <a:fld id="{A8AF0ABA-1503-4581-BC5A-AF3D56D7DD45}" type="datetimeFigureOut">
               <a:rPr lang="en-US" smtClean="0"/>
-              <a:t>11/5/2024</a:t>
+              <a:t>11/6/2024</a:t>
             </a:fld>
             <a:endParaRPr lang="en-US"/>
           </a:p>
@@ -494,7 +496,7 @@
           <a:p>
             <a:fld id="{78186FDC-CD1E-4E7E-B1CD-1CBCCD519E8C}" type="datetimeFigureOut">
               <a:rPr lang="en-US" smtClean="0"/>
-              <a:t>11/5/2024</a:t>
+              <a:t>11/6/2024</a:t>
             </a:fld>
             <a:endParaRPr lang="en-US"/>
           </a:p>
@@ -930,7 +932,7 @@
           <a:p>
             <a:fld id="{4B9A8B04-59C6-4476-9B83-8806D24CC38B}" type="slidenum">
               <a:rPr lang="en-US" smtClean="0"/>
-              <a:t>6</a:t>
+              <a:t>7</a:t>
             </a:fld>
             <a:endParaRPr lang="en-US"/>
           </a:p>
@@ -1004,6 +1006,90 @@
             <a:spLocks noGrp="1"/>
           </p:cNvSpPr>
           <p:nvPr>
+            <p:ph type="sldNum" sz="quarter" idx="5"/>
+          </p:nvPr>
+        </p:nvSpPr>
+        <p:spPr/>
+        <p:txBody>
+          <a:bodyPr/>
+          <a:lstStyle/>
+          <a:p>
+            <a:fld id="{4B9A8B04-59C6-4476-9B83-8806D24CC38B}" type="slidenum">
+              <a:rPr lang="en-US" smtClean="0"/>
+              <a:t>9</a:t>
+            </a:fld>
+            <a:endParaRPr lang="en-US"/>
+          </a:p>
+        </p:txBody>
+      </p:sp>
+    </p:spTree>
+    <p:extLst>
+      <p:ext uri="{BB962C8B-B14F-4D97-AF65-F5344CB8AC3E}">
+        <p14:creationId xmlns:p14="http://schemas.microsoft.com/office/powerpoint/2010/main" val="3706268069"/>
+      </p:ext>
+    </p:extLst>
+  </p:cSld>
+  <p:clrMapOvr>
+    <a:masterClrMapping/>
+  </p:clrMapOvr>
+</p:notes>
+</file>
+
+<file path=ppt/notesSlides/notesSlide4.xml><?xml version="1.0" encoding="utf-8"?>
+<p:notes xmlns:a="http://schemas.openxmlformats.org/drawingml/2006/main" xmlns:r="http://schemas.openxmlformats.org/officeDocument/2006/relationships" xmlns:p="http://schemas.openxmlformats.org/presentationml/2006/main">
+  <p:cSld>
+    <p:spTree>
+      <p:nvGrpSpPr>
+        <p:cNvPr id="1" name=""/>
+        <p:cNvGrpSpPr/>
+        <p:nvPr/>
+      </p:nvGrpSpPr>
+      <p:grpSpPr>
+        <a:xfrm>
+          <a:off x="0" y="0"/>
+          <a:ext cx="0" cy="0"/>
+          <a:chOff x="0" y="0"/>
+          <a:chExt cx="0" cy="0"/>
+        </a:xfrm>
+      </p:grpSpPr>
+      <p:sp>
+        <p:nvSpPr>
+          <p:cNvPr id="2" name="Slide Image Placeholder 1"/>
+          <p:cNvSpPr>
+            <a:spLocks noGrp="1" noRot="1" noChangeAspect="1"/>
+          </p:cNvSpPr>
+          <p:nvPr>
+            <p:ph type="sldImg"/>
+          </p:nvPr>
+        </p:nvSpPr>
+        <p:spPr/>
+      </p:sp>
+      <p:sp>
+        <p:nvSpPr>
+          <p:cNvPr id="3" name="Notes Placeholder 2"/>
+          <p:cNvSpPr>
+            <a:spLocks noGrp="1"/>
+          </p:cNvSpPr>
+          <p:nvPr>
+            <p:ph type="body" idx="1"/>
+          </p:nvPr>
+        </p:nvSpPr>
+        <p:spPr/>
+        <p:txBody>
+          <a:bodyPr/>
+          <a:lstStyle/>
+          <a:p>
+            <a:endParaRPr lang="en-US"/>
+          </a:p>
+        </p:txBody>
+      </p:sp>
+      <p:sp>
+        <p:nvSpPr>
+          <p:cNvPr id="4" name="Slide Number Placeholder 3"/>
+          <p:cNvSpPr>
+            <a:spLocks noGrp="1"/>
+          </p:cNvSpPr>
+          <p:nvPr>
             <p:ph type="sldNum" sz="quarter" idx="10"/>
           </p:nvPr>
         </p:nvSpPr>
@@ -1014,7 +1100,7 @@
           <a:p>
             <a:fld id="{4B9A8B04-59C6-4476-9B83-8806D24CC38B}" type="slidenum">
               <a:rPr lang="en-US" smtClean="0"/>
-              <a:t>10</a:t>
+              <a:t>11</a:t>
             </a:fld>
             <a:endParaRPr lang="en-US"/>
           </a:p>
@@ -22394,6 +22480,421 @@
       </p:grpSpPr>
       <p:sp>
         <p:nvSpPr>
+          <p:cNvPr id="6" name="TextBox 5">
+            <a:extLst>
+              <a:ext uri="{FF2B5EF4-FFF2-40B4-BE49-F238E27FC236}">
+                <a16:creationId xmlns:a16="http://schemas.microsoft.com/office/drawing/2014/main" id="{9F8FFC18-4FD7-5E97-CCB3-5E13CE612AEB}"/>
+              </a:ext>
+            </a:extLst>
+          </p:cNvPr>
+          <p:cNvSpPr txBox="1"/>
+          <p:nvPr/>
+        </p:nvSpPr>
+        <p:spPr>
+          <a:xfrm>
+            <a:off x="1212322" y="909045"/>
+            <a:ext cx="9568567" cy="2697892"/>
+          </a:xfrm>
+          <a:prstGeom prst="rect">
+            <a:avLst/>
+          </a:prstGeom>
+          <a:noFill/>
+        </p:spPr>
+        <p:txBody>
+          <a:bodyPr wrap="square" lIns="0" tIns="0" rIns="0" bIns="0" rtlCol="0">
+            <a:noAutofit/>
+          </a:bodyPr>
+          <a:lstStyle/>
+          <a:p>
+            <a:pPr marL="342900" indent="-342900">
+              <a:lnSpc>
+                <a:spcPct val="90000"/>
+              </a:lnSpc>
+              <a:spcAft>
+                <a:spcPts val="1000"/>
+              </a:spcAft>
+              <a:buFont typeface="Arial" panose="020B0604020202020204" pitchFamily="34" charset="0"/>
+              <a:buChar char="•"/>
+            </a:pPr>
+            <a:r>
+              <a:rPr lang="en-US" sz="1600" dirty="0">
+                <a:latin typeface="Roboto" charset="0"/>
+                <a:ea typeface="Roboto" charset="0"/>
+                <a:cs typeface="Roboto" charset="0"/>
+              </a:rPr>
+              <a:t>Python will look for the latest Excel or zip file in the same directory.</a:t>
+            </a:r>
+          </a:p>
+          <a:p>
+            <a:pPr marL="342900" indent="-342900">
+              <a:lnSpc>
+                <a:spcPct val="90000"/>
+              </a:lnSpc>
+              <a:spcAft>
+                <a:spcPts val="1000"/>
+              </a:spcAft>
+              <a:buFont typeface="Arial" panose="020B0604020202020204" pitchFamily="34" charset="0"/>
+              <a:buChar char="•"/>
+            </a:pPr>
+            <a:r>
+              <a:rPr lang="en-US" sz="1600" dirty="0">
+                <a:latin typeface="Roboto" charset="0"/>
+                <a:ea typeface="Roboto" charset="0"/>
+                <a:cs typeface="Roboto" charset="0"/>
+              </a:rPr>
+              <a:t>Python will look for the config.csv in the same directory (if config file not specified)</a:t>
+            </a:r>
+          </a:p>
+          <a:p>
+            <a:pPr marL="342900" indent="-342900">
+              <a:lnSpc>
+                <a:spcPct val="90000"/>
+              </a:lnSpc>
+              <a:spcAft>
+                <a:spcPts val="1000"/>
+              </a:spcAft>
+              <a:buFont typeface="Arial" panose="020B0604020202020204" pitchFamily="34" charset="0"/>
+              <a:buChar char="•"/>
+            </a:pPr>
+            <a:r>
+              <a:rPr lang="en-US" sz="1600" dirty="0">
+                <a:latin typeface="Roboto" charset="0"/>
+                <a:ea typeface="Roboto" charset="0"/>
+                <a:cs typeface="Roboto" charset="0"/>
+              </a:rPr>
+              <a:t>Will display the lineage that it’s creating </a:t>
+            </a:r>
+          </a:p>
+          <a:p>
+            <a:pPr marL="342900" indent="-342900">
+              <a:lnSpc>
+                <a:spcPct val="90000"/>
+              </a:lnSpc>
+              <a:spcAft>
+                <a:spcPts val="1000"/>
+              </a:spcAft>
+              <a:buFont typeface="Arial" panose="020B0604020202020204" pitchFamily="34" charset="0"/>
+              <a:buChar char="•"/>
+            </a:pPr>
+            <a:r>
+              <a:rPr lang="en-US" sz="1600" dirty="0">
+                <a:latin typeface="Roboto" charset="0"/>
+                <a:ea typeface="Roboto" charset="0"/>
+                <a:cs typeface="Roboto" charset="0"/>
+              </a:rPr>
+              <a:t>Will display the match score for the dataset / element</a:t>
+            </a:r>
+          </a:p>
+          <a:p>
+            <a:pPr marL="342900" indent="-342900">
+              <a:lnSpc>
+                <a:spcPct val="90000"/>
+              </a:lnSpc>
+              <a:spcAft>
+                <a:spcPts val="1000"/>
+              </a:spcAft>
+              <a:buFont typeface="Arial" panose="020B0604020202020204" pitchFamily="34" charset="0"/>
+              <a:buChar char="•"/>
+            </a:pPr>
+            <a:r>
+              <a:rPr lang="en-US" sz="1600" dirty="0">
+                <a:latin typeface="Roboto" charset="0"/>
+                <a:ea typeface="Roboto" charset="0"/>
+                <a:cs typeface="Roboto" charset="0"/>
+              </a:rPr>
+              <a:t>Will write the lineage information to links_&lt;timestamp&gt;.csv within the “links” directory</a:t>
+            </a:r>
+          </a:p>
+          <a:p>
+            <a:pPr marL="342900" indent="-342900">
+              <a:lnSpc>
+                <a:spcPct val="90000"/>
+              </a:lnSpc>
+              <a:spcAft>
+                <a:spcPts val="1000"/>
+              </a:spcAft>
+              <a:buFont typeface="Arial" panose="020B0604020202020204" pitchFamily="34" charset="0"/>
+              <a:buChar char="•"/>
+            </a:pPr>
+            <a:r>
+              <a:rPr lang="en-US" sz="1600" dirty="0">
+                <a:latin typeface="Roboto" charset="0"/>
+                <a:ea typeface="Roboto" charset="0"/>
+                <a:cs typeface="Roboto" charset="0"/>
+              </a:rPr>
+              <a:t>Will write the lineage information to lineage_&lt;timestamp&gt;.zip within the “links” directory</a:t>
+            </a:r>
+          </a:p>
+          <a:p>
+            <a:pPr marL="342900" indent="-342900">
+              <a:lnSpc>
+                <a:spcPct val="90000"/>
+              </a:lnSpc>
+              <a:spcAft>
+                <a:spcPts val="1000"/>
+              </a:spcAft>
+              <a:buFont typeface="Arial" panose="020B0604020202020204" pitchFamily="34" charset="0"/>
+              <a:buChar char="•"/>
+            </a:pPr>
+            <a:r>
+              <a:rPr lang="en-US" sz="1600" dirty="0">
+                <a:latin typeface="Roboto" charset="0"/>
+                <a:ea typeface="Roboto" charset="0"/>
+                <a:cs typeface="Roboto" charset="0"/>
+              </a:rPr>
+              <a:t>Will write the ETL Resource information to &lt;Resource Name&gt;_&lt;timestamp&gt;.zip within the “resources” directory</a:t>
+            </a:r>
+          </a:p>
+          <a:p>
+            <a:pPr marL="342900" indent="-342900">
+              <a:lnSpc>
+                <a:spcPct val="90000"/>
+              </a:lnSpc>
+              <a:spcAft>
+                <a:spcPts val="1000"/>
+              </a:spcAft>
+              <a:buFont typeface="Arial" panose="020B0604020202020204" pitchFamily="34" charset="0"/>
+              <a:buChar char="•"/>
+            </a:pPr>
+            <a:endParaRPr lang="en-US" sz="1600" dirty="0">
+              <a:latin typeface="Roboto" charset="0"/>
+              <a:ea typeface="Roboto" charset="0"/>
+              <a:cs typeface="Roboto" charset="0"/>
+            </a:endParaRPr>
+          </a:p>
+          <a:p>
+            <a:pPr marL="342900" indent="-342900">
+              <a:lnSpc>
+                <a:spcPct val="90000"/>
+              </a:lnSpc>
+              <a:spcAft>
+                <a:spcPts val="1000"/>
+              </a:spcAft>
+              <a:buFont typeface="Arial" panose="020B0604020202020204" pitchFamily="34" charset="0"/>
+              <a:buChar char="•"/>
+            </a:pPr>
+            <a:endParaRPr lang="en-US" sz="1600" dirty="0">
+              <a:latin typeface="Roboto" charset="0"/>
+              <a:ea typeface="Roboto" charset="0"/>
+              <a:cs typeface="Roboto" charset="0"/>
+            </a:endParaRPr>
+          </a:p>
+          <a:p>
+            <a:pPr marL="342900" indent="-342900">
+              <a:lnSpc>
+                <a:spcPct val="90000"/>
+              </a:lnSpc>
+              <a:spcAft>
+                <a:spcPts val="1000"/>
+              </a:spcAft>
+              <a:buFont typeface="Arial" panose="020B0604020202020204" pitchFamily="34" charset="0"/>
+              <a:buChar char="•"/>
+            </a:pPr>
+            <a:endParaRPr lang="en-US" sz="1600" dirty="0">
+              <a:latin typeface="Roboto" charset="0"/>
+              <a:ea typeface="Roboto" charset="0"/>
+              <a:cs typeface="Roboto" charset="0"/>
+            </a:endParaRPr>
+          </a:p>
+          <a:p>
+            <a:pPr marL="342900" indent="-342900">
+              <a:lnSpc>
+                <a:spcPct val="90000"/>
+              </a:lnSpc>
+              <a:spcAft>
+                <a:spcPts val="1000"/>
+              </a:spcAft>
+              <a:buFont typeface="Arial" panose="020B0604020202020204" pitchFamily="34" charset="0"/>
+              <a:buChar char="•"/>
+            </a:pPr>
+            <a:endParaRPr lang="en-US" sz="1600" dirty="0">
+              <a:latin typeface="Roboto" charset="0"/>
+              <a:ea typeface="Roboto" charset="0"/>
+              <a:cs typeface="Roboto" charset="0"/>
+            </a:endParaRPr>
+          </a:p>
+          <a:p>
+            <a:pPr marL="342900" indent="-342900">
+              <a:lnSpc>
+                <a:spcPct val="90000"/>
+              </a:lnSpc>
+              <a:spcAft>
+                <a:spcPts val="1000"/>
+              </a:spcAft>
+              <a:buFont typeface="Arial" panose="020B0604020202020204" pitchFamily="34" charset="0"/>
+              <a:buChar char="•"/>
+            </a:pPr>
+            <a:endParaRPr lang="en-US" sz="1600" dirty="0">
+              <a:latin typeface="Roboto" charset="0"/>
+              <a:ea typeface="Roboto" charset="0"/>
+              <a:cs typeface="Roboto" charset="0"/>
+            </a:endParaRPr>
+          </a:p>
+          <a:p>
+            <a:pPr marL="342900" indent="-342900">
+              <a:lnSpc>
+                <a:spcPct val="90000"/>
+              </a:lnSpc>
+              <a:spcAft>
+                <a:spcPts val="1000"/>
+              </a:spcAft>
+              <a:buFont typeface="Arial" panose="020B0604020202020204" pitchFamily="34" charset="0"/>
+              <a:buChar char="•"/>
+            </a:pPr>
+            <a:endParaRPr lang="en-US" sz="1600" dirty="0">
+              <a:latin typeface="Roboto" charset="0"/>
+              <a:ea typeface="Roboto" charset="0"/>
+              <a:cs typeface="Roboto" charset="0"/>
+            </a:endParaRPr>
+          </a:p>
+          <a:p>
+            <a:pPr marL="342900" indent="-342900">
+              <a:lnSpc>
+                <a:spcPct val="90000"/>
+              </a:lnSpc>
+              <a:spcAft>
+                <a:spcPts val="1000"/>
+              </a:spcAft>
+              <a:buFont typeface="Arial" panose="020B0604020202020204" pitchFamily="34" charset="0"/>
+              <a:buChar char="•"/>
+            </a:pPr>
+            <a:endParaRPr lang="en-US" sz="1600" dirty="0">
+              <a:latin typeface="Roboto" charset="0"/>
+              <a:ea typeface="Roboto" charset="0"/>
+              <a:cs typeface="Roboto" charset="0"/>
+            </a:endParaRPr>
+          </a:p>
+        </p:txBody>
+      </p:sp>
+      <p:sp>
+        <p:nvSpPr>
+          <p:cNvPr id="2" name="Title 4">
+            <a:extLst>
+              <a:ext uri="{FF2B5EF4-FFF2-40B4-BE49-F238E27FC236}">
+                <a16:creationId xmlns:a16="http://schemas.microsoft.com/office/drawing/2014/main" id="{491E361F-9E4F-ECEB-D6D5-DB8E848EC4E0}"/>
+              </a:ext>
+            </a:extLst>
+          </p:cNvPr>
+          <p:cNvSpPr txBox="1">
+            <a:spLocks/>
+          </p:cNvSpPr>
+          <p:nvPr/>
+        </p:nvSpPr>
+        <p:spPr>
+          <a:xfrm>
+            <a:off x="284546" y="159431"/>
+            <a:ext cx="11195177" cy="562427"/>
+          </a:xfrm>
+          <a:prstGeom prst="rect">
+            <a:avLst/>
+          </a:prstGeom>
+        </p:spPr>
+        <p:txBody>
+          <a:bodyPr vert="horz" lIns="0" tIns="0" rIns="0" bIns="0" rtlCol="0" anchor="t" anchorCtr="0">
+            <a:noAutofit/>
+          </a:bodyPr>
+          <a:lstStyle>
+            <a:lvl1pPr algn="l" defTabSz="914217" rtl="0" eaLnBrk="1" latinLnBrk="0" hangingPunct="1">
+              <a:lnSpc>
+                <a:spcPct val="90000"/>
+              </a:lnSpc>
+              <a:spcBef>
+                <a:spcPct val="0"/>
+              </a:spcBef>
+              <a:buNone/>
+              <a:defRPr sz="3600" b="0" i="0" kern="1200" baseline="0">
+                <a:solidFill>
+                  <a:schemeClr val="tx1"/>
+                </a:solidFill>
+                <a:latin typeface="Roboto Light" charset="0"/>
+                <a:ea typeface="Roboto Light" charset="0"/>
+                <a:cs typeface="Roboto Light" charset="0"/>
+              </a:defRPr>
+            </a:lvl1pPr>
+          </a:lstStyle>
+          <a:p>
+            <a:r>
+              <a:rPr lang="en-US" dirty="0"/>
+              <a:t>Output</a:t>
+            </a:r>
+            <a:endParaRPr lang="en-IN" dirty="0"/>
+          </a:p>
+        </p:txBody>
+      </p:sp>
+      <p:pic>
+        <p:nvPicPr>
+          <p:cNvPr id="17" name="Picture 16">
+            <a:extLst>
+              <a:ext uri="{FF2B5EF4-FFF2-40B4-BE49-F238E27FC236}">
+                <a16:creationId xmlns:a16="http://schemas.microsoft.com/office/drawing/2014/main" id="{38B41BA6-86A5-2AF5-6163-4932FA8F4F5D}"/>
+              </a:ext>
+            </a:extLst>
+          </p:cNvPr>
+          <p:cNvPicPr>
+            <a:picLocks noChangeAspect="1"/>
+          </p:cNvPicPr>
+          <p:nvPr/>
+        </p:nvPicPr>
+        <p:blipFill>
+          <a:blip r:embed="rId2"/>
+          <a:stretch>
+            <a:fillRect/>
+          </a:stretch>
+        </p:blipFill>
+        <p:spPr>
+          <a:xfrm>
+            <a:off x="1212322" y="3794125"/>
+            <a:ext cx="9058275" cy="2114550"/>
+          </a:xfrm>
+          <a:prstGeom prst="rect">
+            <a:avLst/>
+          </a:prstGeom>
+        </p:spPr>
+      </p:pic>
+    </p:spTree>
+    <p:extLst>
+      <p:ext uri="{BB962C8B-B14F-4D97-AF65-F5344CB8AC3E}">
+        <p14:creationId xmlns:p14="http://schemas.microsoft.com/office/powerpoint/2010/main" val="1682179034"/>
+      </p:ext>
+    </p:extLst>
+  </p:cSld>
+  <p:clrMapOvr>
+    <a:masterClrMapping/>
+  </p:clrMapOvr>
+  <mc:AlternateContent xmlns:mc="http://schemas.openxmlformats.org/markup-compatibility/2006" xmlns:p14="http://schemas.microsoft.com/office/powerpoint/2010/main">
+    <mc:Choice Requires="p14">
+      <p:transition spd="med" p14:dur="700" advClick="0">
+        <p:fade/>
+      </p:transition>
+    </mc:Choice>
+    <mc:Fallback xmlns="">
+      <p:transition spd="med" advClick="0">
+        <p:fade/>
+      </p:transition>
+    </mc:Fallback>
+  </mc:AlternateContent>
+</p:sld>
+</file>
+
+<file path=ppt/slides/slide11.xml><?xml version="1.0" encoding="utf-8"?>
+<p:sld xmlns:a="http://schemas.openxmlformats.org/drawingml/2006/main" xmlns:r="http://schemas.openxmlformats.org/officeDocument/2006/relationships" xmlns:p="http://schemas.openxmlformats.org/presentationml/2006/main">
+  <p:cSld>
+    <p:spTree>
+      <p:nvGrpSpPr>
+        <p:cNvPr id="1" name=""/>
+        <p:cNvGrpSpPr/>
+        <p:nvPr/>
+      </p:nvGrpSpPr>
+      <p:grpSpPr>
+        <a:xfrm>
+          <a:off x="0" y="0"/>
+          <a:ext cx="0" cy="0"/>
+          <a:chOff x="0" y="0"/>
+          <a:chExt cx="0" cy="0"/>
+        </a:xfrm>
+      </p:grpSpPr>
+      <p:sp>
+        <p:nvSpPr>
           <p:cNvPr id="3" name="Text Placeholder 2"/>
           <p:cNvSpPr>
             <a:spLocks noGrp="1"/>
@@ -25062,6 +25563,364 @@
           <a:chExt cx="0" cy="0"/>
         </a:xfrm>
       </p:grpSpPr>
+      <p:pic>
+        <p:nvPicPr>
+          <p:cNvPr id="8" name="Picture 7">
+            <a:extLst>
+              <a:ext uri="{FF2B5EF4-FFF2-40B4-BE49-F238E27FC236}">
+                <a16:creationId xmlns:a16="http://schemas.microsoft.com/office/drawing/2014/main" id="{9056A42A-D2AB-4881-A923-B4FA7FC00E1C}"/>
+              </a:ext>
+            </a:extLst>
+          </p:cNvPr>
+          <p:cNvPicPr>
+            <a:picLocks noChangeAspect="1"/>
+          </p:cNvPicPr>
+          <p:nvPr/>
+        </p:nvPicPr>
+        <p:blipFill>
+          <a:blip r:embed="rId2"/>
+          <a:stretch>
+            <a:fillRect/>
+          </a:stretch>
+        </p:blipFill>
+        <p:spPr>
+          <a:xfrm>
+            <a:off x="657414" y="1705658"/>
+            <a:ext cx="5622749" cy="1672590"/>
+          </a:xfrm>
+          <a:prstGeom prst="rect">
+            <a:avLst/>
+          </a:prstGeom>
+        </p:spPr>
+      </p:pic>
+      <p:sp>
+        <p:nvSpPr>
+          <p:cNvPr id="29" name="Title 4">
+            <a:extLst>
+              <a:ext uri="{FF2B5EF4-FFF2-40B4-BE49-F238E27FC236}">
+                <a16:creationId xmlns:a16="http://schemas.microsoft.com/office/drawing/2014/main" id="{CDAFCEB1-84B4-1FF8-6C77-B719D71B0E80}"/>
+              </a:ext>
+            </a:extLst>
+          </p:cNvPr>
+          <p:cNvSpPr>
+            <a:spLocks noGrp="1"/>
+          </p:cNvSpPr>
+          <p:nvPr>
+            <p:ph type="title"/>
+          </p:nvPr>
+        </p:nvSpPr>
+        <p:spPr>
+          <a:xfrm>
+            <a:off x="284546" y="159431"/>
+            <a:ext cx="11195177" cy="562427"/>
+          </a:xfrm>
+        </p:spPr>
+        <p:txBody>
+          <a:bodyPr/>
+          <a:lstStyle/>
+          <a:p>
+            <a:r>
+              <a:rPr lang="en-US" dirty="0"/>
+              <a:t>ETL Configuration </a:t>
+            </a:r>
+            <a:r>
+              <a:rPr lang="en-US" i="1" dirty="0"/>
+              <a:t>(optional)</a:t>
+            </a:r>
+            <a:endParaRPr lang="en-IN" i="1" dirty="0"/>
+          </a:p>
+        </p:txBody>
+      </p:sp>
+      <p:sp>
+        <p:nvSpPr>
+          <p:cNvPr id="2" name="TextBox 1">
+            <a:extLst>
+              <a:ext uri="{FF2B5EF4-FFF2-40B4-BE49-F238E27FC236}">
+                <a16:creationId xmlns:a16="http://schemas.microsoft.com/office/drawing/2014/main" id="{D467DCCE-B639-A33F-4B00-8B2252D83658}"/>
+              </a:ext>
+            </a:extLst>
+          </p:cNvPr>
+          <p:cNvSpPr txBox="1"/>
+          <p:nvPr/>
+        </p:nvSpPr>
+        <p:spPr>
+          <a:xfrm>
+            <a:off x="527832" y="941859"/>
+            <a:ext cx="10490887" cy="1002471"/>
+          </a:xfrm>
+          <a:prstGeom prst="rect">
+            <a:avLst/>
+          </a:prstGeom>
+          <a:noFill/>
+        </p:spPr>
+        <p:txBody>
+          <a:bodyPr wrap="square" lIns="0" tIns="0" rIns="0" bIns="0" rtlCol="0">
+            <a:noAutofit/>
+          </a:bodyPr>
+          <a:lstStyle/>
+          <a:p>
+            <a:pPr>
+              <a:lnSpc>
+                <a:spcPct val="90000"/>
+              </a:lnSpc>
+              <a:spcAft>
+                <a:spcPts val="1000"/>
+              </a:spcAft>
+            </a:pPr>
+            <a:r>
+              <a:rPr lang="en-US" sz="2100" dirty="0">
+                <a:latin typeface="Roboto" charset="0"/>
+                <a:ea typeface="Roboto" charset="0"/>
+                <a:cs typeface="Roboto" charset="0"/>
+              </a:rPr>
+              <a:t>Optionally, you can configure the script to add additional attributes to the ETL custom sources. With that you can add descriptions, source code, calculations and more:</a:t>
+            </a:r>
+          </a:p>
+        </p:txBody>
+      </p:sp>
+      <p:sp>
+        <p:nvSpPr>
+          <p:cNvPr id="10" name="TextBox 9">
+            <a:extLst>
+              <a:ext uri="{FF2B5EF4-FFF2-40B4-BE49-F238E27FC236}">
+                <a16:creationId xmlns:a16="http://schemas.microsoft.com/office/drawing/2014/main" id="{11772137-C473-7D46-B57C-3DFF3C558E39}"/>
+              </a:ext>
+            </a:extLst>
+          </p:cNvPr>
+          <p:cNvSpPr txBox="1"/>
+          <p:nvPr/>
+        </p:nvSpPr>
+        <p:spPr>
+          <a:xfrm>
+            <a:off x="609955" y="1600532"/>
+            <a:ext cx="4379734" cy="194402"/>
+          </a:xfrm>
+          <a:prstGeom prst="rect">
+            <a:avLst/>
+          </a:prstGeom>
+          <a:noFill/>
+        </p:spPr>
+        <p:txBody>
+          <a:bodyPr wrap="square" lIns="0" tIns="0" rIns="0" bIns="0" rtlCol="0">
+            <a:noAutofit/>
+          </a:bodyPr>
+          <a:lstStyle/>
+          <a:p>
+            <a:pPr>
+              <a:lnSpc>
+                <a:spcPct val="90000"/>
+              </a:lnSpc>
+              <a:spcAft>
+                <a:spcPts val="1000"/>
+              </a:spcAft>
+            </a:pPr>
+            <a:r>
+              <a:rPr lang="en-US" sz="1200" dirty="0">
+                <a:latin typeface="Roboto" charset="0"/>
+                <a:ea typeface="Roboto" charset="0"/>
+                <a:cs typeface="Roboto" charset="0"/>
+              </a:rPr>
+              <a:t>Example of lineage with a custom ETL (using the script model):</a:t>
+            </a:r>
+          </a:p>
+        </p:txBody>
+      </p:sp>
+      <p:sp>
+        <p:nvSpPr>
+          <p:cNvPr id="4" name="TextBox 3">
+            <a:extLst>
+              <a:ext uri="{FF2B5EF4-FFF2-40B4-BE49-F238E27FC236}">
+                <a16:creationId xmlns:a16="http://schemas.microsoft.com/office/drawing/2014/main" id="{4B8DAC36-747F-A777-0E02-688FC03A1C06}"/>
+              </a:ext>
+            </a:extLst>
+          </p:cNvPr>
+          <p:cNvSpPr txBox="1"/>
+          <p:nvPr/>
+        </p:nvSpPr>
+        <p:spPr>
+          <a:xfrm>
+            <a:off x="719407" y="3429000"/>
+            <a:ext cx="3423616" cy="291767"/>
+          </a:xfrm>
+          <a:prstGeom prst="rect">
+            <a:avLst/>
+          </a:prstGeom>
+          <a:noFill/>
+        </p:spPr>
+        <p:txBody>
+          <a:bodyPr wrap="square" lIns="0" tIns="0" rIns="0" bIns="0" rtlCol="0">
+            <a:noAutofit/>
+          </a:bodyPr>
+          <a:lstStyle/>
+          <a:p>
+            <a:pPr>
+              <a:lnSpc>
+                <a:spcPct val="90000"/>
+              </a:lnSpc>
+              <a:spcAft>
+                <a:spcPts val="1000"/>
+              </a:spcAft>
+            </a:pPr>
+            <a:r>
+              <a:rPr lang="en-US" sz="1200" dirty="0">
+                <a:latin typeface="Roboto" charset="0"/>
+                <a:ea typeface="Roboto" charset="0"/>
+                <a:cs typeface="Roboto" charset="0"/>
+              </a:rPr>
+              <a:t>Example of lineage with a custom ETL with attribute for expression (using the script model):</a:t>
+            </a:r>
+          </a:p>
+        </p:txBody>
+      </p:sp>
+      <p:pic>
+        <p:nvPicPr>
+          <p:cNvPr id="12" name="Picture 11">
+            <a:extLst>
+              <a:ext uri="{FF2B5EF4-FFF2-40B4-BE49-F238E27FC236}">
+                <a16:creationId xmlns:a16="http://schemas.microsoft.com/office/drawing/2014/main" id="{2F1D3CCA-AC60-0AE4-2B8B-CCD01997267C}"/>
+              </a:ext>
+            </a:extLst>
+          </p:cNvPr>
+          <p:cNvPicPr>
+            <a:picLocks noChangeAspect="1"/>
+          </p:cNvPicPr>
+          <p:nvPr/>
+        </p:nvPicPr>
+        <p:blipFill>
+          <a:blip r:embed="rId3"/>
+          <a:stretch>
+            <a:fillRect/>
+          </a:stretch>
+        </p:blipFill>
+        <p:spPr>
+          <a:xfrm>
+            <a:off x="657413" y="3720767"/>
+            <a:ext cx="5622749" cy="1531838"/>
+          </a:xfrm>
+          <a:prstGeom prst="rect">
+            <a:avLst/>
+          </a:prstGeom>
+        </p:spPr>
+      </p:pic>
+      <p:pic>
+        <p:nvPicPr>
+          <p:cNvPr id="14" name="Picture 13">
+            <a:extLst>
+              <a:ext uri="{FF2B5EF4-FFF2-40B4-BE49-F238E27FC236}">
+                <a16:creationId xmlns:a16="http://schemas.microsoft.com/office/drawing/2014/main" id="{5387D7B7-8C93-67A9-DECF-EBBCB3FEB9FE}"/>
+              </a:ext>
+            </a:extLst>
+          </p:cNvPr>
+          <p:cNvPicPr>
+            <a:picLocks noChangeAspect="1"/>
+          </p:cNvPicPr>
+          <p:nvPr/>
+        </p:nvPicPr>
+        <p:blipFill>
+          <a:blip r:embed="rId4"/>
+          <a:stretch>
+            <a:fillRect/>
+          </a:stretch>
+        </p:blipFill>
+        <p:spPr>
+          <a:xfrm>
+            <a:off x="7354181" y="2832548"/>
+            <a:ext cx="3423616" cy="2774826"/>
+          </a:xfrm>
+          <a:prstGeom prst="rect">
+            <a:avLst/>
+          </a:prstGeom>
+        </p:spPr>
+      </p:pic>
+      <p:sp>
+        <p:nvSpPr>
+          <p:cNvPr id="15" name="TextBox 14">
+            <a:extLst>
+              <a:ext uri="{FF2B5EF4-FFF2-40B4-BE49-F238E27FC236}">
+                <a16:creationId xmlns:a16="http://schemas.microsoft.com/office/drawing/2014/main" id="{045E0B93-EFDA-AF21-7A68-3824788BF4F9}"/>
+              </a:ext>
+            </a:extLst>
+          </p:cNvPr>
+          <p:cNvSpPr txBox="1"/>
+          <p:nvPr/>
+        </p:nvSpPr>
+        <p:spPr>
+          <a:xfrm>
+            <a:off x="7272607" y="2686665"/>
+            <a:ext cx="3423616" cy="291767"/>
+          </a:xfrm>
+          <a:prstGeom prst="rect">
+            <a:avLst/>
+          </a:prstGeom>
+          <a:noFill/>
+        </p:spPr>
+        <p:txBody>
+          <a:bodyPr wrap="square" lIns="0" tIns="0" rIns="0" bIns="0" rtlCol="0">
+            <a:noAutofit/>
+          </a:bodyPr>
+          <a:lstStyle/>
+          <a:p>
+            <a:pPr>
+              <a:lnSpc>
+                <a:spcPct val="90000"/>
+              </a:lnSpc>
+              <a:spcAft>
+                <a:spcPts val="1000"/>
+              </a:spcAft>
+            </a:pPr>
+            <a:r>
+              <a:rPr lang="en-US" sz="1200" dirty="0">
+                <a:latin typeface="Roboto" charset="0"/>
+                <a:ea typeface="Roboto" charset="0"/>
+                <a:cs typeface="Roboto" charset="0"/>
+              </a:rPr>
+              <a:t>Example of custom script with source code:</a:t>
+            </a:r>
+          </a:p>
+        </p:txBody>
+      </p:sp>
+    </p:spTree>
+    <p:extLst>
+      <p:ext uri="{BB962C8B-B14F-4D97-AF65-F5344CB8AC3E}">
+        <p14:creationId xmlns:p14="http://schemas.microsoft.com/office/powerpoint/2010/main" val="2293783834"/>
+      </p:ext>
+    </p:extLst>
+  </p:cSld>
+  <p:clrMapOvr>
+    <a:masterClrMapping/>
+  </p:clrMapOvr>
+  <mc:AlternateContent xmlns:mc="http://schemas.openxmlformats.org/markup-compatibility/2006" xmlns:p14="http://schemas.microsoft.com/office/powerpoint/2010/main">
+    <mc:Choice Requires="p14">
+      <p:transition spd="med" p14:dur="700" advClick="0">
+        <p:fade/>
+      </p:transition>
+    </mc:Choice>
+    <mc:Fallback xmlns="">
+      <p:transition spd="med" advClick="0">
+        <p:fade/>
+      </p:transition>
+    </mc:Fallback>
+  </mc:AlternateContent>
+</p:sld>
+</file>
+
+<file path=ppt/slides/slide7.xml><?xml version="1.0" encoding="utf-8"?>
+<p:sld xmlns:a="http://schemas.openxmlformats.org/drawingml/2006/main" xmlns:r="http://schemas.openxmlformats.org/officeDocument/2006/relationships" xmlns:p="http://schemas.openxmlformats.org/presentationml/2006/main">
+  <p:cSld>
+    <p:spTree>
+      <p:nvGrpSpPr>
+        <p:cNvPr id="1" name=""/>
+        <p:cNvGrpSpPr/>
+        <p:nvPr/>
+      </p:nvGrpSpPr>
+      <p:grpSpPr>
+        <a:xfrm>
+          <a:off x="0" y="0"/>
+          <a:ext cx="0" cy="0"/>
+          <a:chOff x="0" y="0"/>
+          <a:chExt cx="0" cy="0"/>
+        </a:xfrm>
+      </p:grpSpPr>
       <p:sp>
         <p:nvSpPr>
           <p:cNvPr id="5" name="Title 4">
@@ -25390,7 +26249,25 @@
                 <a:ea typeface="Roboto" charset="0"/>
                 <a:cs typeface="Roboto" charset="0"/>
               </a:rPr>
-              <a:t>Extra Fields can be included, in case there are specific attributes you want to provide:</a:t>
+              <a:t>Extra Fields can be included, in case there are specific attributes you want to provide.</a:t>
+            </a:r>
+          </a:p>
+          <a:p>
+            <a:pPr>
+              <a:lnSpc>
+                <a:spcPct val="90000"/>
+              </a:lnSpc>
+              <a:spcAft>
+                <a:spcPts val="1000"/>
+              </a:spcAft>
+            </a:pPr>
+            <a:r>
+              <a:rPr lang="en-US" sz="1600" dirty="0">
+                <a:latin typeface="Roboto" charset="0"/>
+                <a:ea typeface="Roboto" charset="0"/>
+                <a:cs typeface="Roboto" charset="0"/>
+              </a:rPr>
+              <a:t>These object names, and values can contain tokens.</a:t>
             </a:r>
           </a:p>
           <a:p>
@@ -25471,7 +26348,7 @@
         </p:nvSpPr>
         <p:spPr>
           <a:xfrm>
-            <a:off x="482474" y="4607462"/>
+            <a:off x="214786" y="3072173"/>
             <a:ext cx="1930921" cy="203200"/>
           </a:xfrm>
           <a:prstGeom prst="rect">
@@ -25506,10 +26383,10 @@
       </p:sp>
       <p:pic>
         <p:nvPicPr>
-          <p:cNvPr id="7" name="Picture 6">
+          <p:cNvPr id="3" name="Picture 2">
             <a:extLst>
               <a:ext uri="{FF2B5EF4-FFF2-40B4-BE49-F238E27FC236}">
-                <a16:creationId xmlns:a16="http://schemas.microsoft.com/office/drawing/2014/main" id="{747799CD-2122-F233-BD9E-C0046AFDEF87}"/>
+                <a16:creationId xmlns:a16="http://schemas.microsoft.com/office/drawing/2014/main" id="{DA758657-0519-EE4A-78D9-63908D59CFCE}"/>
               </a:ext>
             </a:extLst>
           </p:cNvPr>
@@ -25526,8 +26403,8 @@
         </p:blipFill>
         <p:spPr>
           <a:xfrm>
-            <a:off x="482474" y="4810662"/>
-            <a:ext cx="11514237" cy="1378701"/>
+            <a:off x="66699" y="3247439"/>
+            <a:ext cx="12055425" cy="1378701"/>
           </a:xfrm>
           <a:prstGeom prst="rect">
             <a:avLst/>
@@ -25559,7 +26436,7 @@
 </p:sld>
 </file>
 
-<file path=ppt/slides/slide7.xml><?xml version="1.0" encoding="utf-8"?>
+<file path=ppt/slides/slide8.xml><?xml version="1.0" encoding="utf-8"?>
 <p:sld xmlns:a="http://schemas.openxmlformats.org/drawingml/2006/main" xmlns:r="http://schemas.openxmlformats.org/officeDocument/2006/relationships" xmlns:p="http://schemas.openxmlformats.org/presentationml/2006/main">
   <p:cSld>
     <p:spTree>
@@ -26057,7 +26934,7 @@
 </p:sld>
 </file>
 
-<file path=ppt/slides/slide8.xml><?xml version="1.0" encoding="utf-8"?>
+<file path=ppt/slides/slide9.xml><?xml version="1.0" encoding="utf-8"?>
 <p:sld xmlns:a="http://schemas.openxmlformats.org/drawingml/2006/main" xmlns:r="http://schemas.openxmlformats.org/officeDocument/2006/relationships" xmlns:p="http://schemas.openxmlformats.org/presentationml/2006/main">
   <p:cSld>
     <p:spTree>
@@ -26944,421 +27821,6 @@
     <p:extLst>
       <p:ext uri="{BB962C8B-B14F-4D97-AF65-F5344CB8AC3E}">
         <p14:creationId xmlns:p14="http://schemas.microsoft.com/office/powerpoint/2010/main" val="386637155"/>
-      </p:ext>
-    </p:extLst>
-  </p:cSld>
-  <p:clrMapOvr>
-    <a:masterClrMapping/>
-  </p:clrMapOvr>
-  <mc:AlternateContent xmlns:mc="http://schemas.openxmlformats.org/markup-compatibility/2006" xmlns:p14="http://schemas.microsoft.com/office/powerpoint/2010/main">
-    <mc:Choice Requires="p14">
-      <p:transition spd="med" p14:dur="700" advClick="0">
-        <p:fade/>
-      </p:transition>
-    </mc:Choice>
-    <mc:Fallback xmlns="">
-      <p:transition spd="med" advClick="0">
-        <p:fade/>
-      </p:transition>
-    </mc:Fallback>
-  </mc:AlternateContent>
-</p:sld>
-</file>
-
-<file path=ppt/slides/slide9.xml><?xml version="1.0" encoding="utf-8"?>
-<p:sld xmlns:a="http://schemas.openxmlformats.org/drawingml/2006/main" xmlns:r="http://schemas.openxmlformats.org/officeDocument/2006/relationships" xmlns:p="http://schemas.openxmlformats.org/presentationml/2006/main">
-  <p:cSld>
-    <p:spTree>
-      <p:nvGrpSpPr>
-        <p:cNvPr id="1" name=""/>
-        <p:cNvGrpSpPr/>
-        <p:nvPr/>
-      </p:nvGrpSpPr>
-      <p:grpSpPr>
-        <a:xfrm>
-          <a:off x="0" y="0"/>
-          <a:ext cx="0" cy="0"/>
-          <a:chOff x="0" y="0"/>
-          <a:chExt cx="0" cy="0"/>
-        </a:xfrm>
-      </p:grpSpPr>
-      <p:sp>
-        <p:nvSpPr>
-          <p:cNvPr id="6" name="TextBox 5">
-            <a:extLst>
-              <a:ext uri="{FF2B5EF4-FFF2-40B4-BE49-F238E27FC236}">
-                <a16:creationId xmlns:a16="http://schemas.microsoft.com/office/drawing/2014/main" id="{9F8FFC18-4FD7-5E97-CCB3-5E13CE612AEB}"/>
-              </a:ext>
-            </a:extLst>
-          </p:cNvPr>
-          <p:cNvSpPr txBox="1"/>
-          <p:nvPr/>
-        </p:nvSpPr>
-        <p:spPr>
-          <a:xfrm>
-            <a:off x="1212322" y="909045"/>
-            <a:ext cx="9568567" cy="2697892"/>
-          </a:xfrm>
-          <a:prstGeom prst="rect">
-            <a:avLst/>
-          </a:prstGeom>
-          <a:noFill/>
-        </p:spPr>
-        <p:txBody>
-          <a:bodyPr wrap="square" lIns="0" tIns="0" rIns="0" bIns="0" rtlCol="0">
-            <a:noAutofit/>
-          </a:bodyPr>
-          <a:lstStyle/>
-          <a:p>
-            <a:pPr marL="342900" indent="-342900">
-              <a:lnSpc>
-                <a:spcPct val="90000"/>
-              </a:lnSpc>
-              <a:spcAft>
-                <a:spcPts val="1000"/>
-              </a:spcAft>
-              <a:buFont typeface="Arial" panose="020B0604020202020204" pitchFamily="34" charset="0"/>
-              <a:buChar char="•"/>
-            </a:pPr>
-            <a:r>
-              <a:rPr lang="en-US" sz="1600" dirty="0">
-                <a:latin typeface="Roboto" charset="0"/>
-                <a:ea typeface="Roboto" charset="0"/>
-                <a:cs typeface="Roboto" charset="0"/>
-              </a:rPr>
-              <a:t>Python will look for the latest Excel or zip file in the same directory.</a:t>
-            </a:r>
-          </a:p>
-          <a:p>
-            <a:pPr marL="342900" indent="-342900">
-              <a:lnSpc>
-                <a:spcPct val="90000"/>
-              </a:lnSpc>
-              <a:spcAft>
-                <a:spcPts val="1000"/>
-              </a:spcAft>
-              <a:buFont typeface="Arial" panose="020B0604020202020204" pitchFamily="34" charset="0"/>
-              <a:buChar char="•"/>
-            </a:pPr>
-            <a:r>
-              <a:rPr lang="en-US" sz="1600" dirty="0">
-                <a:latin typeface="Roboto" charset="0"/>
-                <a:ea typeface="Roboto" charset="0"/>
-                <a:cs typeface="Roboto" charset="0"/>
-              </a:rPr>
-              <a:t>Python will look for the config.csv in the same directory (if config file not specified)</a:t>
-            </a:r>
-          </a:p>
-          <a:p>
-            <a:pPr marL="342900" indent="-342900">
-              <a:lnSpc>
-                <a:spcPct val="90000"/>
-              </a:lnSpc>
-              <a:spcAft>
-                <a:spcPts val="1000"/>
-              </a:spcAft>
-              <a:buFont typeface="Arial" panose="020B0604020202020204" pitchFamily="34" charset="0"/>
-              <a:buChar char="•"/>
-            </a:pPr>
-            <a:r>
-              <a:rPr lang="en-US" sz="1600" dirty="0">
-                <a:latin typeface="Roboto" charset="0"/>
-                <a:ea typeface="Roboto" charset="0"/>
-                <a:cs typeface="Roboto" charset="0"/>
-              </a:rPr>
-              <a:t>Will display the lineage that it’s creating </a:t>
-            </a:r>
-          </a:p>
-          <a:p>
-            <a:pPr marL="342900" indent="-342900">
-              <a:lnSpc>
-                <a:spcPct val="90000"/>
-              </a:lnSpc>
-              <a:spcAft>
-                <a:spcPts val="1000"/>
-              </a:spcAft>
-              <a:buFont typeface="Arial" panose="020B0604020202020204" pitchFamily="34" charset="0"/>
-              <a:buChar char="•"/>
-            </a:pPr>
-            <a:r>
-              <a:rPr lang="en-US" sz="1600" dirty="0">
-                <a:latin typeface="Roboto" charset="0"/>
-                <a:ea typeface="Roboto" charset="0"/>
-                <a:cs typeface="Roboto" charset="0"/>
-              </a:rPr>
-              <a:t>Will display the match score for the dataset / element</a:t>
-            </a:r>
-          </a:p>
-          <a:p>
-            <a:pPr marL="342900" indent="-342900">
-              <a:lnSpc>
-                <a:spcPct val="90000"/>
-              </a:lnSpc>
-              <a:spcAft>
-                <a:spcPts val="1000"/>
-              </a:spcAft>
-              <a:buFont typeface="Arial" panose="020B0604020202020204" pitchFamily="34" charset="0"/>
-              <a:buChar char="•"/>
-            </a:pPr>
-            <a:r>
-              <a:rPr lang="en-US" sz="1600" dirty="0">
-                <a:latin typeface="Roboto" charset="0"/>
-                <a:ea typeface="Roboto" charset="0"/>
-                <a:cs typeface="Roboto" charset="0"/>
-              </a:rPr>
-              <a:t>Will write the lineage information to links_&lt;timestamp&gt;.csv within the “links” directory</a:t>
-            </a:r>
-          </a:p>
-          <a:p>
-            <a:pPr marL="342900" indent="-342900">
-              <a:lnSpc>
-                <a:spcPct val="90000"/>
-              </a:lnSpc>
-              <a:spcAft>
-                <a:spcPts val="1000"/>
-              </a:spcAft>
-              <a:buFont typeface="Arial" panose="020B0604020202020204" pitchFamily="34" charset="0"/>
-              <a:buChar char="•"/>
-            </a:pPr>
-            <a:r>
-              <a:rPr lang="en-US" sz="1600" dirty="0">
-                <a:latin typeface="Roboto" charset="0"/>
-                <a:ea typeface="Roboto" charset="0"/>
-                <a:cs typeface="Roboto" charset="0"/>
-              </a:rPr>
-              <a:t>Will write the lineage information to lineage_&lt;timestamp&gt;.zip within the “links” directory</a:t>
-            </a:r>
-          </a:p>
-          <a:p>
-            <a:pPr marL="342900" indent="-342900">
-              <a:lnSpc>
-                <a:spcPct val="90000"/>
-              </a:lnSpc>
-              <a:spcAft>
-                <a:spcPts val="1000"/>
-              </a:spcAft>
-              <a:buFont typeface="Arial" panose="020B0604020202020204" pitchFamily="34" charset="0"/>
-              <a:buChar char="•"/>
-            </a:pPr>
-            <a:r>
-              <a:rPr lang="en-US" sz="1600" dirty="0">
-                <a:latin typeface="Roboto" charset="0"/>
-                <a:ea typeface="Roboto" charset="0"/>
-                <a:cs typeface="Roboto" charset="0"/>
-              </a:rPr>
-              <a:t>Will write the ETL Resource information to &lt;Resource Name&gt;_&lt;timestamp&gt;.zip within the “resources” directory</a:t>
-            </a:r>
-          </a:p>
-          <a:p>
-            <a:pPr marL="342900" indent="-342900">
-              <a:lnSpc>
-                <a:spcPct val="90000"/>
-              </a:lnSpc>
-              <a:spcAft>
-                <a:spcPts val="1000"/>
-              </a:spcAft>
-              <a:buFont typeface="Arial" panose="020B0604020202020204" pitchFamily="34" charset="0"/>
-              <a:buChar char="•"/>
-            </a:pPr>
-            <a:endParaRPr lang="en-US" sz="1600" dirty="0">
-              <a:latin typeface="Roboto" charset="0"/>
-              <a:ea typeface="Roboto" charset="0"/>
-              <a:cs typeface="Roboto" charset="0"/>
-            </a:endParaRPr>
-          </a:p>
-          <a:p>
-            <a:pPr marL="342900" indent="-342900">
-              <a:lnSpc>
-                <a:spcPct val="90000"/>
-              </a:lnSpc>
-              <a:spcAft>
-                <a:spcPts val="1000"/>
-              </a:spcAft>
-              <a:buFont typeface="Arial" panose="020B0604020202020204" pitchFamily="34" charset="0"/>
-              <a:buChar char="•"/>
-            </a:pPr>
-            <a:endParaRPr lang="en-US" sz="1600" dirty="0">
-              <a:latin typeface="Roboto" charset="0"/>
-              <a:ea typeface="Roboto" charset="0"/>
-              <a:cs typeface="Roboto" charset="0"/>
-            </a:endParaRPr>
-          </a:p>
-          <a:p>
-            <a:pPr marL="342900" indent="-342900">
-              <a:lnSpc>
-                <a:spcPct val="90000"/>
-              </a:lnSpc>
-              <a:spcAft>
-                <a:spcPts val="1000"/>
-              </a:spcAft>
-              <a:buFont typeface="Arial" panose="020B0604020202020204" pitchFamily="34" charset="0"/>
-              <a:buChar char="•"/>
-            </a:pPr>
-            <a:endParaRPr lang="en-US" sz="1600" dirty="0">
-              <a:latin typeface="Roboto" charset="0"/>
-              <a:ea typeface="Roboto" charset="0"/>
-              <a:cs typeface="Roboto" charset="0"/>
-            </a:endParaRPr>
-          </a:p>
-          <a:p>
-            <a:pPr marL="342900" indent="-342900">
-              <a:lnSpc>
-                <a:spcPct val="90000"/>
-              </a:lnSpc>
-              <a:spcAft>
-                <a:spcPts val="1000"/>
-              </a:spcAft>
-              <a:buFont typeface="Arial" panose="020B0604020202020204" pitchFamily="34" charset="0"/>
-              <a:buChar char="•"/>
-            </a:pPr>
-            <a:endParaRPr lang="en-US" sz="1600" dirty="0">
-              <a:latin typeface="Roboto" charset="0"/>
-              <a:ea typeface="Roboto" charset="0"/>
-              <a:cs typeface="Roboto" charset="0"/>
-            </a:endParaRPr>
-          </a:p>
-          <a:p>
-            <a:pPr marL="342900" indent="-342900">
-              <a:lnSpc>
-                <a:spcPct val="90000"/>
-              </a:lnSpc>
-              <a:spcAft>
-                <a:spcPts val="1000"/>
-              </a:spcAft>
-              <a:buFont typeface="Arial" panose="020B0604020202020204" pitchFamily="34" charset="0"/>
-              <a:buChar char="•"/>
-            </a:pPr>
-            <a:endParaRPr lang="en-US" sz="1600" dirty="0">
-              <a:latin typeface="Roboto" charset="0"/>
-              <a:ea typeface="Roboto" charset="0"/>
-              <a:cs typeface="Roboto" charset="0"/>
-            </a:endParaRPr>
-          </a:p>
-          <a:p>
-            <a:pPr marL="342900" indent="-342900">
-              <a:lnSpc>
-                <a:spcPct val="90000"/>
-              </a:lnSpc>
-              <a:spcAft>
-                <a:spcPts val="1000"/>
-              </a:spcAft>
-              <a:buFont typeface="Arial" panose="020B0604020202020204" pitchFamily="34" charset="0"/>
-              <a:buChar char="•"/>
-            </a:pPr>
-            <a:endParaRPr lang="en-US" sz="1600" dirty="0">
-              <a:latin typeface="Roboto" charset="0"/>
-              <a:ea typeface="Roboto" charset="0"/>
-              <a:cs typeface="Roboto" charset="0"/>
-            </a:endParaRPr>
-          </a:p>
-          <a:p>
-            <a:pPr marL="342900" indent="-342900">
-              <a:lnSpc>
-                <a:spcPct val="90000"/>
-              </a:lnSpc>
-              <a:spcAft>
-                <a:spcPts val="1000"/>
-              </a:spcAft>
-              <a:buFont typeface="Arial" panose="020B0604020202020204" pitchFamily="34" charset="0"/>
-              <a:buChar char="•"/>
-            </a:pPr>
-            <a:endParaRPr lang="en-US" sz="1600" dirty="0">
-              <a:latin typeface="Roboto" charset="0"/>
-              <a:ea typeface="Roboto" charset="0"/>
-              <a:cs typeface="Roboto" charset="0"/>
-            </a:endParaRPr>
-          </a:p>
-        </p:txBody>
-      </p:sp>
-      <p:sp>
-        <p:nvSpPr>
-          <p:cNvPr id="2" name="Title 4">
-            <a:extLst>
-              <a:ext uri="{FF2B5EF4-FFF2-40B4-BE49-F238E27FC236}">
-                <a16:creationId xmlns:a16="http://schemas.microsoft.com/office/drawing/2014/main" id="{491E361F-9E4F-ECEB-D6D5-DB8E848EC4E0}"/>
-              </a:ext>
-            </a:extLst>
-          </p:cNvPr>
-          <p:cNvSpPr txBox="1">
-            <a:spLocks/>
-          </p:cNvSpPr>
-          <p:nvPr/>
-        </p:nvSpPr>
-        <p:spPr>
-          <a:xfrm>
-            <a:off x="284546" y="159431"/>
-            <a:ext cx="11195177" cy="562427"/>
-          </a:xfrm>
-          <a:prstGeom prst="rect">
-            <a:avLst/>
-          </a:prstGeom>
-        </p:spPr>
-        <p:txBody>
-          <a:bodyPr vert="horz" lIns="0" tIns="0" rIns="0" bIns="0" rtlCol="0" anchor="t" anchorCtr="0">
-            <a:noAutofit/>
-          </a:bodyPr>
-          <a:lstStyle>
-            <a:lvl1pPr algn="l" defTabSz="914217" rtl="0" eaLnBrk="1" latinLnBrk="0" hangingPunct="1">
-              <a:lnSpc>
-                <a:spcPct val="90000"/>
-              </a:lnSpc>
-              <a:spcBef>
-                <a:spcPct val="0"/>
-              </a:spcBef>
-              <a:buNone/>
-              <a:defRPr sz="3600" b="0" i="0" kern="1200" baseline="0">
-                <a:solidFill>
-                  <a:schemeClr val="tx1"/>
-                </a:solidFill>
-                <a:latin typeface="Roboto Light" charset="0"/>
-                <a:ea typeface="Roboto Light" charset="0"/>
-                <a:cs typeface="Roboto Light" charset="0"/>
-              </a:defRPr>
-            </a:lvl1pPr>
-          </a:lstStyle>
-          <a:p>
-            <a:r>
-              <a:rPr lang="en-US" dirty="0"/>
-              <a:t>Output</a:t>
-            </a:r>
-            <a:endParaRPr lang="en-IN" dirty="0"/>
-          </a:p>
-        </p:txBody>
-      </p:sp>
-      <p:pic>
-        <p:nvPicPr>
-          <p:cNvPr id="17" name="Picture 16">
-            <a:extLst>
-              <a:ext uri="{FF2B5EF4-FFF2-40B4-BE49-F238E27FC236}">
-                <a16:creationId xmlns:a16="http://schemas.microsoft.com/office/drawing/2014/main" id="{38B41BA6-86A5-2AF5-6163-4932FA8F4F5D}"/>
-              </a:ext>
-            </a:extLst>
-          </p:cNvPr>
-          <p:cNvPicPr>
-            <a:picLocks noChangeAspect="1"/>
-          </p:cNvPicPr>
-          <p:nvPr/>
-        </p:nvPicPr>
-        <p:blipFill>
-          <a:blip r:embed="rId2"/>
-          <a:stretch>
-            <a:fillRect/>
-          </a:stretch>
-        </p:blipFill>
-        <p:spPr>
-          <a:xfrm>
-            <a:off x="1212322" y="3794125"/>
-            <a:ext cx="9058275" cy="2114550"/>
-          </a:xfrm>
-          <a:prstGeom prst="rect">
-            <a:avLst/>
-          </a:prstGeom>
-        </p:spPr>
-      </p:pic>
-    </p:spTree>
-    <p:extLst>
-      <p:ext uri="{BB962C8B-B14F-4D97-AF65-F5344CB8AC3E}">
-        <p14:creationId xmlns:p14="http://schemas.microsoft.com/office/powerpoint/2010/main" val="1682179034"/>
       </p:ext>
     </p:extLst>
   </p:cSld>
@@ -28810,6 +29272,15 @@
 </file>
 
 <file path=customXml/item1.xml><?xml version="1.0" encoding="utf-8"?>
+<?mso-contentType ?>
+<FormTemplates xmlns="http://schemas.microsoft.com/sharepoint/v3/contenttype/forms">
+  <Display>DocumentLibraryForm</Display>
+  <Edit>DocumentLibraryForm</Edit>
+  <New>DocumentLibraryForm</New>
+</FormTemplates>
+</file>
+
+<file path=customXml/item2.xml><?xml version="1.0" encoding="utf-8"?>
 <ct:contentTypeSchema xmlns:ct="http://schemas.microsoft.com/office/2006/metadata/contentType" xmlns:ma="http://schemas.microsoft.com/office/2006/metadata/properties/metaAttributes" ct:_="" ma:_="" ma:contentTypeName="Document" ma:contentTypeID="0x0101008F469B9DDCB7884E95DD88D1FAB455BB" ma:contentTypeVersion="4" ma:contentTypeDescription="Create a new document." ma:contentTypeScope="" ma:versionID="2af74787b6fa7b67583c56dc5776735d">
   <xsd:schema xmlns:xsd="http://www.w3.org/2001/XMLSchema" xmlns:xs="http://www.w3.org/2001/XMLSchema" xmlns:p="http://schemas.microsoft.com/office/2006/metadata/properties" xmlns:ns2="d7abb67f-8ba3-4629-af4a-9ad47f056db5" targetNamespace="http://schemas.microsoft.com/office/2006/metadata/properties" ma:root="true" ma:fieldsID="03e5ccd49f08cdc976c4df5b8baab980" ns2:_="">
     <xsd:import namespace="d7abb67f-8ba3-4629-af4a-9ad47f056db5"/>
@@ -28955,16 +29426,15 @@
 </ct:contentTypeSchema>
 </file>
 
-<file path=customXml/item2.xml><?xml version="1.0" encoding="utf-8"?>
-<?mso-contentType ?>
-<FormTemplates xmlns="http://schemas.microsoft.com/sharepoint/v3/contenttype/forms">
-  <Display>DocumentLibraryForm</Display>
-  <Edit>DocumentLibraryForm</Edit>
-  <New>DocumentLibraryForm</New>
-</FormTemplates>
+<file path=customXml/itemProps1.xml><?xml version="1.0" encoding="utf-8"?>
+<ds:datastoreItem xmlns:ds="http://schemas.openxmlformats.org/officeDocument/2006/customXml" ds:itemID="{0FFC13DC-9E91-480E-AA50-E69DFCF153D3}">
+  <ds:schemaRefs>
+    <ds:schemaRef ds:uri="http://schemas.microsoft.com/sharepoint/v3/contenttype/forms"/>
+  </ds:schemaRefs>
+</ds:datastoreItem>
 </file>
 
-<file path=customXml/itemProps1.xml><?xml version="1.0" encoding="utf-8"?>
+<file path=customXml/itemProps2.xml><?xml version="1.0" encoding="utf-8"?>
 <ds:datastoreItem xmlns:ds="http://schemas.openxmlformats.org/officeDocument/2006/customXml" ds:itemID="{5CA5433E-CDB9-440C-BB77-1799205ED86D}">
   <ds:schemaRefs>
     <ds:schemaRef ds:uri="d7abb67f-8ba3-4629-af4a-9ad47f056db5"/>
@@ -28980,12 +29450,4 @@
     <ds:schemaRef ds:uri="http://www.w3.org/2001/XMLSchema"/>
   </ds:schemaRefs>
 </ds:datastoreItem>
-</file>
-
-<file path=customXml/itemProps2.xml><?xml version="1.0" encoding="utf-8"?>
-<ds:datastoreItem xmlns:ds="http://schemas.openxmlformats.org/officeDocument/2006/customXml" ds:itemID="{0FFC13DC-9E91-480E-AA50-E69DFCF153D3}">
-  <ds:schemaRefs>
-    <ds:schemaRef ds:uri="http://schemas.microsoft.com/sharepoint/v3/contenttype/forms"/>
-  </ds:schemaRefs>
-</ds:datastoreItem>
 </file>
</xml_diff>

<commit_message>
Version 20241122 Finalized API functionality. Included creation of Custom Source Type, download templates, and model, creation / modification of resources, and execution of resources in order. Also includes functionality to prompt for config file, and newer credential file.
</commit_message>
<xml_diff>
--- a/Custom Lineage Creator.pptx
+++ b/Custom Lineage Creator.pptx
@@ -331,7 +331,7 @@
           <a:p>
             <a:fld id="{A8AF0ABA-1503-4581-BC5A-AF3D56D7DD45}" type="datetimeFigureOut">
               <a:rPr lang="en-US" smtClean="0"/>
-              <a:t>11/6/2024</a:t>
+              <a:t>11/22/2024</a:t>
             </a:fld>
             <a:endParaRPr lang="en-US"/>
           </a:p>
@@ -496,7 +496,7 @@
           <a:p>
             <a:fld id="{78186FDC-CD1E-4E7E-B1CD-1CBCCD519E8C}" type="datetimeFigureOut">
               <a:rPr lang="en-US" smtClean="0"/>
-              <a:t>11/6/2024</a:t>
+              <a:t>11/22/2024</a:t>
             </a:fld>
             <a:endParaRPr lang="en-US"/>
           </a:p>
@@ -22517,12 +22517,12 @@
               <a:buChar char="•"/>
             </a:pPr>
             <a:r>
-              <a:rPr lang="en-US" sz="1600" dirty="0">
+              <a:rPr lang="en-US" sz="1400" dirty="0">
                 <a:latin typeface="Roboto" charset="0"/>
                 <a:ea typeface="Roboto" charset="0"/>
                 <a:cs typeface="Roboto" charset="0"/>
               </a:rPr>
-              <a:t>Python will look for the latest Excel or zip file in the same directory.</a:t>
+              <a:t>Python will prompt for which config file to use (if config file not specified)</a:t>
             </a:r>
           </a:p>
           <a:p>
@@ -22537,7 +22537,7 @@
               <a:buChar char="•"/>
             </a:pPr>
             <a:r>
-              <a:rPr lang="en-US" sz="1600" dirty="0">
+              <a:rPr lang="en-US" sz="1400" dirty="0">
                 <a:latin typeface="Roboto" charset="0"/>
                 <a:ea typeface="Roboto" charset="0"/>
                 <a:cs typeface="Roboto" charset="0"/>
@@ -22557,12 +22557,12 @@
               <a:buChar char="•"/>
             </a:pPr>
             <a:r>
-              <a:rPr lang="en-US" sz="1600" dirty="0">
+              <a:rPr lang="en-US" sz="1400" dirty="0">
                 <a:latin typeface="Roboto" charset="0"/>
                 <a:ea typeface="Roboto" charset="0"/>
                 <a:cs typeface="Roboto" charset="0"/>
               </a:rPr>
-              <a:t>Will display the lineage that it’s creating </a:t>
+              <a:t>Will display the lineage that it’s creating along with any fuzzy matching score </a:t>
             </a:r>
           </a:p>
           <a:p>
@@ -22577,12 +22577,12 @@
               <a:buChar char="•"/>
             </a:pPr>
             <a:r>
-              <a:rPr lang="en-US" sz="1600" dirty="0">
+              <a:rPr lang="en-US" sz="1400" dirty="0">
                 <a:latin typeface="Roboto" charset="0"/>
                 <a:ea typeface="Roboto" charset="0"/>
                 <a:cs typeface="Roboto" charset="0"/>
               </a:rPr>
-              <a:t>Will display the match score for the dataset / element</a:t>
+              <a:t>Will write the lineage files in the “links” directory</a:t>
             </a:r>
           </a:p>
           <a:p>
@@ -22597,12 +22597,12 @@
               <a:buChar char="•"/>
             </a:pPr>
             <a:r>
-              <a:rPr lang="en-US" sz="1600" dirty="0">
+              <a:rPr lang="en-US" sz="1400" dirty="0">
                 <a:latin typeface="Roboto" charset="0"/>
                 <a:ea typeface="Roboto" charset="0"/>
                 <a:cs typeface="Roboto" charset="0"/>
               </a:rPr>
-              <a:t>Will write the lineage information to links_&lt;timestamp&gt;.csv within the “links” directory</a:t>
+              <a:t>Will write the resources files in the “resources” directory</a:t>
             </a:r>
           </a:p>
           <a:p>
@@ -22617,12 +22617,12 @@
               <a:buChar char="•"/>
             </a:pPr>
             <a:r>
-              <a:rPr lang="en-US" sz="1600" dirty="0">
+              <a:rPr lang="en-US" sz="1400" dirty="0">
                 <a:latin typeface="Roboto" charset="0"/>
                 <a:ea typeface="Roboto" charset="0"/>
                 <a:cs typeface="Roboto" charset="0"/>
               </a:rPr>
-              <a:t>Will write the lineage information to lineage_&lt;timestamp&gt;.zip within the “links” directory</a:t>
+              <a:t>Will write some raw temporary data in the “data” directory.</a:t>
             </a:r>
           </a:p>
           <a:p>
@@ -22636,14 +22636,11 @@
               <a:buFont typeface="Arial" panose="020B0604020202020204" pitchFamily="34" charset="0"/>
               <a:buChar char="•"/>
             </a:pPr>
-            <a:r>
-              <a:rPr lang="en-US" sz="1600" dirty="0">
-                <a:latin typeface="Roboto" charset="0"/>
-                <a:ea typeface="Roboto" charset="0"/>
-                <a:cs typeface="Roboto" charset="0"/>
-              </a:rPr>
-              <a:t>Will write the ETL Resource information to &lt;Resource Name&gt;_&lt;timestamp&gt;.zip within the “resources” directory</a:t>
-            </a:r>
+            <a:endParaRPr lang="en-US" sz="1400" dirty="0">
+              <a:latin typeface="Roboto" charset="0"/>
+              <a:ea typeface="Roboto" charset="0"/>
+              <a:cs typeface="Roboto" charset="0"/>
+            </a:endParaRPr>
           </a:p>
           <a:p>
             <a:pPr marL="342900" indent="-342900">
@@ -22656,7 +22653,7 @@
               <a:buFont typeface="Arial" panose="020B0604020202020204" pitchFamily="34" charset="0"/>
               <a:buChar char="•"/>
             </a:pPr>
-            <a:endParaRPr lang="en-US" sz="1600" dirty="0">
+            <a:endParaRPr lang="en-US" sz="1400" dirty="0">
               <a:latin typeface="Roboto" charset="0"/>
               <a:ea typeface="Roboto" charset="0"/>
               <a:cs typeface="Roboto" charset="0"/>
@@ -22673,7 +22670,7 @@
               <a:buFont typeface="Arial" panose="020B0604020202020204" pitchFamily="34" charset="0"/>
               <a:buChar char="•"/>
             </a:pPr>
-            <a:endParaRPr lang="en-US" sz="1600" dirty="0">
+            <a:endParaRPr lang="en-US" sz="1400" dirty="0">
               <a:latin typeface="Roboto" charset="0"/>
               <a:ea typeface="Roboto" charset="0"/>
               <a:cs typeface="Roboto" charset="0"/>
@@ -22690,7 +22687,7 @@
               <a:buFont typeface="Arial" panose="020B0604020202020204" pitchFamily="34" charset="0"/>
               <a:buChar char="•"/>
             </a:pPr>
-            <a:endParaRPr lang="en-US" sz="1600" dirty="0">
+            <a:endParaRPr lang="en-US" sz="1400" dirty="0">
               <a:latin typeface="Roboto" charset="0"/>
               <a:ea typeface="Roboto" charset="0"/>
               <a:cs typeface="Roboto" charset="0"/>
@@ -22707,7 +22704,7 @@
               <a:buFont typeface="Arial" panose="020B0604020202020204" pitchFamily="34" charset="0"/>
               <a:buChar char="•"/>
             </a:pPr>
-            <a:endParaRPr lang="en-US" sz="1600" dirty="0">
+            <a:endParaRPr lang="en-US" sz="1400" dirty="0">
               <a:latin typeface="Roboto" charset="0"/>
               <a:ea typeface="Roboto" charset="0"/>
               <a:cs typeface="Roboto" charset="0"/>
@@ -22724,7 +22721,7 @@
               <a:buFont typeface="Arial" panose="020B0604020202020204" pitchFamily="34" charset="0"/>
               <a:buChar char="•"/>
             </a:pPr>
-            <a:endParaRPr lang="en-US" sz="1600" dirty="0">
+            <a:endParaRPr lang="en-US" sz="1400" dirty="0">
               <a:latin typeface="Roboto" charset="0"/>
               <a:ea typeface="Roboto" charset="0"/>
               <a:cs typeface="Roboto" charset="0"/>
@@ -22741,7 +22738,7 @@
               <a:buFont typeface="Arial" panose="020B0604020202020204" pitchFamily="34" charset="0"/>
               <a:buChar char="•"/>
             </a:pPr>
-            <a:endParaRPr lang="en-US" sz="1600" dirty="0">
+            <a:endParaRPr lang="en-US" sz="1400" dirty="0">
               <a:latin typeface="Roboto" charset="0"/>
               <a:ea typeface="Roboto" charset="0"/>
               <a:cs typeface="Roboto" charset="0"/>
@@ -22758,7 +22755,7 @@
               <a:buFont typeface="Arial" panose="020B0604020202020204" pitchFamily="34" charset="0"/>
               <a:buChar char="•"/>
             </a:pPr>
-            <a:endParaRPr lang="en-US" sz="1600" dirty="0">
+            <a:endParaRPr lang="en-US" sz="1400" dirty="0">
               <a:latin typeface="Roboto" charset="0"/>
               <a:ea typeface="Roboto" charset="0"/>
               <a:cs typeface="Roboto" charset="0"/>
@@ -22821,36 +22818,784 @@
           </a:p>
         </p:txBody>
       </p:sp>
-      <p:pic>
-        <p:nvPicPr>
-          <p:cNvPr id="17" name="Picture 16">
+      <p:graphicFrame>
+        <p:nvGraphicFramePr>
+          <p:cNvPr id="3" name="Table 2">
             <a:extLst>
               <a:ext uri="{FF2B5EF4-FFF2-40B4-BE49-F238E27FC236}">
-                <a16:creationId xmlns:a16="http://schemas.microsoft.com/office/drawing/2014/main" id="{38B41BA6-86A5-2AF5-6163-4932FA8F4F5D}"/>
+                <a16:creationId xmlns:a16="http://schemas.microsoft.com/office/drawing/2014/main" id="{C8DDB3D4-BCC2-E980-09B9-D17A27C99E23}"/>
               </a:ext>
             </a:extLst>
           </p:cNvPr>
-          <p:cNvPicPr>
-            <a:picLocks noChangeAspect="1"/>
-          </p:cNvPicPr>
-          <p:nvPr/>
-        </p:nvPicPr>
-        <p:blipFill>
-          <a:blip r:embed="rId2"/>
-          <a:stretch>
-            <a:fillRect/>
-          </a:stretch>
-        </p:blipFill>
-        <p:spPr>
-          <a:xfrm>
-            <a:off x="1212322" y="3794125"/>
-            <a:ext cx="9058275" cy="2114550"/>
-          </a:xfrm>
-          <a:prstGeom prst="rect">
-            <a:avLst/>
-          </a:prstGeom>
-        </p:spPr>
-      </p:pic>
+          <p:cNvGraphicFramePr>
+            <a:graphicFrameLocks noGrp="1"/>
+          </p:cNvGraphicFramePr>
+          <p:nvPr>
+            <p:extLst>
+              <p:ext uri="{D42A27DB-BD31-4B8C-83A1-F6EECF244321}">
+                <p14:modId xmlns:p14="http://schemas.microsoft.com/office/powerpoint/2010/main" val="2483617383"/>
+              </p:ext>
+            </p:extLst>
+          </p:nvPr>
+        </p:nvGraphicFramePr>
+        <p:xfrm>
+          <a:off x="1809750" y="2886075"/>
+          <a:ext cx="7762875" cy="3343275"/>
+        </p:xfrm>
+        <a:graphic>
+          <a:graphicData uri="http://schemas.openxmlformats.org/drawingml/2006/table">
+            <a:tbl>
+              <a:tblPr firstRow="1" bandRow="1">
+                <a:tableStyleId>{5C22544A-7EE6-4342-B048-85BDC9FD1C3A}</a:tableStyleId>
+              </a:tblPr>
+              <a:tblGrid>
+                <a:gridCol w="7762875">
+                  <a:extLst>
+                    <a:ext uri="{9D8B030D-6E8A-4147-A177-3AD203B41FA5}">
+                      <a16:colId xmlns:a16="http://schemas.microsoft.com/office/drawing/2014/main" val="1261491639"/>
+                    </a:ext>
+                  </a:extLst>
+                </a:gridCol>
+              </a:tblGrid>
+              <a:tr h="3343275">
+                <a:tc>
+                  <a:txBody>
+                    <a:bodyPr/>
+                    <a:lstStyle/>
+                    <a:p>
+                      <a:r>
+                        <a:rPr lang="en-US" sz="600" b="0" dirty="0">
+                          <a:solidFill>
+                            <a:schemeClr val="bg2"/>
+                          </a:solidFill>
+                          <a:latin typeface="Courier New" panose="02070309020205020404" pitchFamily="49" charset="0"/>
+                          <a:cs typeface="Courier New" panose="02070309020205020404" pitchFamily="49" charset="0"/>
+                        </a:rPr>
+                        <a:t>Select a CSV file:</a:t>
+                      </a:r>
+                    </a:p>
+                    <a:p>
+                      <a:r>
+                        <a:rPr lang="en-US" sz="600" b="0" dirty="0">
+                          <a:solidFill>
+                            <a:schemeClr val="bg2"/>
+                          </a:solidFill>
+                          <a:latin typeface="Courier New" panose="02070309020205020404" pitchFamily="49" charset="0"/>
+                          <a:cs typeface="Courier New" panose="02070309020205020404" pitchFamily="49" charset="0"/>
+                        </a:rPr>
+                        <a:t>    1. config - Lineage (with ETL).csv - Lineage (with ETL)</a:t>
+                      </a:r>
+                    </a:p>
+                    <a:p>
+                      <a:r>
+                        <a:rPr lang="en-US" sz="600" b="0" dirty="0">
+                          <a:solidFill>
+                            <a:schemeClr val="bg2"/>
+                          </a:solidFill>
+                          <a:latin typeface="Courier New" panose="02070309020205020404" pitchFamily="49" charset="0"/>
+                          <a:cs typeface="Courier New" panose="02070309020205020404" pitchFamily="49" charset="0"/>
+                        </a:rPr>
+                        <a:t>    2. config - Lineage with Mass Ingestion.csv - Lineage with Mass Ingestion</a:t>
+                      </a:r>
+                    </a:p>
+                    <a:p>
+                      <a:r>
+                        <a:rPr lang="en-US" sz="600" b="0" dirty="0">
+                          <a:solidFill>
+                            <a:schemeClr val="bg2"/>
+                          </a:solidFill>
+                          <a:latin typeface="Courier New" panose="02070309020205020404" pitchFamily="49" charset="0"/>
+                          <a:cs typeface="Courier New" panose="02070309020205020404" pitchFamily="49" charset="0"/>
+                        </a:rPr>
+                        <a:t>Enter the number of the file to select (1-2): 1</a:t>
+                      </a:r>
+                    </a:p>
+                    <a:p>
+                      <a:r>
+                        <a:rPr lang="en-US" sz="600" b="0" dirty="0">
+                          <a:solidFill>
+                            <a:schemeClr val="bg2"/>
+                          </a:solidFill>
+                          <a:latin typeface="Courier New" panose="02070309020205020404" pitchFamily="49" charset="0"/>
+                          <a:cs typeface="Courier New" panose="02070309020205020404" pitchFamily="49" charset="0"/>
+                        </a:rPr>
+                        <a:t>INFO: Downloading initial data</a:t>
+                      </a:r>
+                    </a:p>
+                    <a:p>
+                      <a:r>
+                        <a:rPr lang="en-US" sz="600" b="0" dirty="0">
+                          <a:solidFill>
+                            <a:schemeClr val="bg2"/>
+                          </a:solidFill>
+                          <a:latin typeface="Courier New" panose="02070309020205020404" pitchFamily="49" charset="0"/>
+                          <a:cs typeface="Courier New" panose="02070309020205020404" pitchFamily="49" charset="0"/>
+                        </a:rPr>
+                        <a:t>INFO: No 'default' profile found. Please select a profile:</a:t>
+                      </a:r>
+                    </a:p>
+                    <a:p>
+                      <a:r>
+                        <a:rPr lang="en-US" sz="600" b="0" dirty="0">
+                          <a:solidFill>
+                            <a:schemeClr val="bg2"/>
+                          </a:solidFill>
+                          <a:latin typeface="Courier New" panose="02070309020205020404" pitchFamily="49" charset="0"/>
+                          <a:cs typeface="Courier New" panose="02070309020205020404" pitchFamily="49" charset="0"/>
+                        </a:rPr>
+                        <a:t>    1. Test</a:t>
+                      </a:r>
+                    </a:p>
+                    <a:p>
+                      <a:r>
+                        <a:rPr lang="en-US" sz="600" b="0" dirty="0">
+                          <a:solidFill>
+                            <a:schemeClr val="bg2"/>
+                          </a:solidFill>
+                          <a:latin typeface="Courier New" panose="02070309020205020404" pitchFamily="49" charset="0"/>
+                          <a:cs typeface="Courier New" panose="02070309020205020404" pitchFamily="49" charset="0"/>
+                        </a:rPr>
+                        <a:t>    2. </a:t>
+                      </a:r>
+                      <a:r>
+                        <a:rPr lang="en-US" sz="600" b="0" dirty="0" err="1">
+                          <a:solidFill>
+                            <a:schemeClr val="bg2"/>
+                          </a:solidFill>
+                          <a:latin typeface="Courier New" panose="02070309020205020404" pitchFamily="49" charset="0"/>
+                          <a:cs typeface="Courier New" panose="02070309020205020404" pitchFamily="49" charset="0"/>
+                        </a:rPr>
+                        <a:t>shayes_compass</a:t>
+                      </a:r>
+                      <a:endParaRPr lang="en-US" sz="600" b="0" dirty="0">
+                        <a:solidFill>
+                          <a:schemeClr val="bg2"/>
+                        </a:solidFill>
+                        <a:latin typeface="Courier New" panose="02070309020205020404" pitchFamily="49" charset="0"/>
+                        <a:cs typeface="Courier New" panose="02070309020205020404" pitchFamily="49" charset="0"/>
+                      </a:endParaRPr>
+                    </a:p>
+                    <a:p>
+                      <a:r>
+                        <a:rPr lang="en-US" sz="600" b="0" dirty="0">
+                          <a:solidFill>
+                            <a:schemeClr val="bg2"/>
+                          </a:solidFill>
+                          <a:latin typeface="Courier New" panose="02070309020205020404" pitchFamily="49" charset="0"/>
+                          <a:cs typeface="Courier New" panose="02070309020205020404" pitchFamily="49" charset="0"/>
+                        </a:rPr>
+                        <a:t>    3. reinvent</a:t>
+                      </a:r>
+                    </a:p>
+                    <a:p>
+                      <a:r>
+                        <a:rPr lang="en-US" sz="600" b="0" dirty="0">
+                          <a:solidFill>
+                            <a:schemeClr val="bg2"/>
+                          </a:solidFill>
+                          <a:latin typeface="Courier New" panose="02070309020205020404" pitchFamily="49" charset="0"/>
+                          <a:cs typeface="Courier New" panose="02070309020205020404" pitchFamily="49" charset="0"/>
+                        </a:rPr>
+                        <a:t>Enter the number of the profile to use: 1</a:t>
+                      </a:r>
+                    </a:p>
+                    <a:p>
+                      <a:r>
+                        <a:rPr lang="en-US" sz="600" b="0" dirty="0">
+                          <a:solidFill>
+                            <a:schemeClr val="bg2"/>
+                          </a:solidFill>
+                          <a:latin typeface="Courier New" panose="02070309020205020404" pitchFamily="49" charset="0"/>
+                          <a:cs typeface="Courier New" panose="02070309020205020404" pitchFamily="49" charset="0"/>
+                        </a:rPr>
+                        <a:t>Using credentials from the 'Test' profile.</a:t>
+                      </a:r>
+                    </a:p>
+                    <a:p>
+                      <a:r>
+                        <a:rPr lang="en-US" sz="600" b="0" dirty="0">
+                          <a:solidFill>
+                            <a:schemeClr val="bg2"/>
+                          </a:solidFill>
+                          <a:latin typeface="Courier New" panose="02070309020205020404" pitchFamily="49" charset="0"/>
+                          <a:cs typeface="Courier New" panose="02070309020205020404" pitchFamily="49" charset="0"/>
+                        </a:rPr>
+                        <a:t>Enter pod (default: </a:t>
+                      </a:r>
+                      <a:r>
+                        <a:rPr lang="en-US" sz="600" b="0" dirty="0" err="1">
+                          <a:solidFill>
+                            <a:schemeClr val="bg2"/>
+                          </a:solidFill>
+                          <a:latin typeface="Courier New" panose="02070309020205020404" pitchFamily="49" charset="0"/>
+                          <a:cs typeface="Courier New" panose="02070309020205020404" pitchFamily="49" charset="0"/>
+                        </a:rPr>
+                        <a:t>dmp</a:t>
+                      </a:r>
+                      <a:r>
+                        <a:rPr lang="en-US" sz="600" b="0" dirty="0">
+                          <a:solidFill>
+                            <a:schemeClr val="bg2"/>
+                          </a:solidFill>
+                          <a:latin typeface="Courier New" panose="02070309020205020404" pitchFamily="49" charset="0"/>
+                          <a:cs typeface="Courier New" panose="02070309020205020404" pitchFamily="49" charset="0"/>
+                        </a:rPr>
+                        <a:t>-us):</a:t>
+                      </a:r>
+                    </a:p>
+                    <a:p>
+                      <a:r>
+                        <a:rPr lang="en-US" sz="600" b="0" dirty="0">
+                          <a:solidFill>
+                            <a:schemeClr val="bg2"/>
+                          </a:solidFill>
+                          <a:latin typeface="Courier New" panose="02070309020205020404" pitchFamily="49" charset="0"/>
+                          <a:cs typeface="Courier New" panose="02070309020205020404" pitchFamily="49" charset="0"/>
+                        </a:rPr>
+                        <a:t>Enter username (default : </a:t>
+                      </a:r>
+                      <a:r>
+                        <a:rPr lang="en-US" sz="600" b="0" dirty="0" err="1">
+                          <a:solidFill>
+                            <a:schemeClr val="bg2"/>
+                          </a:solidFill>
+                          <a:latin typeface="Courier New" panose="02070309020205020404" pitchFamily="49" charset="0"/>
+                          <a:cs typeface="Courier New" panose="02070309020205020404" pitchFamily="49" charset="0"/>
+                        </a:rPr>
+                        <a:t>shayes_test</a:t>
+                      </a:r>
+                      <a:r>
+                        <a:rPr lang="en-US" sz="600" b="0" dirty="0">
+                          <a:solidFill>
+                            <a:schemeClr val="bg2"/>
+                          </a:solidFill>
+                          <a:latin typeface="Courier New" panose="02070309020205020404" pitchFamily="49" charset="0"/>
+                          <a:cs typeface="Courier New" panose="02070309020205020404" pitchFamily="49" charset="0"/>
+                        </a:rPr>
+                        <a:t>):</a:t>
+                      </a:r>
+                    </a:p>
+                    <a:p>
+                      <a:r>
+                        <a:rPr lang="en-US" sz="600" b="0" dirty="0">
+                          <a:solidFill>
+                            <a:schemeClr val="bg2"/>
+                          </a:solidFill>
+                          <a:latin typeface="Courier New" panose="02070309020205020404" pitchFamily="49" charset="0"/>
+                          <a:cs typeface="Courier New" panose="02070309020205020404" pitchFamily="49" charset="0"/>
+                        </a:rPr>
+                        <a:t>Enter password:</a:t>
+                      </a:r>
+                    </a:p>
+                    <a:p>
+                      <a:r>
+                        <a:rPr lang="en-US" sz="600" b="0" dirty="0">
+                          <a:solidFill>
+                            <a:schemeClr val="bg2"/>
+                          </a:solidFill>
+                          <a:latin typeface="Courier New" panose="02070309020205020404" pitchFamily="49" charset="0"/>
+                          <a:cs typeface="Courier New" panose="02070309020205020404" pitchFamily="49" charset="0"/>
+                        </a:rPr>
+                        <a:t>Successfully written Mass Ingestion to C:\Toolbox\Python\Projects\Custom_Lineage_Creator\Test2/resources/Mass Ingestion_20241122171323.zip</a:t>
+                      </a:r>
+                    </a:p>
+                    <a:p>
+                      <a:r>
+                        <a:rPr lang="en-US" sz="600" b="0" dirty="0">
+                          <a:solidFill>
+                            <a:schemeClr val="bg2"/>
+                          </a:solidFill>
+                          <a:latin typeface="Courier New" panose="02070309020205020404" pitchFamily="49" charset="0"/>
+                          <a:cs typeface="Courier New" panose="02070309020205020404" pitchFamily="49" charset="0"/>
+                        </a:rPr>
+                        <a:t>Test v1/</a:t>
+                      </a:r>
+                      <a:r>
+                        <a:rPr lang="en-US" sz="600" b="0" dirty="0" err="1">
+                          <a:solidFill>
+                            <a:schemeClr val="bg2"/>
+                          </a:solidFill>
+                          <a:latin typeface="Courier New" panose="02070309020205020404" pitchFamily="49" charset="0"/>
+                          <a:cs typeface="Courier New" panose="02070309020205020404" pitchFamily="49" charset="0"/>
+                        </a:rPr>
+                        <a:t>orcl</a:t>
+                      </a:r>
+                      <a:r>
+                        <a:rPr lang="en-US" sz="600" b="0" dirty="0">
+                          <a:solidFill>
+                            <a:schemeClr val="bg2"/>
+                          </a:solidFill>
+                          <a:latin typeface="Courier New" panose="02070309020205020404" pitchFamily="49" charset="0"/>
+                          <a:cs typeface="Courier New" panose="02070309020205020404" pitchFamily="49" charset="0"/>
+                        </a:rPr>
+                        <a:t>/TEST/INFORMATICA_TEST_DEIDENTIFICAT -&gt; Mass Ingestion/Pro...AT/</a:t>
+                      </a:r>
+                      <a:r>
+                        <a:rPr lang="en-US" sz="600" b="0" dirty="0" err="1">
+                          <a:solidFill>
+                            <a:schemeClr val="bg2"/>
+                          </a:solidFill>
+                          <a:latin typeface="Courier New" panose="02070309020205020404" pitchFamily="49" charset="0"/>
+                          <a:cs typeface="Courier New" panose="02070309020205020404" pitchFamily="49" charset="0"/>
+                        </a:rPr>
+                        <a:t>oracle_to_sqlserver_INFORMATICA_TEST_DEIDENTIFICAT</a:t>
+                      </a:r>
+                      <a:r>
+                        <a:rPr lang="en-US" sz="600" b="0" dirty="0">
+                          <a:solidFill>
+                            <a:schemeClr val="bg2"/>
+                          </a:solidFill>
+                          <a:latin typeface="Courier New" panose="02070309020205020404" pitchFamily="49" charset="0"/>
+                          <a:cs typeface="Courier New" panose="02070309020205020404" pitchFamily="49" charset="0"/>
+                        </a:rPr>
+                        <a:t> (1) (1.0)</a:t>
+                      </a:r>
+                    </a:p>
+                    <a:p>
+                      <a:r>
+                        <a:rPr lang="en-US" sz="600" b="0" dirty="0">
+                          <a:solidFill>
+                            <a:schemeClr val="bg2"/>
+                          </a:solidFill>
+                          <a:latin typeface="Courier New" panose="02070309020205020404" pitchFamily="49" charset="0"/>
+                          <a:cs typeface="Courier New" panose="02070309020205020404" pitchFamily="49" charset="0"/>
+                        </a:rPr>
+                        <a:t>Mass Ingestion/Pro...AT/</a:t>
+                      </a:r>
+                      <a:r>
+                        <a:rPr lang="en-US" sz="600" b="0" dirty="0" err="1">
+                          <a:solidFill>
+                            <a:schemeClr val="bg2"/>
+                          </a:solidFill>
+                          <a:latin typeface="Courier New" panose="02070309020205020404" pitchFamily="49" charset="0"/>
+                          <a:cs typeface="Courier New" panose="02070309020205020404" pitchFamily="49" charset="0"/>
+                        </a:rPr>
+                        <a:t>oracle_to_sqlserver_INFORMATICA_TEST_DEIDENTIFICAT</a:t>
+                      </a:r>
+                      <a:r>
+                        <a:rPr lang="en-US" sz="600" b="0" dirty="0">
+                          <a:solidFill>
+                            <a:schemeClr val="bg2"/>
+                          </a:solidFill>
+                          <a:latin typeface="Courier New" panose="02070309020205020404" pitchFamily="49" charset="0"/>
+                          <a:cs typeface="Courier New" panose="02070309020205020404" pitchFamily="49" charset="0"/>
+                        </a:rPr>
+                        <a:t> (1) -&gt; Test v2/</a:t>
+                      </a:r>
+                      <a:r>
+                        <a:rPr lang="en-US" sz="600" b="0" dirty="0" err="1">
+                          <a:solidFill>
+                            <a:schemeClr val="bg2"/>
+                          </a:solidFill>
+                          <a:latin typeface="Courier New" panose="02070309020205020404" pitchFamily="49" charset="0"/>
+                          <a:cs typeface="Courier New" panose="02070309020205020404" pitchFamily="49" charset="0"/>
+                        </a:rPr>
+                        <a:t>orcl</a:t>
+                      </a:r>
+                      <a:r>
+                        <a:rPr lang="en-US" sz="600" b="0" dirty="0">
+                          <a:solidFill>
+                            <a:schemeClr val="bg2"/>
+                          </a:solidFill>
+                          <a:latin typeface="Courier New" panose="02070309020205020404" pitchFamily="49" charset="0"/>
+                          <a:cs typeface="Courier New" panose="02070309020205020404" pitchFamily="49" charset="0"/>
+                        </a:rPr>
+                        <a:t>/TEST/INFORMATICA_TEST_DEIDENTIFICAT (1.0)</a:t>
+                      </a:r>
+                    </a:p>
+                    <a:p>
+                      <a:r>
+                        <a:rPr lang="en-US" sz="600" b="0" dirty="0">
+                          <a:solidFill>
+                            <a:schemeClr val="bg2"/>
+                          </a:solidFill>
+                          <a:latin typeface="Courier New" panose="02070309020205020404" pitchFamily="49" charset="0"/>
+                          <a:cs typeface="Courier New" panose="02070309020205020404" pitchFamily="49" charset="0"/>
+                        </a:rPr>
+                        <a:t>Test v1/</a:t>
+                      </a:r>
+                      <a:r>
+                        <a:rPr lang="en-US" sz="600" b="0" dirty="0" err="1">
+                          <a:solidFill>
+                            <a:schemeClr val="bg2"/>
+                          </a:solidFill>
+                          <a:latin typeface="Courier New" panose="02070309020205020404" pitchFamily="49" charset="0"/>
+                          <a:cs typeface="Courier New" panose="02070309020205020404" pitchFamily="49" charset="0"/>
+                        </a:rPr>
+                        <a:t>orcl</a:t>
+                      </a:r>
+                      <a:r>
+                        <a:rPr lang="en-US" sz="600" b="0" dirty="0">
+                          <a:solidFill>
+                            <a:schemeClr val="bg2"/>
+                          </a:solidFill>
+                          <a:latin typeface="Courier New" panose="02070309020205020404" pitchFamily="49" charset="0"/>
+                          <a:cs typeface="Courier New" panose="02070309020205020404" pitchFamily="49" charset="0"/>
+                        </a:rPr>
+                        <a:t>/TEST/INFORMATICA_TEST_DEIDENTIFICAT/NAME1 -&gt; Mass Ingestion/Pro...AT/</a:t>
+                      </a:r>
+                      <a:r>
+                        <a:rPr lang="en-US" sz="600" b="0" dirty="0" err="1">
+                          <a:solidFill>
+                            <a:schemeClr val="bg2"/>
+                          </a:solidFill>
+                          <a:latin typeface="Courier New" panose="02070309020205020404" pitchFamily="49" charset="0"/>
+                          <a:cs typeface="Courier New" panose="02070309020205020404" pitchFamily="49" charset="0"/>
+                        </a:rPr>
+                        <a:t>oracle_to_sqlserver_INFORMATICA_TEST_DEIDENTIFICAT</a:t>
+                      </a:r>
+                      <a:r>
+                        <a:rPr lang="en-US" sz="600" b="0" dirty="0">
+                          <a:solidFill>
+                            <a:schemeClr val="bg2"/>
+                          </a:solidFill>
+                          <a:latin typeface="Courier New" panose="02070309020205020404" pitchFamily="49" charset="0"/>
+                          <a:cs typeface="Courier New" panose="02070309020205020404" pitchFamily="49" charset="0"/>
+                        </a:rPr>
+                        <a:t> (1)/sync_NAME1 (1.0)</a:t>
+                      </a:r>
+                    </a:p>
+                    <a:p>
+                      <a:r>
+                        <a:rPr lang="en-US" sz="600" b="0" dirty="0">
+                          <a:solidFill>
+                            <a:schemeClr val="bg2"/>
+                          </a:solidFill>
+                          <a:latin typeface="Courier New" panose="02070309020205020404" pitchFamily="49" charset="0"/>
+                          <a:cs typeface="Courier New" panose="02070309020205020404" pitchFamily="49" charset="0"/>
+                        </a:rPr>
+                        <a:t>Mass Ingestion/Pro...AT/</a:t>
+                      </a:r>
+                      <a:r>
+                        <a:rPr lang="en-US" sz="600" b="0" dirty="0" err="1">
+                          <a:solidFill>
+                            <a:schemeClr val="bg2"/>
+                          </a:solidFill>
+                          <a:latin typeface="Courier New" panose="02070309020205020404" pitchFamily="49" charset="0"/>
+                          <a:cs typeface="Courier New" panose="02070309020205020404" pitchFamily="49" charset="0"/>
+                        </a:rPr>
+                        <a:t>oracle_to_sqlserver_INFORMATICA_TEST_DEIDENTIFICAT</a:t>
+                      </a:r>
+                      <a:r>
+                        <a:rPr lang="en-US" sz="600" b="0" dirty="0">
+                          <a:solidFill>
+                            <a:schemeClr val="bg2"/>
+                          </a:solidFill>
+                          <a:latin typeface="Courier New" panose="02070309020205020404" pitchFamily="49" charset="0"/>
+                          <a:cs typeface="Courier New" panose="02070309020205020404" pitchFamily="49" charset="0"/>
+                        </a:rPr>
+                        <a:t> (1)/sync_NAME1 -&gt; Test v2/</a:t>
+                      </a:r>
+                      <a:r>
+                        <a:rPr lang="en-US" sz="600" b="0" dirty="0" err="1">
+                          <a:solidFill>
+                            <a:schemeClr val="bg2"/>
+                          </a:solidFill>
+                          <a:latin typeface="Courier New" panose="02070309020205020404" pitchFamily="49" charset="0"/>
+                          <a:cs typeface="Courier New" panose="02070309020205020404" pitchFamily="49" charset="0"/>
+                        </a:rPr>
+                        <a:t>orcl</a:t>
+                      </a:r>
+                      <a:r>
+                        <a:rPr lang="en-US" sz="600" b="0" dirty="0">
+                          <a:solidFill>
+                            <a:schemeClr val="bg2"/>
+                          </a:solidFill>
+                          <a:latin typeface="Courier New" panose="02070309020205020404" pitchFamily="49" charset="0"/>
+                          <a:cs typeface="Courier New" panose="02070309020205020404" pitchFamily="49" charset="0"/>
+                        </a:rPr>
+                        <a:t>/TEST/INFORMATICA_TEST_DEIDENTIFICAT/NAME1 (1.0)</a:t>
+                      </a:r>
+                    </a:p>
+                    <a:p>
+                      <a:r>
+                        <a:rPr lang="en-US" sz="600" b="0" dirty="0">
+                          <a:solidFill>
+                            <a:schemeClr val="bg2"/>
+                          </a:solidFill>
+                          <a:latin typeface="Courier New" panose="02070309020205020404" pitchFamily="49" charset="0"/>
+                          <a:cs typeface="Courier New" panose="02070309020205020404" pitchFamily="49" charset="0"/>
+                        </a:rPr>
+                        <a:t>Test v1/</a:t>
+                      </a:r>
+                      <a:r>
+                        <a:rPr lang="en-US" sz="600" b="0" dirty="0" err="1">
+                          <a:solidFill>
+                            <a:schemeClr val="bg2"/>
+                          </a:solidFill>
+                          <a:latin typeface="Courier New" panose="02070309020205020404" pitchFamily="49" charset="0"/>
+                          <a:cs typeface="Courier New" panose="02070309020205020404" pitchFamily="49" charset="0"/>
+                        </a:rPr>
+                        <a:t>orcl</a:t>
+                      </a:r>
+                      <a:r>
+                        <a:rPr lang="en-US" sz="600" b="0" dirty="0">
+                          <a:solidFill>
+                            <a:schemeClr val="bg2"/>
+                          </a:solidFill>
+                          <a:latin typeface="Courier New" panose="02070309020205020404" pitchFamily="49" charset="0"/>
+                          <a:cs typeface="Courier New" panose="02070309020205020404" pitchFamily="49" charset="0"/>
+                        </a:rPr>
+                        <a:t>/TEST/INFORMATICA_TEST_DEIDENTIFICAT/NAME2 -&gt; Mass Ingestion/Pro...AT/</a:t>
+                      </a:r>
+                      <a:r>
+                        <a:rPr lang="en-US" sz="600" b="0" dirty="0" err="1">
+                          <a:solidFill>
+                            <a:schemeClr val="bg2"/>
+                          </a:solidFill>
+                          <a:latin typeface="Courier New" panose="02070309020205020404" pitchFamily="49" charset="0"/>
+                          <a:cs typeface="Courier New" panose="02070309020205020404" pitchFamily="49" charset="0"/>
+                        </a:rPr>
+                        <a:t>oracle_to_sqlserver_INFORMATICA_TEST_DEIDENTIFICAT</a:t>
+                      </a:r>
+                      <a:r>
+                        <a:rPr lang="en-US" sz="600" b="0" dirty="0">
+                          <a:solidFill>
+                            <a:schemeClr val="bg2"/>
+                          </a:solidFill>
+                          <a:latin typeface="Courier New" panose="02070309020205020404" pitchFamily="49" charset="0"/>
+                          <a:cs typeface="Courier New" panose="02070309020205020404" pitchFamily="49" charset="0"/>
+                        </a:rPr>
+                        <a:t> (1)/sync_NAME2 (1.0)</a:t>
+                      </a:r>
+                    </a:p>
+                    <a:p>
+                      <a:r>
+                        <a:rPr lang="en-US" sz="600" b="0" dirty="0">
+                          <a:solidFill>
+                            <a:schemeClr val="bg2"/>
+                          </a:solidFill>
+                          <a:latin typeface="Courier New" panose="02070309020205020404" pitchFamily="49" charset="0"/>
+                          <a:cs typeface="Courier New" panose="02070309020205020404" pitchFamily="49" charset="0"/>
+                        </a:rPr>
+                        <a:t>Mass Ingestion/Pro...AT/</a:t>
+                      </a:r>
+                      <a:r>
+                        <a:rPr lang="en-US" sz="600" b="0" dirty="0" err="1">
+                          <a:solidFill>
+                            <a:schemeClr val="bg2"/>
+                          </a:solidFill>
+                          <a:latin typeface="Courier New" panose="02070309020205020404" pitchFamily="49" charset="0"/>
+                          <a:cs typeface="Courier New" panose="02070309020205020404" pitchFamily="49" charset="0"/>
+                        </a:rPr>
+                        <a:t>oracle_to_sqlserver_INFORMATICA_TEST_DEIDENTIFICAT</a:t>
+                      </a:r>
+                      <a:r>
+                        <a:rPr lang="en-US" sz="600" b="0" dirty="0">
+                          <a:solidFill>
+                            <a:schemeClr val="bg2"/>
+                          </a:solidFill>
+                          <a:latin typeface="Courier New" panose="02070309020205020404" pitchFamily="49" charset="0"/>
+                          <a:cs typeface="Courier New" panose="02070309020205020404" pitchFamily="49" charset="0"/>
+                        </a:rPr>
+                        <a:t> (1)/sync_NAME2 -&gt; Test v2/</a:t>
+                      </a:r>
+                      <a:r>
+                        <a:rPr lang="en-US" sz="600" b="0" dirty="0" err="1">
+                          <a:solidFill>
+                            <a:schemeClr val="bg2"/>
+                          </a:solidFill>
+                          <a:latin typeface="Courier New" panose="02070309020205020404" pitchFamily="49" charset="0"/>
+                          <a:cs typeface="Courier New" panose="02070309020205020404" pitchFamily="49" charset="0"/>
+                        </a:rPr>
+                        <a:t>orcl</a:t>
+                      </a:r>
+                      <a:r>
+                        <a:rPr lang="en-US" sz="600" b="0" dirty="0">
+                          <a:solidFill>
+                            <a:schemeClr val="bg2"/>
+                          </a:solidFill>
+                          <a:latin typeface="Courier New" panose="02070309020205020404" pitchFamily="49" charset="0"/>
+                          <a:cs typeface="Courier New" panose="02070309020205020404" pitchFamily="49" charset="0"/>
+                        </a:rPr>
+                        <a:t>/TEST/INFORMATICA_TEST_DEIDENTIFICAT/NAME2 (1.0)</a:t>
+                      </a:r>
+                    </a:p>
+                    <a:p>
+                      <a:r>
+                        <a:rPr lang="en-US" sz="600" b="0" dirty="0">
+                          <a:solidFill>
+                            <a:schemeClr val="bg2"/>
+                          </a:solidFill>
+                          <a:latin typeface="Courier New" panose="02070309020205020404" pitchFamily="49" charset="0"/>
+                          <a:cs typeface="Courier New" panose="02070309020205020404" pitchFamily="49" charset="0"/>
+                        </a:rPr>
+                        <a:t>Writing to C:\Toolbox\Python\Projects\Custom_Lineage_Creator\Test2/links\Lineage (with ETL)_20241122171323.zip containing links.csv</a:t>
+                      </a:r>
+                    </a:p>
+                    <a:p>
+                      <a:r>
+                        <a:rPr lang="en-US" sz="600" b="0" dirty="0">
+                          <a:solidFill>
+                            <a:schemeClr val="bg2"/>
+                          </a:solidFill>
+                          <a:latin typeface="Courier New" panose="02070309020205020404" pitchFamily="49" charset="0"/>
+                          <a:cs typeface="Courier New" panose="02070309020205020404" pitchFamily="49" charset="0"/>
+                        </a:rPr>
+                        <a:t>INFO: Preparing to create/update "Mass Ingestion" using "C:\Toolbox\Python\Projects\Custom_Lineage_Creator\Test2/resources/Mass Ingestion_20241122171323.zip"</a:t>
+                      </a:r>
+                    </a:p>
+                    <a:p>
+                      <a:r>
+                        <a:rPr lang="en-US" sz="600" b="0" dirty="0">
+                          <a:solidFill>
+                            <a:schemeClr val="bg2"/>
+                          </a:solidFill>
+                          <a:latin typeface="Courier New" panose="02070309020205020404" pitchFamily="49" charset="0"/>
+                          <a:cs typeface="Courier New" panose="02070309020205020404" pitchFamily="49" charset="0"/>
+                        </a:rPr>
+                        <a:t>INFO: Preparing to create/update "Lineage (with ETL)" using "C:\Toolbox\Python\Projects\Custom_Lineage_Creator\Test2/links\Lineage (with ETL)_20241122171323.zip"</a:t>
+                      </a:r>
+                    </a:p>
+                    <a:p>
+                      <a:r>
+                        <a:rPr lang="en-US" sz="600" b="0" dirty="0">
+                          <a:solidFill>
+                            <a:schemeClr val="bg2"/>
+                          </a:solidFill>
+                          <a:latin typeface="Courier New" panose="02070309020205020404" pitchFamily="49" charset="0"/>
+                          <a:cs typeface="Courier New" panose="02070309020205020404" pitchFamily="49" charset="0"/>
+                        </a:rPr>
+                        <a:t>Press the &lt;ENTER&gt; key create resources...</a:t>
+                      </a:r>
+                    </a:p>
+                    <a:p>
+                      <a:r>
+                        <a:rPr lang="en-US" sz="600" b="0" dirty="0">
+                          <a:solidFill>
+                            <a:schemeClr val="bg2"/>
+                          </a:solidFill>
+                          <a:latin typeface="Courier New" panose="02070309020205020404" pitchFamily="49" charset="0"/>
+                          <a:cs typeface="Courier New" panose="02070309020205020404" pitchFamily="49" charset="0"/>
+                        </a:rPr>
+                        <a:t>INFO: Successfully updated resource "Mass Ingestion"</a:t>
+                      </a:r>
+                    </a:p>
+                    <a:p>
+                      <a:r>
+                        <a:rPr lang="en-US" sz="600" b="0" dirty="0">
+                          <a:solidFill>
+                            <a:schemeClr val="bg2"/>
+                          </a:solidFill>
+                          <a:latin typeface="Courier New" panose="02070309020205020404" pitchFamily="49" charset="0"/>
+                          <a:cs typeface="Courier New" panose="02070309020205020404" pitchFamily="49" charset="0"/>
+                        </a:rPr>
+                        <a:t>INFO: Successfully created resource "Lineage (with ETL)"</a:t>
+                      </a:r>
+                    </a:p>
+                    <a:p>
+                      <a:r>
+                        <a:rPr lang="en-US" sz="600" b="0" dirty="0">
+                          <a:solidFill>
+                            <a:schemeClr val="bg2"/>
+                          </a:solidFill>
+                          <a:latin typeface="Courier New" panose="02070309020205020404" pitchFamily="49" charset="0"/>
+                          <a:cs typeface="Courier New" panose="02070309020205020404" pitchFamily="49" charset="0"/>
+                        </a:rPr>
+                        <a:t>INFO: Successfully started scan job for "Mass Ingestion"</a:t>
+                      </a:r>
+                    </a:p>
+                    <a:p>
+                      <a:r>
+                        <a:rPr lang="en-US" sz="600" b="0" dirty="0">
+                          <a:solidFill>
+                            <a:schemeClr val="bg2"/>
+                          </a:solidFill>
+                          <a:latin typeface="Courier New" panose="02070309020205020404" pitchFamily="49" charset="0"/>
+                          <a:cs typeface="Courier New" panose="02070309020205020404" pitchFamily="49" charset="0"/>
+                        </a:rPr>
+                        <a:t>    STARTING...............</a:t>
+                      </a:r>
+                    </a:p>
+                    <a:p>
+                      <a:r>
+                        <a:rPr lang="en-US" sz="600" b="0" dirty="0">
+                          <a:solidFill>
+                            <a:schemeClr val="bg2"/>
+                          </a:solidFill>
+                          <a:latin typeface="Courier New" panose="02070309020205020404" pitchFamily="49" charset="0"/>
+                          <a:cs typeface="Courier New" panose="02070309020205020404" pitchFamily="49" charset="0"/>
+                        </a:rPr>
+                        <a:t>    RUNNING........................</a:t>
+                      </a:r>
+                    </a:p>
+                    <a:p>
+                      <a:r>
+                        <a:rPr lang="en-US" sz="600" b="0" dirty="0">
+                          <a:solidFill>
+                            <a:schemeClr val="bg2"/>
+                          </a:solidFill>
+                          <a:latin typeface="Courier New" panose="02070309020205020404" pitchFamily="49" charset="0"/>
+                          <a:cs typeface="Courier New" panose="02070309020205020404" pitchFamily="49" charset="0"/>
+                        </a:rPr>
+                        <a:t>    COMPLETED</a:t>
+                      </a:r>
+                    </a:p>
+                    <a:p>
+                      <a:r>
+                        <a:rPr lang="en-US" sz="600" b="0" dirty="0">
+                          <a:solidFill>
+                            <a:schemeClr val="bg2"/>
+                          </a:solidFill>
+                          <a:latin typeface="Courier New" panose="02070309020205020404" pitchFamily="49" charset="0"/>
+                          <a:cs typeface="Courier New" panose="02070309020205020404" pitchFamily="49" charset="0"/>
+                        </a:rPr>
+                        <a:t>INFO: Successfully started scan job for "Lineage (with ETL)"</a:t>
+                      </a:r>
+                    </a:p>
+                    <a:p>
+                      <a:r>
+                        <a:rPr lang="en-US" sz="600" b="0" dirty="0">
+                          <a:solidFill>
+                            <a:schemeClr val="bg2"/>
+                          </a:solidFill>
+                          <a:latin typeface="Courier New" panose="02070309020205020404" pitchFamily="49" charset="0"/>
+                          <a:cs typeface="Courier New" panose="02070309020205020404" pitchFamily="49" charset="0"/>
+                        </a:rPr>
+                        <a:t>    STARTING...............</a:t>
+                      </a:r>
+                    </a:p>
+                    <a:p>
+                      <a:r>
+                        <a:rPr lang="en-US" sz="600" b="0" dirty="0">
+                          <a:solidFill>
+                            <a:schemeClr val="bg2"/>
+                          </a:solidFill>
+                          <a:latin typeface="Courier New" panose="02070309020205020404" pitchFamily="49" charset="0"/>
+                          <a:cs typeface="Courier New" panose="02070309020205020404" pitchFamily="49" charset="0"/>
+                        </a:rPr>
+                        <a:t>    RUNNING........................</a:t>
+                      </a:r>
+                    </a:p>
+                    <a:p>
+                      <a:r>
+                        <a:rPr lang="en-US" sz="600" b="0" dirty="0">
+                          <a:solidFill>
+                            <a:schemeClr val="bg2"/>
+                          </a:solidFill>
+                          <a:latin typeface="Courier New" panose="02070309020205020404" pitchFamily="49" charset="0"/>
+                          <a:cs typeface="Courier New" panose="02070309020205020404" pitchFamily="49" charset="0"/>
+                        </a:rPr>
+                        <a:t>    COMPLETED</a:t>
+                      </a:r>
+                    </a:p>
+                  </a:txBody>
+                  <a:tcPr>
+                    <a:solidFill>
+                      <a:schemeClr val="tx1"/>
+                    </a:solidFill>
+                  </a:tcPr>
+                </a:tc>
+                <a:extLst>
+                  <a:ext uri="{0D108BD9-81ED-4DB2-BD59-A6C34878D82A}">
+                    <a16:rowId xmlns:a16="http://schemas.microsoft.com/office/drawing/2014/main" val="3598110298"/>
+                  </a:ext>
+                </a:extLst>
+              </a:tr>
+            </a:tbl>
+          </a:graphicData>
+        </a:graphic>
+      </p:graphicFrame>
     </p:spTree>
     <p:extLst>
       <p:ext uri="{BB962C8B-B14F-4D97-AF65-F5344CB8AC3E}">
@@ -23602,26 +24347,6 @@
               <a:t>Allow for fuzzy matching, and provide a threshold for when to match</a:t>
             </a:r>
           </a:p>
-          <a:p>
-            <a:pPr marL="342900" indent="-342900">
-              <a:lnSpc>
-                <a:spcPct val="90000"/>
-              </a:lnSpc>
-              <a:spcAft>
-                <a:spcPts val="1000"/>
-              </a:spcAft>
-              <a:buFont typeface="Arial" panose="020B0604020202020204" pitchFamily="34" charset="0"/>
-              <a:buChar char="•"/>
-            </a:pPr>
-            <a:r>
-              <a:rPr lang="en-US" sz="2100" dirty="0">
-                <a:latin typeface="Roboto" charset="0"/>
-                <a:ea typeface="Roboto" charset="0"/>
-                <a:cs typeface="Roboto" charset="0"/>
-              </a:rPr>
-              <a:t>No API’s required. Just an Export file of Technical Datasets and Elements</a:t>
-            </a:r>
-          </a:p>
         </p:txBody>
       </p:sp>
     </p:spTree>
@@ -24062,7 +24787,39 @@
                 <a:ea typeface="Roboto" charset="0"/>
                 <a:cs typeface="Roboto" charset="0"/>
               </a:rPr>
-              <a:t>Use {name} as a token for the source name </a:t>
+              <a:t>Use {name} or {</a:t>
+            </a:r>
+            <a:r>
+              <a:rPr lang="en-US" sz="1200" dirty="0" err="1">
+                <a:latin typeface="Roboto" charset="0"/>
+                <a:ea typeface="Roboto" charset="0"/>
+                <a:cs typeface="Roboto" charset="0"/>
+              </a:rPr>
+              <a:t>s_dataset</a:t>
+            </a:r>
+            <a:r>
+              <a:rPr lang="en-US" sz="1200" dirty="0">
+                <a:latin typeface="Roboto" charset="0"/>
+                <a:ea typeface="Roboto" charset="0"/>
+                <a:cs typeface="Roboto" charset="0"/>
+              </a:rPr>
+              <a:t>} or {</a:t>
+            </a:r>
+            <a:r>
+              <a:rPr lang="en-US" sz="1200" dirty="0" err="1">
+                <a:latin typeface="Roboto" charset="0"/>
+                <a:ea typeface="Roboto" charset="0"/>
+                <a:cs typeface="Roboto" charset="0"/>
+              </a:rPr>
+              <a:t>s_element</a:t>
+            </a:r>
+            <a:r>
+              <a:rPr lang="en-US" sz="1200" dirty="0">
+                <a:latin typeface="Roboto" charset="0"/>
+                <a:ea typeface="Roboto" charset="0"/>
+                <a:cs typeface="Roboto" charset="0"/>
+              </a:rPr>
+              <a:t>} as a token for the source name </a:t>
             </a:r>
           </a:p>
         </p:txBody>
@@ -26476,11 +27233,11 @@
           <a:p>
             <a:r>
               <a:rPr lang="en-US" dirty="0"/>
-              <a:t>ETL Configuration </a:t>
+              <a:t>Execution </a:t>
             </a:r>
             <a:r>
               <a:rPr lang="en-US" i="1" dirty="0"/>
-              <a:t>(considerations)</a:t>
+              <a:t>considerations</a:t>
             </a:r>
             <a:endParaRPr lang="en-IN" dirty="0"/>
           </a:p>
@@ -26753,8 +27510,8 @@
         </p:nvSpPr>
         <p:spPr>
           <a:xfrm>
-            <a:off x="674588" y="1157381"/>
-            <a:ext cx="11088434" cy="2161552"/>
+            <a:off x="674588" y="1157380"/>
+            <a:ext cx="11088434" cy="4190123"/>
           </a:xfrm>
           <a:prstGeom prst="rect">
             <a:avLst/>
@@ -26801,39 +27558,7 @@
                 <a:ea typeface="Roboto" charset="0"/>
                 <a:cs typeface="Roboto" charset="0"/>
               </a:rPr>
-              <a:t>The script uses no APIs. In order to </a:t>
-            </a:r>
-            <a:r>
-              <a:rPr lang="en-US" sz="2000" dirty="0" err="1">
-                <a:latin typeface="Roboto" charset="0"/>
-                <a:ea typeface="Roboto" charset="0"/>
-                <a:cs typeface="Roboto" charset="0"/>
-              </a:rPr>
-              <a:t>to</a:t>
-            </a:r>
-            <a:r>
-              <a:rPr lang="en-US" sz="2000" dirty="0">
-                <a:latin typeface="Roboto" charset="0"/>
-                <a:ea typeface="Roboto" charset="0"/>
-                <a:cs typeface="Roboto" charset="0"/>
-              </a:rPr>
-              <a:t> get the templates, the script needs a copy of the metamodel (</a:t>
-            </a:r>
-            <a:r>
-              <a:rPr lang="en-US" sz="2000" dirty="0" err="1">
-                <a:latin typeface="Roboto" charset="0"/>
-                <a:ea typeface="Roboto" charset="0"/>
-                <a:cs typeface="Roboto" charset="0"/>
-              </a:rPr>
-              <a:t>json</a:t>
-            </a:r>
-            <a:r>
-              <a:rPr lang="en-US" sz="2000" dirty="0">
-                <a:latin typeface="Roboto" charset="0"/>
-                <a:ea typeface="Roboto" charset="0"/>
-                <a:cs typeface="Roboto" charset="0"/>
-              </a:rPr>
-              <a:t>) and template (zip) placed in the “templates” folder </a:t>
+              <a:t>If not provided, you will be prompted to choose a config file.</a:t>
             </a:r>
           </a:p>
           <a:p>
@@ -26847,14 +27572,141 @@
               <a:buFont typeface="Arial" panose="020B0604020202020204" pitchFamily="34" charset="0"/>
               <a:buChar char="•"/>
             </a:pPr>
+            <a:endParaRPr lang="en-US" sz="2000" dirty="0">
+              <a:latin typeface="Roboto" charset="0"/>
+              <a:ea typeface="Roboto" charset="0"/>
+              <a:cs typeface="Roboto" charset="0"/>
+            </a:endParaRPr>
+          </a:p>
+          <a:p>
+            <a:pPr marL="342900" indent="-342900">
+              <a:lnSpc>
+                <a:spcPct val="90000"/>
+              </a:lnSpc>
+              <a:spcAft>
+                <a:spcPts val="1000"/>
+              </a:spcAft>
+              <a:buFont typeface="Arial" panose="020B0604020202020204" pitchFamily="34" charset="0"/>
+              <a:buChar char="•"/>
+            </a:pPr>
             <a:r>
               <a:rPr lang="en-US" sz="2000" dirty="0">
                 <a:latin typeface="Roboto" charset="0"/>
                 <a:ea typeface="Roboto" charset="0"/>
                 <a:cs typeface="Roboto" charset="0"/>
               </a:rPr>
-              <a:t>If the ETL Name entered does not exist, it will give the logic to create it, but it won’t have the ID needed for the lineage portion. It will but a “placeholder” in the links.csv file. I would suggest you manually create the resource (of the same name), and don’t run a scan. This will produce the ID that will be used.</a:t>
-            </a:r>
+              <a:t>When the Lineage resource is created, it will use the config file name. for example</a:t>
+            </a:r>
+          </a:p>
+          <a:p>
+            <a:pPr marL="800100" lvl="1" indent="-342900">
+              <a:lnSpc>
+                <a:spcPct val="90000"/>
+              </a:lnSpc>
+              <a:spcAft>
+                <a:spcPts val="1000"/>
+              </a:spcAft>
+              <a:buFont typeface="Arial" panose="020B0604020202020204" pitchFamily="34" charset="0"/>
+              <a:buChar char="•"/>
+            </a:pPr>
+            <a:r>
+              <a:rPr lang="en-US" sz="2000" dirty="0">
+                <a:latin typeface="Roboto" charset="0"/>
+                <a:ea typeface="Roboto" charset="0"/>
+                <a:cs typeface="Roboto" charset="0"/>
+              </a:rPr>
+              <a:t>File “config - My Lineage.csv” will create “My Lineage” lineage resource</a:t>
+            </a:r>
+          </a:p>
+          <a:p>
+            <a:pPr marL="800100" lvl="1" indent="-342900">
+              <a:lnSpc>
+                <a:spcPct val="90000"/>
+              </a:lnSpc>
+              <a:spcAft>
+                <a:spcPts val="1000"/>
+              </a:spcAft>
+              <a:buFont typeface="Arial" panose="020B0604020202020204" pitchFamily="34" charset="0"/>
+              <a:buChar char="•"/>
+            </a:pPr>
+            <a:r>
+              <a:rPr lang="en-US" sz="2000" dirty="0">
+                <a:latin typeface="Roboto" charset="0"/>
+                <a:ea typeface="Roboto" charset="0"/>
+                <a:cs typeface="Roboto" charset="0"/>
+              </a:rPr>
+              <a:t>File “config_MyLineage.csv” will create “</a:t>
+            </a:r>
+            <a:r>
+              <a:rPr lang="en-US" sz="2000" dirty="0" err="1">
+                <a:latin typeface="Roboto" charset="0"/>
+                <a:ea typeface="Roboto" charset="0"/>
+                <a:cs typeface="Roboto" charset="0"/>
+              </a:rPr>
+              <a:t>MyLineage</a:t>
+            </a:r>
+            <a:r>
+              <a:rPr lang="en-US" sz="2000" dirty="0">
+                <a:latin typeface="Roboto" charset="0"/>
+                <a:ea typeface="Roboto" charset="0"/>
+                <a:cs typeface="Roboto" charset="0"/>
+              </a:rPr>
+              <a:t>” lineage resource</a:t>
+            </a:r>
+          </a:p>
+          <a:p>
+            <a:pPr marL="800100" lvl="1" indent="-342900">
+              <a:lnSpc>
+                <a:spcPct val="90000"/>
+              </a:lnSpc>
+              <a:spcAft>
+                <a:spcPts val="1000"/>
+              </a:spcAft>
+              <a:buFont typeface="Arial" panose="020B0604020202020204" pitchFamily="34" charset="0"/>
+              <a:buChar char="•"/>
+            </a:pPr>
+            <a:endParaRPr lang="en-US" sz="2000" dirty="0">
+              <a:latin typeface="Roboto" charset="0"/>
+              <a:ea typeface="Roboto" charset="0"/>
+              <a:cs typeface="Roboto" charset="0"/>
+            </a:endParaRPr>
+          </a:p>
+          <a:p>
+            <a:pPr marL="342900" indent="-342900">
+              <a:lnSpc>
+                <a:spcPct val="90000"/>
+              </a:lnSpc>
+              <a:spcAft>
+                <a:spcPts val="1000"/>
+              </a:spcAft>
+              <a:buFont typeface="Arial" panose="020B0604020202020204" pitchFamily="34" charset="0"/>
+              <a:buChar char="•"/>
+            </a:pPr>
+            <a:r>
+              <a:rPr lang="en-US" sz="2000" dirty="0">
+                <a:latin typeface="Roboto" charset="0"/>
+                <a:ea typeface="Roboto" charset="0"/>
+                <a:cs typeface="Roboto" charset="0"/>
+              </a:rPr>
+              <a:t>The script will execute the scans sequentially once it creates them</a:t>
+            </a:r>
+          </a:p>
+          <a:p>
+            <a:pPr marL="342900" indent="-342900">
+              <a:lnSpc>
+                <a:spcPct val="90000"/>
+              </a:lnSpc>
+              <a:spcAft>
+                <a:spcPts val="1000"/>
+              </a:spcAft>
+              <a:buFont typeface="Arial" panose="020B0604020202020204" pitchFamily="34" charset="0"/>
+              <a:buChar char="•"/>
+            </a:pPr>
+            <a:endParaRPr lang="en-US" sz="2000" dirty="0">
+              <a:latin typeface="Roboto" charset="0"/>
+              <a:ea typeface="Roboto" charset="0"/>
+              <a:cs typeface="Roboto" charset="0"/>
+            </a:endParaRPr>
           </a:p>
           <a:p>
             <a:pPr marL="342900" indent="-342900">
@@ -27252,7 +28104,7 @@
         </p:nvSpPr>
         <p:spPr>
           <a:xfrm>
-            <a:off x="595566" y="749509"/>
+            <a:off x="595566" y="761084"/>
             <a:ext cx="11195176" cy="5414224"/>
           </a:xfrm>
           <a:prstGeom prst="rect">
@@ -27291,8 +28143,8 @@
               <a:spcAft>
                 <a:spcPts val="1000"/>
               </a:spcAft>
-              <a:buFont typeface="+mj-lt"/>
-              <a:buAutoNum type="arabicPeriod"/>
+              <a:buFont typeface="Arial" panose="020B0604020202020204" pitchFamily="34" charset="0"/>
+              <a:buChar char="•"/>
             </a:pPr>
             <a:r>
               <a:rPr lang="en-US" sz="1600" dirty="0">
@@ -27300,7 +28152,7 @@
                 <a:ea typeface="Roboto" charset="0"/>
                 <a:cs typeface="Roboto" charset="0"/>
               </a:rPr>
-              <a:t>(optional) If you’re going to be using a new Custom Source, create the custom source within MCC (using the exact name you’ll use. For the Zip file, provide any zip file (as a placeholder), and do not run the scan. (This will create the resource, and generate a unique ID for the resource, that the script will use for lineage)</a:t>
+              <a:t>(if first time running) Run pip to get the required libraries: </a:t>
             </a:r>
           </a:p>
           <a:p>
@@ -27311,8 +28163,8 @@
               <a:spcAft>
                 <a:spcPts val="1000"/>
               </a:spcAft>
-              <a:buFont typeface="+mj-lt"/>
-              <a:buAutoNum type="arabicPeriod"/>
+              <a:buFont typeface="Arial" panose="020B0604020202020204" pitchFamily="34" charset="0"/>
+              <a:buChar char="•"/>
             </a:pPr>
             <a:r>
               <a:rPr lang="en-US" sz="1600" dirty="0">
@@ -27320,23 +28172,7 @@
                 <a:ea typeface="Roboto" charset="0"/>
                 <a:cs typeface="Roboto" charset="0"/>
               </a:rPr>
-              <a:t>(optional) If you’re going to using a Custom Source, download the metamodel (</a:t>
-            </a:r>
-            <a:r>
-              <a:rPr lang="en-US" sz="1600" dirty="0" err="1">
-                <a:latin typeface="Roboto" charset="0"/>
-                <a:ea typeface="Roboto" charset="0"/>
-                <a:cs typeface="Roboto" charset="0"/>
-              </a:rPr>
-              <a:t>json</a:t>
-            </a:r>
-            <a:r>
-              <a:rPr lang="en-US" sz="1600" dirty="0">
-                <a:latin typeface="Roboto" charset="0"/>
-                <a:ea typeface="Roboto" charset="0"/>
-                <a:cs typeface="Roboto" charset="0"/>
-              </a:rPr>
-              <a:t>) and the metadata template (zip) from MCC, and place these files in the “templates” directory. (for convenience, included are the files required for IICSv2)</a:t>
+              <a:t>Execute the script (Either specify the config file name, or you will be prompted):</a:t>
             </a:r>
           </a:p>
           <a:p>
@@ -27367,74 +28203,11 @@
               <a:buFont typeface="+mj-lt"/>
               <a:buAutoNum type="arabicPeriod"/>
             </a:pPr>
-            <a:r>
-              <a:rPr lang="en-US" sz="1600" dirty="0">
-                <a:latin typeface="Roboto" charset="0"/>
-                <a:ea typeface="Roboto" charset="0"/>
-                <a:cs typeface="Roboto" charset="0"/>
-              </a:rPr>
-              <a:t>Within CDGC, run a search for “Resources”. Export the results. When completes, you’ll either have an excel (xlsx) or a zip file. Whichever it is, save it in the same directory as the python script.</a:t>
-            </a:r>
-          </a:p>
-          <a:p>
-            <a:pPr marL="342900" indent="-342900">
-              <a:lnSpc>
-                <a:spcPct val="90000"/>
-              </a:lnSpc>
-              <a:spcAft>
-                <a:spcPts val="1000"/>
-              </a:spcAft>
-              <a:buFont typeface="+mj-lt"/>
-              <a:buAutoNum type="arabicPeriod"/>
-            </a:pPr>
-            <a:r>
-              <a:rPr lang="en-US" sz="1600" dirty="0">
-                <a:latin typeface="Roboto" charset="0"/>
-                <a:ea typeface="Roboto" charset="0"/>
-                <a:cs typeface="Roboto" charset="0"/>
-              </a:rPr>
-              <a:t>Modify the config.csv (or other csv filename) file for your information.</a:t>
-            </a:r>
-          </a:p>
-          <a:p>
-            <a:pPr marL="342900" indent="-342900">
-              <a:lnSpc>
-                <a:spcPct val="90000"/>
-              </a:lnSpc>
-              <a:spcAft>
-                <a:spcPts val="1000"/>
-              </a:spcAft>
-              <a:buFont typeface="+mj-lt"/>
-              <a:buAutoNum type="arabicPeriod"/>
-            </a:pPr>
-            <a:r>
-              <a:rPr lang="en-US" sz="1600" dirty="0">
-                <a:latin typeface="Roboto" charset="0"/>
-                <a:ea typeface="Roboto" charset="0"/>
-                <a:cs typeface="Roboto" charset="0"/>
-              </a:rPr>
-              <a:t>(if first time running) Run pip to get the required libraries: </a:t>
-            </a:r>
-          </a:p>
-          <a:p>
-            <a:pPr marL="342900" indent="-342900">
-              <a:lnSpc>
-                <a:spcPct val="90000"/>
-              </a:lnSpc>
-              <a:spcAft>
-                <a:spcPts val="1000"/>
-              </a:spcAft>
-              <a:buFont typeface="+mj-lt"/>
-              <a:buAutoNum type="arabicPeriod"/>
-            </a:pPr>
-            <a:r>
-              <a:rPr lang="en-US" sz="1600" dirty="0">
-                <a:latin typeface="Roboto" charset="0"/>
-                <a:ea typeface="Roboto" charset="0"/>
-                <a:cs typeface="Roboto" charset="0"/>
-              </a:rPr>
-              <a:t>Execute the script (if using config other than config.csv, specify that file. Examples:</a:t>
-            </a:r>
+            <a:endParaRPr lang="en-US" sz="1600" dirty="0">
+              <a:latin typeface="Roboto" charset="0"/>
+              <a:ea typeface="Roboto" charset="0"/>
+              <a:cs typeface="Roboto" charset="0"/>
+            </a:endParaRPr>
           </a:p>
           <a:p>
             <a:pPr marL="342900" indent="-342900">
@@ -27461,42 +28234,8 @@
               <a:spcAft>
                 <a:spcPts val="1000"/>
               </a:spcAft>
-              <a:buFont typeface="+mj-lt"/>
-              <a:buAutoNum type="arabicPeriod"/>
-            </a:pPr>
-            <a:endParaRPr lang="en-US" sz="1600" dirty="0">
-              <a:latin typeface="Roboto" charset="0"/>
-              <a:ea typeface="Roboto" charset="0"/>
-              <a:cs typeface="Roboto" charset="0"/>
-            </a:endParaRPr>
-          </a:p>
-          <a:p>
-            <a:pPr marL="342900" indent="-342900">
-              <a:lnSpc>
-                <a:spcPct val="90000"/>
-              </a:lnSpc>
-              <a:spcAft>
-                <a:spcPts val="1000"/>
-              </a:spcAft>
-              <a:buFont typeface="+mj-lt"/>
-              <a:buAutoNum type="arabicPeriod"/>
-            </a:pPr>
-            <a:endParaRPr lang="en-US" sz="1600" dirty="0">
-              <a:latin typeface="Roboto" charset="0"/>
-              <a:ea typeface="Roboto" charset="0"/>
-              <a:cs typeface="Roboto" charset="0"/>
-            </a:endParaRPr>
-          </a:p>
-          <a:p>
-            <a:pPr marL="342900" indent="-342900">
-              <a:lnSpc>
-                <a:spcPct val="90000"/>
-              </a:lnSpc>
-              <a:spcAft>
-                <a:spcPts val="1000"/>
-              </a:spcAft>
-              <a:buFont typeface="+mj-lt"/>
-              <a:buAutoNum type="arabicPeriod"/>
+              <a:buFont typeface="Arial" panose="020B0604020202020204" pitchFamily="34" charset="0"/>
+              <a:buChar char="•"/>
             </a:pPr>
             <a:r>
               <a:rPr lang="en-US" sz="1600" dirty="0">
@@ -27504,27 +28243,23 @@
                 <a:ea typeface="Roboto" charset="0"/>
                 <a:cs typeface="Roboto" charset="0"/>
               </a:rPr>
-              <a:t>From within MCC, create a custom resource and use the lineage_&lt;timestamp&gt;.zip for the lineage</a:t>
-            </a:r>
-          </a:p>
-          <a:p>
-            <a:pPr marL="342900" indent="-342900">
-              <a:lnSpc>
-                <a:spcPct val="90000"/>
-              </a:lnSpc>
-              <a:spcAft>
-                <a:spcPts val="1000"/>
-              </a:spcAft>
-              <a:buFont typeface="+mj-lt"/>
-              <a:buAutoNum type="arabicPeriod"/>
-            </a:pPr>
+              <a:t>Optionally, you can create a credentials file in ~/.</a:t>
+            </a:r>
+            <a:r>
+              <a:rPr lang="en-US" sz="1600" dirty="0" err="1">
+                <a:latin typeface="Roboto" charset="0"/>
+                <a:ea typeface="Roboto" charset="0"/>
+                <a:cs typeface="Roboto" charset="0"/>
+              </a:rPr>
+              <a:t>informatica_cdgc</a:t>
+            </a:r>
             <a:r>
               <a:rPr lang="en-US" sz="1600" dirty="0">
                 <a:latin typeface="Roboto" charset="0"/>
                 <a:ea typeface="Roboto" charset="0"/>
                 <a:cs typeface="Roboto" charset="0"/>
               </a:rPr>
-              <a:t>From within MCC, create a custom resource and use the &lt;</a:t>
+              <a:t> (c:\Users\&lt;username\.</a:t>
             </a:r>
             <a:r>
               <a:rPr lang="en-US" sz="1600" dirty="0" err="1">
@@ -27532,7 +28267,7 @@
                 <a:ea typeface="Roboto" charset="0"/>
                 <a:cs typeface="Roboto" charset="0"/>
               </a:rPr>
-              <a:t>Resource_Name</a:t>
+              <a:t>informatica_cdgc</a:t>
             </a:r>
             <a:r>
               <a:rPr lang="en-US" sz="1600" dirty="0">
@@ -27540,25 +28275,8 @@
                 <a:ea typeface="Roboto" charset="0"/>
                 <a:cs typeface="Roboto" charset="0"/>
               </a:rPr>
-              <a:t>&gt;_&lt;timestamp&gt;.zip for the ETL</a:t>
-            </a:r>
-          </a:p>
-          <a:p>
-            <a:pPr marL="342900" indent="-342900">
-              <a:lnSpc>
-                <a:spcPct val="90000"/>
-              </a:lnSpc>
-              <a:spcAft>
-                <a:spcPts val="1000"/>
-              </a:spcAft>
-              <a:buFont typeface="+mj-lt"/>
-              <a:buAutoNum type="arabicPeriod"/>
-            </a:pPr>
-            <a:endParaRPr lang="en-US" sz="1600" dirty="0">
-              <a:latin typeface="Roboto" charset="0"/>
-              <a:ea typeface="Roboto" charset="0"/>
-              <a:cs typeface="Roboto" charset="0"/>
-            </a:endParaRPr>
+              <a:t> for Windows). If it finds a default profile, it'll use it, otherwise it'll prompt for which profile to use. If you credential file exists, you will be prompted. Example credentials file:</a:t>
+            </a:r>
           </a:p>
           <a:p>
             <a:pPr marL="342900" indent="-342900">
@@ -27645,14 +28363,14 @@
           <p:nvPr>
             <p:extLst>
               <p:ext uri="{D42A27DB-BD31-4B8C-83A1-F6EECF244321}">
-                <p14:modId xmlns:p14="http://schemas.microsoft.com/office/powerpoint/2010/main" val="712019081"/>
+                <p14:modId xmlns:p14="http://schemas.microsoft.com/office/powerpoint/2010/main" val="179248413"/>
               </p:ext>
             </p:extLst>
           </p:nvPr>
         </p:nvGraphicFramePr>
         <p:xfrm>
-          <a:off x="1546049" y="4355869"/>
-          <a:ext cx="8546218" cy="914400"/>
+          <a:off x="1180247" y="1724555"/>
+          <a:ext cx="8546218" cy="731520"/>
         </p:xfrm>
         <a:graphic>
           <a:graphicData uri="http://schemas.openxmlformats.org/drawingml/2006/table">
@@ -27676,7 +28394,7 @@
                     <a:lstStyle/>
                     <a:p>
                       <a:r>
-                        <a:rPr lang="en-US" b="0" dirty="0">
+                        <a:rPr lang="en-US" sz="1400" b="0" dirty="0">
                           <a:solidFill>
                             <a:schemeClr val="bg2"/>
                           </a:solidFill>
@@ -27688,7 +28406,7 @@
                     </a:p>
                     <a:p>
                       <a:r>
-                        <a:rPr lang="en-US" b="0" dirty="0">
+                        <a:rPr lang="en-US" sz="1400" b="0" dirty="0">
                           <a:solidFill>
                             <a:schemeClr val="bg2"/>
                           </a:solidFill>
@@ -27700,14 +28418,34 @@
                     </a:p>
                     <a:p>
                       <a:r>
-                        <a:rPr lang="en-US" b="0" dirty="0">
+                        <a:rPr lang="en-US" sz="1400" b="0" dirty="0">
                           <a:solidFill>
                             <a:schemeClr val="bg2"/>
                           </a:solidFill>
                           <a:latin typeface="Courier New" panose="02070309020205020404" pitchFamily="49" charset="0"/>
                           <a:cs typeface="Courier New" panose="02070309020205020404" pitchFamily="49" charset="0"/>
                         </a:rPr>
-                        <a:t>python custom_lineage_creator.py config_with_etl.csv</a:t>
+                        <a:t>python custom_lineage_creator.py "</a:t>
+                      </a:r>
+                      <a:r>
+                        <a:rPr lang="en-US" sz="1400" b="0" dirty="0" err="1">
+                          <a:solidFill>
+                            <a:schemeClr val="bg2"/>
+                          </a:solidFill>
+                          <a:latin typeface="Courier New" panose="02070309020205020404" pitchFamily="49" charset="0"/>
+                          <a:cs typeface="Courier New" panose="02070309020205020404" pitchFamily="49" charset="0"/>
+                        </a:rPr>
+                        <a:t>config_My</a:t>
+                      </a:r>
+                      <a:r>
+                        <a:rPr lang="en-US" sz="1400" b="0" dirty="0">
+                          <a:solidFill>
+                            <a:schemeClr val="bg2"/>
+                          </a:solidFill>
+                          <a:latin typeface="Courier New" panose="02070309020205020404" pitchFamily="49" charset="0"/>
+                          <a:cs typeface="Courier New" panose="02070309020205020404" pitchFamily="49" charset="0"/>
+                        </a:rPr>
+                        <a:t> Lineage.csv"</a:t>
                       </a:r>
                     </a:p>
                   </a:txBody>
@@ -27742,14 +28480,14 @@
           <p:nvPr>
             <p:extLst>
               <p:ext uri="{D42A27DB-BD31-4B8C-83A1-F6EECF244321}">
-                <p14:modId xmlns:p14="http://schemas.microsoft.com/office/powerpoint/2010/main" val="4132330575"/>
+                <p14:modId xmlns:p14="http://schemas.microsoft.com/office/powerpoint/2010/main" val="92486335"/>
               </p:ext>
             </p:extLst>
           </p:nvPr>
         </p:nvGraphicFramePr>
         <p:xfrm>
-          <a:off x="6105701" y="3582238"/>
-          <a:ext cx="5329514" cy="365760"/>
+          <a:off x="6094412" y="1071750"/>
+          <a:ext cx="5329514" cy="260557"/>
         </p:xfrm>
         <a:graphic>
           <a:graphicData uri="http://schemas.openxmlformats.org/drawingml/2006/table">
@@ -27766,14 +28504,14 @@
                   </a:extLst>
                 </a:gridCol>
               </a:tblGrid>
-              <a:tr h="338838">
+              <a:tr h="260557">
                 <a:tc>
                   <a:txBody>
                     <a:bodyPr/>
                     <a:lstStyle/>
                     <a:p>
                       <a:r>
-                        <a:rPr lang="en-US" b="0" dirty="0">
+                        <a:rPr lang="en-US" sz="1050" b="0" dirty="0">
                           <a:solidFill>
                             <a:schemeClr val="bg2"/>
                           </a:solidFill>
@@ -27783,7 +28521,7 @@
                         <a:t>pip install pandas datetime </a:t>
                       </a:r>
                       <a:r>
-                        <a:rPr lang="en-US" b="0" dirty="0" err="1">
+                        <a:rPr lang="en-US" sz="1050" b="0" dirty="0" err="1">
                           <a:solidFill>
                             <a:schemeClr val="bg2"/>
                           </a:solidFill>
@@ -27792,7 +28530,425 @@
                         </a:rPr>
                         <a:t>openpyxl</a:t>
                       </a:r>
-                      <a:endParaRPr lang="en-US" b="0" dirty="0">
+                      <a:r>
+                        <a:rPr lang="en-US" sz="1050" b="0" dirty="0">
+                          <a:solidFill>
+                            <a:schemeClr val="bg2"/>
+                          </a:solidFill>
+                          <a:latin typeface="Courier New" panose="02070309020205020404" pitchFamily="49" charset="0"/>
+                          <a:cs typeface="Courier New" panose="02070309020205020404" pitchFamily="49" charset="0"/>
+                        </a:rPr>
+                        <a:t> Requests </a:t>
+                      </a:r>
+                      <a:r>
+                        <a:rPr lang="en-US" sz="1050" b="0" dirty="0" err="1">
+                          <a:solidFill>
+                            <a:schemeClr val="bg2"/>
+                          </a:solidFill>
+                          <a:latin typeface="Courier New" panose="02070309020205020404" pitchFamily="49" charset="0"/>
+                          <a:cs typeface="Courier New" panose="02070309020205020404" pitchFamily="49" charset="0"/>
+                        </a:rPr>
+                        <a:t>requests_toolbelt</a:t>
+                      </a:r>
+                      <a:endParaRPr lang="en-US" sz="1050" b="0" dirty="0">
+                        <a:solidFill>
+                          <a:schemeClr val="bg2"/>
+                        </a:solidFill>
+                        <a:latin typeface="Courier New" panose="02070309020205020404" pitchFamily="49" charset="0"/>
+                        <a:cs typeface="Courier New" panose="02070309020205020404" pitchFamily="49" charset="0"/>
+                      </a:endParaRPr>
+                    </a:p>
+                  </a:txBody>
+                  <a:tcPr>
+                    <a:solidFill>
+                      <a:schemeClr val="tx1"/>
+                    </a:solidFill>
+                  </a:tcPr>
+                </a:tc>
+                <a:extLst>
+                  <a:ext uri="{0D108BD9-81ED-4DB2-BD59-A6C34878D82A}">
+                    <a16:rowId xmlns:a16="http://schemas.microsoft.com/office/drawing/2014/main" val="3598110298"/>
+                  </a:ext>
+                </a:extLst>
+              </a:tr>
+            </a:tbl>
+          </a:graphicData>
+        </a:graphic>
+      </p:graphicFrame>
+      <p:graphicFrame>
+        <p:nvGraphicFramePr>
+          <p:cNvPr id="4" name="Table 3">
+            <a:extLst>
+              <a:ext uri="{FF2B5EF4-FFF2-40B4-BE49-F238E27FC236}">
+                <a16:creationId xmlns:a16="http://schemas.microsoft.com/office/drawing/2014/main" id="{967591A0-BF80-D735-4E85-C75772A6995D}"/>
+              </a:ext>
+            </a:extLst>
+          </p:cNvPr>
+          <p:cNvGraphicFramePr>
+            <a:graphicFrameLocks noGrp="1"/>
+          </p:cNvGraphicFramePr>
+          <p:nvPr>
+            <p:extLst>
+              <p:ext uri="{D42A27DB-BD31-4B8C-83A1-F6EECF244321}">
+                <p14:modId xmlns:p14="http://schemas.microsoft.com/office/powerpoint/2010/main" val="4194737985"/>
+              </p:ext>
+            </p:extLst>
+          </p:nvPr>
+        </p:nvGraphicFramePr>
+        <p:xfrm>
+          <a:off x="5453356" y="3429000"/>
+          <a:ext cx="4547430" cy="2225040"/>
+        </p:xfrm>
+        <a:graphic>
+          <a:graphicData uri="http://schemas.openxmlformats.org/drawingml/2006/table">
+            <a:tbl>
+              <a:tblPr firstRow="1" bandRow="1">
+                <a:tableStyleId>{5C22544A-7EE6-4342-B048-85BDC9FD1C3A}</a:tableStyleId>
+              </a:tblPr>
+              <a:tblGrid>
+                <a:gridCol w="4547430">
+                  <a:extLst>
+                    <a:ext uri="{9D8B030D-6E8A-4147-A177-3AD203B41FA5}">
+                      <a16:colId xmlns:a16="http://schemas.microsoft.com/office/drawing/2014/main" val="1261491639"/>
+                    </a:ext>
+                  </a:extLst>
+                </a:gridCol>
+              </a:tblGrid>
+              <a:tr h="1857904">
+                <a:tc>
+                  <a:txBody>
+                    <a:bodyPr/>
+                    <a:lstStyle/>
+                    <a:p>
+                      <a:r>
+                        <a:rPr lang="en-US" sz="1000" b="0" dirty="0">
+                          <a:solidFill>
+                            <a:schemeClr val="bg2"/>
+                          </a:solidFill>
+                          <a:latin typeface="Courier New" panose="02070309020205020404" pitchFamily="49" charset="0"/>
+                          <a:cs typeface="Courier New" panose="02070309020205020404" pitchFamily="49" charset="0"/>
+                        </a:rPr>
+                        <a:t>[default1]</a:t>
+                      </a:r>
+                    </a:p>
+                    <a:p>
+                      <a:r>
+                        <a:rPr lang="en-US" sz="1000" b="0" dirty="0">
+                          <a:solidFill>
+                            <a:schemeClr val="bg2"/>
+                          </a:solidFill>
+                          <a:latin typeface="Courier New" panose="02070309020205020404" pitchFamily="49" charset="0"/>
+                          <a:cs typeface="Courier New" panose="02070309020205020404" pitchFamily="49" charset="0"/>
+                        </a:rPr>
+                        <a:t>pod = </a:t>
+                      </a:r>
+                      <a:r>
+                        <a:rPr lang="en-US" sz="1000" b="0" dirty="0" err="1">
+                          <a:solidFill>
+                            <a:schemeClr val="bg2"/>
+                          </a:solidFill>
+                          <a:latin typeface="Courier New" panose="02070309020205020404" pitchFamily="49" charset="0"/>
+                          <a:cs typeface="Courier New" panose="02070309020205020404" pitchFamily="49" charset="0"/>
+                        </a:rPr>
+                        <a:t>dmp</a:t>
+                      </a:r>
+                      <a:r>
+                        <a:rPr lang="en-US" sz="1000" b="0" dirty="0">
+                          <a:solidFill>
+                            <a:schemeClr val="bg2"/>
+                          </a:solidFill>
+                          <a:latin typeface="Courier New" panose="02070309020205020404" pitchFamily="49" charset="0"/>
+                          <a:cs typeface="Courier New" panose="02070309020205020404" pitchFamily="49" charset="0"/>
+                        </a:rPr>
+                        <a:t>-us</a:t>
+                      </a:r>
+                    </a:p>
+                    <a:p>
+                      <a:r>
+                        <a:rPr lang="en-US" sz="1000" b="0" dirty="0">
+                          <a:solidFill>
+                            <a:schemeClr val="bg2"/>
+                          </a:solidFill>
+                          <a:latin typeface="Courier New" panose="02070309020205020404" pitchFamily="49" charset="0"/>
+                          <a:cs typeface="Courier New" panose="02070309020205020404" pitchFamily="49" charset="0"/>
+                        </a:rPr>
+                        <a:t>user = </a:t>
+                      </a:r>
+                      <a:r>
+                        <a:rPr lang="en-US" sz="1000" b="0" dirty="0" err="1">
+                          <a:solidFill>
+                            <a:schemeClr val="bg2"/>
+                          </a:solidFill>
+                          <a:latin typeface="Courier New" panose="02070309020205020404" pitchFamily="49" charset="0"/>
+                          <a:cs typeface="Courier New" panose="02070309020205020404" pitchFamily="49" charset="0"/>
+                        </a:rPr>
+                        <a:t>shayes_example</a:t>
+                      </a:r>
+                      <a:endParaRPr lang="en-US" sz="1000" b="0" dirty="0">
+                        <a:solidFill>
+                          <a:schemeClr val="bg2"/>
+                        </a:solidFill>
+                        <a:latin typeface="Courier New" panose="02070309020205020404" pitchFamily="49" charset="0"/>
+                        <a:cs typeface="Courier New" panose="02070309020205020404" pitchFamily="49" charset="0"/>
+                      </a:endParaRPr>
+                    </a:p>
+                    <a:p>
+                      <a:r>
+                        <a:rPr lang="en-US" sz="1000" b="0" dirty="0" err="1">
+                          <a:solidFill>
+                            <a:schemeClr val="bg2"/>
+                          </a:solidFill>
+                          <a:latin typeface="Courier New" panose="02070309020205020404" pitchFamily="49" charset="0"/>
+                          <a:cs typeface="Courier New" panose="02070309020205020404" pitchFamily="49" charset="0"/>
+                        </a:rPr>
+                        <a:t>pwd</a:t>
+                      </a:r>
+                      <a:r>
+                        <a:rPr lang="en-US" sz="1000" b="0" dirty="0">
+                          <a:solidFill>
+                            <a:schemeClr val="bg2"/>
+                          </a:solidFill>
+                          <a:latin typeface="Courier New" panose="02070309020205020404" pitchFamily="49" charset="0"/>
+                          <a:cs typeface="Courier New" panose="02070309020205020404" pitchFamily="49" charset="0"/>
+                        </a:rPr>
+                        <a:t> = </a:t>
+                      </a:r>
+                      <a:r>
+                        <a:rPr lang="en-US" sz="1000" b="0" dirty="0" err="1">
+                          <a:solidFill>
+                            <a:schemeClr val="bg2"/>
+                          </a:solidFill>
+                          <a:latin typeface="Courier New" panose="02070309020205020404" pitchFamily="49" charset="0"/>
+                          <a:cs typeface="Courier New" panose="02070309020205020404" pitchFamily="49" charset="0"/>
+                        </a:rPr>
+                        <a:t>xyz</a:t>
+                      </a:r>
+                      <a:endParaRPr lang="en-US" sz="1000" b="0" dirty="0">
+                        <a:solidFill>
+                          <a:schemeClr val="bg2"/>
+                        </a:solidFill>
+                        <a:latin typeface="Courier New" panose="02070309020205020404" pitchFamily="49" charset="0"/>
+                        <a:cs typeface="Courier New" panose="02070309020205020404" pitchFamily="49" charset="0"/>
+                      </a:endParaRPr>
+                    </a:p>
+                    <a:p>
+                      <a:endParaRPr lang="en-US" sz="1000" b="0" dirty="0">
+                        <a:solidFill>
+                          <a:schemeClr val="bg2"/>
+                        </a:solidFill>
+                        <a:latin typeface="Courier New" panose="02070309020205020404" pitchFamily="49" charset="0"/>
+                        <a:cs typeface="Courier New" panose="02070309020205020404" pitchFamily="49" charset="0"/>
+                      </a:endParaRPr>
+                    </a:p>
+                    <a:p>
+                      <a:r>
+                        <a:rPr lang="en-US" sz="1000" b="0" dirty="0">
+                          <a:solidFill>
+                            <a:schemeClr val="bg2"/>
+                          </a:solidFill>
+                          <a:latin typeface="Courier New" panose="02070309020205020404" pitchFamily="49" charset="0"/>
+                          <a:cs typeface="Courier New" panose="02070309020205020404" pitchFamily="49" charset="0"/>
+                        </a:rPr>
+                        <a:t>[</a:t>
+                      </a:r>
+                      <a:r>
+                        <a:rPr lang="en-US" sz="1000" b="0" dirty="0" err="1">
+                          <a:solidFill>
+                            <a:schemeClr val="bg2"/>
+                          </a:solidFill>
+                          <a:latin typeface="Courier New" panose="02070309020205020404" pitchFamily="49" charset="0"/>
+                          <a:cs typeface="Courier New" panose="02070309020205020404" pitchFamily="49" charset="0"/>
+                        </a:rPr>
+                        <a:t>shayes_compass</a:t>
+                      </a:r>
+                      <a:r>
+                        <a:rPr lang="en-US" sz="1000" b="0" dirty="0">
+                          <a:solidFill>
+                            <a:schemeClr val="bg2"/>
+                          </a:solidFill>
+                          <a:latin typeface="Courier New" panose="02070309020205020404" pitchFamily="49" charset="0"/>
+                          <a:cs typeface="Courier New" panose="02070309020205020404" pitchFamily="49" charset="0"/>
+                        </a:rPr>
+                        <a:t>]</a:t>
+                      </a:r>
+                    </a:p>
+                    <a:p>
+                      <a:r>
+                        <a:rPr lang="en-US" sz="1000" b="0" dirty="0">
+                          <a:solidFill>
+                            <a:schemeClr val="bg2"/>
+                          </a:solidFill>
+                          <a:latin typeface="Courier New" panose="02070309020205020404" pitchFamily="49" charset="0"/>
+                          <a:cs typeface="Courier New" panose="02070309020205020404" pitchFamily="49" charset="0"/>
+                        </a:rPr>
+                        <a:t>pod = </a:t>
+                      </a:r>
+                      <a:r>
+                        <a:rPr lang="en-US" sz="1000" b="0" dirty="0" err="1">
+                          <a:solidFill>
+                            <a:schemeClr val="bg2"/>
+                          </a:solidFill>
+                          <a:latin typeface="Courier New" panose="02070309020205020404" pitchFamily="49" charset="0"/>
+                          <a:cs typeface="Courier New" panose="02070309020205020404" pitchFamily="49" charset="0"/>
+                        </a:rPr>
+                        <a:t>dmp</a:t>
+                      </a:r>
+                      <a:r>
+                        <a:rPr lang="en-US" sz="1000" b="0" dirty="0">
+                          <a:solidFill>
+                            <a:schemeClr val="bg2"/>
+                          </a:solidFill>
+                          <a:latin typeface="Courier New" panose="02070309020205020404" pitchFamily="49" charset="0"/>
+                          <a:cs typeface="Courier New" panose="02070309020205020404" pitchFamily="49" charset="0"/>
+                        </a:rPr>
+                        <a:t>-us</a:t>
+                      </a:r>
+                    </a:p>
+                    <a:p>
+                      <a:r>
+                        <a:rPr lang="en-US" sz="1000" b="0" dirty="0">
+                          <a:solidFill>
+                            <a:schemeClr val="bg2"/>
+                          </a:solidFill>
+                          <a:latin typeface="Courier New" panose="02070309020205020404" pitchFamily="49" charset="0"/>
+                          <a:cs typeface="Courier New" panose="02070309020205020404" pitchFamily="49" charset="0"/>
+                        </a:rPr>
+                        <a:t>user = </a:t>
+                      </a:r>
+                      <a:r>
+                        <a:rPr lang="en-US" sz="1000" b="0" dirty="0" err="1">
+                          <a:solidFill>
+                            <a:schemeClr val="bg2"/>
+                          </a:solidFill>
+                          <a:latin typeface="Courier New" panose="02070309020205020404" pitchFamily="49" charset="0"/>
+                          <a:cs typeface="Courier New" panose="02070309020205020404" pitchFamily="49" charset="0"/>
+                        </a:rPr>
+                        <a:t>shayes_compass</a:t>
+                      </a:r>
+                      <a:endParaRPr lang="en-US" sz="1000" b="0" dirty="0">
+                        <a:solidFill>
+                          <a:schemeClr val="bg2"/>
+                        </a:solidFill>
+                        <a:latin typeface="Courier New" panose="02070309020205020404" pitchFamily="49" charset="0"/>
+                        <a:cs typeface="Courier New" panose="02070309020205020404" pitchFamily="49" charset="0"/>
+                      </a:endParaRPr>
+                    </a:p>
+                    <a:p>
+                      <a:r>
+                        <a:rPr lang="en-US" sz="1000" b="0" dirty="0" err="1">
+                          <a:solidFill>
+                            <a:schemeClr val="bg2"/>
+                          </a:solidFill>
+                          <a:latin typeface="Courier New" panose="02070309020205020404" pitchFamily="49" charset="0"/>
+                          <a:cs typeface="Courier New" panose="02070309020205020404" pitchFamily="49" charset="0"/>
+                        </a:rPr>
+                        <a:t>pwd</a:t>
+                      </a:r>
+                      <a:r>
+                        <a:rPr lang="en-US" sz="1000" b="0" dirty="0">
+                          <a:solidFill>
+                            <a:schemeClr val="bg2"/>
+                          </a:solidFill>
+                          <a:latin typeface="Courier New" panose="02070309020205020404" pitchFamily="49" charset="0"/>
+                          <a:cs typeface="Courier New" panose="02070309020205020404" pitchFamily="49" charset="0"/>
+                        </a:rPr>
+                        <a:t> = </a:t>
+                      </a:r>
+                      <a:r>
+                        <a:rPr lang="en-US" sz="1000" b="0" dirty="0" err="1">
+                          <a:solidFill>
+                            <a:schemeClr val="bg2"/>
+                          </a:solidFill>
+                          <a:latin typeface="Courier New" panose="02070309020205020404" pitchFamily="49" charset="0"/>
+                          <a:cs typeface="Courier New" panose="02070309020205020404" pitchFamily="49" charset="0"/>
+                        </a:rPr>
+                        <a:t>abc</a:t>
+                      </a:r>
+                      <a:endParaRPr lang="en-US" sz="1000" b="0" dirty="0">
+                        <a:solidFill>
+                          <a:schemeClr val="bg2"/>
+                        </a:solidFill>
+                        <a:latin typeface="Courier New" panose="02070309020205020404" pitchFamily="49" charset="0"/>
+                        <a:cs typeface="Courier New" panose="02070309020205020404" pitchFamily="49" charset="0"/>
+                      </a:endParaRPr>
+                    </a:p>
+                    <a:p>
+                      <a:endParaRPr lang="en-US" sz="1000" b="0" dirty="0">
+                        <a:solidFill>
+                          <a:schemeClr val="bg2"/>
+                        </a:solidFill>
+                        <a:latin typeface="Courier New" panose="02070309020205020404" pitchFamily="49" charset="0"/>
+                        <a:cs typeface="Courier New" panose="02070309020205020404" pitchFamily="49" charset="0"/>
+                      </a:endParaRPr>
+                    </a:p>
+                    <a:p>
+                      <a:r>
+                        <a:rPr lang="en-US" sz="1000" b="0" dirty="0">
+                          <a:solidFill>
+                            <a:schemeClr val="bg2"/>
+                          </a:solidFill>
+                          <a:latin typeface="Courier New" panose="02070309020205020404" pitchFamily="49" charset="0"/>
+                          <a:cs typeface="Courier New" panose="02070309020205020404" pitchFamily="49" charset="0"/>
+                        </a:rPr>
+                        <a:t>[reinvent]</a:t>
+                      </a:r>
+                    </a:p>
+                    <a:p>
+                      <a:r>
+                        <a:rPr lang="en-US" sz="1000" b="0" dirty="0">
+                          <a:solidFill>
+                            <a:schemeClr val="bg2"/>
+                          </a:solidFill>
+                          <a:latin typeface="Courier New" panose="02070309020205020404" pitchFamily="49" charset="0"/>
+                          <a:cs typeface="Courier New" panose="02070309020205020404" pitchFamily="49" charset="0"/>
+                        </a:rPr>
+                        <a:t>pod = dm-us</a:t>
+                      </a:r>
+                    </a:p>
+                    <a:p>
+                      <a:r>
+                        <a:rPr lang="en-US" sz="1000" b="0" dirty="0">
+                          <a:solidFill>
+                            <a:schemeClr val="bg2"/>
+                          </a:solidFill>
+                          <a:latin typeface="Courier New" panose="02070309020205020404" pitchFamily="49" charset="0"/>
+                          <a:cs typeface="Courier New" panose="02070309020205020404" pitchFamily="49" charset="0"/>
+                        </a:rPr>
+                        <a:t>user = reinvent01</a:t>
+                      </a:r>
+                    </a:p>
+                    <a:p>
+                      <a:r>
+                        <a:rPr lang="en-US" sz="1000" b="0" dirty="0" err="1">
+                          <a:solidFill>
+                            <a:schemeClr val="bg2"/>
+                          </a:solidFill>
+                          <a:latin typeface="Courier New" panose="02070309020205020404" pitchFamily="49" charset="0"/>
+                          <a:cs typeface="Courier New" panose="02070309020205020404" pitchFamily="49" charset="0"/>
+                        </a:rPr>
+                        <a:t>pwd</a:t>
+                      </a:r>
+                      <a:r>
+                        <a:rPr lang="en-US" sz="1000" b="0" dirty="0">
+                          <a:solidFill>
+                            <a:schemeClr val="bg2"/>
+                          </a:solidFill>
+                          <a:latin typeface="Courier New" panose="02070309020205020404" pitchFamily="49" charset="0"/>
+                          <a:cs typeface="Courier New" panose="02070309020205020404" pitchFamily="49" charset="0"/>
+                        </a:rPr>
+                        <a:t> = </a:t>
+                      </a:r>
+                      <a:r>
+                        <a:rPr lang="en-US" sz="1000" b="0" dirty="0" err="1">
+                          <a:solidFill>
+                            <a:schemeClr val="bg2"/>
+                          </a:solidFill>
+                          <a:latin typeface="Courier New" panose="02070309020205020404" pitchFamily="49" charset="0"/>
+                          <a:cs typeface="Courier New" panose="02070309020205020404" pitchFamily="49" charset="0"/>
+                        </a:rPr>
+                        <a:t>zyx</a:t>
+                      </a:r>
+                      <a:endParaRPr lang="en-US" sz="1000" b="0" dirty="0">
                         <a:solidFill>
                           <a:schemeClr val="bg2"/>
                         </a:solidFill>
@@ -29272,15 +30428,6 @@
 </file>
 
 <file path=customXml/item1.xml><?xml version="1.0" encoding="utf-8"?>
-<?mso-contentType ?>
-<FormTemplates xmlns="http://schemas.microsoft.com/sharepoint/v3/contenttype/forms">
-  <Display>DocumentLibraryForm</Display>
-  <Edit>DocumentLibraryForm</Edit>
-  <New>DocumentLibraryForm</New>
-</FormTemplates>
-</file>
-
-<file path=customXml/item2.xml><?xml version="1.0" encoding="utf-8"?>
 <ct:contentTypeSchema xmlns:ct="http://schemas.microsoft.com/office/2006/metadata/contentType" xmlns:ma="http://schemas.microsoft.com/office/2006/metadata/properties/metaAttributes" ct:_="" ma:_="" ma:contentTypeName="Document" ma:contentTypeID="0x0101008F469B9DDCB7884E95DD88D1FAB455BB" ma:contentTypeVersion="4" ma:contentTypeDescription="Create a new document." ma:contentTypeScope="" ma:versionID="2af74787b6fa7b67583c56dc5776735d">
   <xsd:schema xmlns:xsd="http://www.w3.org/2001/XMLSchema" xmlns:xs="http://www.w3.org/2001/XMLSchema" xmlns:p="http://schemas.microsoft.com/office/2006/metadata/properties" xmlns:ns2="d7abb67f-8ba3-4629-af4a-9ad47f056db5" targetNamespace="http://schemas.microsoft.com/office/2006/metadata/properties" ma:root="true" ma:fieldsID="03e5ccd49f08cdc976c4df5b8baab980" ns2:_="">
     <xsd:import namespace="d7abb67f-8ba3-4629-af4a-9ad47f056db5"/>
@@ -29426,15 +30573,16 @@
 </ct:contentTypeSchema>
 </file>
 
-<file path=customXml/itemProps1.xml><?xml version="1.0" encoding="utf-8"?>
-<ds:datastoreItem xmlns:ds="http://schemas.openxmlformats.org/officeDocument/2006/customXml" ds:itemID="{0FFC13DC-9E91-480E-AA50-E69DFCF153D3}">
-  <ds:schemaRefs>
-    <ds:schemaRef ds:uri="http://schemas.microsoft.com/sharepoint/v3/contenttype/forms"/>
-  </ds:schemaRefs>
-</ds:datastoreItem>
+<file path=customXml/item2.xml><?xml version="1.0" encoding="utf-8"?>
+<?mso-contentType ?>
+<FormTemplates xmlns="http://schemas.microsoft.com/sharepoint/v3/contenttype/forms">
+  <Display>DocumentLibraryForm</Display>
+  <Edit>DocumentLibraryForm</Edit>
+  <New>DocumentLibraryForm</New>
+</FormTemplates>
 </file>
 
-<file path=customXml/itemProps2.xml><?xml version="1.0" encoding="utf-8"?>
+<file path=customXml/itemProps1.xml><?xml version="1.0" encoding="utf-8"?>
 <ds:datastoreItem xmlns:ds="http://schemas.openxmlformats.org/officeDocument/2006/customXml" ds:itemID="{5CA5433E-CDB9-440C-BB77-1799205ED86D}">
   <ds:schemaRefs>
     <ds:schemaRef ds:uri="d7abb67f-8ba3-4629-af4a-9ad47f056db5"/>
@@ -29450,4 +30598,18 @@
     <ds:schemaRef ds:uri="http://www.w3.org/2001/XMLSchema"/>
   </ds:schemaRefs>
 </ds:datastoreItem>
+</file>
+
+<file path=customXml/itemProps2.xml><?xml version="1.0" encoding="utf-8"?>
+<ds:datastoreItem xmlns:ds="http://schemas.openxmlformats.org/officeDocument/2006/customXml" ds:itemID="{0FFC13DC-9E91-480E-AA50-E69DFCF153D3}">
+  <ds:schemaRefs>
+    <ds:schemaRef ds:uri="http://schemas.microsoft.com/sharepoint/v3/contenttype/forms"/>
+  </ds:schemaRefs>
+</ds:datastoreItem>
+</file>
+
+<file path=docMetadata/LabelInfo.xml><?xml version="1.0" encoding="utf-8"?>
+<clbl:labelList xmlns:clbl="http://schemas.microsoft.com/office/2020/mipLabelMetadata">
+  <clbl:label id="{14c8150c-bc7e-4d77-82d5-2d0905f0cd74}" enabled="1" method="Standard" siteId="{2638f43e-f77d-4fc7-ab92-7b753b7876fd}" contentBits="0" removed="0"/>
+</clbl:labelList>
 </file>
</xml_diff>

<commit_message>
Version 20241210 Added options for command line arguments
</commit_message>
<xml_diff>
--- a/Custom Lineage Creator.pptx
+++ b/Custom Lineage Creator.pptx
@@ -7,10 +7,10 @@
     <p:sldMasterId id="2147483794" r:id="rId5"/>
   </p:sldMasterIdLst>
   <p:notesMasterIdLst>
-    <p:notesMasterId r:id="rId17"/>
+    <p:notesMasterId r:id="rId20"/>
   </p:notesMasterIdLst>
   <p:handoutMasterIdLst>
-    <p:handoutMasterId r:id="rId18"/>
+    <p:handoutMasterId r:id="rId21"/>
   </p:handoutMasterIdLst>
   <p:sldIdLst>
     <p:sldId id="288" r:id="rId6"/>
@@ -22,8 +22,11 @@
     <p:sldId id="2134807796" r:id="rId12"/>
     <p:sldId id="2134807794" r:id="rId13"/>
     <p:sldId id="2134807795" r:id="rId14"/>
-    <p:sldId id="2134807766" r:id="rId15"/>
-    <p:sldId id="267" r:id="rId16"/>
+    <p:sldId id="2134807798" r:id="rId15"/>
+    <p:sldId id="2134807799" r:id="rId16"/>
+    <p:sldId id="2134807800" r:id="rId17"/>
+    <p:sldId id="2134807766" r:id="rId18"/>
+    <p:sldId id="267" r:id="rId19"/>
   </p:sldIdLst>
   <p:sldSz cx="12188825" cy="6858000"/>
   <p:notesSz cx="7104063" cy="10234613"/>
@@ -136,6 +139,9 @@
             <p14:sldId id="2134807796"/>
             <p14:sldId id="2134807794"/>
             <p14:sldId id="2134807795"/>
+            <p14:sldId id="2134807798"/>
+            <p14:sldId id="2134807799"/>
+            <p14:sldId id="2134807800"/>
             <p14:sldId id="2134807766"/>
           </p14:sldIdLst>
         </p14:section>
@@ -156,16 +162,40 @@
 </p:presentation>
 </file>
 
-<file path=ppt/revisionInfo.xml><?xml version="1.0" encoding="utf-8"?>
-<p1510:revInfo xmlns:a="http://schemas.openxmlformats.org/drawingml/2006/main" xmlns:r="http://schemas.openxmlformats.org/officeDocument/2006/relationships" xmlns:p1510="http://schemas.microsoft.com/office/powerpoint/2015/10/main">
-  <p1510:revLst>
-    <p1510:client id="{59944CAF-F8ED-4690-BAAD-E249041FCA1D}" v="5" dt="2023-12-01T17:19:37.023"/>
-  </p1510:revLst>
-</p1510:revInfo>
-</file>
-
 <file path=ppt/changesInfos/changesInfo1.xml><?xml version="1.0" encoding="utf-8"?>
 <pc:chgInfo xmlns:a="http://schemas.openxmlformats.org/drawingml/2006/main" xmlns:r="http://schemas.openxmlformats.org/officeDocument/2006/relationships" xmlns:ac="http://schemas.microsoft.com/office/drawing/2013/main/command" xmlns:pc="http://schemas.microsoft.com/office/powerpoint/2013/main/command">
+  <pc:docChgLst>
+    <pc:chgData name="Hayes, Scott" userId="bf5043f3-693f-499f-9b13-f0431f1be482" providerId="ADAL" clId="{F4D3FEF4-8E73-4484-8445-EAD7BD181C4E}"/>
+    <pc:docChg chg="modSld">
+      <pc:chgData name="Hayes, Scott" userId="bf5043f3-693f-499f-9b13-f0431f1be482" providerId="ADAL" clId="{F4D3FEF4-8E73-4484-8445-EAD7BD181C4E}" dt="2024-12-03T15:15:07.545" v="7" actId="14861"/>
+      <pc:docMkLst>
+        <pc:docMk/>
+      </pc:docMkLst>
+      <pc:sldChg chg="addSp modSp mod">
+        <pc:chgData name="Hayes, Scott" userId="bf5043f3-693f-499f-9b13-f0431f1be482" providerId="ADAL" clId="{F4D3FEF4-8E73-4484-8445-EAD7BD181C4E}" dt="2024-12-03T15:15:07.545" v="7" actId="14861"/>
+        <pc:sldMkLst>
+          <pc:docMk/>
+          <pc:sldMk cId="3233205923" sldId="2134807745"/>
+        </pc:sldMkLst>
+        <pc:spChg chg="mod">
+          <ac:chgData name="Hayes, Scott" userId="bf5043f3-693f-499f-9b13-f0431f1be482" providerId="ADAL" clId="{F4D3FEF4-8E73-4484-8445-EAD7BD181C4E}" dt="2024-12-03T15:14:52.551" v="5" actId="14100"/>
+          <ac:spMkLst>
+            <pc:docMk/>
+            <pc:sldMk cId="3233205923" sldId="2134807745"/>
+            <ac:spMk id="6" creationId="{9F8FFC18-4FD7-5E97-CCB3-5E13CE612AEB}"/>
+          </ac:spMkLst>
+        </pc:spChg>
+        <pc:picChg chg="add mod">
+          <ac:chgData name="Hayes, Scott" userId="bf5043f3-693f-499f-9b13-f0431f1be482" providerId="ADAL" clId="{F4D3FEF4-8E73-4484-8445-EAD7BD181C4E}" dt="2024-12-03T15:15:07.545" v="7" actId="14861"/>
+          <ac:picMkLst>
+            <pc:docMk/>
+            <pc:sldMk cId="3233205923" sldId="2134807745"/>
+            <ac:picMk id="3" creationId="{6CA0F699-5FCE-5EA2-506B-954C450164B1}"/>
+          </ac:picMkLst>
+        </pc:picChg>
+      </pc:sldChg>
+    </pc:docChg>
+  </pc:docChgLst>
   <pc:docChgLst>
     <pc:chgData name="Hayes, Scott" userId="bf5043f3-693f-499f-9b13-f0431f1be482" providerId="ADAL" clId="{59944CAF-F8ED-4690-BAAD-E249041FCA1D}"/>
     <pc:docChg chg="custSel addSld modSld">
@@ -331,7 +361,7 @@
           <a:p>
             <a:fld id="{A8AF0ABA-1503-4581-BC5A-AF3D56D7DD45}" type="datetimeFigureOut">
               <a:rPr lang="en-US" smtClean="0"/>
-              <a:t>11/22/2024</a:t>
+              <a:t>12/10/2024</a:t>
             </a:fld>
             <a:endParaRPr lang="en-US"/>
           </a:p>
@@ -496,7 +526,7 @@
           <a:p>
             <a:fld id="{78186FDC-CD1E-4E7E-B1CD-1CBCCD519E8C}" type="datetimeFigureOut">
               <a:rPr lang="en-US" smtClean="0"/>
-              <a:t>11/22/2024</a:t>
+              <a:t>12/10/2024</a:t>
             </a:fld>
             <a:endParaRPr lang="en-US"/>
           </a:p>
@@ -1090,6 +1120,258 @@
             <a:spLocks noGrp="1"/>
           </p:cNvSpPr>
           <p:nvPr>
+            <p:ph type="sldNum" sz="quarter" idx="5"/>
+          </p:nvPr>
+        </p:nvSpPr>
+        <p:spPr/>
+        <p:txBody>
+          <a:bodyPr/>
+          <a:lstStyle/>
+          <a:p>
+            <a:fld id="{4B9A8B04-59C6-4476-9B83-8806D24CC38B}" type="slidenum">
+              <a:rPr lang="en-US" smtClean="0"/>
+              <a:t>10</a:t>
+            </a:fld>
+            <a:endParaRPr lang="en-US"/>
+          </a:p>
+        </p:txBody>
+      </p:sp>
+    </p:spTree>
+    <p:extLst>
+      <p:ext uri="{BB962C8B-B14F-4D97-AF65-F5344CB8AC3E}">
+        <p14:creationId xmlns:p14="http://schemas.microsoft.com/office/powerpoint/2010/main" val="286571131"/>
+      </p:ext>
+    </p:extLst>
+  </p:cSld>
+  <p:clrMapOvr>
+    <a:masterClrMapping/>
+  </p:clrMapOvr>
+</p:notes>
+</file>
+
+<file path=ppt/notesSlides/notesSlide5.xml><?xml version="1.0" encoding="utf-8"?>
+<p:notes xmlns:a="http://schemas.openxmlformats.org/drawingml/2006/main" xmlns:r="http://schemas.openxmlformats.org/officeDocument/2006/relationships" xmlns:p="http://schemas.openxmlformats.org/presentationml/2006/main">
+  <p:cSld>
+    <p:spTree>
+      <p:nvGrpSpPr>
+        <p:cNvPr id="1" name=""/>
+        <p:cNvGrpSpPr/>
+        <p:nvPr/>
+      </p:nvGrpSpPr>
+      <p:grpSpPr>
+        <a:xfrm>
+          <a:off x="0" y="0"/>
+          <a:ext cx="0" cy="0"/>
+          <a:chOff x="0" y="0"/>
+          <a:chExt cx="0" cy="0"/>
+        </a:xfrm>
+      </p:grpSpPr>
+      <p:sp>
+        <p:nvSpPr>
+          <p:cNvPr id="2" name="Slide Image Placeholder 1"/>
+          <p:cNvSpPr>
+            <a:spLocks noGrp="1" noRot="1" noChangeAspect="1"/>
+          </p:cNvSpPr>
+          <p:nvPr>
+            <p:ph type="sldImg"/>
+          </p:nvPr>
+        </p:nvSpPr>
+        <p:spPr/>
+      </p:sp>
+      <p:sp>
+        <p:nvSpPr>
+          <p:cNvPr id="3" name="Notes Placeholder 2"/>
+          <p:cNvSpPr>
+            <a:spLocks noGrp="1"/>
+          </p:cNvSpPr>
+          <p:nvPr>
+            <p:ph type="body" idx="1"/>
+          </p:nvPr>
+        </p:nvSpPr>
+        <p:spPr/>
+        <p:txBody>
+          <a:bodyPr/>
+          <a:lstStyle/>
+          <a:p>
+            <a:endParaRPr lang="en-US"/>
+          </a:p>
+        </p:txBody>
+      </p:sp>
+      <p:sp>
+        <p:nvSpPr>
+          <p:cNvPr id="4" name="Slide Number Placeholder 3"/>
+          <p:cNvSpPr>
+            <a:spLocks noGrp="1"/>
+          </p:cNvSpPr>
+          <p:nvPr>
+            <p:ph type="sldNum" sz="quarter" idx="5"/>
+          </p:nvPr>
+        </p:nvSpPr>
+        <p:spPr/>
+        <p:txBody>
+          <a:bodyPr/>
+          <a:lstStyle/>
+          <a:p>
+            <a:fld id="{4B9A8B04-59C6-4476-9B83-8806D24CC38B}" type="slidenum">
+              <a:rPr lang="en-US" smtClean="0"/>
+              <a:t>11</a:t>
+            </a:fld>
+            <a:endParaRPr lang="en-US"/>
+          </a:p>
+        </p:txBody>
+      </p:sp>
+    </p:spTree>
+    <p:extLst>
+      <p:ext uri="{BB962C8B-B14F-4D97-AF65-F5344CB8AC3E}">
+        <p14:creationId xmlns:p14="http://schemas.microsoft.com/office/powerpoint/2010/main" val="460753130"/>
+      </p:ext>
+    </p:extLst>
+  </p:cSld>
+  <p:clrMapOvr>
+    <a:masterClrMapping/>
+  </p:clrMapOvr>
+</p:notes>
+</file>
+
+<file path=ppt/notesSlides/notesSlide6.xml><?xml version="1.0" encoding="utf-8"?>
+<p:notes xmlns:a="http://schemas.openxmlformats.org/drawingml/2006/main" xmlns:r="http://schemas.openxmlformats.org/officeDocument/2006/relationships" xmlns:p="http://schemas.openxmlformats.org/presentationml/2006/main">
+  <p:cSld>
+    <p:spTree>
+      <p:nvGrpSpPr>
+        <p:cNvPr id="1" name=""/>
+        <p:cNvGrpSpPr/>
+        <p:nvPr/>
+      </p:nvGrpSpPr>
+      <p:grpSpPr>
+        <a:xfrm>
+          <a:off x="0" y="0"/>
+          <a:ext cx="0" cy="0"/>
+          <a:chOff x="0" y="0"/>
+          <a:chExt cx="0" cy="0"/>
+        </a:xfrm>
+      </p:grpSpPr>
+      <p:sp>
+        <p:nvSpPr>
+          <p:cNvPr id="2" name="Slide Image Placeholder 1"/>
+          <p:cNvSpPr>
+            <a:spLocks noGrp="1" noRot="1" noChangeAspect="1"/>
+          </p:cNvSpPr>
+          <p:nvPr>
+            <p:ph type="sldImg"/>
+          </p:nvPr>
+        </p:nvSpPr>
+        <p:spPr/>
+      </p:sp>
+      <p:sp>
+        <p:nvSpPr>
+          <p:cNvPr id="3" name="Notes Placeholder 2"/>
+          <p:cNvSpPr>
+            <a:spLocks noGrp="1"/>
+          </p:cNvSpPr>
+          <p:nvPr>
+            <p:ph type="body" idx="1"/>
+          </p:nvPr>
+        </p:nvSpPr>
+        <p:spPr/>
+        <p:txBody>
+          <a:bodyPr/>
+          <a:lstStyle/>
+          <a:p>
+            <a:endParaRPr lang="en-US"/>
+          </a:p>
+        </p:txBody>
+      </p:sp>
+      <p:sp>
+        <p:nvSpPr>
+          <p:cNvPr id="4" name="Slide Number Placeholder 3"/>
+          <p:cNvSpPr>
+            <a:spLocks noGrp="1"/>
+          </p:cNvSpPr>
+          <p:nvPr>
+            <p:ph type="sldNum" sz="quarter" idx="5"/>
+          </p:nvPr>
+        </p:nvSpPr>
+        <p:spPr/>
+        <p:txBody>
+          <a:bodyPr/>
+          <a:lstStyle/>
+          <a:p>
+            <a:fld id="{4B9A8B04-59C6-4476-9B83-8806D24CC38B}" type="slidenum">
+              <a:rPr lang="en-US" smtClean="0"/>
+              <a:t>12</a:t>
+            </a:fld>
+            <a:endParaRPr lang="en-US"/>
+          </a:p>
+        </p:txBody>
+      </p:sp>
+    </p:spTree>
+    <p:extLst>
+      <p:ext uri="{BB962C8B-B14F-4D97-AF65-F5344CB8AC3E}">
+        <p14:creationId xmlns:p14="http://schemas.microsoft.com/office/powerpoint/2010/main" val="4227166499"/>
+      </p:ext>
+    </p:extLst>
+  </p:cSld>
+  <p:clrMapOvr>
+    <a:masterClrMapping/>
+  </p:clrMapOvr>
+</p:notes>
+</file>
+
+<file path=ppt/notesSlides/notesSlide7.xml><?xml version="1.0" encoding="utf-8"?>
+<p:notes xmlns:a="http://schemas.openxmlformats.org/drawingml/2006/main" xmlns:r="http://schemas.openxmlformats.org/officeDocument/2006/relationships" xmlns:p="http://schemas.openxmlformats.org/presentationml/2006/main">
+  <p:cSld>
+    <p:spTree>
+      <p:nvGrpSpPr>
+        <p:cNvPr id="1" name=""/>
+        <p:cNvGrpSpPr/>
+        <p:nvPr/>
+      </p:nvGrpSpPr>
+      <p:grpSpPr>
+        <a:xfrm>
+          <a:off x="0" y="0"/>
+          <a:ext cx="0" cy="0"/>
+          <a:chOff x="0" y="0"/>
+          <a:chExt cx="0" cy="0"/>
+        </a:xfrm>
+      </p:grpSpPr>
+      <p:sp>
+        <p:nvSpPr>
+          <p:cNvPr id="2" name="Slide Image Placeholder 1"/>
+          <p:cNvSpPr>
+            <a:spLocks noGrp="1" noRot="1" noChangeAspect="1"/>
+          </p:cNvSpPr>
+          <p:nvPr>
+            <p:ph type="sldImg"/>
+          </p:nvPr>
+        </p:nvSpPr>
+        <p:spPr/>
+      </p:sp>
+      <p:sp>
+        <p:nvSpPr>
+          <p:cNvPr id="3" name="Notes Placeholder 2"/>
+          <p:cNvSpPr>
+            <a:spLocks noGrp="1"/>
+          </p:cNvSpPr>
+          <p:nvPr>
+            <p:ph type="body" idx="1"/>
+          </p:nvPr>
+        </p:nvSpPr>
+        <p:spPr/>
+        <p:txBody>
+          <a:bodyPr/>
+          <a:lstStyle/>
+          <a:p>
+            <a:endParaRPr lang="en-US"/>
+          </a:p>
+        </p:txBody>
+      </p:sp>
+      <p:sp>
+        <p:nvSpPr>
+          <p:cNvPr id="4" name="Slide Number Placeholder 3"/>
+          <p:cNvSpPr>
+            <a:spLocks noGrp="1"/>
+          </p:cNvSpPr>
+          <p:nvPr>
             <p:ph type="sldNum" sz="quarter" idx="10"/>
           </p:nvPr>
         </p:nvSpPr>
@@ -1100,7 +1382,7 @@
           <a:p>
             <a:fld id="{4B9A8B04-59C6-4476-9B83-8806D24CC38B}" type="slidenum">
               <a:rPr lang="en-US" smtClean="0"/>
-              <a:t>11</a:t>
+              <a:t>14</a:t>
             </a:fld>
             <a:endParaRPr lang="en-US"/>
           </a:p>
@@ -22462,6 +22744,3460 @@
 </file>
 
 <file path=ppt/slides/slide10.xml><?xml version="1.0" encoding="utf-8"?>
+<p:sld xmlns:a="http://schemas.openxmlformats.org/drawingml/2006/main" xmlns:r="http://schemas.openxmlformats.org/officeDocument/2006/relationships" xmlns:p="http://schemas.openxmlformats.org/presentationml/2006/main">
+  <p:cSld>
+    <p:spTree>
+      <p:nvGrpSpPr>
+        <p:cNvPr id="1" name=""/>
+        <p:cNvGrpSpPr/>
+        <p:nvPr/>
+      </p:nvGrpSpPr>
+      <p:grpSpPr>
+        <a:xfrm>
+          <a:off x="0" y="0"/>
+          <a:ext cx="0" cy="0"/>
+          <a:chOff x="0" y="0"/>
+          <a:chExt cx="0" cy="0"/>
+        </a:xfrm>
+      </p:grpSpPr>
+      <p:sp>
+        <p:nvSpPr>
+          <p:cNvPr id="5" name="Title 4">
+            <a:extLst>
+              <a:ext uri="{FF2B5EF4-FFF2-40B4-BE49-F238E27FC236}">
+                <a16:creationId xmlns:a16="http://schemas.microsoft.com/office/drawing/2014/main" id="{C2B479B7-4E1E-475F-B459-5CE8B05302D3}"/>
+              </a:ext>
+            </a:extLst>
+          </p:cNvPr>
+          <p:cNvSpPr>
+            <a:spLocks noGrp="1"/>
+          </p:cNvSpPr>
+          <p:nvPr>
+            <p:ph type="title"/>
+          </p:nvPr>
+        </p:nvSpPr>
+        <p:spPr>
+          <a:xfrm>
+            <a:off x="319060" y="187082"/>
+            <a:ext cx="11195177" cy="562427"/>
+          </a:xfrm>
+        </p:spPr>
+        <p:txBody>
+          <a:bodyPr/>
+          <a:lstStyle/>
+          <a:p>
+            <a:r>
+              <a:rPr lang="en-US" dirty="0"/>
+              <a:t>Usage </a:t>
+            </a:r>
+            <a:r>
+              <a:rPr lang="en-US" sz="2400" dirty="0"/>
+              <a:t>(optional parameters)</a:t>
+            </a:r>
+            <a:endParaRPr lang="en-IN" sz="2400" dirty="0"/>
+          </a:p>
+        </p:txBody>
+      </p:sp>
+      <p:sp>
+        <p:nvSpPr>
+          <p:cNvPr id="16" name="Content Placeholder 13">
+            <a:extLst>
+              <a:ext uri="{FF2B5EF4-FFF2-40B4-BE49-F238E27FC236}">
+                <a16:creationId xmlns:a16="http://schemas.microsoft.com/office/drawing/2014/main" id="{807EB0DB-72EF-4CAE-8A2F-F7E55C093081}"/>
+              </a:ext>
+            </a:extLst>
+          </p:cNvPr>
+          <p:cNvSpPr txBox="1">
+            <a:spLocks/>
+          </p:cNvSpPr>
+          <p:nvPr/>
+        </p:nvSpPr>
+        <p:spPr>
+          <a:xfrm>
+            <a:off x="1180247" y="1610532"/>
+            <a:ext cx="3180631" cy="2562457"/>
+          </a:xfrm>
+          <a:prstGeom prst="rect">
+            <a:avLst/>
+          </a:prstGeom>
+        </p:spPr>
+        <p:txBody>
+          <a:bodyPr vert="horz" lIns="0" tIns="0" rIns="0" bIns="0" rtlCol="0">
+            <a:noAutofit/>
+          </a:bodyPr>
+          <a:lstStyle>
+            <a:lvl1pPr marL="173038" indent="-173038" algn="l" defTabSz="914217" rtl="0" eaLnBrk="1" latinLnBrk="0" hangingPunct="1">
+              <a:lnSpc>
+                <a:spcPct val="90000"/>
+              </a:lnSpc>
+              <a:spcBef>
+                <a:spcPts val="400"/>
+              </a:spcBef>
+              <a:spcAft>
+                <a:spcPts val="1200"/>
+              </a:spcAft>
+              <a:buClr>
+                <a:schemeClr val="accent2"/>
+              </a:buClr>
+              <a:buFont typeface="Arial" panose="020B0604020202020204" pitchFamily="34" charset="0"/>
+              <a:buChar char="•"/>
+              <a:defRPr sz="2100" b="0" i="0" kern="1200" baseline="0">
+                <a:solidFill>
+                  <a:schemeClr val="tx1"/>
+                </a:solidFill>
+                <a:latin typeface="Roboto" charset="0"/>
+                <a:ea typeface="Roboto" charset="0"/>
+                <a:cs typeface="Roboto" charset="0"/>
+              </a:defRPr>
+            </a:lvl1pPr>
+            <a:lvl2pPr marL="344488" indent="-174625" algn="l" defTabSz="914217" rtl="0" eaLnBrk="1" latinLnBrk="0" hangingPunct="1">
+              <a:lnSpc>
+                <a:spcPct val="90000"/>
+              </a:lnSpc>
+              <a:spcBef>
+                <a:spcPts val="0"/>
+              </a:spcBef>
+              <a:spcAft>
+                <a:spcPts val="1200"/>
+              </a:spcAft>
+              <a:buClr>
+                <a:schemeClr val="accent2"/>
+              </a:buClr>
+              <a:buFont typeface="Arial" panose="020B0604020202020204" pitchFamily="34" charset="0"/>
+              <a:buChar char="•"/>
+              <a:defRPr sz="1800" b="0" i="0" kern="1200" baseline="0">
+                <a:solidFill>
+                  <a:schemeClr val="tx1"/>
+                </a:solidFill>
+                <a:latin typeface="Roboto" charset="0"/>
+                <a:ea typeface="Roboto" charset="0"/>
+                <a:cs typeface="Roboto" charset="0"/>
+              </a:defRPr>
+            </a:lvl2pPr>
+            <a:lvl3pPr marL="514350" indent="-169863" algn="l" defTabSz="914217" rtl="0" eaLnBrk="1" latinLnBrk="0" hangingPunct="1">
+              <a:lnSpc>
+                <a:spcPct val="90000"/>
+              </a:lnSpc>
+              <a:spcBef>
+                <a:spcPts val="0"/>
+              </a:spcBef>
+              <a:spcAft>
+                <a:spcPts val="1200"/>
+              </a:spcAft>
+              <a:buClr>
+                <a:schemeClr val="accent2"/>
+              </a:buClr>
+              <a:buFont typeface="Arial" panose="020B0604020202020204" pitchFamily="34" charset="0"/>
+              <a:buChar char="•"/>
+              <a:defRPr sz="1600" b="0" i="0" kern="1200">
+                <a:solidFill>
+                  <a:schemeClr val="tx1"/>
+                </a:solidFill>
+                <a:latin typeface="Roboto" charset="0"/>
+                <a:ea typeface="Roboto" charset="0"/>
+                <a:cs typeface="Roboto" charset="0"/>
+              </a:defRPr>
+            </a:lvl3pPr>
+            <a:lvl4pPr marL="630238" indent="-171450" algn="l" defTabSz="914217" rtl="0" eaLnBrk="1" latinLnBrk="0" hangingPunct="1">
+              <a:lnSpc>
+                <a:spcPct val="90000"/>
+              </a:lnSpc>
+              <a:spcBef>
+                <a:spcPts val="0"/>
+              </a:spcBef>
+              <a:spcAft>
+                <a:spcPts val="1200"/>
+              </a:spcAft>
+              <a:buClr>
+                <a:schemeClr val="accent2"/>
+              </a:buClr>
+              <a:buFont typeface="Arial" panose="020B0604020202020204" pitchFamily="34" charset="0"/>
+              <a:buChar char="•"/>
+              <a:defRPr sz="1400" b="0" i="0" kern="1200">
+                <a:solidFill>
+                  <a:schemeClr val="tx1"/>
+                </a:solidFill>
+                <a:latin typeface="Roboto" charset="0"/>
+                <a:ea typeface="Roboto" charset="0"/>
+                <a:cs typeface="Roboto" charset="0"/>
+              </a:defRPr>
+            </a:lvl4pPr>
+            <a:lvl5pPr marL="800100" indent="-169863" algn="l" defTabSz="914217" rtl="0" eaLnBrk="1" latinLnBrk="0" hangingPunct="1">
+              <a:lnSpc>
+                <a:spcPct val="90000"/>
+              </a:lnSpc>
+              <a:spcBef>
+                <a:spcPts val="0"/>
+              </a:spcBef>
+              <a:spcAft>
+                <a:spcPts val="1200"/>
+              </a:spcAft>
+              <a:buClr>
+                <a:schemeClr val="accent2"/>
+              </a:buClr>
+              <a:buFont typeface="Arial" panose="020B0604020202020204" pitchFamily="34" charset="0"/>
+              <a:buChar char="•"/>
+              <a:defRPr sz="1400" b="0" i="0" kern="1200">
+                <a:solidFill>
+                  <a:schemeClr val="tx1"/>
+                </a:solidFill>
+                <a:latin typeface="Roboto" charset="0"/>
+                <a:ea typeface="Roboto" charset="0"/>
+                <a:cs typeface="Roboto" charset="0"/>
+              </a:defRPr>
+            </a:lvl5pPr>
+            <a:lvl6pPr marL="914400" indent="-169863" algn="l" defTabSz="914217" rtl="0" eaLnBrk="1" latinLnBrk="0" hangingPunct="1">
+              <a:lnSpc>
+                <a:spcPct val="90000"/>
+              </a:lnSpc>
+              <a:spcBef>
+                <a:spcPts val="500"/>
+              </a:spcBef>
+              <a:spcAft>
+                <a:spcPts val="1200"/>
+              </a:spcAft>
+              <a:buClr>
+                <a:schemeClr val="accent2"/>
+              </a:buClr>
+              <a:buFont typeface="Arial" panose="020B0604020202020204" pitchFamily="34" charset="0"/>
+              <a:buChar char="•"/>
+              <a:defRPr sz="1200" b="0" i="0" kern="1200">
+                <a:solidFill>
+                  <a:schemeClr val="tx1"/>
+                </a:solidFill>
+                <a:latin typeface="Roboto" charset="0"/>
+                <a:ea typeface="Roboto" charset="0"/>
+                <a:cs typeface="Roboto" charset="0"/>
+              </a:defRPr>
+            </a:lvl6pPr>
+            <a:lvl7pPr marL="1084263" indent="-169863" algn="l" defTabSz="914217" rtl="0" eaLnBrk="1" latinLnBrk="0" hangingPunct="1">
+              <a:lnSpc>
+                <a:spcPct val="90000"/>
+              </a:lnSpc>
+              <a:spcBef>
+                <a:spcPts val="500"/>
+              </a:spcBef>
+              <a:spcAft>
+                <a:spcPts val="1200"/>
+              </a:spcAft>
+              <a:buClr>
+                <a:schemeClr val="accent2"/>
+              </a:buClr>
+              <a:buFont typeface="Arial" panose="020B0604020202020204" pitchFamily="34" charset="0"/>
+              <a:buChar char="•"/>
+              <a:defRPr sz="1200" b="0" i="0" kern="1200">
+                <a:solidFill>
+                  <a:schemeClr val="tx1"/>
+                </a:solidFill>
+                <a:latin typeface="Roboto" charset="0"/>
+                <a:ea typeface="Roboto" charset="0"/>
+                <a:cs typeface="Roboto" charset="0"/>
+              </a:defRPr>
+            </a:lvl7pPr>
+            <a:lvl8pPr marL="1258888" indent="-174625" algn="l" defTabSz="914217" rtl="0" eaLnBrk="1" latinLnBrk="0" hangingPunct="1">
+              <a:lnSpc>
+                <a:spcPct val="90000"/>
+              </a:lnSpc>
+              <a:spcBef>
+                <a:spcPts val="500"/>
+              </a:spcBef>
+              <a:spcAft>
+                <a:spcPts val="1200"/>
+              </a:spcAft>
+              <a:buClr>
+                <a:schemeClr val="accent2"/>
+              </a:buClr>
+              <a:buFont typeface="Arial" panose="020B0604020202020204" pitchFamily="34" charset="0"/>
+              <a:buChar char="•"/>
+              <a:defRPr sz="1200" b="0" i="0" kern="1200">
+                <a:solidFill>
+                  <a:schemeClr val="tx1"/>
+                </a:solidFill>
+                <a:latin typeface="Roboto" charset="0"/>
+                <a:ea typeface="Roboto" charset="0"/>
+                <a:cs typeface="Roboto" charset="0"/>
+              </a:defRPr>
+            </a:lvl8pPr>
+            <a:lvl9pPr marL="1428750" indent="-169863" algn="l" defTabSz="914217" rtl="0" eaLnBrk="1" latinLnBrk="0" hangingPunct="1">
+              <a:lnSpc>
+                <a:spcPct val="90000"/>
+              </a:lnSpc>
+              <a:spcBef>
+                <a:spcPts val="500"/>
+              </a:spcBef>
+              <a:spcAft>
+                <a:spcPts val="1200"/>
+              </a:spcAft>
+              <a:buClr>
+                <a:schemeClr val="accent2"/>
+              </a:buClr>
+              <a:buFont typeface="Arial" panose="020B0604020202020204" pitchFamily="34" charset="0"/>
+              <a:buChar char="•"/>
+              <a:defRPr sz="1200" b="0" i="0" kern="1200">
+                <a:solidFill>
+                  <a:schemeClr val="tx1"/>
+                </a:solidFill>
+                <a:latin typeface="Roboto" charset="0"/>
+                <a:ea typeface="Roboto" charset="0"/>
+                <a:cs typeface="Roboto" charset="0"/>
+              </a:defRPr>
+            </a:lvl9pPr>
+          </a:lstStyle>
+          <a:p>
+            <a:pPr marL="0" indent="0">
+              <a:buNone/>
+            </a:pPr>
+            <a:endParaRPr lang="en-IN" sz="1600" dirty="0"/>
+          </a:p>
+        </p:txBody>
+      </p:sp>
+      <p:sp>
+        <p:nvSpPr>
+          <p:cNvPr id="6" name="TextBox 5">
+            <a:extLst>
+              <a:ext uri="{FF2B5EF4-FFF2-40B4-BE49-F238E27FC236}">
+                <a16:creationId xmlns:a16="http://schemas.microsoft.com/office/drawing/2014/main" id="{9F8FFC18-4FD7-5E97-CCB3-5E13CE612AEB}"/>
+              </a:ext>
+            </a:extLst>
+          </p:cNvPr>
+          <p:cNvSpPr txBox="1"/>
+          <p:nvPr/>
+        </p:nvSpPr>
+        <p:spPr>
+          <a:xfrm>
+            <a:off x="595566" y="761084"/>
+            <a:ext cx="11195176" cy="5414224"/>
+          </a:xfrm>
+          <a:prstGeom prst="rect">
+            <a:avLst/>
+          </a:prstGeom>
+          <a:noFill/>
+        </p:spPr>
+        <p:txBody>
+          <a:bodyPr wrap="square" lIns="0" tIns="0" rIns="0" bIns="0" rtlCol="0">
+            <a:noAutofit/>
+          </a:bodyPr>
+          <a:lstStyle/>
+          <a:p>
+            <a:r>
+              <a:rPr lang="en-US" sz="900" dirty="0">
+                <a:latin typeface="Roboto" charset="0"/>
+                <a:ea typeface="Roboto" charset="0"/>
+                <a:cs typeface="Roboto" charset="0"/>
+              </a:rPr>
+              <a:t>Optionally, you can set parameters:</a:t>
+            </a:r>
+          </a:p>
+          <a:p>
+            <a:endParaRPr lang="en-US" sz="900" dirty="0">
+              <a:latin typeface="Roboto" charset="0"/>
+              <a:ea typeface="Roboto" charset="0"/>
+              <a:cs typeface="Roboto" charset="0"/>
+            </a:endParaRPr>
+          </a:p>
+          <a:p>
+            <a:r>
+              <a:rPr lang="en-US" sz="900" dirty="0">
+                <a:latin typeface="Roboto" charset="0"/>
+                <a:ea typeface="Roboto" charset="0"/>
+                <a:cs typeface="Roboto" charset="0"/>
+              </a:rPr>
+              <a:t>   --help</a:t>
+            </a:r>
+          </a:p>
+          <a:p>
+            <a:r>
+              <a:rPr lang="en-US" sz="900" dirty="0">
+                <a:latin typeface="Roboto" charset="0"/>
+                <a:ea typeface="Roboto" charset="0"/>
+                <a:cs typeface="Roboto" charset="0"/>
+              </a:rPr>
+              <a:t>        Providing this parameter, will list all the options, and exit</a:t>
+            </a:r>
+          </a:p>
+          <a:p>
+            <a:endParaRPr lang="en-US" sz="900" dirty="0">
+              <a:latin typeface="Roboto" charset="0"/>
+              <a:ea typeface="Roboto" charset="0"/>
+              <a:cs typeface="Roboto" charset="0"/>
+            </a:endParaRPr>
+          </a:p>
+          <a:p>
+            <a:r>
+              <a:rPr lang="en-US" sz="900" dirty="0">
+                <a:latin typeface="Roboto" charset="0"/>
+                <a:ea typeface="Roboto" charset="0"/>
+                <a:cs typeface="Roboto" charset="0"/>
+              </a:rPr>
+              <a:t>   --</a:t>
+            </a:r>
+            <a:r>
+              <a:rPr lang="en-US" sz="900" dirty="0" err="1">
+                <a:latin typeface="Roboto" charset="0"/>
+                <a:ea typeface="Roboto" charset="0"/>
+                <a:cs typeface="Roboto" charset="0"/>
+              </a:rPr>
+              <a:t>default_user</a:t>
+            </a:r>
+            <a:endParaRPr lang="en-US" sz="900" dirty="0">
+              <a:latin typeface="Roboto" charset="0"/>
+              <a:ea typeface="Roboto" charset="0"/>
+              <a:cs typeface="Roboto" charset="0"/>
+            </a:endParaRPr>
+          </a:p>
+          <a:p>
+            <a:r>
+              <a:rPr lang="en-US" sz="900" dirty="0">
+                <a:latin typeface="Roboto" charset="0"/>
+                <a:ea typeface="Roboto" charset="0"/>
+                <a:cs typeface="Roboto" charset="0"/>
+              </a:rPr>
+              <a:t>        You can specify the username to use. if you do now specify one, it will look in the ~/.</a:t>
+            </a:r>
+            <a:r>
+              <a:rPr lang="en-US" sz="900" dirty="0" err="1">
+                <a:latin typeface="Roboto" charset="0"/>
+                <a:ea typeface="Roboto" charset="0"/>
+                <a:cs typeface="Roboto" charset="0"/>
+              </a:rPr>
+              <a:t>informatica_cdgc</a:t>
+            </a:r>
+            <a:r>
+              <a:rPr lang="en-US" sz="900" dirty="0">
+                <a:latin typeface="Roboto" charset="0"/>
+                <a:ea typeface="Roboto" charset="0"/>
+                <a:cs typeface="Roboto" charset="0"/>
+              </a:rPr>
+              <a:t>/credentials file (as shown below)</a:t>
+            </a:r>
+          </a:p>
+          <a:p>
+            <a:r>
+              <a:rPr lang="en-US" sz="900" dirty="0">
+                <a:latin typeface="Roboto" charset="0"/>
+                <a:ea typeface="Roboto" charset="0"/>
+                <a:cs typeface="Roboto" charset="0"/>
+              </a:rPr>
+              <a:t>        Example:</a:t>
+            </a:r>
+          </a:p>
+          <a:p>
+            <a:r>
+              <a:rPr lang="en-US" sz="900" dirty="0">
+                <a:latin typeface="Roboto" charset="0"/>
+                <a:ea typeface="Roboto" charset="0"/>
+                <a:cs typeface="Roboto" charset="0"/>
+              </a:rPr>
+              <a:t>            --</a:t>
+            </a:r>
+            <a:r>
+              <a:rPr lang="en-US" sz="900" dirty="0" err="1">
+                <a:latin typeface="Roboto" charset="0"/>
+                <a:ea typeface="Roboto" charset="0"/>
+                <a:cs typeface="Roboto" charset="0"/>
+              </a:rPr>
+              <a:t>default_user</a:t>
+            </a:r>
+            <a:r>
+              <a:rPr lang="en-US" sz="900" dirty="0">
+                <a:latin typeface="Roboto" charset="0"/>
+                <a:ea typeface="Roboto" charset="0"/>
+                <a:cs typeface="Roboto" charset="0"/>
+              </a:rPr>
+              <a:t>=</a:t>
+            </a:r>
+            <a:r>
+              <a:rPr lang="en-US" sz="900" dirty="0" err="1">
+                <a:latin typeface="Roboto" charset="0"/>
+                <a:ea typeface="Roboto" charset="0"/>
+                <a:cs typeface="Roboto" charset="0"/>
+              </a:rPr>
+              <a:t>shayes_compass</a:t>
+            </a:r>
+            <a:endParaRPr lang="en-US" sz="900" dirty="0">
+              <a:latin typeface="Roboto" charset="0"/>
+              <a:ea typeface="Roboto" charset="0"/>
+              <a:cs typeface="Roboto" charset="0"/>
+            </a:endParaRPr>
+          </a:p>
+          <a:p>
+            <a:endParaRPr lang="en-US" sz="900" dirty="0">
+              <a:latin typeface="Roboto" charset="0"/>
+              <a:ea typeface="Roboto" charset="0"/>
+              <a:cs typeface="Roboto" charset="0"/>
+            </a:endParaRPr>
+          </a:p>
+          <a:p>
+            <a:r>
+              <a:rPr lang="en-US" sz="900" dirty="0">
+                <a:latin typeface="Roboto" charset="0"/>
+                <a:ea typeface="Roboto" charset="0"/>
+                <a:cs typeface="Roboto" charset="0"/>
+              </a:rPr>
+              <a:t>   --</a:t>
+            </a:r>
+            <a:r>
+              <a:rPr lang="en-US" sz="900" dirty="0" err="1">
+                <a:latin typeface="Roboto" charset="0"/>
+                <a:ea typeface="Roboto" charset="0"/>
+                <a:cs typeface="Roboto" charset="0"/>
+              </a:rPr>
+              <a:t>default_pwd</a:t>
+            </a:r>
+            <a:endParaRPr lang="en-US" sz="900" dirty="0">
+              <a:latin typeface="Roboto" charset="0"/>
+              <a:ea typeface="Roboto" charset="0"/>
+              <a:cs typeface="Roboto" charset="0"/>
+            </a:endParaRPr>
+          </a:p>
+          <a:p>
+            <a:r>
+              <a:rPr lang="en-US" sz="900" dirty="0">
+                <a:latin typeface="Roboto" charset="0"/>
+                <a:ea typeface="Roboto" charset="0"/>
+                <a:cs typeface="Roboto" charset="0"/>
+              </a:rPr>
+              <a:t>        You can specify the password to use. if you do now specify one, it will look in the  ~/.</a:t>
+            </a:r>
+            <a:r>
+              <a:rPr lang="en-US" sz="900" dirty="0" err="1">
+                <a:latin typeface="Roboto" charset="0"/>
+                <a:ea typeface="Roboto" charset="0"/>
+                <a:cs typeface="Roboto" charset="0"/>
+              </a:rPr>
+              <a:t>informatica_cdgc</a:t>
+            </a:r>
+            <a:r>
+              <a:rPr lang="en-US" sz="900" dirty="0">
+                <a:latin typeface="Roboto" charset="0"/>
+                <a:ea typeface="Roboto" charset="0"/>
+                <a:cs typeface="Roboto" charset="0"/>
+              </a:rPr>
+              <a:t>/credentials file (as shown below)</a:t>
+            </a:r>
+          </a:p>
+          <a:p>
+            <a:r>
+              <a:rPr lang="en-US" sz="900" dirty="0">
+                <a:latin typeface="Roboto" charset="0"/>
+                <a:ea typeface="Roboto" charset="0"/>
+                <a:cs typeface="Roboto" charset="0"/>
+              </a:rPr>
+              <a:t>        Example:</a:t>
+            </a:r>
+          </a:p>
+          <a:p>
+            <a:r>
+              <a:rPr lang="en-US" sz="900" dirty="0">
+                <a:latin typeface="Roboto" charset="0"/>
+                <a:ea typeface="Roboto" charset="0"/>
+                <a:cs typeface="Roboto" charset="0"/>
+              </a:rPr>
+              <a:t>            --</a:t>
+            </a:r>
+            <a:r>
+              <a:rPr lang="en-US" sz="900" dirty="0" err="1">
+                <a:latin typeface="Roboto" charset="0"/>
+                <a:ea typeface="Roboto" charset="0"/>
+                <a:cs typeface="Roboto" charset="0"/>
+              </a:rPr>
+              <a:t>default_pwd</a:t>
+            </a:r>
+            <a:r>
+              <a:rPr lang="en-US" sz="900" dirty="0">
+                <a:latin typeface="Roboto" charset="0"/>
+                <a:ea typeface="Roboto" charset="0"/>
+                <a:cs typeface="Roboto" charset="0"/>
+              </a:rPr>
+              <a:t>=12345</a:t>
+            </a:r>
+          </a:p>
+          <a:p>
+            <a:endParaRPr lang="en-US" sz="900" dirty="0">
+              <a:latin typeface="Roboto" charset="0"/>
+              <a:ea typeface="Roboto" charset="0"/>
+              <a:cs typeface="Roboto" charset="0"/>
+            </a:endParaRPr>
+          </a:p>
+          <a:p>
+            <a:r>
+              <a:rPr lang="en-US" sz="900" dirty="0">
+                <a:latin typeface="Roboto" charset="0"/>
+                <a:ea typeface="Roboto" charset="0"/>
+                <a:cs typeface="Roboto" charset="0"/>
+              </a:rPr>
+              <a:t>   --</a:t>
+            </a:r>
+            <a:r>
+              <a:rPr lang="en-US" sz="900" dirty="0" err="1">
+                <a:latin typeface="Roboto" charset="0"/>
+                <a:ea typeface="Roboto" charset="0"/>
+                <a:cs typeface="Roboto" charset="0"/>
+              </a:rPr>
+              <a:t>default_pod</a:t>
+            </a:r>
+            <a:endParaRPr lang="en-US" sz="900" dirty="0">
+              <a:latin typeface="Roboto" charset="0"/>
+              <a:ea typeface="Roboto" charset="0"/>
+              <a:cs typeface="Roboto" charset="0"/>
+            </a:endParaRPr>
+          </a:p>
+          <a:p>
+            <a:r>
+              <a:rPr lang="en-US" sz="900" dirty="0">
+                <a:latin typeface="Roboto" charset="0"/>
+                <a:ea typeface="Roboto" charset="0"/>
+                <a:cs typeface="Roboto" charset="0"/>
+              </a:rPr>
+              <a:t>        You can specify the pod to use. if you do now specify one, it will look in the ~/.</a:t>
+            </a:r>
+            <a:r>
+              <a:rPr lang="en-US" sz="900" dirty="0" err="1">
+                <a:latin typeface="Roboto" charset="0"/>
+                <a:ea typeface="Roboto" charset="0"/>
+                <a:cs typeface="Roboto" charset="0"/>
+              </a:rPr>
+              <a:t>informatica_cdgc</a:t>
+            </a:r>
+            <a:r>
+              <a:rPr lang="en-US" sz="900" dirty="0">
+                <a:latin typeface="Roboto" charset="0"/>
+                <a:ea typeface="Roboto" charset="0"/>
+                <a:cs typeface="Roboto" charset="0"/>
+              </a:rPr>
+              <a:t>/credentials file (as shown below) Typically this "pod" can be shown in the url: for example: "dm-us"</a:t>
+            </a:r>
+          </a:p>
+          <a:p>
+            <a:r>
+              <a:rPr lang="en-US" sz="900" dirty="0">
+                <a:latin typeface="Roboto" charset="0"/>
+                <a:ea typeface="Roboto" charset="0"/>
+                <a:cs typeface="Roboto" charset="0"/>
+              </a:rPr>
+              <a:t>        Example:</a:t>
+            </a:r>
+          </a:p>
+          <a:p>
+            <a:r>
+              <a:rPr lang="en-US" sz="900" dirty="0">
+                <a:latin typeface="Roboto" charset="0"/>
+                <a:ea typeface="Roboto" charset="0"/>
+                <a:cs typeface="Roboto" charset="0"/>
+              </a:rPr>
+              <a:t>            --</a:t>
+            </a:r>
+            <a:r>
+              <a:rPr lang="en-US" sz="900" dirty="0" err="1">
+                <a:latin typeface="Roboto" charset="0"/>
+                <a:ea typeface="Roboto" charset="0"/>
+                <a:cs typeface="Roboto" charset="0"/>
+              </a:rPr>
+              <a:t>default_pwd</a:t>
+            </a:r>
+            <a:r>
+              <a:rPr lang="en-US" sz="900" dirty="0">
+                <a:latin typeface="Roboto" charset="0"/>
+                <a:ea typeface="Roboto" charset="0"/>
+                <a:cs typeface="Roboto" charset="0"/>
+              </a:rPr>
+              <a:t>=dm-us  </a:t>
+            </a:r>
+          </a:p>
+          <a:p>
+            <a:endParaRPr lang="en-US" sz="900" dirty="0">
+              <a:latin typeface="Roboto" charset="0"/>
+              <a:ea typeface="Roboto" charset="0"/>
+              <a:cs typeface="Roboto" charset="0"/>
+            </a:endParaRPr>
+          </a:p>
+          <a:p>
+            <a:r>
+              <a:rPr lang="en-US" sz="900" dirty="0">
+                <a:latin typeface="Roboto" charset="0"/>
+                <a:ea typeface="Roboto" charset="0"/>
+                <a:cs typeface="Roboto" charset="0"/>
+              </a:rPr>
+              <a:t>   --</a:t>
+            </a:r>
+            <a:r>
+              <a:rPr lang="en-US" sz="900" dirty="0" err="1">
+                <a:latin typeface="Roboto" charset="0"/>
+                <a:ea typeface="Roboto" charset="0"/>
+                <a:cs typeface="Roboto" charset="0"/>
+              </a:rPr>
+              <a:t>prompt_for_login_info</a:t>
+            </a:r>
+            <a:r>
+              <a:rPr lang="en-US" sz="900" dirty="0">
+                <a:latin typeface="Roboto" charset="0"/>
+                <a:ea typeface="Roboto" charset="0"/>
+                <a:cs typeface="Roboto" charset="0"/>
+              </a:rPr>
+              <a:t>            </a:t>
+            </a:r>
+          </a:p>
+          <a:p>
+            <a:r>
+              <a:rPr lang="en-US" sz="900" dirty="0">
+                <a:latin typeface="Roboto" charset="0"/>
+                <a:ea typeface="Roboto" charset="0"/>
+                <a:cs typeface="Roboto" charset="0"/>
+              </a:rPr>
+              <a:t>        Is set to False, it will not prompt to confirm credentials, unless needed. So, if a [default] profile is set in credentials file, or if credentials provided on the command line, it won't prompt. This defaults to True</a:t>
+            </a:r>
+          </a:p>
+          <a:p>
+            <a:r>
+              <a:rPr lang="en-US" sz="900" dirty="0">
+                <a:latin typeface="Roboto" charset="0"/>
+                <a:ea typeface="Roboto" charset="0"/>
+                <a:cs typeface="Roboto" charset="0"/>
+              </a:rPr>
+              <a:t>        Example:</a:t>
+            </a:r>
+          </a:p>
+          <a:p>
+            <a:r>
+              <a:rPr lang="en-US" sz="900" dirty="0">
+                <a:latin typeface="Roboto" charset="0"/>
+                <a:ea typeface="Roboto" charset="0"/>
+                <a:cs typeface="Roboto" charset="0"/>
+              </a:rPr>
+              <a:t>            --</a:t>
+            </a:r>
+            <a:r>
+              <a:rPr lang="en-US" sz="900" dirty="0" err="1">
+                <a:latin typeface="Roboto" charset="0"/>
+                <a:ea typeface="Roboto" charset="0"/>
+                <a:cs typeface="Roboto" charset="0"/>
+              </a:rPr>
+              <a:t>prompt_for_login_info</a:t>
+            </a:r>
+            <a:r>
+              <a:rPr lang="en-US" sz="900" dirty="0">
+                <a:latin typeface="Roboto" charset="0"/>
+                <a:ea typeface="Roboto" charset="0"/>
+                <a:cs typeface="Roboto" charset="0"/>
+              </a:rPr>
+              <a:t>=False</a:t>
+            </a:r>
+          </a:p>
+          <a:p>
+            <a:endParaRPr lang="en-US" sz="900" dirty="0">
+              <a:latin typeface="Roboto" charset="0"/>
+              <a:ea typeface="Roboto" charset="0"/>
+              <a:cs typeface="Roboto" charset="0"/>
+            </a:endParaRPr>
+          </a:p>
+          <a:p>
+            <a:r>
+              <a:rPr lang="en-US" sz="900" dirty="0">
+                <a:latin typeface="Roboto" charset="0"/>
+                <a:ea typeface="Roboto" charset="0"/>
+                <a:cs typeface="Roboto" charset="0"/>
+              </a:rPr>
+              <a:t>   --</a:t>
+            </a:r>
+            <a:r>
+              <a:rPr lang="en-US" sz="900" dirty="0" err="1">
+                <a:latin typeface="Roboto" charset="0"/>
+                <a:ea typeface="Roboto" charset="0"/>
+                <a:cs typeface="Roboto" charset="0"/>
+              </a:rPr>
+              <a:t>config_file</a:t>
+            </a:r>
+            <a:endParaRPr lang="en-US" sz="900" dirty="0">
+              <a:latin typeface="Roboto" charset="0"/>
+              <a:ea typeface="Roboto" charset="0"/>
+              <a:cs typeface="Roboto" charset="0"/>
+            </a:endParaRPr>
+          </a:p>
+          <a:p>
+            <a:r>
+              <a:rPr lang="en-US" sz="900" dirty="0">
+                <a:latin typeface="Roboto" charset="0"/>
+                <a:ea typeface="Roboto" charset="0"/>
+                <a:cs typeface="Roboto" charset="0"/>
+              </a:rPr>
+              <a:t>        You can specify an exact config file to use. This csv file should exist in the same directory as the </a:t>
+            </a:r>
+            <a:r>
+              <a:rPr lang="en-US" sz="900" dirty="0" err="1">
+                <a:latin typeface="Roboto" charset="0"/>
+                <a:ea typeface="Roboto" charset="0"/>
+                <a:cs typeface="Roboto" charset="0"/>
+              </a:rPr>
+              <a:t>py</a:t>
+            </a:r>
+            <a:r>
+              <a:rPr lang="en-US" sz="900" dirty="0">
+                <a:latin typeface="Roboto" charset="0"/>
+                <a:ea typeface="Roboto" charset="0"/>
+                <a:cs typeface="Roboto" charset="0"/>
+              </a:rPr>
+              <a:t> or exe file that was executed.</a:t>
+            </a:r>
+          </a:p>
+          <a:p>
+            <a:r>
+              <a:rPr lang="en-US" sz="900" dirty="0">
+                <a:latin typeface="Roboto" charset="0"/>
+                <a:ea typeface="Roboto" charset="0"/>
+                <a:cs typeface="Roboto" charset="0"/>
+              </a:rPr>
+              <a:t>        Example:</a:t>
+            </a:r>
+          </a:p>
+          <a:p>
+            <a:r>
+              <a:rPr lang="en-US" sz="900" dirty="0">
+                <a:latin typeface="Roboto" charset="0"/>
+                <a:ea typeface="Roboto" charset="0"/>
+                <a:cs typeface="Roboto" charset="0"/>
+              </a:rPr>
+              <a:t>            --</a:t>
+            </a:r>
+            <a:r>
+              <a:rPr lang="en-US" sz="900" dirty="0" err="1">
+                <a:latin typeface="Roboto" charset="0"/>
+                <a:ea typeface="Roboto" charset="0"/>
+                <a:cs typeface="Roboto" charset="0"/>
+              </a:rPr>
+              <a:t>config_file</a:t>
+            </a:r>
+            <a:r>
+              <a:rPr lang="en-US" sz="900" dirty="0">
+                <a:latin typeface="Roboto" charset="0"/>
+                <a:ea typeface="Roboto" charset="0"/>
+                <a:cs typeface="Roboto" charset="0"/>
+              </a:rPr>
+              <a:t>="config - My Lineage.csv“</a:t>
+            </a:r>
+          </a:p>
+          <a:p>
+            <a:endParaRPr lang="en-US" sz="900" dirty="0">
+              <a:latin typeface="Roboto" charset="0"/>
+              <a:ea typeface="Roboto" charset="0"/>
+              <a:cs typeface="Roboto" charset="0"/>
+            </a:endParaRPr>
+          </a:p>
+          <a:p>
+            <a:r>
+              <a:rPr lang="en-US" sz="900" dirty="0">
+                <a:latin typeface="Roboto" charset="0"/>
+                <a:ea typeface="Roboto" charset="0"/>
+                <a:cs typeface="Roboto" charset="0"/>
+              </a:rPr>
+              <a:t> --</a:t>
+            </a:r>
+            <a:r>
+              <a:rPr lang="en-US" sz="900" dirty="0" err="1">
+                <a:latin typeface="Roboto" charset="0"/>
+                <a:ea typeface="Roboto" charset="0"/>
+                <a:cs typeface="Roboto" charset="0"/>
+              </a:rPr>
+              <a:t>config_file_path</a:t>
+            </a:r>
+            <a:endParaRPr lang="en-US" sz="900" dirty="0">
+              <a:latin typeface="Roboto" charset="0"/>
+              <a:ea typeface="Roboto" charset="0"/>
+              <a:cs typeface="Roboto" charset="0"/>
+            </a:endParaRPr>
+          </a:p>
+          <a:p>
+            <a:r>
+              <a:rPr lang="en-US" sz="900" dirty="0">
+                <a:latin typeface="Roboto" charset="0"/>
+                <a:ea typeface="Roboto" charset="0"/>
+                <a:cs typeface="Roboto" charset="0"/>
+              </a:rPr>
+              <a:t>        You can specify an exact config file to use, including the full path. Similar to </a:t>
+            </a:r>
+            <a:r>
+              <a:rPr lang="en-US" sz="900" dirty="0" err="1">
+                <a:latin typeface="Roboto" charset="0"/>
+                <a:ea typeface="Roboto" charset="0"/>
+                <a:cs typeface="Roboto" charset="0"/>
+              </a:rPr>
+              <a:t>config_file</a:t>
+            </a:r>
+            <a:r>
+              <a:rPr lang="en-US" sz="900" dirty="0">
+                <a:latin typeface="Roboto" charset="0"/>
+                <a:ea typeface="Roboto" charset="0"/>
+                <a:cs typeface="Roboto" charset="0"/>
+              </a:rPr>
+              <a:t> setting, but you can specify a full path of the config file. For windows, use </a:t>
+            </a:r>
+            <a:r>
+              <a:rPr lang="en-US" sz="900" dirty="0" err="1">
+                <a:latin typeface="Roboto" charset="0"/>
+                <a:ea typeface="Roboto" charset="0"/>
+                <a:cs typeface="Roboto" charset="0"/>
+              </a:rPr>
+              <a:t>linux</a:t>
+            </a:r>
+            <a:r>
+              <a:rPr lang="en-US" sz="900" dirty="0">
+                <a:latin typeface="Roboto" charset="0"/>
+                <a:ea typeface="Roboto" charset="0"/>
+                <a:cs typeface="Roboto" charset="0"/>
+              </a:rPr>
+              <a:t> forward slashes.</a:t>
+            </a:r>
+          </a:p>
+          <a:p>
+            <a:r>
+              <a:rPr lang="en-US" sz="900" dirty="0">
+                <a:latin typeface="Roboto" charset="0"/>
+                <a:ea typeface="Roboto" charset="0"/>
+                <a:cs typeface="Roboto" charset="0"/>
+              </a:rPr>
+              <a:t>        Example:</a:t>
+            </a:r>
+          </a:p>
+          <a:p>
+            <a:r>
+              <a:rPr lang="en-US" sz="900" dirty="0">
+                <a:latin typeface="Roboto" charset="0"/>
+                <a:ea typeface="Roboto" charset="0"/>
+                <a:cs typeface="Roboto" charset="0"/>
+              </a:rPr>
+              <a:t>            --</a:t>
+            </a:r>
+            <a:r>
+              <a:rPr lang="en-US" sz="900" dirty="0" err="1">
+                <a:latin typeface="Roboto" charset="0"/>
+                <a:ea typeface="Roboto" charset="0"/>
+                <a:cs typeface="Roboto" charset="0"/>
+              </a:rPr>
+              <a:t>config_file_path</a:t>
+            </a:r>
+            <a:r>
+              <a:rPr lang="en-US" sz="900" dirty="0">
+                <a:latin typeface="Roboto" charset="0"/>
+                <a:ea typeface="Roboto" charset="0"/>
+                <a:cs typeface="Roboto" charset="0"/>
+              </a:rPr>
+              <a:t>="c:/junk/config - My Lineage.csv“</a:t>
+            </a:r>
+          </a:p>
+          <a:p>
+            <a:endParaRPr lang="en-US" sz="900" dirty="0">
+              <a:latin typeface="Roboto" charset="0"/>
+              <a:ea typeface="Roboto" charset="0"/>
+              <a:cs typeface="Roboto" charset="0"/>
+            </a:endParaRPr>
+          </a:p>
+          <a:p>
+            <a:r>
+              <a:rPr lang="en-US" sz="900" dirty="0">
+                <a:latin typeface="Roboto" charset="0"/>
+                <a:ea typeface="Roboto" charset="0"/>
+                <a:cs typeface="Roboto" charset="0"/>
+              </a:rPr>
+              <a:t>   --</a:t>
+            </a:r>
+            <a:r>
+              <a:rPr lang="en-US" sz="900" dirty="0" err="1">
+                <a:latin typeface="Roboto" charset="0"/>
+                <a:ea typeface="Roboto" charset="0"/>
+                <a:cs typeface="Roboto" charset="0"/>
+              </a:rPr>
+              <a:t>pause_before_loading</a:t>
+            </a:r>
+            <a:r>
+              <a:rPr lang="en-US" sz="900" dirty="0">
+                <a:latin typeface="Roboto" charset="0"/>
+                <a:ea typeface="Roboto" charset="0"/>
+                <a:cs typeface="Roboto" charset="0"/>
+              </a:rPr>
+              <a:t>            </a:t>
+            </a:r>
+          </a:p>
+          <a:p>
+            <a:r>
+              <a:rPr lang="en-US" sz="900" dirty="0">
+                <a:latin typeface="Roboto" charset="0"/>
+                <a:ea typeface="Roboto" charset="0"/>
+                <a:cs typeface="Roboto" charset="0"/>
+              </a:rPr>
+              <a:t>        You can force it to not pause, and just go ahead and load, if set to False this defaults to True</a:t>
+            </a:r>
+          </a:p>
+          <a:p>
+            <a:r>
+              <a:rPr lang="en-US" sz="900" dirty="0">
+                <a:latin typeface="Roboto" charset="0"/>
+                <a:ea typeface="Roboto" charset="0"/>
+                <a:cs typeface="Roboto" charset="0"/>
+              </a:rPr>
+              <a:t>        Example:</a:t>
+            </a:r>
+          </a:p>
+          <a:p>
+            <a:r>
+              <a:rPr lang="en-US" sz="900" dirty="0">
+                <a:latin typeface="Roboto" charset="0"/>
+                <a:ea typeface="Roboto" charset="0"/>
+                <a:cs typeface="Roboto" charset="0"/>
+              </a:rPr>
+              <a:t>            --</a:t>
+            </a:r>
+            <a:r>
+              <a:rPr lang="en-US" sz="900" dirty="0" err="1">
+                <a:latin typeface="Roboto" charset="0"/>
+                <a:ea typeface="Roboto" charset="0"/>
+                <a:cs typeface="Roboto" charset="0"/>
+              </a:rPr>
+              <a:t>pause_before_loading</a:t>
+            </a:r>
+            <a:r>
+              <a:rPr lang="en-US" sz="900" dirty="0">
+                <a:latin typeface="Roboto" charset="0"/>
+                <a:ea typeface="Roboto" charset="0"/>
+                <a:cs typeface="Roboto" charset="0"/>
+              </a:rPr>
+              <a:t>=False</a:t>
+            </a:r>
+          </a:p>
+          <a:p>
+            <a:endParaRPr lang="en-US" sz="900" dirty="0">
+              <a:latin typeface="Roboto" charset="0"/>
+              <a:ea typeface="Roboto" charset="0"/>
+              <a:cs typeface="Roboto" charset="0"/>
+            </a:endParaRPr>
+          </a:p>
+          <a:p>
+            <a:endParaRPr lang="en-US" sz="900" dirty="0">
+              <a:latin typeface="Roboto" charset="0"/>
+              <a:ea typeface="Roboto" charset="0"/>
+              <a:cs typeface="Roboto" charset="0"/>
+            </a:endParaRPr>
+          </a:p>
+          <a:p>
+            <a:endParaRPr lang="en-US" sz="900" dirty="0">
+              <a:latin typeface="Roboto" charset="0"/>
+              <a:ea typeface="Roboto" charset="0"/>
+              <a:cs typeface="Roboto" charset="0"/>
+            </a:endParaRPr>
+          </a:p>
+        </p:txBody>
+      </p:sp>
+    </p:spTree>
+    <p:extLst>
+      <p:ext uri="{BB962C8B-B14F-4D97-AF65-F5344CB8AC3E}">
+        <p14:creationId xmlns:p14="http://schemas.microsoft.com/office/powerpoint/2010/main" val="218706702"/>
+      </p:ext>
+    </p:extLst>
+  </p:cSld>
+  <p:clrMapOvr>
+    <a:masterClrMapping/>
+  </p:clrMapOvr>
+  <mc:AlternateContent xmlns:mc="http://schemas.openxmlformats.org/markup-compatibility/2006" xmlns:p14="http://schemas.microsoft.com/office/powerpoint/2010/main">
+    <mc:Choice Requires="p14">
+      <p:transition spd="med" p14:dur="700" advClick="0">
+        <p:fade/>
+      </p:transition>
+    </mc:Choice>
+    <mc:Fallback xmlns="">
+      <p:transition spd="med" advClick="0">
+        <p:fade/>
+      </p:transition>
+    </mc:Fallback>
+  </mc:AlternateContent>
+</p:sld>
+</file>
+
+<file path=ppt/slides/slide11.xml><?xml version="1.0" encoding="utf-8"?>
+<p:sld xmlns:a="http://schemas.openxmlformats.org/drawingml/2006/main" xmlns:r="http://schemas.openxmlformats.org/officeDocument/2006/relationships" xmlns:p="http://schemas.openxmlformats.org/presentationml/2006/main">
+  <p:cSld>
+    <p:spTree>
+      <p:nvGrpSpPr>
+        <p:cNvPr id="1" name=""/>
+        <p:cNvGrpSpPr/>
+        <p:nvPr/>
+      </p:nvGrpSpPr>
+      <p:grpSpPr>
+        <a:xfrm>
+          <a:off x="0" y="0"/>
+          <a:ext cx="0" cy="0"/>
+          <a:chOff x="0" y="0"/>
+          <a:chExt cx="0" cy="0"/>
+        </a:xfrm>
+      </p:grpSpPr>
+      <p:sp>
+        <p:nvSpPr>
+          <p:cNvPr id="5" name="Title 4">
+            <a:extLst>
+              <a:ext uri="{FF2B5EF4-FFF2-40B4-BE49-F238E27FC236}">
+                <a16:creationId xmlns:a16="http://schemas.microsoft.com/office/drawing/2014/main" id="{C2B479B7-4E1E-475F-B459-5CE8B05302D3}"/>
+              </a:ext>
+            </a:extLst>
+          </p:cNvPr>
+          <p:cNvSpPr>
+            <a:spLocks noGrp="1"/>
+          </p:cNvSpPr>
+          <p:nvPr>
+            <p:ph type="title"/>
+          </p:nvPr>
+        </p:nvSpPr>
+        <p:spPr>
+          <a:xfrm>
+            <a:off x="319060" y="187082"/>
+            <a:ext cx="11195177" cy="562427"/>
+          </a:xfrm>
+        </p:spPr>
+        <p:txBody>
+          <a:bodyPr/>
+          <a:lstStyle/>
+          <a:p>
+            <a:r>
+              <a:rPr lang="en-US" dirty="0"/>
+              <a:t>Usage </a:t>
+            </a:r>
+            <a:r>
+              <a:rPr lang="en-US" sz="2400" dirty="0"/>
+              <a:t>(optional parameters)</a:t>
+            </a:r>
+            <a:endParaRPr lang="en-IN" sz="2400" dirty="0"/>
+          </a:p>
+        </p:txBody>
+      </p:sp>
+      <p:sp>
+        <p:nvSpPr>
+          <p:cNvPr id="16" name="Content Placeholder 13">
+            <a:extLst>
+              <a:ext uri="{FF2B5EF4-FFF2-40B4-BE49-F238E27FC236}">
+                <a16:creationId xmlns:a16="http://schemas.microsoft.com/office/drawing/2014/main" id="{807EB0DB-72EF-4CAE-8A2F-F7E55C093081}"/>
+              </a:ext>
+            </a:extLst>
+          </p:cNvPr>
+          <p:cNvSpPr txBox="1">
+            <a:spLocks/>
+          </p:cNvSpPr>
+          <p:nvPr/>
+        </p:nvSpPr>
+        <p:spPr>
+          <a:xfrm>
+            <a:off x="1180247" y="1610532"/>
+            <a:ext cx="3180631" cy="2562457"/>
+          </a:xfrm>
+          <a:prstGeom prst="rect">
+            <a:avLst/>
+          </a:prstGeom>
+        </p:spPr>
+        <p:txBody>
+          <a:bodyPr vert="horz" lIns="0" tIns="0" rIns="0" bIns="0" rtlCol="0">
+            <a:noAutofit/>
+          </a:bodyPr>
+          <a:lstStyle>
+            <a:lvl1pPr marL="173038" indent="-173038" algn="l" defTabSz="914217" rtl="0" eaLnBrk="1" latinLnBrk="0" hangingPunct="1">
+              <a:lnSpc>
+                <a:spcPct val="90000"/>
+              </a:lnSpc>
+              <a:spcBef>
+                <a:spcPts val="400"/>
+              </a:spcBef>
+              <a:spcAft>
+                <a:spcPts val="1200"/>
+              </a:spcAft>
+              <a:buClr>
+                <a:schemeClr val="accent2"/>
+              </a:buClr>
+              <a:buFont typeface="Arial" panose="020B0604020202020204" pitchFamily="34" charset="0"/>
+              <a:buChar char="•"/>
+              <a:defRPr sz="2100" b="0" i="0" kern="1200" baseline="0">
+                <a:solidFill>
+                  <a:schemeClr val="tx1"/>
+                </a:solidFill>
+                <a:latin typeface="Roboto" charset="0"/>
+                <a:ea typeface="Roboto" charset="0"/>
+                <a:cs typeface="Roboto" charset="0"/>
+              </a:defRPr>
+            </a:lvl1pPr>
+            <a:lvl2pPr marL="344488" indent="-174625" algn="l" defTabSz="914217" rtl="0" eaLnBrk="1" latinLnBrk="0" hangingPunct="1">
+              <a:lnSpc>
+                <a:spcPct val="90000"/>
+              </a:lnSpc>
+              <a:spcBef>
+                <a:spcPts val="0"/>
+              </a:spcBef>
+              <a:spcAft>
+                <a:spcPts val="1200"/>
+              </a:spcAft>
+              <a:buClr>
+                <a:schemeClr val="accent2"/>
+              </a:buClr>
+              <a:buFont typeface="Arial" panose="020B0604020202020204" pitchFamily="34" charset="0"/>
+              <a:buChar char="•"/>
+              <a:defRPr sz="1800" b="0" i="0" kern="1200" baseline="0">
+                <a:solidFill>
+                  <a:schemeClr val="tx1"/>
+                </a:solidFill>
+                <a:latin typeface="Roboto" charset="0"/>
+                <a:ea typeface="Roboto" charset="0"/>
+                <a:cs typeface="Roboto" charset="0"/>
+              </a:defRPr>
+            </a:lvl2pPr>
+            <a:lvl3pPr marL="514350" indent="-169863" algn="l" defTabSz="914217" rtl="0" eaLnBrk="1" latinLnBrk="0" hangingPunct="1">
+              <a:lnSpc>
+                <a:spcPct val="90000"/>
+              </a:lnSpc>
+              <a:spcBef>
+                <a:spcPts val="0"/>
+              </a:spcBef>
+              <a:spcAft>
+                <a:spcPts val="1200"/>
+              </a:spcAft>
+              <a:buClr>
+                <a:schemeClr val="accent2"/>
+              </a:buClr>
+              <a:buFont typeface="Arial" panose="020B0604020202020204" pitchFamily="34" charset="0"/>
+              <a:buChar char="•"/>
+              <a:defRPr sz="1600" b="0" i="0" kern="1200">
+                <a:solidFill>
+                  <a:schemeClr val="tx1"/>
+                </a:solidFill>
+                <a:latin typeface="Roboto" charset="0"/>
+                <a:ea typeface="Roboto" charset="0"/>
+                <a:cs typeface="Roboto" charset="0"/>
+              </a:defRPr>
+            </a:lvl3pPr>
+            <a:lvl4pPr marL="630238" indent="-171450" algn="l" defTabSz="914217" rtl="0" eaLnBrk="1" latinLnBrk="0" hangingPunct="1">
+              <a:lnSpc>
+                <a:spcPct val="90000"/>
+              </a:lnSpc>
+              <a:spcBef>
+                <a:spcPts val="0"/>
+              </a:spcBef>
+              <a:spcAft>
+                <a:spcPts val="1200"/>
+              </a:spcAft>
+              <a:buClr>
+                <a:schemeClr val="accent2"/>
+              </a:buClr>
+              <a:buFont typeface="Arial" panose="020B0604020202020204" pitchFamily="34" charset="0"/>
+              <a:buChar char="•"/>
+              <a:defRPr sz="1400" b="0" i="0" kern="1200">
+                <a:solidFill>
+                  <a:schemeClr val="tx1"/>
+                </a:solidFill>
+                <a:latin typeface="Roboto" charset="0"/>
+                <a:ea typeface="Roboto" charset="0"/>
+                <a:cs typeface="Roboto" charset="0"/>
+              </a:defRPr>
+            </a:lvl4pPr>
+            <a:lvl5pPr marL="800100" indent="-169863" algn="l" defTabSz="914217" rtl="0" eaLnBrk="1" latinLnBrk="0" hangingPunct="1">
+              <a:lnSpc>
+                <a:spcPct val="90000"/>
+              </a:lnSpc>
+              <a:spcBef>
+                <a:spcPts val="0"/>
+              </a:spcBef>
+              <a:spcAft>
+                <a:spcPts val="1200"/>
+              </a:spcAft>
+              <a:buClr>
+                <a:schemeClr val="accent2"/>
+              </a:buClr>
+              <a:buFont typeface="Arial" panose="020B0604020202020204" pitchFamily="34" charset="0"/>
+              <a:buChar char="•"/>
+              <a:defRPr sz="1400" b="0" i="0" kern="1200">
+                <a:solidFill>
+                  <a:schemeClr val="tx1"/>
+                </a:solidFill>
+                <a:latin typeface="Roboto" charset="0"/>
+                <a:ea typeface="Roboto" charset="0"/>
+                <a:cs typeface="Roboto" charset="0"/>
+              </a:defRPr>
+            </a:lvl5pPr>
+            <a:lvl6pPr marL="914400" indent="-169863" algn="l" defTabSz="914217" rtl="0" eaLnBrk="1" latinLnBrk="0" hangingPunct="1">
+              <a:lnSpc>
+                <a:spcPct val="90000"/>
+              </a:lnSpc>
+              <a:spcBef>
+                <a:spcPts val="500"/>
+              </a:spcBef>
+              <a:spcAft>
+                <a:spcPts val="1200"/>
+              </a:spcAft>
+              <a:buClr>
+                <a:schemeClr val="accent2"/>
+              </a:buClr>
+              <a:buFont typeface="Arial" panose="020B0604020202020204" pitchFamily="34" charset="0"/>
+              <a:buChar char="•"/>
+              <a:defRPr sz="1200" b="0" i="0" kern="1200">
+                <a:solidFill>
+                  <a:schemeClr val="tx1"/>
+                </a:solidFill>
+                <a:latin typeface="Roboto" charset="0"/>
+                <a:ea typeface="Roboto" charset="0"/>
+                <a:cs typeface="Roboto" charset="0"/>
+              </a:defRPr>
+            </a:lvl6pPr>
+            <a:lvl7pPr marL="1084263" indent="-169863" algn="l" defTabSz="914217" rtl="0" eaLnBrk="1" latinLnBrk="0" hangingPunct="1">
+              <a:lnSpc>
+                <a:spcPct val="90000"/>
+              </a:lnSpc>
+              <a:spcBef>
+                <a:spcPts val="500"/>
+              </a:spcBef>
+              <a:spcAft>
+                <a:spcPts val="1200"/>
+              </a:spcAft>
+              <a:buClr>
+                <a:schemeClr val="accent2"/>
+              </a:buClr>
+              <a:buFont typeface="Arial" panose="020B0604020202020204" pitchFamily="34" charset="0"/>
+              <a:buChar char="•"/>
+              <a:defRPr sz="1200" b="0" i="0" kern="1200">
+                <a:solidFill>
+                  <a:schemeClr val="tx1"/>
+                </a:solidFill>
+                <a:latin typeface="Roboto" charset="0"/>
+                <a:ea typeface="Roboto" charset="0"/>
+                <a:cs typeface="Roboto" charset="0"/>
+              </a:defRPr>
+            </a:lvl7pPr>
+            <a:lvl8pPr marL="1258888" indent="-174625" algn="l" defTabSz="914217" rtl="0" eaLnBrk="1" latinLnBrk="0" hangingPunct="1">
+              <a:lnSpc>
+                <a:spcPct val="90000"/>
+              </a:lnSpc>
+              <a:spcBef>
+                <a:spcPts val="500"/>
+              </a:spcBef>
+              <a:spcAft>
+                <a:spcPts val="1200"/>
+              </a:spcAft>
+              <a:buClr>
+                <a:schemeClr val="accent2"/>
+              </a:buClr>
+              <a:buFont typeface="Arial" panose="020B0604020202020204" pitchFamily="34" charset="0"/>
+              <a:buChar char="•"/>
+              <a:defRPr sz="1200" b="0" i="0" kern="1200">
+                <a:solidFill>
+                  <a:schemeClr val="tx1"/>
+                </a:solidFill>
+                <a:latin typeface="Roboto" charset="0"/>
+                <a:ea typeface="Roboto" charset="0"/>
+                <a:cs typeface="Roboto" charset="0"/>
+              </a:defRPr>
+            </a:lvl8pPr>
+            <a:lvl9pPr marL="1428750" indent="-169863" algn="l" defTabSz="914217" rtl="0" eaLnBrk="1" latinLnBrk="0" hangingPunct="1">
+              <a:lnSpc>
+                <a:spcPct val="90000"/>
+              </a:lnSpc>
+              <a:spcBef>
+                <a:spcPts val="500"/>
+              </a:spcBef>
+              <a:spcAft>
+                <a:spcPts val="1200"/>
+              </a:spcAft>
+              <a:buClr>
+                <a:schemeClr val="accent2"/>
+              </a:buClr>
+              <a:buFont typeface="Arial" panose="020B0604020202020204" pitchFamily="34" charset="0"/>
+              <a:buChar char="•"/>
+              <a:defRPr sz="1200" b="0" i="0" kern="1200">
+                <a:solidFill>
+                  <a:schemeClr val="tx1"/>
+                </a:solidFill>
+                <a:latin typeface="Roboto" charset="0"/>
+                <a:ea typeface="Roboto" charset="0"/>
+                <a:cs typeface="Roboto" charset="0"/>
+              </a:defRPr>
+            </a:lvl9pPr>
+          </a:lstStyle>
+          <a:p>
+            <a:pPr marL="0" indent="0">
+              <a:buNone/>
+            </a:pPr>
+            <a:endParaRPr lang="en-IN" sz="1600" dirty="0"/>
+          </a:p>
+        </p:txBody>
+      </p:sp>
+      <p:sp>
+        <p:nvSpPr>
+          <p:cNvPr id="6" name="TextBox 5">
+            <a:extLst>
+              <a:ext uri="{FF2B5EF4-FFF2-40B4-BE49-F238E27FC236}">
+                <a16:creationId xmlns:a16="http://schemas.microsoft.com/office/drawing/2014/main" id="{9F8FFC18-4FD7-5E97-CCB3-5E13CE612AEB}"/>
+              </a:ext>
+            </a:extLst>
+          </p:cNvPr>
+          <p:cNvSpPr txBox="1"/>
+          <p:nvPr/>
+        </p:nvSpPr>
+        <p:spPr>
+          <a:xfrm>
+            <a:off x="595566" y="761084"/>
+            <a:ext cx="11195176" cy="5595754"/>
+          </a:xfrm>
+          <a:prstGeom prst="rect">
+            <a:avLst/>
+          </a:prstGeom>
+          <a:noFill/>
+        </p:spPr>
+        <p:txBody>
+          <a:bodyPr wrap="square" lIns="0" tIns="0" rIns="0" bIns="0" rtlCol="0">
+            <a:noAutofit/>
+          </a:bodyPr>
+          <a:lstStyle/>
+          <a:p>
+            <a:r>
+              <a:rPr lang="en-US" sz="900" dirty="0">
+                <a:latin typeface="Roboto" charset="0"/>
+                <a:ea typeface="Roboto" charset="0"/>
+                <a:cs typeface="Roboto" charset="0"/>
+              </a:rPr>
+              <a:t>Optionally, you can set parameters:</a:t>
+            </a:r>
+          </a:p>
+          <a:p>
+            <a:endParaRPr lang="en-US" sz="900" dirty="0">
+              <a:latin typeface="Roboto" charset="0"/>
+              <a:ea typeface="Roboto" charset="0"/>
+              <a:cs typeface="Roboto" charset="0"/>
+            </a:endParaRPr>
+          </a:p>
+          <a:p>
+            <a:r>
+              <a:rPr lang="en-US" sz="900" dirty="0">
+                <a:latin typeface="Roboto" charset="0"/>
+                <a:ea typeface="Roboto" charset="0"/>
+                <a:cs typeface="Roboto" charset="0"/>
+              </a:rPr>
+              <a:t>    --</a:t>
+            </a:r>
+            <a:r>
+              <a:rPr lang="en-US" sz="900" dirty="0" err="1">
+                <a:latin typeface="Roboto" charset="0"/>
+                <a:ea typeface="Roboto" charset="0"/>
+                <a:cs typeface="Roboto" charset="0"/>
+              </a:rPr>
+              <a:t>pause_when_done</a:t>
+            </a:r>
+            <a:endParaRPr lang="en-US" sz="900" dirty="0">
+              <a:latin typeface="Roboto" charset="0"/>
+              <a:ea typeface="Roboto" charset="0"/>
+              <a:cs typeface="Roboto" charset="0"/>
+            </a:endParaRPr>
+          </a:p>
+          <a:p>
+            <a:r>
+              <a:rPr lang="en-US" sz="900" dirty="0">
+                <a:latin typeface="Roboto" charset="0"/>
+                <a:ea typeface="Roboto" charset="0"/>
+                <a:cs typeface="Roboto" charset="0"/>
+              </a:rPr>
+              <a:t>        You can set the behavior on whether or not the script pauses when it's complete. (So you can review the information on the window, before it disappears)</a:t>
+            </a:r>
+          </a:p>
+          <a:p>
+            <a:r>
+              <a:rPr lang="en-US" sz="900" dirty="0">
+                <a:latin typeface="Roboto" charset="0"/>
+                <a:ea typeface="Roboto" charset="0"/>
+                <a:cs typeface="Roboto" charset="0"/>
+              </a:rPr>
+              <a:t>        Example:</a:t>
+            </a:r>
+          </a:p>
+          <a:p>
+            <a:r>
+              <a:rPr lang="en-US" sz="900" dirty="0">
+                <a:latin typeface="Roboto" charset="0"/>
+                <a:ea typeface="Roboto" charset="0"/>
+                <a:cs typeface="Roboto" charset="0"/>
+              </a:rPr>
+              <a:t>            --</a:t>
+            </a:r>
+            <a:r>
+              <a:rPr lang="en-US" sz="900" dirty="0" err="1">
+                <a:latin typeface="Roboto" charset="0"/>
+                <a:ea typeface="Roboto" charset="0"/>
+                <a:cs typeface="Roboto" charset="0"/>
+              </a:rPr>
+              <a:t>pause_when_done</a:t>
+            </a:r>
+            <a:r>
+              <a:rPr lang="en-US" sz="900" dirty="0">
+                <a:latin typeface="Roboto" charset="0"/>
+                <a:ea typeface="Roboto" charset="0"/>
+                <a:cs typeface="Roboto" charset="0"/>
+              </a:rPr>
+              <a:t>=False</a:t>
+            </a:r>
+          </a:p>
+          <a:p>
+            <a:endParaRPr lang="en-US" sz="900" dirty="0">
+              <a:latin typeface="Roboto" charset="0"/>
+              <a:ea typeface="Roboto" charset="0"/>
+              <a:cs typeface="Roboto" charset="0"/>
+            </a:endParaRPr>
+          </a:p>
+          <a:p>
+            <a:r>
+              <a:rPr lang="en-US" sz="900" dirty="0">
+                <a:latin typeface="Roboto" charset="0"/>
+                <a:ea typeface="Roboto" charset="0"/>
+                <a:cs typeface="Roboto" charset="0"/>
+              </a:rPr>
+              <a:t>     --</a:t>
+            </a:r>
+            <a:r>
+              <a:rPr lang="en-US" sz="900" dirty="0" err="1">
+                <a:latin typeface="Roboto" charset="0"/>
+                <a:ea typeface="Roboto" charset="0"/>
+                <a:cs typeface="Roboto" charset="0"/>
+              </a:rPr>
+              <a:t>use_api</a:t>
+            </a:r>
+            <a:endParaRPr lang="en-US" sz="900" dirty="0">
+              <a:latin typeface="Roboto" charset="0"/>
+              <a:ea typeface="Roboto" charset="0"/>
+              <a:cs typeface="Roboto" charset="0"/>
+            </a:endParaRPr>
+          </a:p>
+          <a:p>
+            <a:r>
+              <a:rPr lang="en-US" sz="900" dirty="0">
+                <a:latin typeface="Roboto" charset="0"/>
+                <a:ea typeface="Roboto" charset="0"/>
+                <a:cs typeface="Roboto" charset="0"/>
+              </a:rPr>
+              <a:t>        You can set the script to not use the API. If you set this to False, then additional requirements will be needed. The script will not make any connection to your env, or use any APIs. For this reason, you'll need to</a:t>
+            </a:r>
+          </a:p>
+          <a:p>
+            <a:r>
+              <a:rPr lang="en-US" sz="900" dirty="0">
+                <a:latin typeface="Roboto" charset="0"/>
+                <a:ea typeface="Roboto" charset="0"/>
+                <a:cs typeface="Roboto" charset="0"/>
+              </a:rPr>
+              <a:t>        manually export the assets (Within Data Governance and Catalog perform a search for "resources" and export including children) Place the xlsx or zip file in the same location as the script/exe file. If using ETL, you’ll</a:t>
+            </a:r>
+          </a:p>
+          <a:p>
+            <a:r>
+              <a:rPr lang="en-US" sz="900" dirty="0">
+                <a:latin typeface="Roboto" charset="0"/>
+                <a:ea typeface="Roboto" charset="0"/>
+                <a:cs typeface="Roboto" charset="0"/>
+              </a:rPr>
+              <a:t>        also need to download the templates, and models that you'll be using. (Within Metadata Command Center, go to customize, metadata Models, then Download Template Models are </a:t>
+            </a:r>
+            <a:r>
+              <a:rPr lang="en-US" sz="900" dirty="0" err="1">
+                <a:latin typeface="Roboto" charset="0"/>
+                <a:ea typeface="Roboto" charset="0"/>
+                <a:cs typeface="Roboto" charset="0"/>
+              </a:rPr>
+              <a:t>json</a:t>
+            </a:r>
+            <a:r>
+              <a:rPr lang="en-US" sz="900" dirty="0">
+                <a:latin typeface="Roboto" charset="0"/>
+                <a:ea typeface="Roboto" charset="0"/>
+                <a:cs typeface="Roboto" charset="0"/>
+              </a:rPr>
+              <a:t> files, Metadata Templates are </a:t>
+            </a:r>
+          </a:p>
+          <a:p>
+            <a:r>
+              <a:rPr lang="en-US" sz="900" dirty="0">
+                <a:latin typeface="Roboto" charset="0"/>
+                <a:ea typeface="Roboto" charset="0"/>
+                <a:cs typeface="Roboto" charset="0"/>
+              </a:rPr>
+              <a:t>        zip files) place these files in the &lt;</a:t>
+            </a:r>
+            <a:r>
+              <a:rPr lang="en-US" sz="900" dirty="0" err="1">
+                <a:latin typeface="Roboto" charset="0"/>
+                <a:ea typeface="Roboto" charset="0"/>
+                <a:cs typeface="Roboto" charset="0"/>
+              </a:rPr>
+              <a:t>script_location</a:t>
+            </a:r>
+            <a:r>
+              <a:rPr lang="en-US" sz="900" dirty="0">
+                <a:latin typeface="Roboto" charset="0"/>
+                <a:ea typeface="Roboto" charset="0"/>
+                <a:cs typeface="Roboto" charset="0"/>
+              </a:rPr>
+              <a:t>&gt;/data/templates folder. If using this option, the script will not create resources or execute. So you'll need to manually create the resource(s) and execute them.</a:t>
+            </a:r>
+          </a:p>
+          <a:p>
+            <a:r>
+              <a:rPr lang="en-US" sz="900" dirty="0">
+                <a:latin typeface="Roboto" charset="0"/>
+                <a:ea typeface="Roboto" charset="0"/>
+                <a:cs typeface="Roboto" charset="0"/>
+              </a:rPr>
+              <a:t>        Example:</a:t>
+            </a:r>
+          </a:p>
+          <a:p>
+            <a:r>
+              <a:rPr lang="en-US" sz="900" dirty="0">
+                <a:latin typeface="Roboto" charset="0"/>
+                <a:ea typeface="Roboto" charset="0"/>
+                <a:cs typeface="Roboto" charset="0"/>
+              </a:rPr>
+              <a:t>            --</a:t>
+            </a:r>
+            <a:r>
+              <a:rPr lang="en-US" sz="900" dirty="0" err="1">
+                <a:latin typeface="Roboto" charset="0"/>
+                <a:ea typeface="Roboto" charset="0"/>
+                <a:cs typeface="Roboto" charset="0"/>
+              </a:rPr>
+              <a:t>use_api</a:t>
+            </a:r>
+            <a:r>
+              <a:rPr lang="en-US" sz="900" dirty="0">
+                <a:latin typeface="Roboto" charset="0"/>
+                <a:ea typeface="Roboto" charset="0"/>
+                <a:cs typeface="Roboto" charset="0"/>
+              </a:rPr>
+              <a:t>=False</a:t>
+            </a:r>
+          </a:p>
+          <a:p>
+            <a:endParaRPr lang="en-US" sz="900" dirty="0">
+              <a:latin typeface="Roboto" charset="0"/>
+              <a:ea typeface="Roboto" charset="0"/>
+              <a:cs typeface="Roboto" charset="0"/>
+            </a:endParaRPr>
+          </a:p>
+          <a:p>
+            <a:r>
+              <a:rPr lang="en-US" sz="900" dirty="0">
+                <a:latin typeface="Roboto" charset="0"/>
+                <a:ea typeface="Roboto" charset="0"/>
+                <a:cs typeface="Roboto" charset="0"/>
+              </a:rPr>
+              <a:t>    --</a:t>
+            </a:r>
+            <a:r>
+              <a:rPr lang="en-US" sz="900" dirty="0" err="1">
+                <a:latin typeface="Roboto" charset="0"/>
+                <a:ea typeface="Roboto" charset="0"/>
+                <a:cs typeface="Roboto" charset="0"/>
+              </a:rPr>
+              <a:t>directory_with_assets_export</a:t>
+            </a:r>
+            <a:endParaRPr lang="en-US" sz="900" dirty="0">
+              <a:latin typeface="Roboto" charset="0"/>
+              <a:ea typeface="Roboto" charset="0"/>
+              <a:cs typeface="Roboto" charset="0"/>
+            </a:endParaRPr>
+          </a:p>
+          <a:p>
+            <a:r>
+              <a:rPr lang="en-US" sz="900" dirty="0">
+                <a:latin typeface="Roboto" charset="0"/>
+                <a:ea typeface="Roboto" charset="0"/>
+                <a:cs typeface="Roboto" charset="0"/>
+              </a:rPr>
+              <a:t>        If you set the --</a:t>
+            </a:r>
+            <a:r>
+              <a:rPr lang="en-US" sz="900" dirty="0" err="1">
+                <a:latin typeface="Roboto" charset="0"/>
+                <a:ea typeface="Roboto" charset="0"/>
+                <a:cs typeface="Roboto" charset="0"/>
+              </a:rPr>
+              <a:t>use_api</a:t>
+            </a:r>
+            <a:r>
+              <a:rPr lang="en-US" sz="900" dirty="0">
+                <a:latin typeface="Roboto" charset="0"/>
+                <a:ea typeface="Roboto" charset="0"/>
+                <a:cs typeface="Roboto" charset="0"/>
+              </a:rPr>
+              <a:t>=False, you can specify which directory contains the export file zip/xlsx file It will default to the &lt;</a:t>
+            </a:r>
+            <a:r>
+              <a:rPr lang="en-US" sz="900" dirty="0" err="1">
+                <a:latin typeface="Roboto" charset="0"/>
+                <a:ea typeface="Roboto" charset="0"/>
+                <a:cs typeface="Roboto" charset="0"/>
+              </a:rPr>
+              <a:t>script_location</a:t>
+            </a:r>
+            <a:r>
+              <a:rPr lang="en-US" sz="900" dirty="0">
+                <a:latin typeface="Roboto" charset="0"/>
+                <a:ea typeface="Roboto" charset="0"/>
+                <a:cs typeface="Roboto" charset="0"/>
+              </a:rPr>
+              <a:t>&gt; and will look for the latest zip file or xlsx file in that directory.</a:t>
+            </a:r>
+          </a:p>
+          <a:p>
+            <a:r>
+              <a:rPr lang="en-US" sz="900" dirty="0">
+                <a:latin typeface="Roboto" charset="0"/>
+                <a:ea typeface="Roboto" charset="0"/>
+                <a:cs typeface="Roboto" charset="0"/>
+              </a:rPr>
+              <a:t>        Example:</a:t>
+            </a:r>
+          </a:p>
+          <a:p>
+            <a:r>
+              <a:rPr lang="en-US" sz="900" dirty="0">
+                <a:latin typeface="Roboto" charset="0"/>
+                <a:ea typeface="Roboto" charset="0"/>
+                <a:cs typeface="Roboto" charset="0"/>
+              </a:rPr>
+              <a:t>            --</a:t>
+            </a:r>
+            <a:r>
+              <a:rPr lang="en-US" sz="900" dirty="0" err="1">
+                <a:latin typeface="Roboto" charset="0"/>
+                <a:ea typeface="Roboto" charset="0"/>
+                <a:cs typeface="Roboto" charset="0"/>
+              </a:rPr>
+              <a:t>directory_with_assets_export</a:t>
+            </a:r>
+            <a:r>
+              <a:rPr lang="en-US" sz="900" dirty="0">
+                <a:latin typeface="Roboto" charset="0"/>
+                <a:ea typeface="Roboto" charset="0"/>
+                <a:cs typeface="Roboto" charset="0"/>
+              </a:rPr>
+              <a:t>=/</a:t>
+            </a:r>
+            <a:r>
+              <a:rPr lang="en-US" sz="900" dirty="0" err="1">
+                <a:latin typeface="Roboto" charset="0"/>
+                <a:ea typeface="Roboto" charset="0"/>
+                <a:cs typeface="Roboto" charset="0"/>
+              </a:rPr>
+              <a:t>my_files</a:t>
+            </a:r>
+            <a:r>
+              <a:rPr lang="en-US" sz="900" dirty="0">
+                <a:latin typeface="Roboto" charset="0"/>
+                <a:ea typeface="Roboto" charset="0"/>
+                <a:cs typeface="Roboto" charset="0"/>
+              </a:rPr>
+              <a:t>/assets</a:t>
+            </a:r>
+          </a:p>
+          <a:p>
+            <a:endParaRPr lang="en-US" sz="900" dirty="0">
+              <a:latin typeface="Roboto" charset="0"/>
+              <a:ea typeface="Roboto" charset="0"/>
+              <a:cs typeface="Roboto" charset="0"/>
+            </a:endParaRPr>
+          </a:p>
+          <a:p>
+            <a:r>
+              <a:rPr lang="en-US" sz="900" dirty="0">
+                <a:latin typeface="Roboto" charset="0"/>
+                <a:ea typeface="Roboto" charset="0"/>
+                <a:cs typeface="Roboto" charset="0"/>
+              </a:rPr>
+              <a:t>    --</a:t>
+            </a:r>
+            <a:r>
+              <a:rPr lang="en-US" sz="900" dirty="0" err="1">
+                <a:latin typeface="Roboto" charset="0"/>
+                <a:ea typeface="Roboto" charset="0"/>
+                <a:cs typeface="Roboto" charset="0"/>
+              </a:rPr>
+              <a:t>directory_to_write_links_file</a:t>
+            </a:r>
+            <a:endParaRPr lang="en-US" sz="900" dirty="0">
+              <a:latin typeface="Roboto" charset="0"/>
+              <a:ea typeface="Roboto" charset="0"/>
+              <a:cs typeface="Roboto" charset="0"/>
+            </a:endParaRPr>
+          </a:p>
+          <a:p>
+            <a:r>
+              <a:rPr lang="en-US" sz="900" dirty="0">
+                <a:latin typeface="Roboto" charset="0"/>
+                <a:ea typeface="Roboto" charset="0"/>
+                <a:cs typeface="Roboto" charset="0"/>
+              </a:rPr>
+              <a:t>        You can specify a different location to write the Lineage Resource zip files. It will default to &lt;</a:t>
+            </a:r>
+            <a:r>
+              <a:rPr lang="en-US" sz="900" dirty="0" err="1">
+                <a:latin typeface="Roboto" charset="0"/>
+                <a:ea typeface="Roboto" charset="0"/>
+                <a:cs typeface="Roboto" charset="0"/>
+              </a:rPr>
+              <a:t>script_location</a:t>
+            </a:r>
+            <a:r>
+              <a:rPr lang="en-US" sz="900" dirty="0">
+                <a:latin typeface="Roboto" charset="0"/>
+                <a:ea typeface="Roboto" charset="0"/>
+                <a:cs typeface="Roboto" charset="0"/>
+              </a:rPr>
+              <a:t>&gt;/links </a:t>
+            </a:r>
+          </a:p>
+          <a:p>
+            <a:r>
+              <a:rPr lang="en-US" sz="900" dirty="0">
+                <a:latin typeface="Roboto" charset="0"/>
+                <a:ea typeface="Roboto" charset="0"/>
+                <a:cs typeface="Roboto" charset="0"/>
+              </a:rPr>
+              <a:t>        Example:</a:t>
+            </a:r>
+          </a:p>
+          <a:p>
+            <a:r>
+              <a:rPr lang="en-US" sz="900" dirty="0">
+                <a:latin typeface="Roboto" charset="0"/>
+                <a:ea typeface="Roboto" charset="0"/>
+                <a:cs typeface="Roboto" charset="0"/>
+              </a:rPr>
+              <a:t>            --</a:t>
+            </a:r>
+            <a:r>
+              <a:rPr lang="en-US" sz="900" dirty="0" err="1">
+                <a:latin typeface="Roboto" charset="0"/>
+                <a:ea typeface="Roboto" charset="0"/>
+                <a:cs typeface="Roboto" charset="0"/>
+              </a:rPr>
+              <a:t>directory_to_write_links_file</a:t>
+            </a:r>
+            <a:r>
+              <a:rPr lang="en-US" sz="900" dirty="0">
+                <a:latin typeface="Roboto" charset="0"/>
+                <a:ea typeface="Roboto" charset="0"/>
+                <a:cs typeface="Roboto" charset="0"/>
+              </a:rPr>
+              <a:t>=/</a:t>
+            </a:r>
+            <a:r>
+              <a:rPr lang="en-US" sz="900" dirty="0" err="1">
+                <a:latin typeface="Roboto" charset="0"/>
+                <a:ea typeface="Roboto" charset="0"/>
+                <a:cs typeface="Roboto" charset="0"/>
+              </a:rPr>
+              <a:t>my_files</a:t>
+            </a:r>
+            <a:r>
+              <a:rPr lang="en-US" sz="900" dirty="0">
+                <a:latin typeface="Roboto" charset="0"/>
+                <a:ea typeface="Roboto" charset="0"/>
+                <a:cs typeface="Roboto" charset="0"/>
+              </a:rPr>
+              <a:t>/links</a:t>
+            </a:r>
+          </a:p>
+          <a:p>
+            <a:endParaRPr lang="en-US" sz="900" dirty="0">
+              <a:latin typeface="Roboto" charset="0"/>
+              <a:ea typeface="Roboto" charset="0"/>
+              <a:cs typeface="Roboto" charset="0"/>
+            </a:endParaRPr>
+          </a:p>
+          <a:p>
+            <a:r>
+              <a:rPr lang="en-US" sz="900" dirty="0">
+                <a:latin typeface="Roboto" charset="0"/>
+                <a:ea typeface="Roboto" charset="0"/>
+                <a:cs typeface="Roboto" charset="0"/>
+              </a:rPr>
+              <a:t>    --</a:t>
+            </a:r>
+            <a:r>
+              <a:rPr lang="en-US" sz="900" dirty="0" err="1">
+                <a:latin typeface="Roboto" charset="0"/>
+                <a:ea typeface="Roboto" charset="0"/>
+                <a:cs typeface="Roboto" charset="0"/>
+              </a:rPr>
+              <a:t>directory_with_templates</a:t>
+            </a:r>
+            <a:endParaRPr lang="en-US" sz="900" dirty="0">
+              <a:latin typeface="Roboto" charset="0"/>
+              <a:ea typeface="Roboto" charset="0"/>
+              <a:cs typeface="Roboto" charset="0"/>
+            </a:endParaRPr>
+          </a:p>
+          <a:p>
+            <a:r>
+              <a:rPr lang="en-US" sz="900" dirty="0">
+                <a:latin typeface="Roboto" charset="0"/>
+                <a:ea typeface="Roboto" charset="0"/>
+                <a:cs typeface="Roboto" charset="0"/>
+              </a:rPr>
+              <a:t>        You can specify a different location to reading/write the template and model files. It will default to &lt;</a:t>
+            </a:r>
+            <a:r>
+              <a:rPr lang="en-US" sz="900" dirty="0" err="1">
+                <a:latin typeface="Roboto" charset="0"/>
+                <a:ea typeface="Roboto" charset="0"/>
+                <a:cs typeface="Roboto" charset="0"/>
+              </a:rPr>
+              <a:t>script_location</a:t>
+            </a:r>
+            <a:r>
+              <a:rPr lang="en-US" sz="900" dirty="0">
+                <a:latin typeface="Roboto" charset="0"/>
+                <a:ea typeface="Roboto" charset="0"/>
+                <a:cs typeface="Roboto" charset="0"/>
+              </a:rPr>
+              <a:t>&gt;/data/templates </a:t>
+            </a:r>
+          </a:p>
+          <a:p>
+            <a:r>
+              <a:rPr lang="en-US" sz="900" dirty="0">
+                <a:latin typeface="Roboto" charset="0"/>
+                <a:ea typeface="Roboto" charset="0"/>
+                <a:cs typeface="Roboto" charset="0"/>
+              </a:rPr>
+              <a:t>        Example:</a:t>
+            </a:r>
+          </a:p>
+          <a:p>
+            <a:r>
+              <a:rPr lang="en-US" sz="900" dirty="0">
+                <a:latin typeface="Roboto" charset="0"/>
+                <a:ea typeface="Roboto" charset="0"/>
+                <a:cs typeface="Roboto" charset="0"/>
+              </a:rPr>
+              <a:t>            --</a:t>
+            </a:r>
+            <a:r>
+              <a:rPr lang="en-US" sz="900" dirty="0" err="1">
+                <a:latin typeface="Roboto" charset="0"/>
+                <a:ea typeface="Roboto" charset="0"/>
+                <a:cs typeface="Roboto" charset="0"/>
+              </a:rPr>
+              <a:t>directory_with_templates</a:t>
+            </a:r>
+            <a:r>
+              <a:rPr lang="en-US" sz="900" dirty="0">
+                <a:latin typeface="Roboto" charset="0"/>
+                <a:ea typeface="Roboto" charset="0"/>
+                <a:cs typeface="Roboto" charset="0"/>
+              </a:rPr>
+              <a:t>=/</a:t>
+            </a:r>
+            <a:r>
+              <a:rPr lang="en-US" sz="900" dirty="0" err="1">
+                <a:latin typeface="Roboto" charset="0"/>
+                <a:ea typeface="Roboto" charset="0"/>
+                <a:cs typeface="Roboto" charset="0"/>
+              </a:rPr>
+              <a:t>my_files</a:t>
+            </a:r>
+            <a:r>
+              <a:rPr lang="en-US" sz="900" dirty="0">
+                <a:latin typeface="Roboto" charset="0"/>
+                <a:ea typeface="Roboto" charset="0"/>
+                <a:cs typeface="Roboto" charset="0"/>
+              </a:rPr>
+              <a:t>/data/templates</a:t>
+            </a:r>
+          </a:p>
+          <a:p>
+            <a:endParaRPr lang="en-US" sz="900" dirty="0">
+              <a:latin typeface="Roboto" charset="0"/>
+              <a:ea typeface="Roboto" charset="0"/>
+              <a:cs typeface="Roboto" charset="0"/>
+            </a:endParaRPr>
+          </a:p>
+          <a:p>
+            <a:r>
+              <a:rPr lang="en-US" sz="900" dirty="0">
+                <a:latin typeface="Roboto" charset="0"/>
+                <a:ea typeface="Roboto" charset="0"/>
+                <a:cs typeface="Roboto" charset="0"/>
+              </a:rPr>
+              <a:t>    --</a:t>
+            </a:r>
+            <a:r>
+              <a:rPr lang="en-US" sz="900" dirty="0" err="1">
+                <a:latin typeface="Roboto" charset="0"/>
+                <a:ea typeface="Roboto" charset="0"/>
+                <a:cs typeface="Roboto" charset="0"/>
+              </a:rPr>
+              <a:t>directory_to_write_resource_files</a:t>
+            </a:r>
+            <a:endParaRPr lang="en-US" sz="900" dirty="0">
+              <a:latin typeface="Roboto" charset="0"/>
+              <a:ea typeface="Roboto" charset="0"/>
+              <a:cs typeface="Roboto" charset="0"/>
+            </a:endParaRPr>
+          </a:p>
+          <a:p>
+            <a:r>
+              <a:rPr lang="en-US" sz="900" dirty="0">
+                <a:latin typeface="Roboto" charset="0"/>
+                <a:ea typeface="Roboto" charset="0"/>
+                <a:cs typeface="Roboto" charset="0"/>
+              </a:rPr>
+              <a:t>        You can specify a different location to write the ETL Resource zip files. It will default to &lt;</a:t>
+            </a:r>
+            <a:r>
+              <a:rPr lang="en-US" sz="900" dirty="0" err="1">
+                <a:latin typeface="Roboto" charset="0"/>
+                <a:ea typeface="Roboto" charset="0"/>
+                <a:cs typeface="Roboto" charset="0"/>
+              </a:rPr>
+              <a:t>script_location</a:t>
+            </a:r>
+            <a:r>
+              <a:rPr lang="en-US" sz="900" dirty="0">
+                <a:latin typeface="Roboto" charset="0"/>
+                <a:ea typeface="Roboto" charset="0"/>
+                <a:cs typeface="Roboto" charset="0"/>
+              </a:rPr>
+              <a:t>&gt;/resources </a:t>
+            </a:r>
+          </a:p>
+          <a:p>
+            <a:r>
+              <a:rPr lang="en-US" sz="900" dirty="0">
+                <a:latin typeface="Roboto" charset="0"/>
+                <a:ea typeface="Roboto" charset="0"/>
+                <a:cs typeface="Roboto" charset="0"/>
+              </a:rPr>
+              <a:t>        Example:</a:t>
+            </a:r>
+          </a:p>
+          <a:p>
+            <a:r>
+              <a:rPr lang="en-US" sz="900" dirty="0">
+                <a:latin typeface="Roboto" charset="0"/>
+                <a:ea typeface="Roboto" charset="0"/>
+                <a:cs typeface="Roboto" charset="0"/>
+              </a:rPr>
+              <a:t>            --</a:t>
+            </a:r>
+            <a:r>
+              <a:rPr lang="en-US" sz="900" dirty="0" err="1">
+                <a:latin typeface="Roboto" charset="0"/>
+                <a:ea typeface="Roboto" charset="0"/>
+                <a:cs typeface="Roboto" charset="0"/>
+              </a:rPr>
+              <a:t>directory_to_write_resource_files</a:t>
+            </a:r>
+            <a:r>
+              <a:rPr lang="en-US" sz="900" dirty="0">
+                <a:latin typeface="Roboto" charset="0"/>
+                <a:ea typeface="Roboto" charset="0"/>
+                <a:cs typeface="Roboto" charset="0"/>
+              </a:rPr>
+              <a:t>=/</a:t>
+            </a:r>
+            <a:r>
+              <a:rPr lang="en-US" sz="900" dirty="0" err="1">
+                <a:latin typeface="Roboto" charset="0"/>
+                <a:ea typeface="Roboto" charset="0"/>
+                <a:cs typeface="Roboto" charset="0"/>
+              </a:rPr>
+              <a:t>my_files</a:t>
+            </a:r>
+            <a:r>
+              <a:rPr lang="en-US" sz="900" dirty="0">
+                <a:latin typeface="Roboto" charset="0"/>
+                <a:ea typeface="Roboto" charset="0"/>
+                <a:cs typeface="Roboto" charset="0"/>
+              </a:rPr>
+              <a:t>/resources</a:t>
+            </a:r>
+          </a:p>
+          <a:p>
+            <a:endParaRPr lang="en-US" sz="900" dirty="0">
+              <a:latin typeface="Roboto" charset="0"/>
+              <a:ea typeface="Roboto" charset="0"/>
+              <a:cs typeface="Roboto" charset="0"/>
+            </a:endParaRPr>
+          </a:p>
+          <a:p>
+            <a:r>
+              <a:rPr lang="en-US" sz="900" dirty="0">
+                <a:latin typeface="Roboto" charset="0"/>
+                <a:ea typeface="Roboto" charset="0"/>
+                <a:cs typeface="Roboto" charset="0"/>
+              </a:rPr>
+              <a:t>    --</a:t>
+            </a:r>
+            <a:r>
+              <a:rPr lang="en-US" sz="900" dirty="0" err="1">
+                <a:latin typeface="Roboto" charset="0"/>
+                <a:ea typeface="Roboto" charset="0"/>
+                <a:cs typeface="Roboto" charset="0"/>
+              </a:rPr>
+              <a:t>extracts_folder</a:t>
+            </a:r>
+            <a:endParaRPr lang="en-US" sz="900" dirty="0">
+              <a:latin typeface="Roboto" charset="0"/>
+              <a:ea typeface="Roboto" charset="0"/>
+              <a:cs typeface="Roboto" charset="0"/>
+            </a:endParaRPr>
+          </a:p>
+          <a:p>
+            <a:r>
+              <a:rPr lang="en-US" sz="900" dirty="0">
+                <a:latin typeface="Roboto" charset="0"/>
+                <a:ea typeface="Roboto" charset="0"/>
+                <a:cs typeface="Roboto" charset="0"/>
+              </a:rPr>
+              <a:t>        You can specify a different location to write the temporary files that the </a:t>
+            </a:r>
+            <a:r>
+              <a:rPr lang="en-US" sz="900" dirty="0" err="1">
+                <a:latin typeface="Roboto" charset="0"/>
+                <a:ea typeface="Roboto" charset="0"/>
+                <a:cs typeface="Roboto" charset="0"/>
+              </a:rPr>
+              <a:t>api</a:t>
+            </a:r>
+            <a:r>
+              <a:rPr lang="en-US" sz="900" dirty="0">
+                <a:latin typeface="Roboto" charset="0"/>
+                <a:ea typeface="Roboto" charset="0"/>
+                <a:cs typeface="Roboto" charset="0"/>
+              </a:rPr>
+              <a:t> downloads. These files are raw collection of resources, and assets (in the case of using the </a:t>
+            </a:r>
+            <a:r>
+              <a:rPr lang="en-US" sz="900" dirty="0" err="1">
+                <a:latin typeface="Roboto" charset="0"/>
+                <a:ea typeface="Roboto" charset="0"/>
+                <a:cs typeface="Roboto" charset="0"/>
+              </a:rPr>
+              <a:t>api</a:t>
+            </a:r>
+            <a:r>
+              <a:rPr lang="en-US" sz="900" dirty="0">
+                <a:latin typeface="Roboto" charset="0"/>
+                <a:ea typeface="Roboto" charset="0"/>
+                <a:cs typeface="Roboto" charset="0"/>
+              </a:rPr>
+              <a:t>) It will default to &lt;</a:t>
+            </a:r>
+            <a:r>
+              <a:rPr lang="en-US" sz="900" dirty="0" err="1">
+                <a:latin typeface="Roboto" charset="0"/>
+                <a:ea typeface="Roboto" charset="0"/>
+                <a:cs typeface="Roboto" charset="0"/>
+              </a:rPr>
+              <a:t>script_location</a:t>
+            </a:r>
+            <a:r>
+              <a:rPr lang="en-US" sz="900" dirty="0">
+                <a:latin typeface="Roboto" charset="0"/>
+                <a:ea typeface="Roboto" charset="0"/>
+                <a:cs typeface="Roboto" charset="0"/>
+              </a:rPr>
+              <a:t>&gt;/data </a:t>
+            </a:r>
+          </a:p>
+          <a:p>
+            <a:r>
+              <a:rPr lang="en-US" sz="900" dirty="0">
+                <a:latin typeface="Roboto" charset="0"/>
+                <a:ea typeface="Roboto" charset="0"/>
+                <a:cs typeface="Roboto" charset="0"/>
+              </a:rPr>
+              <a:t>        Example:</a:t>
+            </a:r>
+          </a:p>
+          <a:p>
+            <a:r>
+              <a:rPr lang="en-US" sz="900" dirty="0">
+                <a:latin typeface="Roboto" charset="0"/>
+                <a:ea typeface="Roboto" charset="0"/>
+                <a:cs typeface="Roboto" charset="0"/>
+              </a:rPr>
+              <a:t>            --</a:t>
+            </a:r>
+            <a:r>
+              <a:rPr lang="en-US" sz="900" dirty="0" err="1">
+                <a:latin typeface="Roboto" charset="0"/>
+                <a:ea typeface="Roboto" charset="0"/>
+                <a:cs typeface="Roboto" charset="0"/>
+              </a:rPr>
+              <a:t>extracts_folder</a:t>
+            </a:r>
+            <a:r>
+              <a:rPr lang="en-US" sz="900" dirty="0">
+                <a:latin typeface="Roboto" charset="0"/>
+                <a:ea typeface="Roboto" charset="0"/>
+                <a:cs typeface="Roboto" charset="0"/>
+              </a:rPr>
+              <a:t>=/</a:t>
+            </a:r>
+            <a:r>
+              <a:rPr lang="en-US" sz="900" dirty="0" err="1">
+                <a:latin typeface="Roboto" charset="0"/>
+                <a:ea typeface="Roboto" charset="0"/>
+                <a:cs typeface="Roboto" charset="0"/>
+              </a:rPr>
+              <a:t>my_files</a:t>
+            </a:r>
+            <a:r>
+              <a:rPr lang="en-US" sz="900" dirty="0">
+                <a:latin typeface="Roboto" charset="0"/>
+                <a:ea typeface="Roboto" charset="0"/>
+                <a:cs typeface="Roboto" charset="0"/>
+              </a:rPr>
+              <a:t>/data</a:t>
+            </a:r>
+          </a:p>
+          <a:p>
+            <a:endParaRPr lang="en-US" sz="900" dirty="0">
+              <a:latin typeface="Roboto" charset="0"/>
+              <a:ea typeface="Roboto" charset="0"/>
+              <a:cs typeface="Roboto" charset="0"/>
+            </a:endParaRPr>
+          </a:p>
+          <a:p>
+            <a:r>
+              <a:rPr lang="en-US" sz="900" dirty="0">
+                <a:latin typeface="Roboto" charset="0"/>
+                <a:ea typeface="Roboto" charset="0"/>
+                <a:cs typeface="Roboto" charset="0"/>
+              </a:rPr>
+              <a:t>   </a:t>
+            </a:r>
+          </a:p>
+        </p:txBody>
+      </p:sp>
+    </p:spTree>
+    <p:extLst>
+      <p:ext uri="{BB962C8B-B14F-4D97-AF65-F5344CB8AC3E}">
+        <p14:creationId xmlns:p14="http://schemas.microsoft.com/office/powerpoint/2010/main" val="232155306"/>
+      </p:ext>
+    </p:extLst>
+  </p:cSld>
+  <p:clrMapOvr>
+    <a:masterClrMapping/>
+  </p:clrMapOvr>
+  <mc:AlternateContent xmlns:mc="http://schemas.openxmlformats.org/markup-compatibility/2006" xmlns:p14="http://schemas.microsoft.com/office/powerpoint/2010/main">
+    <mc:Choice Requires="p14">
+      <p:transition spd="med" p14:dur="700" advClick="0">
+        <p:fade/>
+      </p:transition>
+    </mc:Choice>
+    <mc:Fallback xmlns="">
+      <p:transition spd="med" advClick="0">
+        <p:fade/>
+      </p:transition>
+    </mc:Fallback>
+  </mc:AlternateContent>
+</p:sld>
+</file>
+
+<file path=ppt/slides/slide12.xml><?xml version="1.0" encoding="utf-8"?>
+<p:sld xmlns:a="http://schemas.openxmlformats.org/drawingml/2006/main" xmlns:r="http://schemas.openxmlformats.org/officeDocument/2006/relationships" xmlns:p="http://schemas.openxmlformats.org/presentationml/2006/main">
+  <p:cSld>
+    <p:spTree>
+      <p:nvGrpSpPr>
+        <p:cNvPr id="1" name=""/>
+        <p:cNvGrpSpPr/>
+        <p:nvPr/>
+      </p:nvGrpSpPr>
+      <p:grpSpPr>
+        <a:xfrm>
+          <a:off x="0" y="0"/>
+          <a:ext cx="0" cy="0"/>
+          <a:chOff x="0" y="0"/>
+          <a:chExt cx="0" cy="0"/>
+        </a:xfrm>
+      </p:grpSpPr>
+      <p:sp>
+        <p:nvSpPr>
+          <p:cNvPr id="5" name="Title 4">
+            <a:extLst>
+              <a:ext uri="{FF2B5EF4-FFF2-40B4-BE49-F238E27FC236}">
+                <a16:creationId xmlns:a16="http://schemas.microsoft.com/office/drawing/2014/main" id="{C2B479B7-4E1E-475F-B459-5CE8B05302D3}"/>
+              </a:ext>
+            </a:extLst>
+          </p:cNvPr>
+          <p:cNvSpPr>
+            <a:spLocks noGrp="1"/>
+          </p:cNvSpPr>
+          <p:nvPr>
+            <p:ph type="title"/>
+          </p:nvPr>
+        </p:nvSpPr>
+        <p:spPr>
+          <a:xfrm>
+            <a:off x="319060" y="187082"/>
+            <a:ext cx="11195177" cy="562427"/>
+          </a:xfrm>
+        </p:spPr>
+        <p:txBody>
+          <a:bodyPr/>
+          <a:lstStyle/>
+          <a:p>
+            <a:r>
+              <a:rPr lang="en-US" dirty="0"/>
+              <a:t>Usage </a:t>
+            </a:r>
+            <a:r>
+              <a:rPr lang="en-US" sz="2400" dirty="0"/>
+              <a:t>(optional parameters)</a:t>
+            </a:r>
+            <a:endParaRPr lang="en-IN" sz="2400" dirty="0"/>
+          </a:p>
+        </p:txBody>
+      </p:sp>
+      <p:sp>
+        <p:nvSpPr>
+          <p:cNvPr id="16" name="Content Placeholder 13">
+            <a:extLst>
+              <a:ext uri="{FF2B5EF4-FFF2-40B4-BE49-F238E27FC236}">
+                <a16:creationId xmlns:a16="http://schemas.microsoft.com/office/drawing/2014/main" id="{807EB0DB-72EF-4CAE-8A2F-F7E55C093081}"/>
+              </a:ext>
+            </a:extLst>
+          </p:cNvPr>
+          <p:cNvSpPr txBox="1">
+            <a:spLocks/>
+          </p:cNvSpPr>
+          <p:nvPr/>
+        </p:nvSpPr>
+        <p:spPr>
+          <a:xfrm>
+            <a:off x="1180247" y="1610532"/>
+            <a:ext cx="3180631" cy="2562457"/>
+          </a:xfrm>
+          <a:prstGeom prst="rect">
+            <a:avLst/>
+          </a:prstGeom>
+        </p:spPr>
+        <p:txBody>
+          <a:bodyPr vert="horz" lIns="0" tIns="0" rIns="0" bIns="0" rtlCol="0">
+            <a:noAutofit/>
+          </a:bodyPr>
+          <a:lstStyle>
+            <a:lvl1pPr marL="173038" indent="-173038" algn="l" defTabSz="914217" rtl="0" eaLnBrk="1" latinLnBrk="0" hangingPunct="1">
+              <a:lnSpc>
+                <a:spcPct val="90000"/>
+              </a:lnSpc>
+              <a:spcBef>
+                <a:spcPts val="400"/>
+              </a:spcBef>
+              <a:spcAft>
+                <a:spcPts val="1200"/>
+              </a:spcAft>
+              <a:buClr>
+                <a:schemeClr val="accent2"/>
+              </a:buClr>
+              <a:buFont typeface="Arial" panose="020B0604020202020204" pitchFamily="34" charset="0"/>
+              <a:buChar char="•"/>
+              <a:defRPr sz="2100" b="0" i="0" kern="1200" baseline="0">
+                <a:solidFill>
+                  <a:schemeClr val="tx1"/>
+                </a:solidFill>
+                <a:latin typeface="Roboto" charset="0"/>
+                <a:ea typeface="Roboto" charset="0"/>
+                <a:cs typeface="Roboto" charset="0"/>
+              </a:defRPr>
+            </a:lvl1pPr>
+            <a:lvl2pPr marL="344488" indent="-174625" algn="l" defTabSz="914217" rtl="0" eaLnBrk="1" latinLnBrk="0" hangingPunct="1">
+              <a:lnSpc>
+                <a:spcPct val="90000"/>
+              </a:lnSpc>
+              <a:spcBef>
+                <a:spcPts val="0"/>
+              </a:spcBef>
+              <a:spcAft>
+                <a:spcPts val="1200"/>
+              </a:spcAft>
+              <a:buClr>
+                <a:schemeClr val="accent2"/>
+              </a:buClr>
+              <a:buFont typeface="Arial" panose="020B0604020202020204" pitchFamily="34" charset="0"/>
+              <a:buChar char="•"/>
+              <a:defRPr sz="1800" b="0" i="0" kern="1200" baseline="0">
+                <a:solidFill>
+                  <a:schemeClr val="tx1"/>
+                </a:solidFill>
+                <a:latin typeface="Roboto" charset="0"/>
+                <a:ea typeface="Roboto" charset="0"/>
+                <a:cs typeface="Roboto" charset="0"/>
+              </a:defRPr>
+            </a:lvl2pPr>
+            <a:lvl3pPr marL="514350" indent="-169863" algn="l" defTabSz="914217" rtl="0" eaLnBrk="1" latinLnBrk="0" hangingPunct="1">
+              <a:lnSpc>
+                <a:spcPct val="90000"/>
+              </a:lnSpc>
+              <a:spcBef>
+                <a:spcPts val="0"/>
+              </a:spcBef>
+              <a:spcAft>
+                <a:spcPts val="1200"/>
+              </a:spcAft>
+              <a:buClr>
+                <a:schemeClr val="accent2"/>
+              </a:buClr>
+              <a:buFont typeface="Arial" panose="020B0604020202020204" pitchFamily="34" charset="0"/>
+              <a:buChar char="•"/>
+              <a:defRPr sz="1600" b="0" i="0" kern="1200">
+                <a:solidFill>
+                  <a:schemeClr val="tx1"/>
+                </a:solidFill>
+                <a:latin typeface="Roboto" charset="0"/>
+                <a:ea typeface="Roboto" charset="0"/>
+                <a:cs typeface="Roboto" charset="0"/>
+              </a:defRPr>
+            </a:lvl3pPr>
+            <a:lvl4pPr marL="630238" indent="-171450" algn="l" defTabSz="914217" rtl="0" eaLnBrk="1" latinLnBrk="0" hangingPunct="1">
+              <a:lnSpc>
+                <a:spcPct val="90000"/>
+              </a:lnSpc>
+              <a:spcBef>
+                <a:spcPts val="0"/>
+              </a:spcBef>
+              <a:spcAft>
+                <a:spcPts val="1200"/>
+              </a:spcAft>
+              <a:buClr>
+                <a:schemeClr val="accent2"/>
+              </a:buClr>
+              <a:buFont typeface="Arial" panose="020B0604020202020204" pitchFamily="34" charset="0"/>
+              <a:buChar char="•"/>
+              <a:defRPr sz="1400" b="0" i="0" kern="1200">
+                <a:solidFill>
+                  <a:schemeClr val="tx1"/>
+                </a:solidFill>
+                <a:latin typeface="Roboto" charset="0"/>
+                <a:ea typeface="Roboto" charset="0"/>
+                <a:cs typeface="Roboto" charset="0"/>
+              </a:defRPr>
+            </a:lvl4pPr>
+            <a:lvl5pPr marL="800100" indent="-169863" algn="l" defTabSz="914217" rtl="0" eaLnBrk="1" latinLnBrk="0" hangingPunct="1">
+              <a:lnSpc>
+                <a:spcPct val="90000"/>
+              </a:lnSpc>
+              <a:spcBef>
+                <a:spcPts val="0"/>
+              </a:spcBef>
+              <a:spcAft>
+                <a:spcPts val="1200"/>
+              </a:spcAft>
+              <a:buClr>
+                <a:schemeClr val="accent2"/>
+              </a:buClr>
+              <a:buFont typeface="Arial" panose="020B0604020202020204" pitchFamily="34" charset="0"/>
+              <a:buChar char="•"/>
+              <a:defRPr sz="1400" b="0" i="0" kern="1200">
+                <a:solidFill>
+                  <a:schemeClr val="tx1"/>
+                </a:solidFill>
+                <a:latin typeface="Roboto" charset="0"/>
+                <a:ea typeface="Roboto" charset="0"/>
+                <a:cs typeface="Roboto" charset="0"/>
+              </a:defRPr>
+            </a:lvl5pPr>
+            <a:lvl6pPr marL="914400" indent="-169863" algn="l" defTabSz="914217" rtl="0" eaLnBrk="1" latinLnBrk="0" hangingPunct="1">
+              <a:lnSpc>
+                <a:spcPct val="90000"/>
+              </a:lnSpc>
+              <a:spcBef>
+                <a:spcPts val="500"/>
+              </a:spcBef>
+              <a:spcAft>
+                <a:spcPts val="1200"/>
+              </a:spcAft>
+              <a:buClr>
+                <a:schemeClr val="accent2"/>
+              </a:buClr>
+              <a:buFont typeface="Arial" panose="020B0604020202020204" pitchFamily="34" charset="0"/>
+              <a:buChar char="•"/>
+              <a:defRPr sz="1200" b="0" i="0" kern="1200">
+                <a:solidFill>
+                  <a:schemeClr val="tx1"/>
+                </a:solidFill>
+                <a:latin typeface="Roboto" charset="0"/>
+                <a:ea typeface="Roboto" charset="0"/>
+                <a:cs typeface="Roboto" charset="0"/>
+              </a:defRPr>
+            </a:lvl6pPr>
+            <a:lvl7pPr marL="1084263" indent="-169863" algn="l" defTabSz="914217" rtl="0" eaLnBrk="1" latinLnBrk="0" hangingPunct="1">
+              <a:lnSpc>
+                <a:spcPct val="90000"/>
+              </a:lnSpc>
+              <a:spcBef>
+                <a:spcPts val="500"/>
+              </a:spcBef>
+              <a:spcAft>
+                <a:spcPts val="1200"/>
+              </a:spcAft>
+              <a:buClr>
+                <a:schemeClr val="accent2"/>
+              </a:buClr>
+              <a:buFont typeface="Arial" panose="020B0604020202020204" pitchFamily="34" charset="0"/>
+              <a:buChar char="•"/>
+              <a:defRPr sz="1200" b="0" i="0" kern="1200">
+                <a:solidFill>
+                  <a:schemeClr val="tx1"/>
+                </a:solidFill>
+                <a:latin typeface="Roboto" charset="0"/>
+                <a:ea typeface="Roboto" charset="0"/>
+                <a:cs typeface="Roboto" charset="0"/>
+              </a:defRPr>
+            </a:lvl7pPr>
+            <a:lvl8pPr marL="1258888" indent="-174625" algn="l" defTabSz="914217" rtl="0" eaLnBrk="1" latinLnBrk="0" hangingPunct="1">
+              <a:lnSpc>
+                <a:spcPct val="90000"/>
+              </a:lnSpc>
+              <a:spcBef>
+                <a:spcPts val="500"/>
+              </a:spcBef>
+              <a:spcAft>
+                <a:spcPts val="1200"/>
+              </a:spcAft>
+              <a:buClr>
+                <a:schemeClr val="accent2"/>
+              </a:buClr>
+              <a:buFont typeface="Arial" panose="020B0604020202020204" pitchFamily="34" charset="0"/>
+              <a:buChar char="•"/>
+              <a:defRPr sz="1200" b="0" i="0" kern="1200">
+                <a:solidFill>
+                  <a:schemeClr val="tx1"/>
+                </a:solidFill>
+                <a:latin typeface="Roboto" charset="0"/>
+                <a:ea typeface="Roboto" charset="0"/>
+                <a:cs typeface="Roboto" charset="0"/>
+              </a:defRPr>
+            </a:lvl8pPr>
+            <a:lvl9pPr marL="1428750" indent="-169863" algn="l" defTabSz="914217" rtl="0" eaLnBrk="1" latinLnBrk="0" hangingPunct="1">
+              <a:lnSpc>
+                <a:spcPct val="90000"/>
+              </a:lnSpc>
+              <a:spcBef>
+                <a:spcPts val="500"/>
+              </a:spcBef>
+              <a:spcAft>
+                <a:spcPts val="1200"/>
+              </a:spcAft>
+              <a:buClr>
+                <a:schemeClr val="accent2"/>
+              </a:buClr>
+              <a:buFont typeface="Arial" panose="020B0604020202020204" pitchFamily="34" charset="0"/>
+              <a:buChar char="•"/>
+              <a:defRPr sz="1200" b="0" i="0" kern="1200">
+                <a:solidFill>
+                  <a:schemeClr val="tx1"/>
+                </a:solidFill>
+                <a:latin typeface="Roboto" charset="0"/>
+                <a:ea typeface="Roboto" charset="0"/>
+                <a:cs typeface="Roboto" charset="0"/>
+              </a:defRPr>
+            </a:lvl9pPr>
+          </a:lstStyle>
+          <a:p>
+            <a:pPr marL="0" indent="0">
+              <a:buNone/>
+            </a:pPr>
+            <a:endParaRPr lang="en-IN" sz="1600" dirty="0"/>
+          </a:p>
+        </p:txBody>
+      </p:sp>
+      <p:sp>
+        <p:nvSpPr>
+          <p:cNvPr id="6" name="TextBox 5">
+            <a:extLst>
+              <a:ext uri="{FF2B5EF4-FFF2-40B4-BE49-F238E27FC236}">
+                <a16:creationId xmlns:a16="http://schemas.microsoft.com/office/drawing/2014/main" id="{9F8FFC18-4FD7-5E97-CCB3-5E13CE612AEB}"/>
+              </a:ext>
+            </a:extLst>
+          </p:cNvPr>
+          <p:cNvSpPr txBox="1"/>
+          <p:nvPr/>
+        </p:nvSpPr>
+        <p:spPr>
+          <a:xfrm>
+            <a:off x="595566" y="761084"/>
+            <a:ext cx="11195176" cy="3872462"/>
+          </a:xfrm>
+          <a:prstGeom prst="rect">
+            <a:avLst/>
+          </a:prstGeom>
+          <a:noFill/>
+        </p:spPr>
+        <p:txBody>
+          <a:bodyPr wrap="square" lIns="0" tIns="0" rIns="0" bIns="0" rtlCol="0">
+            <a:noAutofit/>
+          </a:bodyPr>
+          <a:lstStyle/>
+          <a:p>
+            <a:endParaRPr lang="en-US" sz="900" dirty="0">
+              <a:latin typeface="Roboto" charset="0"/>
+              <a:ea typeface="Roboto" charset="0"/>
+              <a:cs typeface="Roboto" charset="0"/>
+            </a:endParaRPr>
+          </a:p>
+          <a:p>
+            <a:r>
+              <a:rPr lang="en-US" sz="900" dirty="0">
+                <a:latin typeface="Roboto" charset="0"/>
+                <a:ea typeface="Roboto" charset="0"/>
+                <a:cs typeface="Roboto" charset="0"/>
+              </a:rPr>
+              <a:t>Optionally, you can set parameters:</a:t>
+            </a:r>
+          </a:p>
+          <a:p>
+            <a:endParaRPr lang="en-US" sz="900" dirty="0">
+              <a:latin typeface="Roboto" charset="0"/>
+              <a:ea typeface="Roboto" charset="0"/>
+              <a:cs typeface="Roboto" charset="0"/>
+            </a:endParaRPr>
+          </a:p>
+          <a:p>
+            <a:endParaRPr lang="en-US" sz="900" dirty="0">
+              <a:latin typeface="Roboto" charset="0"/>
+              <a:ea typeface="Roboto" charset="0"/>
+              <a:cs typeface="Roboto" charset="0"/>
+            </a:endParaRPr>
+          </a:p>
+          <a:p>
+            <a:r>
+              <a:rPr lang="en-US" sz="900" dirty="0">
+                <a:latin typeface="Roboto" charset="0"/>
+                <a:ea typeface="Roboto" charset="0"/>
+                <a:cs typeface="Roboto" charset="0"/>
+              </a:rPr>
+              <a:t>   --</a:t>
+            </a:r>
+            <a:r>
+              <a:rPr lang="en-US" sz="900" dirty="0" err="1">
+                <a:latin typeface="Roboto" charset="0"/>
+                <a:ea typeface="Roboto" charset="0"/>
+                <a:cs typeface="Roboto" charset="0"/>
+              </a:rPr>
+              <a:t>models_to_download</a:t>
+            </a:r>
+            <a:endParaRPr lang="en-US" sz="900" dirty="0">
+              <a:latin typeface="Roboto" charset="0"/>
+              <a:ea typeface="Roboto" charset="0"/>
+              <a:cs typeface="Roboto" charset="0"/>
+            </a:endParaRPr>
+          </a:p>
+          <a:p>
+            <a:r>
+              <a:rPr lang="en-US" sz="900" dirty="0">
+                <a:latin typeface="Roboto" charset="0"/>
+                <a:ea typeface="Roboto" charset="0"/>
+                <a:cs typeface="Roboto" charset="0"/>
+              </a:rPr>
+              <a:t>        You can specify any additional models to download for your ETL. By default</a:t>
+            </a:r>
+          </a:p>
+          <a:p>
+            <a:r>
+              <a:rPr lang="en-US" sz="900" dirty="0">
+                <a:latin typeface="Roboto" charset="0"/>
+                <a:ea typeface="Roboto" charset="0"/>
+                <a:cs typeface="Roboto" charset="0"/>
+              </a:rPr>
+              <a:t>        it will download "com.infa.odin.models.IICS.V2","com.infa.odin.models.Script", and "core"</a:t>
+            </a:r>
+          </a:p>
+          <a:p>
+            <a:r>
+              <a:rPr lang="en-US" sz="900" dirty="0">
+                <a:latin typeface="Roboto" charset="0"/>
+                <a:ea typeface="Roboto" charset="0"/>
+                <a:cs typeface="Roboto" charset="0"/>
+              </a:rPr>
+              <a:t>        so no need to specify those. But if you are using an additional model, you can update the script</a:t>
+            </a:r>
+          </a:p>
+          <a:p>
+            <a:r>
+              <a:rPr lang="en-US" sz="900" dirty="0">
+                <a:latin typeface="Roboto" charset="0"/>
+                <a:ea typeface="Roboto" charset="0"/>
+                <a:cs typeface="Roboto" charset="0"/>
+              </a:rPr>
+              <a:t>        or you can specify the model in an array format. Note that typically, any templates you're going</a:t>
+            </a:r>
+          </a:p>
+          <a:p>
+            <a:r>
+              <a:rPr lang="en-US" sz="900" dirty="0">
+                <a:latin typeface="Roboto" charset="0"/>
+                <a:ea typeface="Roboto" charset="0"/>
+                <a:cs typeface="Roboto" charset="0"/>
+              </a:rPr>
+              <a:t>        to download, you'll want to get that model as well.</a:t>
+            </a:r>
+          </a:p>
+          <a:p>
+            <a:r>
+              <a:rPr lang="en-US" sz="900" dirty="0">
+                <a:latin typeface="Roboto" charset="0"/>
+                <a:ea typeface="Roboto" charset="0"/>
+                <a:cs typeface="Roboto" charset="0"/>
+              </a:rPr>
+              <a:t>        Example:</a:t>
+            </a:r>
+          </a:p>
+          <a:p>
+            <a:r>
+              <a:rPr lang="en-US" sz="900" dirty="0">
+                <a:latin typeface="Roboto" charset="0"/>
+                <a:ea typeface="Roboto" charset="0"/>
+                <a:cs typeface="Roboto" charset="0"/>
+              </a:rPr>
+              <a:t>            --</a:t>
+            </a:r>
+            <a:r>
+              <a:rPr lang="en-US" sz="900" dirty="0" err="1">
+                <a:latin typeface="Roboto" charset="0"/>
+                <a:ea typeface="Roboto" charset="0"/>
+                <a:cs typeface="Roboto" charset="0"/>
+              </a:rPr>
+              <a:t>models_to_download</a:t>
+            </a:r>
+            <a:r>
+              <a:rPr lang="en-US" sz="900" dirty="0">
+                <a:latin typeface="Roboto" charset="0"/>
+                <a:ea typeface="Roboto" charset="0"/>
+                <a:cs typeface="Roboto" charset="0"/>
+              </a:rPr>
+              <a:t>="['</a:t>
+            </a:r>
+            <a:r>
+              <a:rPr lang="en-US" sz="900" dirty="0" err="1">
+                <a:latin typeface="Roboto" charset="0"/>
+                <a:ea typeface="Roboto" charset="0"/>
+                <a:cs typeface="Roboto" charset="0"/>
+              </a:rPr>
+              <a:t>custom.etl</a:t>
+            </a:r>
+            <a:r>
+              <a:rPr lang="en-US" sz="900" dirty="0">
+                <a:latin typeface="Roboto" charset="0"/>
+                <a:ea typeface="Roboto" charset="0"/>
+                <a:cs typeface="Roboto" charset="0"/>
+              </a:rPr>
+              <a:t>', '</a:t>
+            </a:r>
+            <a:r>
+              <a:rPr lang="en-US" sz="900" dirty="0" err="1">
+                <a:latin typeface="Roboto" charset="0"/>
+                <a:ea typeface="Roboto" charset="0"/>
+                <a:cs typeface="Roboto" charset="0"/>
+              </a:rPr>
+              <a:t>custom.myScript</a:t>
+            </a:r>
+            <a:r>
+              <a:rPr lang="en-US" sz="900" dirty="0">
+                <a:latin typeface="Roboto" charset="0"/>
+                <a:ea typeface="Roboto" charset="0"/>
+                <a:cs typeface="Roboto" charset="0"/>
+              </a:rPr>
+              <a:t>']"</a:t>
+            </a:r>
+          </a:p>
+          <a:p>
+            <a:endParaRPr lang="en-US" sz="900" dirty="0">
+              <a:latin typeface="Roboto" charset="0"/>
+              <a:ea typeface="Roboto" charset="0"/>
+              <a:cs typeface="Roboto" charset="0"/>
+            </a:endParaRPr>
+          </a:p>
+          <a:p>
+            <a:r>
+              <a:rPr lang="en-US" sz="900" dirty="0">
+                <a:latin typeface="Roboto" charset="0"/>
+                <a:ea typeface="Roboto" charset="0"/>
+                <a:cs typeface="Roboto" charset="0"/>
+              </a:rPr>
+              <a:t>   --</a:t>
+            </a:r>
+            <a:r>
+              <a:rPr lang="en-US" sz="900" dirty="0" err="1">
+                <a:latin typeface="Roboto" charset="0"/>
+                <a:ea typeface="Roboto" charset="0"/>
+                <a:cs typeface="Roboto" charset="0"/>
+              </a:rPr>
+              <a:t>templates_to_download</a:t>
+            </a:r>
+            <a:endParaRPr lang="en-US" sz="900" dirty="0">
+              <a:latin typeface="Roboto" charset="0"/>
+              <a:ea typeface="Roboto" charset="0"/>
+              <a:cs typeface="Roboto" charset="0"/>
+            </a:endParaRPr>
+          </a:p>
+          <a:p>
+            <a:r>
+              <a:rPr lang="en-US" sz="900" dirty="0">
+                <a:latin typeface="Roboto" charset="0"/>
+                <a:ea typeface="Roboto" charset="0"/>
+                <a:cs typeface="Roboto" charset="0"/>
+              </a:rPr>
+              <a:t>        You can specify any additional models to download for your ETL. By default</a:t>
+            </a:r>
+          </a:p>
+          <a:p>
+            <a:r>
+              <a:rPr lang="en-US" sz="900" dirty="0">
+                <a:latin typeface="Roboto" charset="0"/>
+                <a:ea typeface="Roboto" charset="0"/>
+                <a:cs typeface="Roboto" charset="0"/>
+              </a:rPr>
+              <a:t>        it will download "com.infa.odin.models.IICS.V2" and "</a:t>
+            </a:r>
+            <a:r>
+              <a:rPr lang="en-US" sz="900" dirty="0" err="1">
+                <a:latin typeface="Roboto" charset="0"/>
+                <a:ea typeface="Roboto" charset="0"/>
+                <a:cs typeface="Roboto" charset="0"/>
+              </a:rPr>
+              <a:t>com.infa.odin.models.Script</a:t>
+            </a:r>
+            <a:r>
+              <a:rPr lang="en-US" sz="900" dirty="0">
+                <a:latin typeface="Roboto" charset="0"/>
+                <a:ea typeface="Roboto" charset="0"/>
+                <a:cs typeface="Roboto" charset="0"/>
+              </a:rPr>
+              <a:t>"</a:t>
+            </a:r>
+          </a:p>
+          <a:p>
+            <a:r>
+              <a:rPr lang="en-US" sz="900" dirty="0">
+                <a:latin typeface="Roboto" charset="0"/>
+                <a:ea typeface="Roboto" charset="0"/>
+                <a:cs typeface="Roboto" charset="0"/>
+              </a:rPr>
+              <a:t>        so no need to specify those. But if you are using an additional model, you can update the script</a:t>
+            </a:r>
+          </a:p>
+          <a:p>
+            <a:r>
+              <a:rPr lang="en-US" sz="900" dirty="0">
+                <a:latin typeface="Roboto" charset="0"/>
+                <a:ea typeface="Roboto" charset="0"/>
+                <a:cs typeface="Roboto" charset="0"/>
+              </a:rPr>
+              <a:t>        or you can specify the model in an array format. Note that typically, any templates you're going</a:t>
+            </a:r>
+          </a:p>
+          <a:p>
+            <a:r>
+              <a:rPr lang="en-US" sz="900" dirty="0">
+                <a:latin typeface="Roboto" charset="0"/>
+                <a:ea typeface="Roboto" charset="0"/>
+                <a:cs typeface="Roboto" charset="0"/>
+              </a:rPr>
+              <a:t>        to download, you'll want to get that model as well.</a:t>
+            </a:r>
+          </a:p>
+          <a:p>
+            <a:r>
+              <a:rPr lang="en-US" sz="900" dirty="0">
+                <a:latin typeface="Roboto" charset="0"/>
+                <a:ea typeface="Roboto" charset="0"/>
+                <a:cs typeface="Roboto" charset="0"/>
+              </a:rPr>
+              <a:t>        Example:</a:t>
+            </a:r>
+          </a:p>
+          <a:p>
+            <a:r>
+              <a:rPr lang="en-US" sz="900" dirty="0">
+                <a:latin typeface="Roboto" charset="0"/>
+                <a:ea typeface="Roboto" charset="0"/>
+                <a:cs typeface="Roboto" charset="0"/>
+              </a:rPr>
+              <a:t>            --</a:t>
+            </a:r>
+            <a:r>
+              <a:rPr lang="en-US" sz="900" dirty="0" err="1">
+                <a:latin typeface="Roboto" charset="0"/>
+                <a:ea typeface="Roboto" charset="0"/>
+                <a:cs typeface="Roboto" charset="0"/>
+              </a:rPr>
+              <a:t>templates_to_download</a:t>
+            </a:r>
+            <a:r>
+              <a:rPr lang="en-US" sz="900" dirty="0">
+                <a:latin typeface="Roboto" charset="0"/>
+                <a:ea typeface="Roboto" charset="0"/>
+                <a:cs typeface="Roboto" charset="0"/>
+              </a:rPr>
+              <a:t>="['</a:t>
+            </a:r>
+            <a:r>
+              <a:rPr lang="en-US" sz="900" dirty="0" err="1">
+                <a:latin typeface="Roboto" charset="0"/>
+                <a:ea typeface="Roboto" charset="0"/>
+                <a:cs typeface="Roboto" charset="0"/>
+              </a:rPr>
+              <a:t>custom.etl</a:t>
+            </a:r>
+            <a:r>
+              <a:rPr lang="en-US" sz="900" dirty="0">
+                <a:latin typeface="Roboto" charset="0"/>
+                <a:ea typeface="Roboto" charset="0"/>
+                <a:cs typeface="Roboto" charset="0"/>
+              </a:rPr>
+              <a:t>', '</a:t>
+            </a:r>
+            <a:r>
+              <a:rPr lang="en-US" sz="900" dirty="0" err="1">
+                <a:latin typeface="Roboto" charset="0"/>
+                <a:ea typeface="Roboto" charset="0"/>
+                <a:cs typeface="Roboto" charset="0"/>
+              </a:rPr>
+              <a:t>custom.myScript</a:t>
+            </a:r>
+            <a:r>
+              <a:rPr lang="en-US" sz="900" dirty="0">
+                <a:latin typeface="Roboto" charset="0"/>
+                <a:ea typeface="Roboto" charset="0"/>
+                <a:cs typeface="Roboto" charset="0"/>
+              </a:rPr>
+              <a:t>’]”</a:t>
+            </a:r>
+          </a:p>
+          <a:p>
+            <a:endParaRPr lang="en-US" sz="900" dirty="0">
+              <a:latin typeface="Roboto" charset="0"/>
+              <a:ea typeface="Roboto" charset="0"/>
+              <a:cs typeface="Roboto" charset="0"/>
+            </a:endParaRPr>
+          </a:p>
+          <a:p>
+            <a:endParaRPr lang="en-US" sz="900" dirty="0">
+              <a:latin typeface="Roboto" charset="0"/>
+              <a:ea typeface="Roboto" charset="0"/>
+              <a:cs typeface="Roboto" charset="0"/>
+            </a:endParaRPr>
+          </a:p>
+          <a:p>
+            <a:r>
+              <a:rPr lang="en-US" sz="900" dirty="0">
+                <a:latin typeface="Roboto" charset="0"/>
+                <a:ea typeface="Roboto" charset="0"/>
+                <a:cs typeface="Roboto" charset="0"/>
+              </a:rPr>
+              <a:t>Examples running with command line options</a:t>
+            </a:r>
+          </a:p>
+          <a:p>
+            <a:endParaRPr lang="en-US" sz="900" dirty="0">
+              <a:latin typeface="Roboto" charset="0"/>
+              <a:ea typeface="Roboto" charset="0"/>
+              <a:cs typeface="Roboto" charset="0"/>
+            </a:endParaRPr>
+          </a:p>
+        </p:txBody>
+      </p:sp>
+      <p:graphicFrame>
+        <p:nvGraphicFramePr>
+          <p:cNvPr id="2" name="Table 1">
+            <a:extLst>
+              <a:ext uri="{FF2B5EF4-FFF2-40B4-BE49-F238E27FC236}">
+                <a16:creationId xmlns:a16="http://schemas.microsoft.com/office/drawing/2014/main" id="{8E6B50F2-0C9C-0F66-0D28-518245E118E2}"/>
+              </a:ext>
+            </a:extLst>
+          </p:cNvPr>
+          <p:cNvGraphicFramePr>
+            <a:graphicFrameLocks noGrp="1"/>
+          </p:cNvGraphicFramePr>
+          <p:nvPr>
+            <p:extLst>
+              <p:ext uri="{D42A27DB-BD31-4B8C-83A1-F6EECF244321}">
+                <p14:modId xmlns:p14="http://schemas.microsoft.com/office/powerpoint/2010/main" val="943447114"/>
+              </p:ext>
+            </p:extLst>
+          </p:nvPr>
+        </p:nvGraphicFramePr>
+        <p:xfrm>
+          <a:off x="729762" y="4132305"/>
+          <a:ext cx="11060980" cy="1890426"/>
+        </p:xfrm>
+        <a:graphic>
+          <a:graphicData uri="http://schemas.openxmlformats.org/drawingml/2006/table">
+            <a:tbl>
+              <a:tblPr firstRow="1" bandRow="1">
+                <a:tableStyleId>{5C22544A-7EE6-4342-B048-85BDC9FD1C3A}</a:tableStyleId>
+              </a:tblPr>
+              <a:tblGrid>
+                <a:gridCol w="11060980">
+                  <a:extLst>
+                    <a:ext uri="{9D8B030D-6E8A-4147-A177-3AD203B41FA5}">
+                      <a16:colId xmlns:a16="http://schemas.microsoft.com/office/drawing/2014/main" val="1261491639"/>
+                    </a:ext>
+                  </a:extLst>
+                </a:gridCol>
+              </a:tblGrid>
+              <a:tr h="1890426">
+                <a:tc>
+                  <a:txBody>
+                    <a:bodyPr/>
+                    <a:lstStyle/>
+                    <a:p>
+                      <a:r>
+                        <a:rPr lang="en-US" sz="900" b="0" dirty="0">
+                          <a:solidFill>
+                            <a:schemeClr val="bg2"/>
+                          </a:solidFill>
+                          <a:latin typeface="Courier New" panose="02070309020205020404" pitchFamily="49" charset="0"/>
+                          <a:cs typeface="Courier New" panose="02070309020205020404" pitchFamily="49" charset="0"/>
+                        </a:rPr>
+                        <a:t>python custom_lineage_creator.py --</a:t>
+                      </a:r>
+                      <a:r>
+                        <a:rPr lang="en-US" sz="900" b="0" dirty="0" err="1">
+                          <a:solidFill>
+                            <a:schemeClr val="bg2"/>
+                          </a:solidFill>
+                          <a:latin typeface="Courier New" panose="02070309020205020404" pitchFamily="49" charset="0"/>
+                          <a:cs typeface="Courier New" panose="02070309020205020404" pitchFamily="49" charset="0"/>
+                        </a:rPr>
+                        <a:t>default_user</a:t>
+                      </a:r>
+                      <a:r>
+                        <a:rPr lang="en-US" sz="900" b="0" dirty="0">
+                          <a:solidFill>
+                            <a:schemeClr val="bg2"/>
+                          </a:solidFill>
+                          <a:latin typeface="Courier New" panose="02070309020205020404" pitchFamily="49" charset="0"/>
+                          <a:cs typeface="Courier New" panose="02070309020205020404" pitchFamily="49" charset="0"/>
+                        </a:rPr>
+                        <a:t>=</a:t>
+                      </a:r>
+                      <a:r>
+                        <a:rPr lang="en-US" sz="900" b="0" dirty="0" err="1">
+                          <a:solidFill>
+                            <a:schemeClr val="bg2"/>
+                          </a:solidFill>
+                          <a:latin typeface="Courier New" panose="02070309020205020404" pitchFamily="49" charset="0"/>
+                          <a:cs typeface="Courier New" panose="02070309020205020404" pitchFamily="49" charset="0"/>
+                        </a:rPr>
+                        <a:t>shayes_compass</a:t>
+                      </a:r>
+                      <a:r>
+                        <a:rPr lang="en-US" sz="900" b="0" dirty="0">
+                          <a:solidFill>
+                            <a:schemeClr val="bg2"/>
+                          </a:solidFill>
+                          <a:latin typeface="Courier New" panose="02070309020205020404" pitchFamily="49" charset="0"/>
+                          <a:cs typeface="Courier New" panose="02070309020205020404" pitchFamily="49" charset="0"/>
+                        </a:rPr>
+                        <a:t> --</a:t>
+                      </a:r>
+                      <a:r>
+                        <a:rPr lang="en-US" sz="900" b="0" dirty="0" err="1">
+                          <a:solidFill>
+                            <a:schemeClr val="bg2"/>
+                          </a:solidFill>
+                          <a:latin typeface="Courier New" panose="02070309020205020404" pitchFamily="49" charset="0"/>
+                          <a:cs typeface="Courier New" panose="02070309020205020404" pitchFamily="49" charset="0"/>
+                        </a:rPr>
+                        <a:t>default_pwd</a:t>
+                      </a:r>
+                      <a:r>
+                        <a:rPr lang="en-US" sz="900" b="0" dirty="0">
+                          <a:solidFill>
+                            <a:schemeClr val="bg2"/>
+                          </a:solidFill>
+                          <a:latin typeface="Courier New" panose="02070309020205020404" pitchFamily="49" charset="0"/>
+                          <a:cs typeface="Courier New" panose="02070309020205020404" pitchFamily="49" charset="0"/>
+                        </a:rPr>
+                        <a:t>="</a:t>
+                      </a:r>
+                      <a:r>
+                        <a:rPr lang="en-US" sz="900" b="0" dirty="0" err="1">
+                          <a:solidFill>
+                            <a:schemeClr val="bg2"/>
+                          </a:solidFill>
+                          <a:latin typeface="Courier New" panose="02070309020205020404" pitchFamily="49" charset="0"/>
+                          <a:cs typeface="Courier New" panose="02070309020205020404" pitchFamily="49" charset="0"/>
+                        </a:rPr>
+                        <a:t>my_password</a:t>
+                      </a:r>
+                      <a:r>
+                        <a:rPr lang="en-US" sz="900" b="0" dirty="0">
+                          <a:solidFill>
+                            <a:schemeClr val="bg2"/>
+                          </a:solidFill>
+                          <a:latin typeface="Courier New" panose="02070309020205020404" pitchFamily="49" charset="0"/>
+                          <a:cs typeface="Courier New" panose="02070309020205020404" pitchFamily="49" charset="0"/>
+                        </a:rPr>
+                        <a:t>" --</a:t>
+                      </a:r>
+                      <a:r>
+                        <a:rPr lang="en-US" sz="900" b="0" dirty="0" err="1">
+                          <a:solidFill>
+                            <a:schemeClr val="bg2"/>
+                          </a:solidFill>
+                          <a:latin typeface="Courier New" panose="02070309020205020404" pitchFamily="49" charset="0"/>
+                          <a:cs typeface="Courier New" panose="02070309020205020404" pitchFamily="49" charset="0"/>
+                        </a:rPr>
+                        <a:t>default_pod</a:t>
+                      </a:r>
+                      <a:r>
+                        <a:rPr lang="en-US" sz="900" b="0" dirty="0">
+                          <a:solidFill>
+                            <a:schemeClr val="bg2"/>
+                          </a:solidFill>
+                          <a:latin typeface="Courier New" panose="02070309020205020404" pitchFamily="49" charset="0"/>
+                          <a:cs typeface="Courier New" panose="02070309020205020404" pitchFamily="49" charset="0"/>
+                        </a:rPr>
+                        <a:t>=</a:t>
+                      </a:r>
+                      <a:r>
+                        <a:rPr lang="en-US" sz="900" b="0" dirty="0" err="1">
+                          <a:solidFill>
+                            <a:schemeClr val="bg2"/>
+                          </a:solidFill>
+                          <a:latin typeface="Courier New" panose="02070309020205020404" pitchFamily="49" charset="0"/>
+                          <a:cs typeface="Courier New" panose="02070309020205020404" pitchFamily="49" charset="0"/>
+                        </a:rPr>
+                        <a:t>dmp</a:t>
+                      </a:r>
+                      <a:r>
+                        <a:rPr lang="en-US" sz="900" b="0" dirty="0">
+                          <a:solidFill>
+                            <a:schemeClr val="bg2"/>
+                          </a:solidFill>
+                          <a:latin typeface="Courier New" panose="02070309020205020404" pitchFamily="49" charset="0"/>
+                          <a:cs typeface="Courier New" panose="02070309020205020404" pitchFamily="49" charset="0"/>
+                        </a:rPr>
+                        <a:t>-us --</a:t>
+                      </a:r>
+                      <a:r>
+                        <a:rPr lang="en-US" sz="900" b="0" dirty="0" err="1">
+                          <a:solidFill>
+                            <a:schemeClr val="bg2"/>
+                          </a:solidFill>
+                          <a:latin typeface="Courier New" panose="02070309020205020404" pitchFamily="49" charset="0"/>
+                          <a:cs typeface="Courier New" panose="02070309020205020404" pitchFamily="49" charset="0"/>
+                        </a:rPr>
+                        <a:t>prompt_for_login_info</a:t>
+                      </a:r>
+                      <a:r>
+                        <a:rPr lang="en-US" sz="900" b="0" dirty="0">
+                          <a:solidFill>
+                            <a:schemeClr val="bg2"/>
+                          </a:solidFill>
+                          <a:latin typeface="Courier New" panose="02070309020205020404" pitchFamily="49" charset="0"/>
+                          <a:cs typeface="Courier New" panose="02070309020205020404" pitchFamily="49" charset="0"/>
+                        </a:rPr>
+                        <a:t>=False </a:t>
+                      </a:r>
+                    </a:p>
+                    <a:p>
+                      <a:r>
+                        <a:rPr lang="en-US" sz="900" b="0" dirty="0">
+                          <a:solidFill>
+                            <a:schemeClr val="bg2"/>
+                          </a:solidFill>
+                          <a:latin typeface="Courier New" panose="02070309020205020404" pitchFamily="49" charset="0"/>
+                          <a:cs typeface="Courier New" panose="02070309020205020404" pitchFamily="49" charset="0"/>
+                        </a:rPr>
+                        <a:t>--</a:t>
+                      </a:r>
+                      <a:r>
+                        <a:rPr lang="en-US" sz="900" b="0" dirty="0" err="1">
+                          <a:solidFill>
+                            <a:schemeClr val="bg2"/>
+                          </a:solidFill>
+                          <a:latin typeface="Courier New" panose="02070309020205020404" pitchFamily="49" charset="0"/>
+                          <a:cs typeface="Courier New" panose="02070309020205020404" pitchFamily="49" charset="0"/>
+                        </a:rPr>
+                        <a:t>config_file</a:t>
+                      </a:r>
+                      <a:r>
+                        <a:rPr lang="en-US" sz="900" b="0" dirty="0">
+                          <a:solidFill>
+                            <a:schemeClr val="bg2"/>
+                          </a:solidFill>
+                          <a:latin typeface="Courier New" panose="02070309020205020404" pitchFamily="49" charset="0"/>
+                          <a:cs typeface="Courier New" panose="02070309020205020404" pitchFamily="49" charset="0"/>
+                        </a:rPr>
+                        <a:t>="config - Lineage (Oracle to SQL).csv" --</a:t>
+                      </a:r>
+                      <a:r>
+                        <a:rPr lang="en-US" sz="900" b="0" dirty="0" err="1">
+                          <a:solidFill>
+                            <a:schemeClr val="bg2"/>
+                          </a:solidFill>
+                          <a:latin typeface="Courier New" panose="02070309020205020404" pitchFamily="49" charset="0"/>
+                          <a:cs typeface="Courier New" panose="02070309020205020404" pitchFamily="49" charset="0"/>
+                        </a:rPr>
+                        <a:t>pause_before_loading</a:t>
+                      </a:r>
+                      <a:r>
+                        <a:rPr lang="en-US" sz="900" b="0" dirty="0">
+                          <a:solidFill>
+                            <a:schemeClr val="bg2"/>
+                          </a:solidFill>
+                          <a:latin typeface="Courier New" panose="02070309020205020404" pitchFamily="49" charset="0"/>
+                          <a:cs typeface="Courier New" panose="02070309020205020404" pitchFamily="49" charset="0"/>
+                        </a:rPr>
+                        <a:t>=False</a:t>
+                      </a:r>
+                    </a:p>
+                    <a:p>
+                      <a:endParaRPr lang="en-US" sz="900" b="0" dirty="0">
+                        <a:solidFill>
+                          <a:schemeClr val="bg2"/>
+                        </a:solidFill>
+                        <a:latin typeface="Courier New" panose="02070309020205020404" pitchFamily="49" charset="0"/>
+                        <a:cs typeface="Courier New" panose="02070309020205020404" pitchFamily="49" charset="0"/>
+                      </a:endParaRPr>
+                    </a:p>
+                    <a:p>
+                      <a:r>
+                        <a:rPr lang="en-US" sz="900" b="0" dirty="0">
+                          <a:solidFill>
+                            <a:schemeClr val="bg2"/>
+                          </a:solidFill>
+                          <a:latin typeface="Courier New" panose="02070309020205020404" pitchFamily="49" charset="0"/>
+                          <a:cs typeface="Courier New" panose="02070309020205020404" pitchFamily="49" charset="0"/>
+                        </a:rPr>
+                        <a:t>custom_lineage_creator.exe --</a:t>
+                      </a:r>
+                      <a:r>
+                        <a:rPr lang="en-US" sz="900" b="0" dirty="0" err="1">
+                          <a:solidFill>
+                            <a:schemeClr val="bg2"/>
+                          </a:solidFill>
+                          <a:latin typeface="Courier New" panose="02070309020205020404" pitchFamily="49" charset="0"/>
+                          <a:cs typeface="Courier New" panose="02070309020205020404" pitchFamily="49" charset="0"/>
+                        </a:rPr>
+                        <a:t>default_user</a:t>
+                      </a:r>
+                      <a:r>
+                        <a:rPr lang="en-US" sz="900" b="0" dirty="0">
+                          <a:solidFill>
+                            <a:schemeClr val="bg2"/>
+                          </a:solidFill>
+                          <a:latin typeface="Courier New" panose="02070309020205020404" pitchFamily="49" charset="0"/>
+                          <a:cs typeface="Courier New" panose="02070309020205020404" pitchFamily="49" charset="0"/>
+                        </a:rPr>
+                        <a:t>=</a:t>
+                      </a:r>
+                      <a:r>
+                        <a:rPr lang="en-US" sz="900" b="0" dirty="0" err="1">
+                          <a:solidFill>
+                            <a:schemeClr val="bg2"/>
+                          </a:solidFill>
+                          <a:latin typeface="Courier New" panose="02070309020205020404" pitchFamily="49" charset="0"/>
+                          <a:cs typeface="Courier New" panose="02070309020205020404" pitchFamily="49" charset="0"/>
+                        </a:rPr>
+                        <a:t>shayes_test</a:t>
+                      </a:r>
+                      <a:r>
+                        <a:rPr lang="en-US" sz="900" b="0" dirty="0">
+                          <a:solidFill>
+                            <a:schemeClr val="bg2"/>
+                          </a:solidFill>
+                          <a:latin typeface="Courier New" panose="02070309020205020404" pitchFamily="49" charset="0"/>
+                          <a:cs typeface="Courier New" panose="02070309020205020404" pitchFamily="49" charset="0"/>
+                        </a:rPr>
+                        <a:t> --</a:t>
+                      </a:r>
+                      <a:r>
+                        <a:rPr lang="en-US" sz="900" b="0" dirty="0" err="1">
+                          <a:solidFill>
+                            <a:schemeClr val="bg2"/>
+                          </a:solidFill>
+                          <a:latin typeface="Courier New" panose="02070309020205020404" pitchFamily="49" charset="0"/>
+                          <a:cs typeface="Courier New" panose="02070309020205020404" pitchFamily="49" charset="0"/>
+                        </a:rPr>
+                        <a:t>default_pwd</a:t>
+                      </a:r>
+                      <a:r>
+                        <a:rPr lang="en-US" sz="900" b="0" dirty="0">
+                          <a:solidFill>
+                            <a:schemeClr val="bg2"/>
+                          </a:solidFill>
+                          <a:latin typeface="Courier New" panose="02070309020205020404" pitchFamily="49" charset="0"/>
+                          <a:cs typeface="Courier New" panose="02070309020205020404" pitchFamily="49" charset="0"/>
+                        </a:rPr>
+                        <a:t>="</a:t>
+                      </a:r>
+                      <a:r>
+                        <a:rPr lang="en-US" sz="900" b="0" dirty="0" err="1">
+                          <a:solidFill>
+                            <a:schemeClr val="bg2"/>
+                          </a:solidFill>
+                          <a:latin typeface="Courier New" panose="02070309020205020404" pitchFamily="49" charset="0"/>
+                          <a:cs typeface="Courier New" panose="02070309020205020404" pitchFamily="49" charset="0"/>
+                        </a:rPr>
+                        <a:t>my_password</a:t>
+                      </a:r>
+                      <a:r>
+                        <a:rPr lang="en-US" sz="900" b="0" dirty="0">
+                          <a:solidFill>
+                            <a:schemeClr val="bg2"/>
+                          </a:solidFill>
+                          <a:latin typeface="Courier New" panose="02070309020205020404" pitchFamily="49" charset="0"/>
+                          <a:cs typeface="Courier New" panose="02070309020205020404" pitchFamily="49" charset="0"/>
+                        </a:rPr>
+                        <a:t>" --</a:t>
+                      </a:r>
+                      <a:r>
+                        <a:rPr lang="en-US" sz="900" b="0" dirty="0" err="1">
+                          <a:solidFill>
+                            <a:schemeClr val="bg2"/>
+                          </a:solidFill>
+                          <a:latin typeface="Courier New" panose="02070309020205020404" pitchFamily="49" charset="0"/>
+                          <a:cs typeface="Courier New" panose="02070309020205020404" pitchFamily="49" charset="0"/>
+                        </a:rPr>
+                        <a:t>default_pod</a:t>
+                      </a:r>
+                      <a:r>
+                        <a:rPr lang="en-US" sz="900" b="0" dirty="0">
+                          <a:solidFill>
+                            <a:schemeClr val="bg2"/>
+                          </a:solidFill>
+                          <a:latin typeface="Courier New" panose="02070309020205020404" pitchFamily="49" charset="0"/>
+                          <a:cs typeface="Courier New" panose="02070309020205020404" pitchFamily="49" charset="0"/>
+                        </a:rPr>
+                        <a:t>=dm-us --</a:t>
+                      </a:r>
+                      <a:r>
+                        <a:rPr lang="en-US" sz="900" b="0" dirty="0" err="1">
+                          <a:solidFill>
+                            <a:schemeClr val="bg2"/>
+                          </a:solidFill>
+                          <a:latin typeface="Courier New" panose="02070309020205020404" pitchFamily="49" charset="0"/>
+                          <a:cs typeface="Courier New" panose="02070309020205020404" pitchFamily="49" charset="0"/>
+                        </a:rPr>
+                        <a:t>prompt_for_login_info</a:t>
+                      </a:r>
+                      <a:r>
+                        <a:rPr lang="en-US" sz="900" b="0" dirty="0">
+                          <a:solidFill>
+                            <a:schemeClr val="bg2"/>
+                          </a:solidFill>
+                          <a:latin typeface="Courier New" panose="02070309020205020404" pitchFamily="49" charset="0"/>
+                          <a:cs typeface="Courier New" panose="02070309020205020404" pitchFamily="49" charset="0"/>
+                        </a:rPr>
+                        <a:t>=False </a:t>
+                      </a:r>
+                    </a:p>
+                    <a:p>
+                      <a:r>
+                        <a:rPr lang="en-US" sz="900" b="0" dirty="0">
+                          <a:solidFill>
+                            <a:schemeClr val="bg2"/>
+                          </a:solidFill>
+                          <a:latin typeface="Courier New" panose="02070309020205020404" pitchFamily="49" charset="0"/>
+                          <a:cs typeface="Courier New" panose="02070309020205020404" pitchFamily="49" charset="0"/>
+                        </a:rPr>
+                        <a:t>--</a:t>
+                      </a:r>
+                      <a:r>
+                        <a:rPr lang="en-US" sz="900" b="0" dirty="0" err="1">
+                          <a:solidFill>
+                            <a:schemeClr val="bg2"/>
+                          </a:solidFill>
+                          <a:latin typeface="Courier New" panose="02070309020205020404" pitchFamily="49" charset="0"/>
+                          <a:cs typeface="Courier New" panose="02070309020205020404" pitchFamily="49" charset="0"/>
+                        </a:rPr>
+                        <a:t>config_file</a:t>
+                      </a:r>
+                      <a:r>
+                        <a:rPr lang="en-US" sz="900" b="0" dirty="0">
+                          <a:solidFill>
+                            <a:schemeClr val="bg2"/>
+                          </a:solidFill>
+                          <a:latin typeface="Courier New" panose="02070309020205020404" pitchFamily="49" charset="0"/>
+                          <a:cs typeface="Courier New" panose="02070309020205020404" pitchFamily="49" charset="0"/>
+                        </a:rPr>
+                        <a:t>="config - Lineage (Oracle to SQL).csv" --</a:t>
+                      </a:r>
+                      <a:r>
+                        <a:rPr lang="en-US" sz="900" b="0" dirty="0" err="1">
+                          <a:solidFill>
+                            <a:schemeClr val="bg2"/>
+                          </a:solidFill>
+                          <a:latin typeface="Courier New" panose="02070309020205020404" pitchFamily="49" charset="0"/>
+                          <a:cs typeface="Courier New" panose="02070309020205020404" pitchFamily="49" charset="0"/>
+                        </a:rPr>
+                        <a:t>pause_before_loading</a:t>
+                      </a:r>
+                      <a:r>
+                        <a:rPr lang="en-US" sz="900" b="0" dirty="0">
+                          <a:solidFill>
+                            <a:schemeClr val="bg2"/>
+                          </a:solidFill>
+                          <a:latin typeface="Courier New" panose="02070309020205020404" pitchFamily="49" charset="0"/>
+                          <a:cs typeface="Courier New" panose="02070309020205020404" pitchFamily="49" charset="0"/>
+                        </a:rPr>
+                        <a:t>=False</a:t>
+                      </a:r>
+                    </a:p>
+                    <a:p>
+                      <a:endParaRPr lang="en-US" sz="900" b="0" dirty="0">
+                        <a:solidFill>
+                          <a:schemeClr val="bg2"/>
+                        </a:solidFill>
+                        <a:latin typeface="Courier New" panose="02070309020205020404" pitchFamily="49" charset="0"/>
+                        <a:cs typeface="Courier New" panose="02070309020205020404" pitchFamily="49" charset="0"/>
+                      </a:endParaRPr>
+                    </a:p>
+                  </a:txBody>
+                  <a:tcPr>
+                    <a:solidFill>
+                      <a:schemeClr val="tx1"/>
+                    </a:solidFill>
+                  </a:tcPr>
+                </a:tc>
+                <a:extLst>
+                  <a:ext uri="{0D108BD9-81ED-4DB2-BD59-A6C34878D82A}">
+                    <a16:rowId xmlns:a16="http://schemas.microsoft.com/office/drawing/2014/main" val="3598110298"/>
+                  </a:ext>
+                </a:extLst>
+              </a:tr>
+            </a:tbl>
+          </a:graphicData>
+        </a:graphic>
+      </p:graphicFrame>
+    </p:spTree>
+    <p:extLst>
+      <p:ext uri="{BB962C8B-B14F-4D97-AF65-F5344CB8AC3E}">
+        <p14:creationId xmlns:p14="http://schemas.microsoft.com/office/powerpoint/2010/main" val="1540042599"/>
+      </p:ext>
+    </p:extLst>
+  </p:cSld>
+  <p:clrMapOvr>
+    <a:masterClrMapping/>
+  </p:clrMapOvr>
+  <mc:AlternateContent xmlns:mc="http://schemas.openxmlformats.org/markup-compatibility/2006" xmlns:p14="http://schemas.microsoft.com/office/powerpoint/2010/main">
+    <mc:Choice Requires="p14">
+      <p:transition spd="med" p14:dur="700" advClick="0">
+        <p:fade/>
+      </p:transition>
+    </mc:Choice>
+    <mc:Fallback xmlns="">
+      <p:transition spd="med" advClick="0">
+        <p:fade/>
+      </p:transition>
+    </mc:Fallback>
+  </mc:AlternateContent>
+</p:sld>
+</file>
+
+<file path=ppt/slides/slide13.xml><?xml version="1.0" encoding="utf-8"?>
 <p:sld xmlns:a="http://schemas.openxmlformats.org/drawingml/2006/main" xmlns:r="http://schemas.openxmlformats.org/officeDocument/2006/relationships" xmlns:p="http://schemas.openxmlformats.org/presentationml/2006/main">
   <p:cSld>
     <p:spTree>
@@ -23621,7 +27357,7 @@
 </p:sld>
 </file>
 
-<file path=ppt/slides/slide11.xml><?xml version="1.0" encoding="utf-8"?>
+<file path=ppt/slides/slide14.xml><?xml version="1.0" encoding="utf-8"?>
 <p:sld xmlns:a="http://schemas.openxmlformats.org/drawingml/2006/main" xmlns:r="http://schemas.openxmlformats.org/officeDocument/2006/relationships" xmlns:p="http://schemas.openxmlformats.org/presentationml/2006/main">
   <p:cSld>
     <p:spTree>
@@ -24256,8 +27992,8 @@
         </p:nvSpPr>
         <p:spPr>
           <a:xfrm>
-            <a:off x="1013254" y="1754659"/>
-            <a:ext cx="10490887" cy="4090087"/>
+            <a:off x="834618" y="1157381"/>
+            <a:ext cx="10490887" cy="2257605"/>
           </a:xfrm>
           <a:prstGeom prst="rect">
             <a:avLst/>
@@ -24279,7 +28015,7 @@
               </a:spcAft>
             </a:pPr>
             <a:r>
-              <a:rPr lang="en-US" sz="2100" dirty="0">
+              <a:rPr lang="en-US" dirty="0">
                 <a:latin typeface="Roboto" charset="0"/>
                 <a:ea typeface="Roboto" charset="0"/>
                 <a:cs typeface="Roboto" charset="0"/>
@@ -24299,7 +28035,7 @@
               <a:buChar char="•"/>
             </a:pPr>
             <a:r>
-              <a:rPr lang="en-US" sz="2100" dirty="0">
+              <a:rPr lang="en-US" dirty="0">
                 <a:latin typeface="Roboto" charset="0"/>
                 <a:ea typeface="Roboto" charset="0"/>
                 <a:cs typeface="Roboto" charset="0"/>
@@ -24319,7 +28055,7 @@
               <a:buChar char="•"/>
             </a:pPr>
             <a:r>
-              <a:rPr lang="en-US" sz="2100" dirty="0">
+              <a:rPr lang="en-US" dirty="0">
                 <a:latin typeface="Roboto" charset="0"/>
                 <a:ea typeface="Roboto" charset="0"/>
                 <a:cs typeface="Roboto" charset="0"/>
@@ -24339,7 +28075,7 @@
               <a:buChar char="•"/>
             </a:pPr>
             <a:r>
-              <a:rPr lang="en-US" sz="2100" dirty="0">
+              <a:rPr lang="en-US" dirty="0">
                 <a:latin typeface="Roboto" charset="0"/>
                 <a:ea typeface="Roboto" charset="0"/>
                 <a:cs typeface="Roboto" charset="0"/>
@@ -24349,6 +28085,43 @@
           </a:p>
         </p:txBody>
       </p:sp>
+      <p:pic>
+        <p:nvPicPr>
+          <p:cNvPr id="3" name="Picture 2">
+            <a:extLst>
+              <a:ext uri="{FF2B5EF4-FFF2-40B4-BE49-F238E27FC236}">
+                <a16:creationId xmlns:a16="http://schemas.microsoft.com/office/drawing/2014/main" id="{6CA0F699-5FCE-5EA2-506B-954C450164B1}"/>
+              </a:ext>
+            </a:extLst>
+          </p:cNvPr>
+          <p:cNvPicPr>
+            <a:picLocks noChangeAspect="1"/>
+          </p:cNvPicPr>
+          <p:nvPr/>
+        </p:nvPicPr>
+        <p:blipFill>
+          <a:blip r:embed="rId2"/>
+          <a:stretch>
+            <a:fillRect/>
+          </a:stretch>
+        </p:blipFill>
+        <p:spPr>
+          <a:xfrm>
+            <a:off x="3972169" y="3527338"/>
+            <a:ext cx="7519377" cy="2401732"/>
+          </a:xfrm>
+          <a:prstGeom prst="rect">
+            <a:avLst/>
+          </a:prstGeom>
+          <a:effectLst>
+            <a:outerShdw blurRad="50800" dist="38100" dir="2700000" algn="tl" rotWithShape="0">
+              <a:prstClr val="black">
+                <a:alpha val="40000"/>
+              </a:prstClr>
+            </a:outerShdw>
+          </a:effectLst>
+        </p:spPr>
+      </p:pic>
     </p:spTree>
     <p:extLst>
       <p:ext uri="{BB962C8B-B14F-4D97-AF65-F5344CB8AC3E}">
@@ -25203,7 +28976,7 @@
                 <a:ea typeface="Roboto" charset="0"/>
                 <a:cs typeface="Roboto" charset="0"/>
               </a:rPr>
-              <a:t>Optionally, you can configure the script to create custom sources to act an ETLs to be between the source and target. The script will create a custom ETL source for you and build the lineage. For example:</a:t>
+              <a:t>Optionally, you can configure the script to create custom sources to act an ETL to be between the source and target. The script will create a custom ETL source for you and build the lineage. For example:</a:t>
             </a:r>
           </a:p>
         </p:txBody>
@@ -28172,8 +31945,25 @@
                 <a:ea typeface="Roboto" charset="0"/>
                 <a:cs typeface="Roboto" charset="0"/>
               </a:rPr>
-              <a:t>Execute the script (Either specify the config file name, or you will be prompted):</a:t>
-            </a:r>
+              <a:t>Execute the script (with or without optional parameters):</a:t>
+            </a:r>
+          </a:p>
+          <a:p>
+            <a:pPr marL="342900" indent="-342900">
+              <a:lnSpc>
+                <a:spcPct val="90000"/>
+              </a:lnSpc>
+              <a:spcAft>
+                <a:spcPts val="1000"/>
+              </a:spcAft>
+              <a:buFont typeface="Arial" panose="020B0604020202020204" pitchFamily="34" charset="0"/>
+              <a:buChar char="•"/>
+            </a:pPr>
+            <a:endParaRPr lang="en-US" sz="1600" dirty="0">
+              <a:latin typeface="Roboto" charset="0"/>
+              <a:ea typeface="Roboto" charset="0"/>
+              <a:cs typeface="Roboto" charset="0"/>
+            </a:endParaRPr>
           </a:p>
           <a:p>
             <a:pPr marL="342900" indent="-342900">
@@ -28217,14 +32007,17 @@
               <a:spcAft>
                 <a:spcPts val="1000"/>
               </a:spcAft>
-              <a:buFont typeface="+mj-lt"/>
-              <a:buAutoNum type="arabicPeriod"/>
+              <a:buFont typeface="Arial" panose="020B0604020202020204" pitchFamily="34" charset="0"/>
+              <a:buChar char="•"/>
             </a:pPr>
-            <a:endParaRPr lang="en-US" sz="1600" dirty="0">
-              <a:latin typeface="Roboto" charset="0"/>
-              <a:ea typeface="Roboto" charset="0"/>
-              <a:cs typeface="Roboto" charset="0"/>
-            </a:endParaRPr>
+            <a:r>
+              <a:rPr lang="en-US" sz="1600" dirty="0">
+                <a:latin typeface="Roboto" charset="0"/>
+                <a:ea typeface="Roboto" charset="0"/>
+                <a:cs typeface="Roboto" charset="0"/>
+              </a:rPr>
+              <a:t>Windows exe file is also available, for environments where python is not available.</a:t>
+            </a:r>
           </a:p>
           <a:p>
             <a:pPr marL="342900" indent="-342900">
@@ -28363,7 +32156,7 @@
           <p:nvPr>
             <p:extLst>
               <p:ext uri="{D42A27DB-BD31-4B8C-83A1-F6EECF244321}">
-                <p14:modId xmlns:p14="http://schemas.microsoft.com/office/powerpoint/2010/main" val="179248413"/>
+                <p14:modId xmlns:p14="http://schemas.microsoft.com/office/powerpoint/2010/main" val="310494764"/>
               </p:ext>
             </p:extLst>
           </p:nvPr>
@@ -28425,27 +32218,7 @@
                           <a:latin typeface="Courier New" panose="02070309020205020404" pitchFamily="49" charset="0"/>
                           <a:cs typeface="Courier New" panose="02070309020205020404" pitchFamily="49" charset="0"/>
                         </a:rPr>
-                        <a:t>python custom_lineage_creator.py "</a:t>
-                      </a:r>
-                      <a:r>
-                        <a:rPr lang="en-US" sz="1400" b="0" dirty="0" err="1">
-                          <a:solidFill>
-                            <a:schemeClr val="bg2"/>
-                          </a:solidFill>
-                          <a:latin typeface="Courier New" panose="02070309020205020404" pitchFamily="49" charset="0"/>
-                          <a:cs typeface="Courier New" panose="02070309020205020404" pitchFamily="49" charset="0"/>
-                        </a:rPr>
-                        <a:t>config_My</a:t>
-                      </a:r>
-                      <a:r>
-                        <a:rPr lang="en-US" sz="1400" b="0" dirty="0">
-                          <a:solidFill>
-                            <a:schemeClr val="bg2"/>
-                          </a:solidFill>
-                          <a:latin typeface="Courier New" panose="02070309020205020404" pitchFamily="49" charset="0"/>
-                          <a:cs typeface="Courier New" panose="02070309020205020404" pitchFamily="49" charset="0"/>
-                        </a:rPr>
-                        <a:t> Lineage.csv"</a:t>
+                        <a:t>custom_lineage_creator.exe</a:t>
                       </a:r>
                     </a:p>
                   </a:txBody>
@@ -28480,14 +32253,14 @@
           <p:nvPr>
             <p:extLst>
               <p:ext uri="{D42A27DB-BD31-4B8C-83A1-F6EECF244321}">
-                <p14:modId xmlns:p14="http://schemas.microsoft.com/office/powerpoint/2010/main" val="92486335"/>
+                <p14:modId xmlns:p14="http://schemas.microsoft.com/office/powerpoint/2010/main" val="2000632223"/>
               </p:ext>
             </p:extLst>
           </p:nvPr>
         </p:nvGraphicFramePr>
         <p:xfrm>
-          <a:off x="6094412" y="1071750"/>
-          <a:ext cx="5329514" cy="260557"/>
+          <a:off x="6094411" y="1071750"/>
+          <a:ext cx="5827957" cy="273473"/>
         </p:xfrm>
         <a:graphic>
           <a:graphicData uri="http://schemas.openxmlformats.org/drawingml/2006/table">
@@ -28496,7 +32269,7 @@
                 <a:tableStyleId>{5C22544A-7EE6-4342-B048-85BDC9FD1C3A}</a:tableStyleId>
               </a:tblPr>
               <a:tblGrid>
-                <a:gridCol w="5329514">
+                <a:gridCol w="5827957">
                   <a:extLst>
                     <a:ext uri="{9D8B030D-6E8A-4147-A177-3AD203B41FA5}">
                       <a16:colId xmlns:a16="http://schemas.microsoft.com/office/drawing/2014/main" val="1261491639"/>
@@ -28504,14 +32277,14 @@
                   </a:extLst>
                 </a:gridCol>
               </a:tblGrid>
-              <a:tr h="260557">
+              <a:tr h="273473">
                 <a:tc>
                   <a:txBody>
                     <a:bodyPr/>
                     <a:lstStyle/>
                     <a:p>
                       <a:r>
-                        <a:rPr lang="en-US" sz="1050" b="0" dirty="0">
+                        <a:rPr lang="en-US" sz="900" b="0" dirty="0">
                           <a:solidFill>
                             <a:schemeClr val="bg2"/>
                           </a:solidFill>
@@ -28521,7 +32294,7 @@
                         <a:t>pip install pandas datetime </a:t>
                       </a:r>
                       <a:r>
-                        <a:rPr lang="en-US" sz="1050" b="0" dirty="0" err="1">
+                        <a:rPr lang="en-US" sz="900" b="0" dirty="0" err="1">
                           <a:solidFill>
                             <a:schemeClr val="bg2"/>
                           </a:solidFill>
@@ -28531,7 +32304,7 @@
                         <a:t>openpyxl</a:t>
                       </a:r>
                       <a:r>
-                        <a:rPr lang="en-US" sz="1050" b="0" dirty="0">
+                        <a:rPr lang="en-US" sz="900" b="0" dirty="0">
                           <a:solidFill>
                             <a:schemeClr val="bg2"/>
                           </a:solidFill>
@@ -28541,7 +32314,27 @@
                         <a:t> Requests </a:t>
                       </a:r>
                       <a:r>
-                        <a:rPr lang="en-US" sz="1050" b="0" dirty="0" err="1">
+                        <a:rPr lang="en-US" sz="900" b="0" dirty="0" err="1">
+                          <a:solidFill>
+                            <a:schemeClr val="bg2"/>
+                          </a:solidFill>
+                          <a:latin typeface="Courier New" panose="02070309020205020404" pitchFamily="49" charset="0"/>
+                          <a:cs typeface="Courier New" panose="02070309020205020404" pitchFamily="49" charset="0"/>
+                        </a:rPr>
+                        <a:t>configparser</a:t>
+                      </a:r>
+                      <a:r>
+                        <a:rPr lang="en-US" sz="900" b="0" dirty="0">
+                          <a:solidFill>
+                            <a:schemeClr val="bg2"/>
+                          </a:solidFill>
+                          <a:latin typeface="Courier New" panose="02070309020205020404" pitchFamily="49" charset="0"/>
+                          <a:cs typeface="Courier New" panose="02070309020205020404" pitchFamily="49" charset="0"/>
+                        </a:rPr>
+                        <a:t> </a:t>
+                      </a:r>
+                      <a:r>
+                        <a:rPr lang="en-US" sz="900" b="0" dirty="0" err="1">
                           <a:solidFill>
                             <a:schemeClr val="bg2"/>
                           </a:solidFill>
@@ -28550,13 +32343,16 @@
                         </a:rPr>
                         <a:t>requests_toolbelt</a:t>
                       </a:r>
-                      <a:endParaRPr lang="en-US" sz="1050" b="0" dirty="0">
-                        <a:solidFill>
-                          <a:schemeClr val="bg2"/>
-                        </a:solidFill>
-                        <a:latin typeface="Courier New" panose="02070309020205020404" pitchFamily="49" charset="0"/>
-                        <a:cs typeface="Courier New" panose="02070309020205020404" pitchFamily="49" charset="0"/>
-                      </a:endParaRPr>
+                      <a:r>
+                        <a:rPr lang="en-US" sz="900" b="0" dirty="0">
+                          <a:solidFill>
+                            <a:schemeClr val="bg2"/>
+                          </a:solidFill>
+                          <a:latin typeface="Courier New" panose="02070309020205020404" pitchFamily="49" charset="0"/>
+                          <a:cs typeface="Courier New" panose="02070309020205020404" pitchFamily="49" charset="0"/>
+                        </a:rPr>
+                        <a:t> </a:t>
+                      </a:r>
                     </a:p>
                   </a:txBody>
                   <a:tcPr>
@@ -28590,13 +32386,13 @@
           <p:nvPr>
             <p:extLst>
               <p:ext uri="{D42A27DB-BD31-4B8C-83A1-F6EECF244321}">
-                <p14:modId xmlns:p14="http://schemas.microsoft.com/office/powerpoint/2010/main" val="4194737985"/>
+                <p14:modId xmlns:p14="http://schemas.microsoft.com/office/powerpoint/2010/main" val="1527813053"/>
               </p:ext>
             </p:extLst>
           </p:nvPr>
         </p:nvGraphicFramePr>
         <p:xfrm>
-          <a:off x="5453356" y="3429000"/>
+          <a:off x="5554233" y="3698611"/>
           <a:ext cx="4547430" cy="2225040"/>
         </p:xfrm>
         <a:graphic>

</xml_diff>